<commit_message>
Critical Failure v.0.3 Final
Camera system is fully working and all assets have been organised ready for coding. In addition I have begun programming the code for the oxygen system for my game. Sprites have also been made for the doors and vents.
</commit_message>
<xml_diff>
--- a/Logs/Development Log and Alpha Testing.pptx
+++ b/Logs/Development Log and Alpha Testing.pptx
@@ -10,7 +10,8 @@
     <p:sldId id="259" r:id="rId4"/>
     <p:sldId id="260" r:id="rId5"/>
     <p:sldId id="261" r:id="rId6"/>
-    <p:sldId id="257" r:id="rId7"/>
+    <p:sldId id="262" r:id="rId7"/>
+    <p:sldId id="257" r:id="rId8"/>
   </p:sldIdLst>
   <p:sldSz cx="12192000" cy="6858000"/>
   <p:notesSz cx="6858000" cy="9144000"/>
@@ -455,7 +456,7 @@
           <a:p>
             <a:fld id="{846CE7D5-CF57-46EF-B807-FDD0502418D4}" type="datetimeFigureOut">
               <a:rPr lang="en-GB" smtClean="0"/>
-              <a:t>05/12/2025</a:t>
+              <a:t>12/12/2025</a:t>
             </a:fld>
             <a:endParaRPr lang="en-GB"/>
           </a:p>
@@ -625,7 +626,7 @@
           <a:p>
             <a:fld id="{846CE7D5-CF57-46EF-B807-FDD0502418D4}" type="datetimeFigureOut">
               <a:rPr lang="en-GB" smtClean="0"/>
-              <a:t>05/12/2025</a:t>
+              <a:t>12/12/2025</a:t>
             </a:fld>
             <a:endParaRPr lang="en-GB"/>
           </a:p>
@@ -805,7 +806,7 @@
           <a:p>
             <a:fld id="{846CE7D5-CF57-46EF-B807-FDD0502418D4}" type="datetimeFigureOut">
               <a:rPr lang="en-GB" smtClean="0"/>
-              <a:t>05/12/2025</a:t>
+              <a:t>12/12/2025</a:t>
             </a:fld>
             <a:endParaRPr lang="en-GB"/>
           </a:p>
@@ -975,7 +976,7 @@
           <a:p>
             <a:fld id="{846CE7D5-CF57-46EF-B807-FDD0502418D4}" type="datetimeFigureOut">
               <a:rPr lang="en-GB" smtClean="0"/>
-              <a:t>05/12/2025</a:t>
+              <a:t>12/12/2025</a:t>
             </a:fld>
             <a:endParaRPr lang="en-GB"/>
           </a:p>
@@ -1221,7 +1222,7 @@
           <a:p>
             <a:fld id="{846CE7D5-CF57-46EF-B807-FDD0502418D4}" type="datetimeFigureOut">
               <a:rPr lang="en-GB" smtClean="0"/>
-              <a:t>05/12/2025</a:t>
+              <a:t>12/12/2025</a:t>
             </a:fld>
             <a:endParaRPr lang="en-GB"/>
           </a:p>
@@ -1453,7 +1454,7 @@
           <a:p>
             <a:fld id="{846CE7D5-CF57-46EF-B807-FDD0502418D4}" type="datetimeFigureOut">
               <a:rPr lang="en-GB" smtClean="0"/>
-              <a:t>05/12/2025</a:t>
+              <a:t>12/12/2025</a:t>
             </a:fld>
             <a:endParaRPr lang="en-GB"/>
           </a:p>
@@ -1820,7 +1821,7 @@
           <a:p>
             <a:fld id="{846CE7D5-CF57-46EF-B807-FDD0502418D4}" type="datetimeFigureOut">
               <a:rPr lang="en-GB" smtClean="0"/>
-              <a:t>05/12/2025</a:t>
+              <a:t>12/12/2025</a:t>
             </a:fld>
             <a:endParaRPr lang="en-GB"/>
           </a:p>
@@ -1938,7 +1939,7 @@
           <a:p>
             <a:fld id="{846CE7D5-CF57-46EF-B807-FDD0502418D4}" type="datetimeFigureOut">
               <a:rPr lang="en-GB" smtClean="0"/>
-              <a:t>05/12/2025</a:t>
+              <a:t>12/12/2025</a:t>
             </a:fld>
             <a:endParaRPr lang="en-GB"/>
           </a:p>
@@ -2033,7 +2034,7 @@
           <a:p>
             <a:fld id="{846CE7D5-CF57-46EF-B807-FDD0502418D4}" type="datetimeFigureOut">
               <a:rPr lang="en-GB" smtClean="0"/>
-              <a:t>05/12/2025</a:t>
+              <a:t>12/12/2025</a:t>
             </a:fld>
             <a:endParaRPr lang="en-GB"/>
           </a:p>
@@ -2310,7 +2311,7 @@
           <a:p>
             <a:fld id="{846CE7D5-CF57-46EF-B807-FDD0502418D4}" type="datetimeFigureOut">
               <a:rPr lang="en-GB" smtClean="0"/>
-              <a:t>05/12/2025</a:t>
+              <a:t>12/12/2025</a:t>
             </a:fld>
             <a:endParaRPr lang="en-GB"/>
           </a:p>
@@ -2567,7 +2568,7 @@
           <a:p>
             <a:fld id="{846CE7D5-CF57-46EF-B807-FDD0502418D4}" type="datetimeFigureOut">
               <a:rPr lang="en-GB" smtClean="0"/>
-              <a:t>05/12/2025</a:t>
+              <a:t>12/12/2025</a:t>
             </a:fld>
             <a:endParaRPr lang="en-GB"/>
           </a:p>
@@ -2780,7 +2781,7 @@
           <a:p>
             <a:fld id="{846CE7D5-CF57-46EF-B807-FDD0502418D4}" type="datetimeFigureOut">
               <a:rPr lang="en-GB" smtClean="0"/>
-              <a:t>05/12/2025</a:t>
+              <a:t>12/12/2025</a:t>
             </a:fld>
             <a:endParaRPr lang="en-GB"/>
           </a:p>
@@ -5359,6 +5360,304 @@
   <p:cSld>
     <p:spTree>
       <p:nvGrpSpPr>
+        <p:cNvPr id="1" name="">
+          <a:extLst>
+            <a:ext uri="{FF2B5EF4-FFF2-40B4-BE49-F238E27FC236}">
+              <a16:creationId xmlns:a16="http://schemas.microsoft.com/office/drawing/2014/main" id="{A30F62DB-3EC3-3B41-03C8-0A1E51E32683}"/>
+            </a:ext>
+          </a:extLst>
+        </p:cNvPr>
+        <p:cNvGrpSpPr/>
+        <p:nvPr/>
+      </p:nvGrpSpPr>
+      <p:grpSpPr>
+        <a:xfrm>
+          <a:off x="0" y="0"/>
+          <a:ext cx="0" cy="0"/>
+          <a:chOff x="0" y="0"/>
+          <a:chExt cx="0" cy="0"/>
+        </a:xfrm>
+      </p:grpSpPr>
+      <p:sp>
+        <p:nvSpPr>
+          <p:cNvPr id="4" name="TextBox 3">
+            <a:extLst>
+              <a:ext uri="{FF2B5EF4-FFF2-40B4-BE49-F238E27FC236}">
+                <a16:creationId xmlns:a16="http://schemas.microsoft.com/office/drawing/2014/main" id="{F11C257E-74C8-A3AC-8D69-29E9A23F0848}"/>
+              </a:ext>
+            </a:extLst>
+          </p:cNvPr>
+          <p:cNvSpPr txBox="1"/>
+          <p:nvPr/>
+        </p:nvSpPr>
+        <p:spPr>
+          <a:xfrm>
+            <a:off x="7763992" y="90121"/>
+            <a:ext cx="1809641" cy="338554"/>
+          </a:xfrm>
+          <a:prstGeom prst="rect">
+            <a:avLst/>
+          </a:prstGeom>
+          <a:noFill/>
+          <a:ln>
+            <a:solidFill>
+              <a:schemeClr val="tx1"/>
+            </a:solidFill>
+          </a:ln>
+        </p:spPr>
+        <p:txBody>
+          <a:bodyPr rot="0" spcFirstLastPara="0" vertOverflow="overflow" horzOverflow="overflow" vert="horz" wrap="square" lIns="91440" tIns="45720" rIns="91440" bIns="45720" numCol="1" spcCol="0" rtlCol="0" fromWordArt="0" anchor="t" anchorCtr="0" forceAA="0" compatLnSpc="1">
+            <a:prstTxWarp prst="textNoShape">
+              <a:avLst/>
+            </a:prstTxWarp>
+            <a:spAutoFit/>
+          </a:bodyPr>
+          <a:lstStyle/>
+          <a:p>
+            <a:r>
+              <a:rPr lang="en-GB" sz="1600" dirty="0"/>
+              <a:t>Date – 12/12/2025</a:t>
+            </a:r>
+          </a:p>
+        </p:txBody>
+      </p:sp>
+      <p:sp>
+        <p:nvSpPr>
+          <p:cNvPr id="2" name="TextBox 1">
+            <a:extLst>
+              <a:ext uri="{FF2B5EF4-FFF2-40B4-BE49-F238E27FC236}">
+                <a16:creationId xmlns:a16="http://schemas.microsoft.com/office/drawing/2014/main" id="{902949C2-E2B9-D83D-8899-C29A3FA172F8}"/>
+              </a:ext>
+            </a:extLst>
+          </p:cNvPr>
+          <p:cNvSpPr txBox="1"/>
+          <p:nvPr/>
+        </p:nvSpPr>
+        <p:spPr>
+          <a:xfrm>
+            <a:off x="5651845" y="90120"/>
+            <a:ext cx="1959856" cy="338554"/>
+          </a:xfrm>
+          <a:prstGeom prst="rect">
+            <a:avLst/>
+          </a:prstGeom>
+          <a:noFill/>
+          <a:ln>
+            <a:solidFill>
+              <a:schemeClr val="tx1"/>
+            </a:solidFill>
+          </a:ln>
+        </p:spPr>
+        <p:txBody>
+          <a:bodyPr rot="0" spcFirstLastPara="0" vertOverflow="overflow" horzOverflow="overflow" vert="horz" wrap="square" lIns="91440" tIns="45720" rIns="91440" bIns="45720" numCol="1" spcCol="0" rtlCol="0" fromWordArt="0" anchor="t" anchorCtr="0" forceAA="0" compatLnSpc="1">
+            <a:prstTxWarp prst="textNoShape">
+              <a:avLst/>
+            </a:prstTxWarp>
+            <a:spAutoFit/>
+          </a:bodyPr>
+          <a:lstStyle/>
+          <a:p>
+            <a:r>
+              <a:rPr lang="en-GB" sz="1600" dirty="0"/>
+              <a:t>Game Build V.0.3</a:t>
+            </a:r>
+          </a:p>
+        </p:txBody>
+      </p:sp>
+      <p:sp>
+        <p:nvSpPr>
+          <p:cNvPr id="3" name="TextBox 2">
+            <a:extLst>
+              <a:ext uri="{FF2B5EF4-FFF2-40B4-BE49-F238E27FC236}">
+                <a16:creationId xmlns:a16="http://schemas.microsoft.com/office/drawing/2014/main" id="{9E000D2B-0307-02E8-BECB-1750F323F22B}"/>
+              </a:ext>
+            </a:extLst>
+          </p:cNvPr>
+          <p:cNvSpPr txBox="1"/>
+          <p:nvPr/>
+        </p:nvSpPr>
+        <p:spPr>
+          <a:xfrm>
+            <a:off x="5642854" y="578678"/>
+            <a:ext cx="3926490" cy="1815882"/>
+          </a:xfrm>
+          <a:prstGeom prst="rect">
+            <a:avLst/>
+          </a:prstGeom>
+          <a:noFill/>
+          <a:ln>
+            <a:solidFill>
+              <a:schemeClr val="tx1"/>
+            </a:solidFill>
+          </a:ln>
+        </p:spPr>
+        <p:txBody>
+          <a:bodyPr rot="0" spcFirstLastPara="0" vertOverflow="overflow" horzOverflow="overflow" vert="horz" wrap="square" lIns="91440" tIns="45720" rIns="91440" bIns="45720" numCol="1" spcCol="0" rtlCol="0" fromWordArt="0" anchor="t" anchorCtr="0" forceAA="0" compatLnSpc="1">
+            <a:prstTxWarp prst="textNoShape">
+              <a:avLst/>
+            </a:prstTxWarp>
+            <a:spAutoFit/>
+          </a:bodyPr>
+          <a:lstStyle/>
+          <a:p>
+            <a:r>
+              <a:rPr lang="en-GB" sz="1600" dirty="0"/>
+              <a:t>Cameras are now fully function, with them correctly going to their respective zones as well as the camera Hud.</a:t>
+            </a:r>
+          </a:p>
+          <a:p>
+            <a:endParaRPr lang="en-GB" sz="1600" dirty="0"/>
+          </a:p>
+          <a:p>
+            <a:r>
+              <a:rPr lang="en-GB" sz="1600" dirty="0"/>
+              <a:t>I have made up close vent/door buttons in addition to the vents actual sprite which is a landscaped version of the doors.</a:t>
+            </a:r>
+          </a:p>
+        </p:txBody>
+      </p:sp>
+      <p:sp>
+        <p:nvSpPr>
+          <p:cNvPr id="6" name="TextBox 5">
+            <a:extLst>
+              <a:ext uri="{FF2B5EF4-FFF2-40B4-BE49-F238E27FC236}">
+                <a16:creationId xmlns:a16="http://schemas.microsoft.com/office/drawing/2014/main" id="{525691B3-5070-833F-136D-FE02B5A0A477}"/>
+              </a:ext>
+            </a:extLst>
+          </p:cNvPr>
+          <p:cNvSpPr txBox="1"/>
+          <p:nvPr/>
+        </p:nvSpPr>
+        <p:spPr>
+          <a:xfrm>
+            <a:off x="9642445" y="54237"/>
+            <a:ext cx="2438400" cy="2677656"/>
+          </a:xfrm>
+          <a:prstGeom prst="rect">
+            <a:avLst/>
+          </a:prstGeom>
+          <a:noFill/>
+          <a:ln>
+            <a:solidFill>
+              <a:schemeClr val="tx1"/>
+            </a:solidFill>
+          </a:ln>
+        </p:spPr>
+        <p:txBody>
+          <a:bodyPr rot="0" spcFirstLastPara="0" vertOverflow="overflow" horzOverflow="overflow" vert="horz" wrap="square" lIns="91440" tIns="45720" rIns="91440" bIns="45720" numCol="1" spcCol="0" rtlCol="0" fromWordArt="0" anchor="t" anchorCtr="0" forceAA="0" compatLnSpc="1">
+            <a:prstTxWarp prst="textNoShape">
+              <a:avLst/>
+            </a:prstTxWarp>
+            <a:spAutoFit/>
+          </a:bodyPr>
+          <a:lstStyle/>
+          <a:p>
+            <a:r>
+              <a:rPr lang="en-GB" sz="1200" dirty="0"/>
+              <a:t>What to Do next Session.</a:t>
+            </a:r>
+          </a:p>
+          <a:p>
+            <a:endParaRPr lang="en-GB" sz="1200" dirty="0"/>
+          </a:p>
+          <a:p>
+            <a:r>
+              <a:rPr lang="en-GB" sz="1200" dirty="0"/>
+              <a:t>Create SFX and add Soundtrack.</a:t>
+            </a:r>
+          </a:p>
+          <a:p>
+            <a:endParaRPr lang="en-GB" sz="1200" dirty="0"/>
+          </a:p>
+          <a:p>
+            <a:r>
+              <a:rPr lang="en-GB" sz="1200" dirty="0"/>
+              <a:t>Design the Prototype.</a:t>
+            </a:r>
+          </a:p>
+          <a:p>
+            <a:endParaRPr lang="en-GB" sz="1200" dirty="0"/>
+          </a:p>
+          <a:p>
+            <a:r>
+              <a:rPr lang="en-GB" sz="1200" dirty="0"/>
+              <a:t>Finish Oxygen System.</a:t>
+            </a:r>
+          </a:p>
+          <a:p>
+            <a:endParaRPr lang="en-GB" sz="1200" dirty="0"/>
+          </a:p>
+          <a:p>
+            <a:r>
+              <a:rPr lang="en-GB" sz="1200" dirty="0"/>
+              <a:t>Have Doors open and close.</a:t>
+            </a:r>
+          </a:p>
+          <a:p>
+            <a:endParaRPr lang="en-GB" sz="1200" dirty="0"/>
+          </a:p>
+          <a:p>
+            <a:endParaRPr lang="en-GB" sz="1200" dirty="0"/>
+          </a:p>
+          <a:p>
+            <a:endParaRPr lang="en-GB" sz="1200" dirty="0"/>
+          </a:p>
+          <a:p>
+            <a:endParaRPr lang="en-GB" sz="1200" dirty="0"/>
+          </a:p>
+          <a:p>
+            <a:endParaRPr lang="en-GB" sz="1200" dirty="0"/>
+          </a:p>
+        </p:txBody>
+      </p:sp>
+      <p:pic>
+        <p:nvPicPr>
+          <p:cNvPr id="8" name="Picture 7">
+            <a:extLst>
+              <a:ext uri="{FF2B5EF4-FFF2-40B4-BE49-F238E27FC236}">
+                <a16:creationId xmlns:a16="http://schemas.microsoft.com/office/drawing/2014/main" id="{56107CA3-D414-0D54-F60B-B2C50A404372}"/>
+              </a:ext>
+            </a:extLst>
+          </p:cNvPr>
+          <p:cNvPicPr>
+            <a:picLocks noChangeAspect="1"/>
+          </p:cNvPicPr>
+          <p:nvPr/>
+        </p:nvPicPr>
+        <p:blipFill>
+          <a:blip r:embed="rId2"/>
+          <a:stretch>
+            <a:fillRect/>
+          </a:stretch>
+        </p:blipFill>
+        <p:spPr>
+          <a:xfrm>
+            <a:off x="111155" y="54237"/>
+            <a:ext cx="3715268" cy="5058481"/>
+          </a:xfrm>
+          <a:prstGeom prst="rect">
+            <a:avLst/>
+          </a:prstGeom>
+        </p:spPr>
+      </p:pic>
+    </p:spTree>
+    <p:extLst>
+      <p:ext uri="{BB962C8B-B14F-4D97-AF65-F5344CB8AC3E}">
+        <p14:creationId xmlns:p14="http://schemas.microsoft.com/office/powerpoint/2010/main" val="1932514878"/>
+      </p:ext>
+    </p:extLst>
+  </p:cSld>
+  <p:clrMapOvr>
+    <a:masterClrMapping/>
+  </p:clrMapOvr>
+</p:sld>
+</file>
+
+<file path=ppt/slides/slide7.xml><?xml version="1.0" encoding="utf-8"?>
+<p:sld xmlns:a="http://schemas.openxmlformats.org/drawingml/2006/main" xmlns:r="http://schemas.openxmlformats.org/officeDocument/2006/relationships" xmlns:p="http://schemas.openxmlformats.org/presentationml/2006/main">
+  <p:cSld>
+    <p:spTree>
+      <p:nvGrpSpPr>
         <p:cNvPr id="1" name=""/>
         <p:cNvGrpSpPr/>
         <p:nvPr/>
@@ -5386,14 +5685,14 @@
           <p:nvPr>
             <p:extLst>
               <p:ext uri="{D42A27DB-BD31-4B8C-83A1-F6EECF244321}">
-                <p14:modId xmlns:p14="http://schemas.microsoft.com/office/powerpoint/2010/main" val="830270156"/>
+                <p14:modId xmlns:p14="http://schemas.microsoft.com/office/powerpoint/2010/main" val="3129869145"/>
               </p:ext>
             </p:extLst>
           </p:nvPr>
         </p:nvGraphicFramePr>
         <p:xfrm>
           <a:off x="97155" y="84201"/>
-          <a:ext cx="11988463" cy="5033598"/>
+          <a:ext cx="11988463" cy="6374718"/>
         </p:xfrm>
         <a:graphic>
           <a:graphicData uri="http://schemas.openxmlformats.org/drawingml/2006/table">
@@ -5653,8 +5952,20 @@
                     <a:lstStyle/>
                     <a:p>
                       <a:r>
+                        <a:rPr lang="en-GB" sz="1100" dirty="0" err="1"/>
+                        <a:t>obj_camera</a:t>
+                      </a:r>
+                      <a:r>
                         <a:rPr lang="en-GB" sz="1100" dirty="0"/>
-                        <a:t>obj_camera, obj_player, </a:t>
+                        <a:t>, </a:t>
+                      </a:r>
+                      <a:r>
+                        <a:rPr lang="en-GB" sz="1100" dirty="0" err="1"/>
+                        <a:t>scr_change_camera</a:t>
+                      </a:r>
+                      <a:r>
+                        <a:rPr lang="en-GB" sz="1100" dirty="0"/>
+                        <a:t>, </a:t>
                       </a:r>
                       <a:r>
                         <a:rPr lang="en-GB" sz="1100" dirty="0" err="1"/>
@@ -5662,7 +5973,15 @@
                       </a:r>
                       <a:r>
                         <a:rPr lang="en-GB" sz="1100" dirty="0"/>
-                        <a:t>.</a:t>
+                        <a:t>, </a:t>
+                      </a:r>
+                      <a:r>
+                        <a:rPr lang="en-GB" sz="1100" dirty="0" err="1"/>
+                        <a:t>obj_cam_zone</a:t>
+                      </a:r>
+                      <a:r>
+                        <a:rPr lang="en-GB" sz="1100" dirty="0"/>
+                        <a:t> 1-8, Close Up scene zones.</a:t>
                       </a:r>
                     </a:p>
                   </a:txBody>
@@ -5675,15 +5994,7 @@
                     <a:p>
                       <a:r>
                         <a:rPr lang="en-GB" sz="1100" dirty="0"/>
-                        <a:t>When the game runs, rm_start_up_up_screen_init with object camera goes to the next room </a:t>
-                      </a:r>
-                      <a:r>
-                        <a:rPr lang="en-GB" sz="1100" dirty="0" err="1"/>
-                        <a:t>rm_office</a:t>
-                      </a:r>
-                      <a:r>
-                        <a:rPr lang="en-GB" sz="1100" dirty="0"/>
-                        <a:t> at viewport 0.</a:t>
+                        <a:t>When the game runs, the camera goes to the office zone from there the player can click on the doors to move to the close up door zones. In addition when Pressing Key C, they change camera view to the Camera Hud Zone where they can interact with the obj_cam_1-8 to change cameras. They can press C again to return to camera Hud or press V to return to office.</a:t>
                       </a:r>
                     </a:p>
                   </a:txBody>
@@ -5696,15 +6007,7 @@
                     <a:p>
                       <a:r>
                         <a:rPr lang="en-GB" sz="1100" dirty="0"/>
-                        <a:t>When game starts, I am not taken to the next room. In addition if I try using the camera object in the </a:t>
-                      </a:r>
-                      <a:r>
-                        <a:rPr lang="en-GB" sz="1100" dirty="0" err="1"/>
-                        <a:t>rm_office</a:t>
-                      </a:r>
-                      <a:r>
-                        <a:rPr lang="en-GB" sz="1100" dirty="0"/>
-                        <a:t>, the camera doesn’t show viewport 0.</a:t>
+                        <a:t>When the game starts I am taken to the office zone and are able to interact with the buttons and they all go to their respective zones and all keys function properly.</a:t>
                       </a:r>
                     </a:p>
                   </a:txBody>
@@ -5715,7 +6018,19 @@
                     <a:bodyPr/>
                     <a:lstStyle/>
                     <a:p>
+                      <a:r>
+                        <a:rPr lang="en-GB" sz="1100" dirty="0"/>
+                        <a:t>During practise with this code I did have to correct the co-ordinates due to them not being accurate, in addition I had issues due to my background being off which caused Duplicates of the zones to appear.</a:t>
+                      </a:r>
+                    </a:p>
+                    <a:p>
                       <a:endParaRPr lang="en-GB" sz="1100" dirty="0"/>
+                    </a:p>
+                    <a:p>
+                      <a:r>
+                        <a:rPr lang="en-GB" sz="1100" dirty="0"/>
+                        <a:t>Both were fixed by changing the Co-ordinates and turning on background.</a:t>
+                      </a:r>
                     </a:p>
                   </a:txBody>
                   <a:tcPr/>

</xml_diff>

<commit_message>
Critical Failure V.0.6.1 Test Build
Testing Gwibers code and trying to add Gwibers behaviour in repsosne to door and his jump scare
</commit_message>
<xml_diff>
--- a/Logs/Development Log and Alpha Testing.pptx
+++ b/Logs/Development Log and Alpha Testing.pptx
@@ -17,9 +17,10 @@
     <p:sldId id="266" r:id="rId11"/>
     <p:sldId id="268" r:id="rId12"/>
     <p:sldId id="269" r:id="rId13"/>
-    <p:sldId id="257" r:id="rId14"/>
-    <p:sldId id="267" r:id="rId15"/>
-    <p:sldId id="270" r:id="rId16"/>
+    <p:sldId id="271" r:id="rId14"/>
+    <p:sldId id="257" r:id="rId15"/>
+    <p:sldId id="267" r:id="rId16"/>
+    <p:sldId id="270" r:id="rId17"/>
   </p:sldIdLst>
   <p:sldSz cx="12192000" cy="6858000"/>
   <p:notesSz cx="6858000" cy="9144000"/>
@@ -3693,23 +3694,7 @@
           <a:p>
             <a:r>
               <a:rPr lang="en-GB" sz="1400" dirty="0"/>
-              <a:t>The code now makes it so that each zone </a:t>
-            </a:r>
-            <a:r>
-              <a:rPr lang="en-GB" sz="1400" dirty="0" err="1"/>
-              <a:t>Gwiber</a:t>
-            </a:r>
-            <a:r>
-              <a:rPr lang="en-GB" sz="1400" dirty="0"/>
-              <a:t> gives him options of which zone it can move to based on certain variables. More specifically zone 2 where </a:t>
-            </a:r>
-            <a:r>
-              <a:rPr lang="en-GB" sz="1400" dirty="0" err="1"/>
-              <a:t>Gwiber</a:t>
-            </a:r>
-            <a:r>
-              <a:rPr lang="en-GB" sz="1400" dirty="0"/>
-              <a:t> can only go to zone 0 IF the door is open.</a:t>
+              <a:t>The code now makes it so that each zone Gwiber gives him options of which zone it can move to based on certain variables. More specifically zone 2 where Gwiber can only go to zone 0 IF the door is open.</a:t>
             </a:r>
           </a:p>
         </p:txBody>
@@ -3885,15 +3870,7 @@
           <a:p>
             <a:r>
               <a:rPr lang="en-GB" sz="1400" dirty="0"/>
-              <a:t>Also, this code can allow me to restrict their movement. Example, </a:t>
-            </a:r>
-            <a:r>
-              <a:rPr lang="en-GB" sz="1400" dirty="0" err="1"/>
-              <a:t>Gwiber</a:t>
-            </a:r>
-            <a:r>
-              <a:rPr lang="en-GB" sz="1400" dirty="0"/>
-              <a:t> can only move throughout the left side zones.</a:t>
+              <a:t>Also, this code can allow me to restrict their movement. Example, Gwiber can only move throughout the left side zones.</a:t>
             </a:r>
           </a:p>
           <a:p>
@@ -4063,28 +4040,8 @@
           <a:lstStyle/>
           <a:p>
             <a:r>
-              <a:rPr lang="en-GB" sz="1200" dirty="0" err="1"/>
-              <a:t>Gwiber</a:t>
-            </a:r>
-            <a:r>
               <a:rPr lang="en-GB" sz="1200" dirty="0"/>
-              <a:t> officially moves and no longer requires an alarm. </a:t>
-            </a:r>
-            <a:r>
-              <a:rPr lang="en-GB" sz="1200" dirty="0" err="1"/>
-              <a:t>Gwiber</a:t>
-            </a:r>
-            <a:r>
-              <a:rPr lang="en-GB" sz="1200" dirty="0"/>
-              <a:t> reacts and calculates whether it is being watched and what zone it can move to. </a:t>
-            </a:r>
-            <a:r>
-              <a:rPr lang="en-GB" sz="1200" dirty="0" err="1"/>
-              <a:t>Gwiber</a:t>
-            </a:r>
-            <a:r>
-              <a:rPr lang="en-GB" sz="1200" dirty="0"/>
-              <a:t> also reacts to the doors state, knowing when the door is or is not open.</a:t>
+              <a:t>Gwiber officially moves and no longer requires an alarm. Gwiber reacts and calculates whether it is being watched and what zone it can move to. Gwiber also reacts to the doors state, knowing when the door is or is not open.</a:t>
             </a:r>
           </a:p>
           <a:p>
@@ -4106,15 +4063,7 @@
           <a:p>
             <a:r>
               <a:rPr lang="en-GB" sz="1200" dirty="0"/>
-              <a:t>The key thing with this enemies, code is the lack of alarms. Instead of them I used Move timers. The move timers tell </a:t>
-            </a:r>
-            <a:r>
-              <a:rPr lang="en-GB" sz="1200" dirty="0" err="1"/>
-              <a:t>Gwiber</a:t>
-            </a:r>
-            <a:r>
-              <a:rPr lang="en-GB" sz="1200" dirty="0"/>
-              <a:t> the time until it should move. This also worked perfectly with the </a:t>
+              <a:t>The key thing with this enemies, code is the lack of alarms. Instead of them I used Move timers. The move timers tell Gwiber the time until it should move. This also worked perfectly with the </a:t>
             </a:r>
             <a:r>
               <a:rPr lang="en-GB" sz="1200" dirty="0" err="1"/>
@@ -4139,15 +4088,7 @@
           <a:p>
             <a:r>
               <a:rPr lang="en-GB" sz="1200" dirty="0"/>
-              <a:t>The best part is that </a:t>
-            </a:r>
-            <a:r>
-              <a:rPr lang="en-GB" sz="1200" dirty="0" err="1"/>
-              <a:t>Gwiber</a:t>
-            </a:r>
-            <a:r>
-              <a:rPr lang="en-GB" sz="1200" dirty="0"/>
-              <a:t> has basically 1% relation to </a:t>
+              <a:t>The best part is that Gwiber has basically 1% relation to </a:t>
             </a:r>
             <a:r>
               <a:rPr lang="en-GB" sz="1200" dirty="0" err="1"/>
@@ -4215,15 +4156,7 @@
             </a:r>
             <a:r>
               <a:rPr lang="en-GB" sz="1050" dirty="0"/>
-              <a:t> code. </a:t>
-            </a:r>
-            <a:r>
-              <a:rPr lang="en-GB" sz="1050" dirty="0" err="1"/>
-              <a:t>Gwiber</a:t>
-            </a:r>
-            <a:r>
-              <a:rPr lang="en-GB" sz="1050" dirty="0"/>
-              <a:t> might be moving but he doesn’t have much in terms of behaviour such as delayed movement in zone 0 before jump scare, sounds and speed.</a:t>
+              <a:t> code. Gwiber might be moving but he doesn’t have much in terms of behaviour such as delayed movement in zone 0 before jump scare, sounds and speed.</a:t>
             </a:r>
           </a:p>
           <a:p>
@@ -4699,15 +4632,7 @@
             </a:r>
             <a:r>
               <a:rPr lang="en-GB" sz="1050" dirty="0"/>
-              <a:t> code. </a:t>
-            </a:r>
-            <a:r>
-              <a:rPr lang="en-GB" sz="1050" dirty="0" err="1"/>
-              <a:t>Gwiber</a:t>
-            </a:r>
-            <a:r>
-              <a:rPr lang="en-GB" sz="1050" dirty="0"/>
-              <a:t> might be moving but he doesn’t have much in terms of behaviour such as delayed movement in zone 0 before jump scare, sounds and speed.</a:t>
+              <a:t> code. Gwiber might be moving but he doesn’t have much in terms of behaviour such as delayed movement in zone 0 before jump scare, sounds and speed.</a:t>
             </a:r>
           </a:p>
           <a:p>
@@ -4864,16 +4789,42 @@
           <a:lstStyle/>
           <a:p>
             <a:r>
-              <a:rPr lang="en-GB" sz="1400" dirty="0"/>
-              <a:t>I</a:t>
-            </a:r>
-            <a:r>
               <a:rPr lang="en-GB" dirty="0"/>
               <a:t> </a:t>
             </a:r>
           </a:p>
         </p:txBody>
       </p:sp>
+      <p:pic>
+        <p:nvPicPr>
+          <p:cNvPr id="8" name="Picture 7" descr="A screenshot of a computer screen&#10;&#10;AI-generated content may be incorrect.">
+            <a:extLst>
+              <a:ext uri="{FF2B5EF4-FFF2-40B4-BE49-F238E27FC236}">
+                <a16:creationId xmlns:a16="http://schemas.microsoft.com/office/drawing/2014/main" id="{B7A6EDD6-433A-1B4B-50AF-8D3B71F79BF1}"/>
+              </a:ext>
+            </a:extLst>
+          </p:cNvPr>
+          <p:cNvPicPr>
+            <a:picLocks noChangeAspect="1"/>
+          </p:cNvPicPr>
+          <p:nvPr/>
+        </p:nvPicPr>
+        <p:blipFill>
+          <a:blip r:embed="rId6"/>
+          <a:stretch>
+            <a:fillRect/>
+          </a:stretch>
+        </p:blipFill>
+        <p:spPr>
+          <a:xfrm>
+            <a:off x="5677991" y="2447811"/>
+            <a:ext cx="2114845" cy="809738"/>
+          </a:xfrm>
+          <a:prstGeom prst="rect">
+            <a:avLst/>
+          </a:prstGeom>
+        </p:spPr>
+      </p:pic>
     </p:spTree>
     <p:extLst>
       <p:ext uri="{BB962C8B-B14F-4D97-AF65-F5344CB8AC3E}">
@@ -4888,6 +4839,293 @@
 </file>
 
 <file path=ppt/slides/slide13.xml><?xml version="1.0" encoding="utf-8"?>
+<p:sld xmlns:a="http://schemas.openxmlformats.org/drawingml/2006/main" xmlns:r="http://schemas.openxmlformats.org/officeDocument/2006/relationships" xmlns:p="http://schemas.openxmlformats.org/presentationml/2006/main">
+  <p:cSld>
+    <p:spTree>
+      <p:nvGrpSpPr>
+        <p:cNvPr id="1" name="">
+          <a:extLst>
+            <a:ext uri="{FF2B5EF4-FFF2-40B4-BE49-F238E27FC236}">
+              <a16:creationId xmlns:a16="http://schemas.microsoft.com/office/drawing/2014/main" id="{72EC2B3A-BEBF-F44B-2678-AD12220052B0}"/>
+            </a:ext>
+          </a:extLst>
+        </p:cNvPr>
+        <p:cNvGrpSpPr/>
+        <p:nvPr/>
+      </p:nvGrpSpPr>
+      <p:grpSpPr>
+        <a:xfrm>
+          <a:off x="0" y="0"/>
+          <a:ext cx="0" cy="0"/>
+          <a:chOff x="0" y="0"/>
+          <a:chExt cx="0" cy="0"/>
+        </a:xfrm>
+      </p:grpSpPr>
+      <p:sp>
+        <p:nvSpPr>
+          <p:cNvPr id="4" name="TextBox 3">
+            <a:extLst>
+              <a:ext uri="{FF2B5EF4-FFF2-40B4-BE49-F238E27FC236}">
+                <a16:creationId xmlns:a16="http://schemas.microsoft.com/office/drawing/2014/main" id="{3CBB28B7-F361-995F-947D-001C40ECDFBF}"/>
+              </a:ext>
+            </a:extLst>
+          </p:cNvPr>
+          <p:cNvSpPr txBox="1"/>
+          <p:nvPr/>
+        </p:nvSpPr>
+        <p:spPr>
+          <a:xfrm>
+            <a:off x="7894620" y="121250"/>
+            <a:ext cx="1809641" cy="338554"/>
+          </a:xfrm>
+          <a:prstGeom prst="rect">
+            <a:avLst/>
+          </a:prstGeom>
+          <a:noFill/>
+          <a:ln>
+            <a:solidFill>
+              <a:schemeClr val="tx1"/>
+            </a:solidFill>
+          </a:ln>
+        </p:spPr>
+        <p:txBody>
+          <a:bodyPr rot="0" spcFirstLastPara="0" vertOverflow="overflow" horzOverflow="overflow" vert="horz" wrap="square" lIns="91440" tIns="45720" rIns="91440" bIns="45720" numCol="1" spcCol="0" rtlCol="0" fromWordArt="0" anchor="t" anchorCtr="0" forceAA="0" compatLnSpc="1">
+            <a:prstTxWarp prst="textNoShape">
+              <a:avLst/>
+            </a:prstTxWarp>
+            <a:spAutoFit/>
+          </a:bodyPr>
+          <a:lstStyle/>
+          <a:p>
+            <a:r>
+              <a:rPr lang="en-GB" sz="1600" dirty="0"/>
+              <a:t>Date – 16/01/2026</a:t>
+            </a:r>
+          </a:p>
+        </p:txBody>
+      </p:sp>
+      <p:sp>
+        <p:nvSpPr>
+          <p:cNvPr id="2" name="TextBox 1">
+            <a:extLst>
+              <a:ext uri="{FF2B5EF4-FFF2-40B4-BE49-F238E27FC236}">
+                <a16:creationId xmlns:a16="http://schemas.microsoft.com/office/drawing/2014/main" id="{AA92E289-B709-C849-297B-8FC5D01C2DD2}"/>
+              </a:ext>
+            </a:extLst>
+          </p:cNvPr>
+          <p:cNvSpPr txBox="1"/>
+          <p:nvPr/>
+        </p:nvSpPr>
+        <p:spPr>
+          <a:xfrm>
+            <a:off x="5651845" y="121250"/>
+            <a:ext cx="2112147" cy="338554"/>
+          </a:xfrm>
+          <a:prstGeom prst="rect">
+            <a:avLst/>
+          </a:prstGeom>
+          <a:noFill/>
+          <a:ln>
+            <a:solidFill>
+              <a:schemeClr val="tx1"/>
+            </a:solidFill>
+          </a:ln>
+        </p:spPr>
+        <p:txBody>
+          <a:bodyPr rot="0" spcFirstLastPara="0" vertOverflow="overflow" horzOverflow="overflow" vert="horz" wrap="square" lIns="91440" tIns="45720" rIns="91440" bIns="45720" numCol="1" spcCol="0" rtlCol="0" fromWordArt="0" anchor="t" anchorCtr="0" forceAA="0" compatLnSpc="1">
+            <a:prstTxWarp prst="textNoShape">
+              <a:avLst/>
+            </a:prstTxWarp>
+            <a:spAutoFit/>
+          </a:bodyPr>
+          <a:lstStyle/>
+          <a:p>
+            <a:r>
+              <a:rPr lang="en-GB" sz="1600" dirty="0"/>
+              <a:t>Game Build V.0.6.1</a:t>
+            </a:r>
+          </a:p>
+        </p:txBody>
+      </p:sp>
+      <p:sp>
+        <p:nvSpPr>
+          <p:cNvPr id="3" name="TextBox 2">
+            <a:extLst>
+              <a:ext uri="{FF2B5EF4-FFF2-40B4-BE49-F238E27FC236}">
+                <a16:creationId xmlns:a16="http://schemas.microsoft.com/office/drawing/2014/main" id="{0F1E3482-7F5A-4FDE-7C91-37D302F5BFB7}"/>
+              </a:ext>
+            </a:extLst>
+          </p:cNvPr>
+          <p:cNvSpPr txBox="1"/>
+          <p:nvPr/>
+        </p:nvSpPr>
+        <p:spPr>
+          <a:xfrm>
+            <a:off x="0" y="152027"/>
+            <a:ext cx="5576207" cy="646331"/>
+          </a:xfrm>
+          <a:prstGeom prst="rect">
+            <a:avLst/>
+          </a:prstGeom>
+          <a:noFill/>
+          <a:ln>
+            <a:solidFill>
+              <a:schemeClr val="tx1"/>
+            </a:solidFill>
+          </a:ln>
+        </p:spPr>
+        <p:txBody>
+          <a:bodyPr rot="0" spcFirstLastPara="0" vertOverflow="overflow" horzOverflow="overflow" vert="horz" wrap="square" lIns="91440" tIns="45720" rIns="91440" bIns="45720" numCol="1" spcCol="0" rtlCol="0" fromWordArt="0" anchor="t" anchorCtr="0" forceAA="0" compatLnSpc="1">
+            <a:prstTxWarp prst="textNoShape">
+              <a:avLst/>
+            </a:prstTxWarp>
+            <a:spAutoFit/>
+          </a:bodyPr>
+          <a:lstStyle/>
+          <a:p>
+            <a:r>
+              <a:rPr lang="en-GB" sz="1200" dirty="0"/>
+              <a:t>This Build Is the finished refined code for Enemy Gwiber besides some small behavioural additions that still need to be made it Gwiber but </a:t>
+            </a:r>
+            <a:r>
+              <a:rPr lang="en-GB" sz="1200" dirty="0" err="1"/>
+              <a:t>he;s</a:t>
+            </a:r>
+            <a:r>
+              <a:rPr lang="en-GB" sz="1200" dirty="0"/>
+              <a:t> 90% the way there.</a:t>
+            </a:r>
+          </a:p>
+        </p:txBody>
+      </p:sp>
+      <p:sp>
+        <p:nvSpPr>
+          <p:cNvPr id="6" name="TextBox 5">
+            <a:extLst>
+              <a:ext uri="{FF2B5EF4-FFF2-40B4-BE49-F238E27FC236}">
+                <a16:creationId xmlns:a16="http://schemas.microsoft.com/office/drawing/2014/main" id="{7BFDDCD7-356A-BBD7-B72D-2284BED1C08B}"/>
+              </a:ext>
+            </a:extLst>
+          </p:cNvPr>
+          <p:cNvSpPr txBox="1"/>
+          <p:nvPr/>
+        </p:nvSpPr>
+        <p:spPr>
+          <a:xfrm>
+            <a:off x="8542002" y="612254"/>
+            <a:ext cx="3307343" cy="1546577"/>
+          </a:xfrm>
+          <a:prstGeom prst="rect">
+            <a:avLst/>
+          </a:prstGeom>
+          <a:noFill/>
+          <a:ln>
+            <a:solidFill>
+              <a:schemeClr val="tx1"/>
+            </a:solidFill>
+          </a:ln>
+        </p:spPr>
+        <p:txBody>
+          <a:bodyPr rot="0" spcFirstLastPara="0" vertOverflow="overflow" horzOverflow="overflow" vert="horz" wrap="square" lIns="91440" tIns="45720" rIns="91440" bIns="45720" numCol="1" spcCol="0" rtlCol="0" fromWordArt="0" anchor="t" anchorCtr="0" forceAA="0" compatLnSpc="1">
+            <a:prstTxWarp prst="textNoShape">
+              <a:avLst/>
+            </a:prstTxWarp>
+            <a:spAutoFit/>
+          </a:bodyPr>
+          <a:lstStyle/>
+          <a:p>
+            <a:r>
+              <a:rPr lang="en-GB" sz="1050" dirty="0"/>
+              <a:t>To do next session</a:t>
+            </a:r>
+          </a:p>
+          <a:p>
+            <a:endParaRPr lang="en-GB" sz="1050" dirty="0"/>
+          </a:p>
+          <a:p>
+            <a:r>
+              <a:rPr lang="en-GB" sz="1050" dirty="0"/>
+              <a:t>Create sounds for objects.</a:t>
+            </a:r>
+          </a:p>
+          <a:p>
+            <a:endParaRPr lang="en-GB" sz="1050" dirty="0"/>
+          </a:p>
+          <a:p>
+            <a:r>
+              <a:rPr lang="en-GB" sz="1050" dirty="0"/>
+              <a:t>Begin storyboarding intro sequence.</a:t>
+            </a:r>
+          </a:p>
+          <a:p>
+            <a:endParaRPr lang="en-GB" sz="1050" dirty="0"/>
+          </a:p>
+          <a:p>
+            <a:r>
+              <a:rPr lang="en-GB" sz="1050" dirty="0"/>
+              <a:t>Finish all of ESA’s Voice Lines.</a:t>
+            </a:r>
+          </a:p>
+          <a:p>
+            <a:endParaRPr lang="en-GB" sz="1050" dirty="0"/>
+          </a:p>
+          <a:p>
+            <a:r>
+              <a:rPr lang="en-GB" sz="1050" dirty="0"/>
+              <a:t>Start Designing Zones.</a:t>
+            </a:r>
+          </a:p>
+        </p:txBody>
+      </p:sp>
+      <p:sp>
+        <p:nvSpPr>
+          <p:cNvPr id="19" name="TextBox 18">
+            <a:extLst>
+              <a:ext uri="{FF2B5EF4-FFF2-40B4-BE49-F238E27FC236}">
+                <a16:creationId xmlns:a16="http://schemas.microsoft.com/office/drawing/2014/main" id="{20CFE538-1D18-0E62-7F8D-669AF94CD9B9}"/>
+              </a:ext>
+            </a:extLst>
+          </p:cNvPr>
+          <p:cNvSpPr txBox="1"/>
+          <p:nvPr/>
+        </p:nvSpPr>
+        <p:spPr>
+          <a:xfrm>
+            <a:off x="5662412" y="720049"/>
+            <a:ext cx="2408464" cy="369332"/>
+          </a:xfrm>
+          <a:prstGeom prst="rect">
+            <a:avLst/>
+          </a:prstGeom>
+          <a:noFill/>
+        </p:spPr>
+        <p:txBody>
+          <a:bodyPr wrap="square" rtlCol="0">
+            <a:spAutoFit/>
+          </a:bodyPr>
+          <a:lstStyle/>
+          <a:p>
+            <a:r>
+              <a:rPr lang="en-GB" dirty="0"/>
+              <a:t> </a:t>
+            </a:r>
+          </a:p>
+        </p:txBody>
+      </p:sp>
+    </p:spTree>
+    <p:extLst>
+      <p:ext uri="{BB962C8B-B14F-4D97-AF65-F5344CB8AC3E}">
+        <p14:creationId xmlns:p14="http://schemas.microsoft.com/office/powerpoint/2010/main" val="2644026364"/>
+      </p:ext>
+    </p:extLst>
+  </p:cSld>
+  <p:clrMapOvr>
+    <a:masterClrMapping/>
+  </p:clrMapOvr>
+</p:sld>
+</file>
+
+<file path=ppt/slides/slide14.xml><?xml version="1.0" encoding="utf-8"?>
 <p:sld xmlns:a="http://schemas.openxmlformats.org/drawingml/2006/main" xmlns:r="http://schemas.openxmlformats.org/officeDocument/2006/relationships" xmlns:p="http://schemas.openxmlformats.org/presentationml/2006/main">
   <p:cSld>
     <p:spTree>
@@ -5700,7 +5938,7 @@
 </p:sld>
 </file>
 
-<file path=ppt/slides/slide14.xml><?xml version="1.0" encoding="utf-8"?>
+<file path=ppt/slides/slide15.xml><?xml version="1.0" encoding="utf-8"?>
 <p:sld xmlns:a="http://schemas.openxmlformats.org/drawingml/2006/main" xmlns:r="http://schemas.openxmlformats.org/officeDocument/2006/relationships" xmlns:p="http://schemas.openxmlformats.org/presentationml/2006/main">
   <p:cSld>
     <p:spTree>
@@ -6021,20 +6259,8 @@
                     <a:lstStyle/>
                     <a:p>
                       <a:r>
-                        <a:rPr lang="en-GB" sz="1100" dirty="0" err="1"/>
-                        <a:t>Gwiber</a:t>
-                      </a:r>
-                      <a:r>
                         <a:rPr lang="en-GB" sz="1100" dirty="0"/>
-                        <a:t> is to change zones based on what zone its currently in and whether or not it is currently able to go to zone 0 from zone 2. </a:t>
-                      </a:r>
-                      <a:r>
-                        <a:rPr lang="en-GB" sz="1100" dirty="0" err="1"/>
-                        <a:t>Gwiber</a:t>
-                      </a:r>
-                      <a:r>
-                        <a:rPr lang="en-GB" sz="1100" dirty="0"/>
-                        <a:t> should also have its movement delayed when </a:t>
+                        <a:t>Gwiber is to change zones based on what zone its currently in and whether or not it is currently able to go to zone 0 from zone 2. Gwiber should also have its movement delayed when </a:t>
                       </a:r>
                       <a:r>
                         <a:rPr lang="en-GB" sz="1100" dirty="0" err="1"/>
@@ -6062,12 +6288,8 @@
                     <a:lstStyle/>
                     <a:p>
                       <a:r>
-                        <a:rPr lang="en-GB" sz="1100" dirty="0" err="1"/>
-                        <a:t>Gwiber</a:t>
-                      </a:r>
-                      <a:r>
                         <a:rPr lang="en-GB" sz="1100" dirty="0"/>
-                        <a:t> moved from zone 1 to zone 5 but remained their, it didn’t move back to zone 1 for it to move to zone 2 </a:t>
+                        <a:t>Gwiber moved from zone 1 to zone 5 but remained their, it didn’t move back to zone 1 for it to move to zone 2 </a:t>
                       </a:r>
                       <a:r>
                         <a:rPr lang="en-GB" sz="1100" dirty="0" err="1"/>
@@ -6088,15 +6310,16 @@
                     <a:p>
                       <a:r>
                         <a:rPr lang="en-GB" sz="1100" dirty="0"/>
-                        <a:t>At the time of this test, I have not made any changes besides trying to give </a:t>
-                      </a:r>
-                      <a:r>
-                        <a:rPr lang="en-GB" sz="1100" dirty="0" err="1"/>
-                        <a:t>Gwiber</a:t>
-                      </a:r>
+                        <a:t>At the time of this test, I have not made any changes besides trying to give Gwiber a draw GUI to see if he is in fact moving or not.</a:t>
+                      </a:r>
+                    </a:p>
+                    <a:p>
+                      <a:endParaRPr lang="en-GB" sz="1100" dirty="0"/>
+                    </a:p>
+                    <a:p>
                       <a:r>
                         <a:rPr lang="en-GB" sz="1100" dirty="0"/>
-                        <a:t> a draw GUI to see if he is in fact moving or not.</a:t>
+                        <a:t>Update: got a GUI draw and I can confirm that Gwiber doesn’t move from zone 1.</a:t>
                       </a:r>
                     </a:p>
                     <a:p>
@@ -6105,32 +6328,7 @@
                     <a:p>
                       <a:r>
                         <a:rPr lang="en-GB" sz="1100" dirty="0"/>
-                        <a:t>Update: got a GUI draw and I can confirm that </a:t>
-                      </a:r>
-                      <a:r>
-                        <a:rPr lang="en-GB" sz="1100" dirty="0" err="1"/>
-                        <a:t>Gwiber</a:t>
-                      </a:r>
-                      <a:r>
-                        <a:rPr lang="en-GB" sz="1100" dirty="0"/>
-                        <a:t> doesn’t move from zone 1.</a:t>
-                      </a:r>
-                    </a:p>
-                    <a:p>
-                      <a:endParaRPr lang="en-GB" sz="1100" dirty="0"/>
-                    </a:p>
-                    <a:p>
-                      <a:r>
-                        <a:rPr lang="en-GB" sz="1100" dirty="0"/>
-                        <a:t>Also, using debug show I can confirm that </a:t>
-                      </a:r>
-                      <a:r>
-                        <a:rPr lang="en-GB" sz="1100" dirty="0" err="1"/>
-                        <a:t>Gwiber</a:t>
-                      </a:r>
-                      <a:r>
-                        <a:rPr lang="en-GB" sz="1100" dirty="0"/>
-                        <a:t> is running its step event but alarm 0 is not, meaning that the step event is having problems triggering alarm [0].</a:t>
+                        <a:t>Also, using debug show I can confirm that Gwiber is running its step event but alarm 0 is not, meaning that the step event is having problems triggering alarm [0].</a:t>
                       </a:r>
                     </a:p>
                   </a:txBody>
@@ -6198,28 +6396,8 @@
                     <a:lstStyle/>
                     <a:p>
                       <a:r>
-                        <a:rPr lang="en-GB" sz="1100" dirty="0" err="1"/>
-                        <a:t>Gwiber</a:t>
-                      </a:r>
-                      <a:r>
                         <a:rPr lang="en-GB" sz="1100" dirty="0"/>
-                        <a:t> has a move timer that when it reaches 0, will reset to 600. when it goes 0 </a:t>
-                      </a:r>
-                      <a:r>
-                        <a:rPr lang="en-GB" sz="1100" dirty="0" err="1"/>
-                        <a:t>Gwiber</a:t>
-                      </a:r>
-                      <a:r>
-                        <a:rPr lang="en-GB" sz="1100" dirty="0"/>
-                        <a:t> does a zone check and determines based on a 50/50 chance which zone it can move two. Specifically for zone 2, </a:t>
-                      </a:r>
-                      <a:r>
-                        <a:rPr lang="en-GB" sz="1100" dirty="0" err="1"/>
-                        <a:t>Gwiber</a:t>
-                      </a:r>
-                      <a:r>
-                        <a:rPr lang="en-GB" sz="1100" dirty="0"/>
-                        <a:t> must understand if the door is In an open or closed state before moving into zone 0 (The Office).</a:t>
+                        <a:t>Gwiber has a move timer that when it reaches 0, will reset to 600. when it goes 0 Gwiber does a zone check and determines based on a 50/50 chance which zone it can move two. Specifically for zone 2, Gwiber must understand if the door is In an open or closed state before moving into zone 0 (The Office).</a:t>
                       </a:r>
                     </a:p>
                   </a:txBody>
@@ -6231,36 +6409,8 @@
                     <a:lstStyle/>
                     <a:p>
                       <a:r>
-                        <a:rPr lang="en-GB" sz="1100" dirty="0" err="1"/>
-                        <a:t>Gwiber</a:t>
-                      </a:r>
-                      <a:r>
                         <a:rPr lang="en-GB" sz="1100" dirty="0"/>
-                        <a:t> does move between zones based on the timers. However, </a:t>
-                      </a:r>
-                      <a:r>
-                        <a:rPr lang="en-GB" sz="1100" dirty="0" err="1"/>
-                        <a:t>Gwiber</a:t>
-                      </a:r>
-                      <a:r>
-                        <a:rPr lang="en-GB" sz="1100" dirty="0"/>
-                        <a:t> moves from zone 1 straight to zone 0 when it should only be able to go to zone 2 or 5. Also, for some reason the code that tells </a:t>
-                      </a:r>
-                      <a:r>
-                        <a:rPr lang="en-GB" sz="1100" dirty="0" err="1"/>
-                        <a:t>Gwiber</a:t>
-                      </a:r>
-                      <a:r>
-                        <a:rPr lang="en-GB" sz="1100" dirty="0"/>
-                        <a:t> if the doors are open or closed had caused the door sprites to disappear in addition to teleporting the other enemy objects when button is pressed. </a:t>
-                      </a:r>
-                      <a:r>
-                        <a:rPr lang="en-GB" sz="1100" dirty="0" err="1"/>
-                        <a:t>Gwiber</a:t>
-                      </a:r>
-                      <a:r>
-                        <a:rPr lang="en-GB" sz="1100" dirty="0"/>
-                        <a:t> does not go into zone 0 when </a:t>
+                        <a:t>Gwiber does move between zones based on the timers. However, Gwiber moves from zone 1 straight to zone 0 when it should only be able to go to zone 2 or 5. Also, for some reason the code that tells Gwiber if the doors are open or closed had caused the door sprites to disappear in addition to teleporting the other enemy objects when button is pressed. Gwiber does not go into zone 0 when </a:t>
                       </a:r>
                       <a:r>
                         <a:rPr lang="en-GB" sz="1100" dirty="0" err="1"/>
@@ -6314,27 +6464,14 @@
                     <a:p>
                       <a:r>
                         <a:rPr lang="en-GB" sz="1100" dirty="0"/>
-                        <a:t>But it is also needed to give </a:t>
-                      </a:r>
-                      <a:r>
-                        <a:rPr lang="en-GB" sz="1100" dirty="0" err="1"/>
-                        <a:t>Gwiber</a:t>
-                      </a:r>
+                        <a:t>But it is also needed to give Gwiber information in whether the door is in an open state.</a:t>
+                      </a:r>
+                    </a:p>
+                    <a:p>
                       <a:r>
                         <a:rPr lang="en-GB" sz="1100" dirty="0"/>
-                        <a:t> information in whether the door is in an open state.</a:t>
-                      </a:r>
-                    </a:p>
-                    <a:p>
-                      <a:r>
-                        <a:rPr lang="en-GB" sz="1100" dirty="0"/>
-                        <a:t>(Ok don’t know why or </a:t>
-                      </a:r>
-                      <a:r>
-                        <a:rPr lang="en-GB" sz="1100"/>
-                        <a:t>how but the doors are fixed?)</a:t>
-                      </a:r>
-                      <a:endParaRPr lang="en-GB" sz="1100" dirty="0"/>
+                        <a:t>(Ok don’t know why or how but the doors are fixed?)</a:t>
+                      </a:r>
                     </a:p>
                   </a:txBody>
                   <a:tcPr/>
@@ -6392,7 +6529,7 @@
 </p:sld>
 </file>
 
-<file path=ppt/slides/slide15.xml><?xml version="1.0" encoding="utf-8"?>
+<file path=ppt/slides/slide16.xml><?xml version="1.0" encoding="utf-8"?>
 <p:sld xmlns:a="http://schemas.openxmlformats.org/drawingml/2006/main" xmlns:r="http://schemas.openxmlformats.org/officeDocument/2006/relationships" xmlns:p="http://schemas.openxmlformats.org/presentationml/2006/main">
   <p:cSld>
     <p:spTree>
@@ -6430,14 +6567,14 @@
           <p:nvPr>
             <p:extLst>
               <p:ext uri="{D42A27DB-BD31-4B8C-83A1-F6EECF244321}">
-                <p14:modId xmlns:p14="http://schemas.microsoft.com/office/powerpoint/2010/main" val="2915272319"/>
+                <p14:modId xmlns:p14="http://schemas.microsoft.com/office/powerpoint/2010/main" val="1060461396"/>
               </p:ext>
             </p:extLst>
           </p:nvPr>
         </p:nvGraphicFramePr>
         <p:xfrm>
           <a:off x="-10679" y="0"/>
-          <a:ext cx="11988463" cy="3324396"/>
+          <a:ext cx="11988463" cy="3993588"/>
         </p:xfrm>
         <a:graphic>
           <a:graphicData uri="http://schemas.openxmlformats.org/drawingml/2006/table">
@@ -6799,7 +6936,10 @@
                     <a:bodyPr/>
                     <a:lstStyle/>
                     <a:p>
-                      <a:endParaRPr lang="en-GB" sz="1100" dirty="0"/>
+                      <a:r>
+                        <a:rPr lang="en-GB" sz="1100" dirty="0"/>
+                        <a:t>6. Build V.0.6.1</a:t>
+                      </a:r>
                     </a:p>
                   </a:txBody>
                   <a:tcPr/>
@@ -6809,6 +6949,10 @@
                     <a:bodyPr/>
                     <a:lstStyle/>
                     <a:p>
+                      <a:r>
+                        <a:rPr lang="en-GB" sz="1100" dirty="0" err="1"/>
+                        <a:t>Rm_office</a:t>
+                      </a:r>
                       <a:endParaRPr lang="en-GB" sz="1100" dirty="0"/>
                     </a:p>
                   </a:txBody>
@@ -6819,7 +6963,14 @@
                     <a:bodyPr/>
                     <a:lstStyle/>
                     <a:p>
-                      <a:endParaRPr lang="en-GB" sz="1100" dirty="0"/>
+                      <a:r>
+                        <a:rPr lang="en-GB" sz="1100" dirty="0" err="1"/>
+                        <a:t>Obj_gwiber</a:t>
+                      </a:r>
+                      <a:r>
+                        <a:rPr lang="en-GB" sz="1100" dirty="0"/>
+                        <a:t>, object doors</a:t>
+                      </a:r>
                     </a:p>
                   </a:txBody>
                   <a:tcPr/>
@@ -6829,7 +6980,18 @@
                     <a:bodyPr/>
                     <a:lstStyle/>
                     <a:p>
-                      <a:endParaRPr lang="en-GB" sz="1100" dirty="0"/>
+                      <a:r>
+                        <a:rPr lang="en-GB" sz="1100" dirty="0"/>
+                        <a:t>When Gwiber is in zone zero wait for a certain amount of time before triggering a </a:t>
+                      </a:r>
+                      <a:r>
+                        <a:rPr lang="en-GB" sz="1100" dirty="0" err="1"/>
+                        <a:t>jumpscare</a:t>
+                      </a:r>
+                      <a:r>
+                        <a:rPr lang="en-GB" sz="1100" dirty="0"/>
+                        <a:t>, if door is closed while Gwiber is in zone 0 before the wait timer runs out, retreat back to zone 2.</a:t>
+                      </a:r>
                     </a:p>
                   </a:txBody>
                   <a:tcPr/>
@@ -6839,7 +7001,10 @@
                     <a:bodyPr/>
                     <a:lstStyle/>
                     <a:p>
-                      <a:endParaRPr lang="en-GB" sz="1100" dirty="0"/>
+                      <a:r>
+                        <a:rPr lang="en-GB" sz="1100" dirty="0"/>
+                        <a:t>When Gwiber moves from zone 4, to zone 3, then to zone 2, when he enters zone 0 the wait timer doesn’t trigger and jump scare sprite doesn’t trigger before room restart.</a:t>
+                      </a:r>
                     </a:p>
                   </a:txBody>
                   <a:tcPr/>

</xml_diff>

<commit_message>
Folder Containing V.0.6 and V.0.6.3
Two Versions, V.0.6 is the first fully working movement code for Gwiber and V.0.6.3 is the current latest attempt in adding zone 0 behaviour however this has caused some unknown issues that i need to resolve before proceeding to Build V.0.7
</commit_message>
<xml_diff>
--- a/Logs/Development Log and Alpha Testing.pptx
+++ b/Logs/Development Log and Alpha Testing.pptx
@@ -5462,7 +5462,7 @@
         <p:spPr>
           <a:xfrm>
             <a:off x="0" y="152027"/>
-            <a:ext cx="5576207" cy="1384995"/>
+            <a:ext cx="5576207" cy="2308324"/>
           </a:xfrm>
           <a:prstGeom prst="rect">
             <a:avLst/>
@@ -5513,6 +5513,23 @@
               <a:t> Movement code and at the time of typing, actively searching for the reason behind the problems. (Visit Build Test 7 in alpha testing table for more details)</a:t>
             </a:r>
           </a:p>
+          <a:p>
+            <a:endParaRPr lang="en-GB" sz="1200" dirty="0"/>
+          </a:p>
+          <a:p>
+            <a:r>
+              <a:rPr lang="en-GB" sz="1200" dirty="0"/>
+              <a:t>To help resolve this issue I have made a folder containing Build V.0.6 (Functioning Enemy Movement) then in the same folder added the latest version Build V.0.6.3 Which has the attempted updated code to try and give </a:t>
+            </a:r>
+            <a:r>
+              <a:rPr lang="en-GB" sz="1200" dirty="0" err="1"/>
+              <a:t>Gwiber</a:t>
+            </a:r>
+            <a:r>
+              <a:rPr lang="en-GB" sz="1200" dirty="0"/>
+              <a:t> movement behaviour in zone 0+jump-scare, however, this came with some issues.</a:t>
+            </a:r>
+          </a:p>
         </p:txBody>
       </p:sp>
       <p:sp>
@@ -5530,7 +5547,7 @@
         <p:spPr>
           <a:xfrm>
             <a:off x="8542002" y="612254"/>
-            <a:ext cx="3307343" cy="415498"/>
+            <a:ext cx="3307343" cy="1708160"/>
           </a:xfrm>
           <a:prstGeom prst="rect">
             <a:avLst/>
@@ -5558,6 +5575,47 @@
           </a:p>
           <a:p>
             <a:endParaRPr lang="en-GB" sz="1050" dirty="0"/>
+          </a:p>
+          <a:p>
+            <a:r>
+              <a:rPr lang="en-GB" sz="1050" dirty="0"/>
+              <a:t>Resolve </a:t>
+            </a:r>
+            <a:r>
+              <a:rPr lang="en-GB" sz="1050" dirty="0" err="1"/>
+              <a:t>Gwiber’s</a:t>
+            </a:r>
+            <a:r>
+              <a:rPr lang="en-GB" sz="1050" dirty="0"/>
+              <a:t> movement Code</a:t>
+            </a:r>
+          </a:p>
+          <a:p>
+            <a:endParaRPr lang="en-GB" sz="1050" dirty="0"/>
+          </a:p>
+          <a:p>
+            <a:r>
+              <a:rPr lang="en-GB" sz="1050" dirty="0"/>
+              <a:t>Design Jump-Scares for AMCD’s</a:t>
+            </a:r>
+          </a:p>
+          <a:p>
+            <a:endParaRPr lang="en-GB" sz="1050" dirty="0"/>
+          </a:p>
+          <a:p>
+            <a:r>
+              <a:rPr lang="en-GB" sz="1050" dirty="0"/>
+              <a:t>Start adding minor mechanics such as end game, game menu, pause menu and control scheme.</a:t>
+            </a:r>
+          </a:p>
+          <a:p>
+            <a:endParaRPr lang="en-GB" sz="1050" dirty="0"/>
+          </a:p>
+          <a:p>
+            <a:r>
+              <a:rPr lang="en-GB" sz="1050" dirty="0"/>
+              <a:t>Finish AMCD’s Designs.</a:t>
+            </a:r>
           </a:p>
         </p:txBody>
       </p:sp>

</xml_diff>

<commit_message>
Attempt in Shrinking the Assets
I was able to shrink the assets, however this caused issues with the camera controller and when attempting to remove the smooth transition code, the rest of the camera code broke. This was caused by poor variable management.
</commit_message>
<xml_diff>
--- a/Logs/Development Log and Alpha Testing.pptx
+++ b/Logs/Development Log and Alpha Testing.pptx
@@ -19,10 +19,13 @@
     <p:sldId id="269" r:id="rId13"/>
     <p:sldId id="271" r:id="rId14"/>
     <p:sldId id="273" r:id="rId15"/>
-    <p:sldId id="257" r:id="rId16"/>
-    <p:sldId id="267" r:id="rId17"/>
-    <p:sldId id="270" r:id="rId18"/>
-    <p:sldId id="272" r:id="rId19"/>
+    <p:sldId id="274" r:id="rId16"/>
+    <p:sldId id="275" r:id="rId17"/>
+    <p:sldId id="257" r:id="rId18"/>
+    <p:sldId id="267" r:id="rId19"/>
+    <p:sldId id="270" r:id="rId20"/>
+    <p:sldId id="272" r:id="rId21"/>
+    <p:sldId id="276" r:id="rId22"/>
   </p:sldIdLst>
   <p:sldSz cx="12192000" cy="6858000"/>
   <p:notesSz cx="6858000" cy="9144000"/>
@@ -296,7 +299,7 @@
           <a:p>
             <a:fld id="{846CE7D5-CF57-46EF-B807-FDD0502418D4}" type="datetimeFigureOut">
               <a:rPr lang="en-GB" smtClean="0"/>
-              <a:t>20/01/2026</a:t>
+              <a:t>22/01/2026</a:t>
             </a:fld>
             <a:endParaRPr lang="en-GB"/>
           </a:p>
@@ -466,7 +469,7 @@
           <a:p>
             <a:fld id="{846CE7D5-CF57-46EF-B807-FDD0502418D4}" type="datetimeFigureOut">
               <a:rPr lang="en-GB" smtClean="0"/>
-              <a:t>20/01/2026</a:t>
+              <a:t>22/01/2026</a:t>
             </a:fld>
             <a:endParaRPr lang="en-GB"/>
           </a:p>
@@ -646,7 +649,7 @@
           <a:p>
             <a:fld id="{846CE7D5-CF57-46EF-B807-FDD0502418D4}" type="datetimeFigureOut">
               <a:rPr lang="en-GB" smtClean="0"/>
-              <a:t>20/01/2026</a:t>
+              <a:t>22/01/2026</a:t>
             </a:fld>
             <a:endParaRPr lang="en-GB"/>
           </a:p>
@@ -816,7 +819,7 @@
           <a:p>
             <a:fld id="{846CE7D5-CF57-46EF-B807-FDD0502418D4}" type="datetimeFigureOut">
               <a:rPr lang="en-GB" smtClean="0"/>
-              <a:t>20/01/2026</a:t>
+              <a:t>22/01/2026</a:t>
             </a:fld>
             <a:endParaRPr lang="en-GB"/>
           </a:p>
@@ -1062,7 +1065,7 @@
           <a:p>
             <a:fld id="{846CE7D5-CF57-46EF-B807-FDD0502418D4}" type="datetimeFigureOut">
               <a:rPr lang="en-GB" smtClean="0"/>
-              <a:t>20/01/2026</a:t>
+              <a:t>22/01/2026</a:t>
             </a:fld>
             <a:endParaRPr lang="en-GB"/>
           </a:p>
@@ -1294,7 +1297,7 @@
           <a:p>
             <a:fld id="{846CE7D5-CF57-46EF-B807-FDD0502418D4}" type="datetimeFigureOut">
               <a:rPr lang="en-GB" smtClean="0"/>
-              <a:t>20/01/2026</a:t>
+              <a:t>22/01/2026</a:t>
             </a:fld>
             <a:endParaRPr lang="en-GB"/>
           </a:p>
@@ -1661,7 +1664,7 @@
           <a:p>
             <a:fld id="{846CE7D5-CF57-46EF-B807-FDD0502418D4}" type="datetimeFigureOut">
               <a:rPr lang="en-GB" smtClean="0"/>
-              <a:t>20/01/2026</a:t>
+              <a:t>22/01/2026</a:t>
             </a:fld>
             <a:endParaRPr lang="en-GB"/>
           </a:p>
@@ -1779,7 +1782,7 @@
           <a:p>
             <a:fld id="{846CE7D5-CF57-46EF-B807-FDD0502418D4}" type="datetimeFigureOut">
               <a:rPr lang="en-GB" smtClean="0"/>
-              <a:t>20/01/2026</a:t>
+              <a:t>22/01/2026</a:t>
             </a:fld>
             <a:endParaRPr lang="en-GB"/>
           </a:p>
@@ -1874,7 +1877,7 @@
           <a:p>
             <a:fld id="{846CE7D5-CF57-46EF-B807-FDD0502418D4}" type="datetimeFigureOut">
               <a:rPr lang="en-GB" smtClean="0"/>
-              <a:t>20/01/2026</a:t>
+              <a:t>22/01/2026</a:t>
             </a:fld>
             <a:endParaRPr lang="en-GB"/>
           </a:p>
@@ -2151,7 +2154,7 @@
           <a:p>
             <a:fld id="{846CE7D5-CF57-46EF-B807-FDD0502418D4}" type="datetimeFigureOut">
               <a:rPr lang="en-GB" smtClean="0"/>
-              <a:t>20/01/2026</a:t>
+              <a:t>22/01/2026</a:t>
             </a:fld>
             <a:endParaRPr lang="en-GB"/>
           </a:p>
@@ -2408,7 +2411,7 @@
           <a:p>
             <a:fld id="{846CE7D5-CF57-46EF-B807-FDD0502418D4}" type="datetimeFigureOut">
               <a:rPr lang="en-GB" smtClean="0"/>
-              <a:t>20/01/2026</a:t>
+              <a:t>22/01/2026</a:t>
             </a:fld>
             <a:endParaRPr lang="en-GB"/>
           </a:p>
@@ -2621,7 +2624,7 @@
           <a:p>
             <a:fld id="{846CE7D5-CF57-46EF-B807-FDD0502418D4}" type="datetimeFigureOut">
               <a:rPr lang="en-GB" smtClean="0"/>
-              <a:t>20/01/2026</a:t>
+              <a:t>22/01/2026</a:t>
             </a:fld>
             <a:endParaRPr lang="en-GB"/>
           </a:p>
@@ -5702,6 +5705,1122 @@
   <p:cSld>
     <p:spTree>
       <p:nvGrpSpPr>
+        <p:cNvPr id="1" name="">
+          <a:extLst>
+            <a:ext uri="{FF2B5EF4-FFF2-40B4-BE49-F238E27FC236}">
+              <a16:creationId xmlns:a16="http://schemas.microsoft.com/office/drawing/2014/main" id="{8FB683C6-9EAB-BF99-A8E9-F70058DB466A}"/>
+            </a:ext>
+          </a:extLst>
+        </p:cNvPr>
+        <p:cNvGrpSpPr/>
+        <p:nvPr/>
+      </p:nvGrpSpPr>
+      <p:grpSpPr>
+        <a:xfrm>
+          <a:off x="0" y="0"/>
+          <a:ext cx="0" cy="0"/>
+          <a:chOff x="0" y="0"/>
+          <a:chExt cx="0" cy="0"/>
+        </a:xfrm>
+      </p:grpSpPr>
+      <p:sp>
+        <p:nvSpPr>
+          <p:cNvPr id="4" name="TextBox 3">
+            <a:extLst>
+              <a:ext uri="{FF2B5EF4-FFF2-40B4-BE49-F238E27FC236}">
+                <a16:creationId xmlns:a16="http://schemas.microsoft.com/office/drawing/2014/main" id="{F4ABC83A-2F60-A128-7935-33D69B2019DF}"/>
+              </a:ext>
+            </a:extLst>
+          </p:cNvPr>
+          <p:cNvSpPr txBox="1"/>
+          <p:nvPr/>
+        </p:nvSpPr>
+        <p:spPr>
+          <a:xfrm>
+            <a:off x="7894620" y="121250"/>
+            <a:ext cx="2269916" cy="338554"/>
+          </a:xfrm>
+          <a:prstGeom prst="rect">
+            <a:avLst/>
+          </a:prstGeom>
+          <a:noFill/>
+          <a:ln>
+            <a:solidFill>
+              <a:schemeClr val="tx1"/>
+            </a:solidFill>
+          </a:ln>
+        </p:spPr>
+        <p:txBody>
+          <a:bodyPr rot="0" spcFirstLastPara="0" vertOverflow="overflow" horzOverflow="overflow" vert="horz" wrap="square" lIns="91440" tIns="45720" rIns="91440" bIns="45720" numCol="1" spcCol="0" rtlCol="0" fromWordArt="0" anchor="t" anchorCtr="0" forceAA="0" compatLnSpc="1">
+            <a:prstTxWarp prst="textNoShape">
+              <a:avLst/>
+            </a:prstTxWarp>
+            <a:spAutoFit/>
+          </a:bodyPr>
+          <a:lstStyle/>
+          <a:p>
+            <a:r>
+              <a:rPr lang="en-GB" sz="1600" dirty="0"/>
+              <a:t>Date – 21/01/2026</a:t>
+            </a:r>
+          </a:p>
+        </p:txBody>
+      </p:sp>
+      <p:sp>
+        <p:nvSpPr>
+          <p:cNvPr id="2" name="TextBox 1">
+            <a:extLst>
+              <a:ext uri="{FF2B5EF4-FFF2-40B4-BE49-F238E27FC236}">
+                <a16:creationId xmlns:a16="http://schemas.microsoft.com/office/drawing/2014/main" id="{3A076CD0-5B22-5B0C-7DEB-EB0030A78E36}"/>
+              </a:ext>
+            </a:extLst>
+          </p:cNvPr>
+          <p:cNvSpPr txBox="1"/>
+          <p:nvPr/>
+        </p:nvSpPr>
+        <p:spPr>
+          <a:xfrm>
+            <a:off x="5651845" y="121250"/>
+            <a:ext cx="2112147" cy="338554"/>
+          </a:xfrm>
+          <a:prstGeom prst="rect">
+            <a:avLst/>
+          </a:prstGeom>
+          <a:noFill/>
+          <a:ln>
+            <a:solidFill>
+              <a:schemeClr val="tx1"/>
+            </a:solidFill>
+          </a:ln>
+        </p:spPr>
+        <p:txBody>
+          <a:bodyPr rot="0" spcFirstLastPara="0" vertOverflow="overflow" horzOverflow="overflow" vert="horz" wrap="square" lIns="91440" tIns="45720" rIns="91440" bIns="45720" numCol="1" spcCol="0" rtlCol="0" fromWordArt="0" anchor="t" anchorCtr="0" forceAA="0" compatLnSpc="1">
+            <a:prstTxWarp prst="textNoShape">
+              <a:avLst/>
+            </a:prstTxWarp>
+            <a:spAutoFit/>
+          </a:bodyPr>
+          <a:lstStyle/>
+          <a:p>
+            <a:r>
+              <a:rPr lang="en-GB" sz="1600" dirty="0"/>
+              <a:t>Game Build V.0.6.3</a:t>
+            </a:r>
+          </a:p>
+        </p:txBody>
+      </p:sp>
+      <p:sp>
+        <p:nvSpPr>
+          <p:cNvPr id="3" name="TextBox 2">
+            <a:extLst>
+              <a:ext uri="{FF2B5EF4-FFF2-40B4-BE49-F238E27FC236}">
+                <a16:creationId xmlns:a16="http://schemas.microsoft.com/office/drawing/2014/main" id="{3CE4025F-D7E1-0680-998A-332B9A883D5F}"/>
+              </a:ext>
+            </a:extLst>
+          </p:cNvPr>
+          <p:cNvSpPr txBox="1"/>
+          <p:nvPr/>
+        </p:nvSpPr>
+        <p:spPr>
+          <a:xfrm>
+            <a:off x="0" y="152027"/>
+            <a:ext cx="5576207" cy="4524315"/>
+          </a:xfrm>
+          <a:prstGeom prst="rect">
+            <a:avLst/>
+          </a:prstGeom>
+          <a:noFill/>
+          <a:ln>
+            <a:solidFill>
+              <a:schemeClr val="tx1"/>
+            </a:solidFill>
+          </a:ln>
+        </p:spPr>
+        <p:txBody>
+          <a:bodyPr rot="0" spcFirstLastPara="0" vertOverflow="overflow" horzOverflow="overflow" vert="horz" wrap="square" lIns="91440" tIns="45720" rIns="91440" bIns="45720" numCol="1" spcCol="0" rtlCol="0" fromWordArt="0" anchor="t" anchorCtr="0" forceAA="0" compatLnSpc="1">
+            <a:prstTxWarp prst="textNoShape">
+              <a:avLst/>
+            </a:prstTxWarp>
+            <a:spAutoFit/>
+          </a:bodyPr>
+          <a:lstStyle/>
+          <a:p>
+            <a:r>
+              <a:rPr lang="en-GB" sz="1200" dirty="0"/>
+              <a:t>I was able to fix </a:t>
+            </a:r>
+            <a:r>
+              <a:rPr lang="en-GB" sz="1200" dirty="0" err="1"/>
+              <a:t>Gwibers</a:t>
+            </a:r>
+            <a:r>
+              <a:rPr lang="en-GB" sz="1200" dirty="0"/>
+              <a:t> Movement code and now his movement is more concrete.</a:t>
+            </a:r>
+          </a:p>
+          <a:p>
+            <a:endParaRPr lang="en-GB" sz="1200" dirty="0"/>
+          </a:p>
+          <a:p>
+            <a:r>
+              <a:rPr lang="en-GB" sz="1200" dirty="0"/>
+              <a:t>The issue before was that my original code was made on light scaffolding, so when I tried adding zone 0, the whole movement code broke.</a:t>
+            </a:r>
+          </a:p>
+          <a:p>
+            <a:endParaRPr lang="en-GB" sz="1200" dirty="0"/>
+          </a:p>
+          <a:p>
+            <a:r>
+              <a:rPr lang="en-GB" sz="1200" dirty="0"/>
+              <a:t>Having some assistance from a friend, we were able to discover the flaws and now </a:t>
+            </a:r>
+            <a:r>
+              <a:rPr lang="en-GB" sz="1200" dirty="0" err="1"/>
+              <a:t>Gwiber</a:t>
+            </a:r>
+            <a:r>
+              <a:rPr lang="en-GB" sz="1200" dirty="0"/>
+              <a:t> moves correctly and his behaviour is working 100%. We did remove </a:t>
+            </a:r>
+            <a:r>
+              <a:rPr lang="en-GB" sz="1200" dirty="0" err="1"/>
+              <a:t>gwiberpos</a:t>
+            </a:r>
+            <a:r>
+              <a:rPr lang="en-GB" sz="1200" dirty="0"/>
+              <a:t> zone 0 from his code due to the realisation that it wasn’t needed for his movement.</a:t>
+            </a:r>
+          </a:p>
+          <a:p>
+            <a:endParaRPr lang="en-GB" sz="1200" dirty="0"/>
+          </a:p>
+          <a:p>
+            <a:r>
+              <a:rPr lang="en-GB" sz="1200" dirty="0"/>
+              <a:t>The jump-scare is also working, however for some reason the </a:t>
+            </a:r>
+            <a:r>
+              <a:rPr lang="en-GB" sz="1200" dirty="0" err="1"/>
+              <a:t>instance_create</a:t>
+            </a:r>
+            <a:r>
+              <a:rPr lang="en-GB" sz="1200" dirty="0"/>
+              <a:t> isn’t creating the </a:t>
+            </a:r>
+            <a:r>
+              <a:rPr lang="en-GB" sz="1200" dirty="0" err="1"/>
+              <a:t>jump_scare</a:t>
+            </a:r>
+            <a:r>
+              <a:rPr lang="en-GB" sz="1200" dirty="0"/>
+              <a:t> object for </a:t>
+            </a:r>
+            <a:r>
+              <a:rPr lang="en-GB" sz="1200" dirty="0" err="1"/>
+              <a:t>Gwiber</a:t>
+            </a:r>
+            <a:r>
+              <a:rPr lang="en-GB" sz="1200" dirty="0"/>
+              <a:t>.</a:t>
+            </a:r>
+          </a:p>
+          <a:p>
+            <a:endParaRPr lang="en-GB" sz="1200" dirty="0"/>
+          </a:p>
+          <a:p>
+            <a:r>
+              <a:rPr lang="en-GB" sz="1200" dirty="0"/>
+              <a:t>Also, with </a:t>
+            </a:r>
+            <a:r>
+              <a:rPr lang="en-GB" sz="1200" dirty="0" err="1"/>
+              <a:t>Gwiber</a:t>
+            </a:r>
+            <a:r>
+              <a:rPr lang="en-GB" sz="1200" dirty="0"/>
+              <a:t> finished, I moved onto K9 in which I altered the original camera layout to have K9 attack both the left and right doors. He, is also extremely quick but the enemy's speeds will be adjusted once all of them are completed.</a:t>
+            </a:r>
+          </a:p>
+          <a:p>
+            <a:endParaRPr lang="en-GB" sz="1200" dirty="0"/>
+          </a:p>
+          <a:p>
+            <a:r>
+              <a:rPr lang="en-GB" sz="1200" dirty="0"/>
+              <a:t>Lastly, instead of the watched code making the enemies movement timers longer, it instead makes the movement countdown slower when watched and faster when not watched, since the original code caused some problems with other timers.</a:t>
+            </a:r>
+          </a:p>
+          <a:p>
+            <a:endParaRPr lang="en-GB" sz="1200" dirty="0"/>
+          </a:p>
+          <a:p>
+            <a:r>
+              <a:rPr lang="en-GB" sz="1200" dirty="0"/>
+              <a:t>Also, most of the code in the step event has instead been moved into alarms, for all of </a:t>
+            </a:r>
+            <a:r>
+              <a:rPr lang="en-GB" sz="1200" dirty="0" err="1"/>
+              <a:t>Gwiber’s</a:t>
+            </a:r>
+            <a:r>
+              <a:rPr lang="en-GB" sz="1200" dirty="0"/>
+              <a:t> code was running off one frame, which caused a lot of issues.</a:t>
+            </a:r>
+          </a:p>
+        </p:txBody>
+      </p:sp>
+      <p:sp>
+        <p:nvSpPr>
+          <p:cNvPr id="6" name="TextBox 5">
+            <a:extLst>
+              <a:ext uri="{FF2B5EF4-FFF2-40B4-BE49-F238E27FC236}">
+                <a16:creationId xmlns:a16="http://schemas.microsoft.com/office/drawing/2014/main" id="{FA16B7EC-75FE-9B28-5F3C-34E6D0B29A9A}"/>
+              </a:ext>
+            </a:extLst>
+          </p:cNvPr>
+          <p:cNvSpPr txBox="1"/>
+          <p:nvPr/>
+        </p:nvSpPr>
+        <p:spPr>
+          <a:xfrm>
+            <a:off x="8542002" y="612254"/>
+            <a:ext cx="3307343" cy="2192908"/>
+          </a:xfrm>
+          <a:prstGeom prst="rect">
+            <a:avLst/>
+          </a:prstGeom>
+          <a:noFill/>
+          <a:ln>
+            <a:solidFill>
+              <a:schemeClr val="tx1"/>
+            </a:solidFill>
+          </a:ln>
+        </p:spPr>
+        <p:txBody>
+          <a:bodyPr rot="0" spcFirstLastPara="0" vertOverflow="overflow" horzOverflow="overflow" vert="horz" wrap="square" lIns="91440" tIns="45720" rIns="91440" bIns="45720" numCol="1" spcCol="0" rtlCol="0" fromWordArt="0" anchor="t" anchorCtr="0" forceAA="0" compatLnSpc="1">
+            <a:prstTxWarp prst="textNoShape">
+              <a:avLst/>
+            </a:prstTxWarp>
+            <a:spAutoFit/>
+          </a:bodyPr>
+          <a:lstStyle/>
+          <a:p>
+            <a:r>
+              <a:rPr lang="en-GB" sz="1050" dirty="0"/>
+              <a:t>What to do Next Session </a:t>
+            </a:r>
+          </a:p>
+          <a:p>
+            <a:endParaRPr lang="en-GB" sz="1050" dirty="0"/>
+          </a:p>
+          <a:p>
+            <a:r>
+              <a:rPr lang="en-GB" sz="1050" dirty="0"/>
+              <a:t>Complete the rest of the </a:t>
+            </a:r>
+            <a:r>
+              <a:rPr lang="en-GB" sz="1050" dirty="0" err="1"/>
+              <a:t>enemie’s</a:t>
+            </a:r>
+            <a:r>
+              <a:rPr lang="en-GB" sz="1050" dirty="0"/>
+              <a:t> code.</a:t>
+            </a:r>
+          </a:p>
+          <a:p>
+            <a:endParaRPr lang="en-GB" sz="1050" dirty="0"/>
+          </a:p>
+          <a:p>
+            <a:r>
+              <a:rPr lang="en-GB" sz="1050" dirty="0"/>
+              <a:t>Start making new levels</a:t>
+            </a:r>
+          </a:p>
+          <a:p>
+            <a:endParaRPr lang="en-GB" sz="1050" dirty="0"/>
+          </a:p>
+          <a:p>
+            <a:r>
+              <a:rPr lang="en-GB" sz="1050" dirty="0"/>
+              <a:t>Finish making the death-screen room and menu options.</a:t>
+            </a:r>
+          </a:p>
+          <a:p>
+            <a:endParaRPr lang="en-GB" sz="1050" dirty="0"/>
+          </a:p>
+          <a:p>
+            <a:r>
+              <a:rPr lang="en-GB" sz="1050" dirty="0"/>
+              <a:t>Shrink current zones to 400x200 due to size issues and memory. Then adjust code in Camera controller, </a:t>
+            </a:r>
+            <a:r>
+              <a:rPr lang="en-GB" sz="1050" dirty="0" err="1"/>
+              <a:t>Gwiber</a:t>
+            </a:r>
+            <a:r>
+              <a:rPr lang="en-GB" sz="1050" dirty="0"/>
+              <a:t> and K9 to new co-ordinates. This will open the opportunity to add more zones.</a:t>
+            </a:r>
+          </a:p>
+        </p:txBody>
+      </p:sp>
+      <p:sp>
+        <p:nvSpPr>
+          <p:cNvPr id="19" name="TextBox 18">
+            <a:extLst>
+              <a:ext uri="{FF2B5EF4-FFF2-40B4-BE49-F238E27FC236}">
+                <a16:creationId xmlns:a16="http://schemas.microsoft.com/office/drawing/2014/main" id="{97D54616-45F4-1EDC-63D8-B9CEF19E3521}"/>
+              </a:ext>
+            </a:extLst>
+          </p:cNvPr>
+          <p:cNvSpPr txBox="1"/>
+          <p:nvPr/>
+        </p:nvSpPr>
+        <p:spPr>
+          <a:xfrm>
+            <a:off x="5662412" y="720049"/>
+            <a:ext cx="2408464" cy="369332"/>
+          </a:xfrm>
+          <a:prstGeom prst="rect">
+            <a:avLst/>
+          </a:prstGeom>
+          <a:noFill/>
+        </p:spPr>
+        <p:txBody>
+          <a:bodyPr wrap="square" rtlCol="0">
+            <a:spAutoFit/>
+          </a:bodyPr>
+          <a:lstStyle/>
+          <a:p>
+            <a:r>
+              <a:rPr lang="en-GB" dirty="0"/>
+              <a:t> </a:t>
+            </a:r>
+          </a:p>
+        </p:txBody>
+      </p:sp>
+      <p:pic>
+        <p:nvPicPr>
+          <p:cNvPr id="7" name="Picture 6" descr="A screenshot of a computer&#10;&#10;AI-generated content may be incorrect.">
+            <a:extLst>
+              <a:ext uri="{FF2B5EF4-FFF2-40B4-BE49-F238E27FC236}">
+                <a16:creationId xmlns:a16="http://schemas.microsoft.com/office/drawing/2014/main" id="{67931DB4-D69C-7870-1C86-362938E93E85}"/>
+              </a:ext>
+            </a:extLst>
+          </p:cNvPr>
+          <p:cNvPicPr>
+            <a:picLocks noChangeAspect="1"/>
+          </p:cNvPicPr>
+          <p:nvPr/>
+        </p:nvPicPr>
+        <p:blipFill>
+          <a:blip r:embed="rId2"/>
+          <a:stretch>
+            <a:fillRect/>
+          </a:stretch>
+        </p:blipFill>
+        <p:spPr>
+          <a:xfrm>
+            <a:off x="5856734" y="546940"/>
+            <a:ext cx="2576455" cy="4508796"/>
+          </a:xfrm>
+          <a:prstGeom prst="rect">
+            <a:avLst/>
+          </a:prstGeom>
+        </p:spPr>
+      </p:pic>
+      <p:pic>
+        <p:nvPicPr>
+          <p:cNvPr id="9" name="Picture 8" descr="A screenshot of a computer program&#10;&#10;AI-generated content may be incorrect.">
+            <a:extLst>
+              <a:ext uri="{FF2B5EF4-FFF2-40B4-BE49-F238E27FC236}">
+                <a16:creationId xmlns:a16="http://schemas.microsoft.com/office/drawing/2014/main" id="{10D13559-9A24-1E71-A0B5-1DA41A81AEAD}"/>
+              </a:ext>
+            </a:extLst>
+          </p:cNvPr>
+          <p:cNvPicPr>
+            <a:picLocks noChangeAspect="1"/>
+          </p:cNvPicPr>
+          <p:nvPr/>
+        </p:nvPicPr>
+        <p:blipFill>
+          <a:blip r:embed="rId3"/>
+          <a:stretch>
+            <a:fillRect/>
+          </a:stretch>
+        </p:blipFill>
+        <p:spPr>
+          <a:xfrm>
+            <a:off x="8822529" y="4014275"/>
+            <a:ext cx="2843384" cy="2677213"/>
+          </a:xfrm>
+          <a:prstGeom prst="rect">
+            <a:avLst/>
+          </a:prstGeom>
+        </p:spPr>
+      </p:pic>
+      <p:pic>
+        <p:nvPicPr>
+          <p:cNvPr id="11" name="Picture 10" descr="A screen shot of a computer&#10;&#10;AI-generated content may be incorrect.">
+            <a:extLst>
+              <a:ext uri="{FF2B5EF4-FFF2-40B4-BE49-F238E27FC236}">
+                <a16:creationId xmlns:a16="http://schemas.microsoft.com/office/drawing/2014/main" id="{4C7DB0C1-607E-8B66-D755-44A61F7E5347}"/>
+              </a:ext>
+            </a:extLst>
+          </p:cNvPr>
+          <p:cNvPicPr>
+            <a:picLocks noChangeAspect="1"/>
+          </p:cNvPicPr>
+          <p:nvPr/>
+        </p:nvPicPr>
+        <p:blipFill>
+          <a:blip r:embed="rId4"/>
+          <a:stretch>
+            <a:fillRect/>
+          </a:stretch>
+        </p:blipFill>
+        <p:spPr>
+          <a:xfrm>
+            <a:off x="4302785" y="5457467"/>
+            <a:ext cx="4239217" cy="895475"/>
+          </a:xfrm>
+          <a:prstGeom prst="rect">
+            <a:avLst/>
+          </a:prstGeom>
+        </p:spPr>
+      </p:pic>
+      <p:pic>
+        <p:nvPicPr>
+          <p:cNvPr id="13" name="Picture 12" descr="A screen shot of a computer program&#10;&#10;AI-generated content may be incorrect.">
+            <a:extLst>
+              <a:ext uri="{FF2B5EF4-FFF2-40B4-BE49-F238E27FC236}">
+                <a16:creationId xmlns:a16="http://schemas.microsoft.com/office/drawing/2014/main" id="{CBC0D0F0-074B-BBE9-3687-77AF4E303676}"/>
+              </a:ext>
+            </a:extLst>
+          </p:cNvPr>
+          <p:cNvPicPr>
+            <a:picLocks noChangeAspect="1"/>
+          </p:cNvPicPr>
+          <p:nvPr/>
+        </p:nvPicPr>
+        <p:blipFill>
+          <a:blip r:embed="rId5"/>
+          <a:srcRect b="23587"/>
+          <a:stretch>
+            <a:fillRect/>
+          </a:stretch>
+        </p:blipFill>
+        <p:spPr>
+          <a:xfrm>
+            <a:off x="0" y="5310893"/>
+            <a:ext cx="1835990" cy="1485181"/>
+          </a:xfrm>
+          <a:prstGeom prst="rect">
+            <a:avLst/>
+          </a:prstGeom>
+        </p:spPr>
+      </p:pic>
+      <p:sp>
+        <p:nvSpPr>
+          <p:cNvPr id="14" name="TextBox 13">
+            <a:extLst>
+              <a:ext uri="{FF2B5EF4-FFF2-40B4-BE49-F238E27FC236}">
+                <a16:creationId xmlns:a16="http://schemas.microsoft.com/office/drawing/2014/main" id="{C1CAFA85-24A1-783C-4821-BC513F34CB45}"/>
+              </a:ext>
+            </a:extLst>
+          </p:cNvPr>
+          <p:cNvSpPr txBox="1"/>
+          <p:nvPr/>
+        </p:nvSpPr>
+        <p:spPr>
+          <a:xfrm>
+            <a:off x="1944803" y="5380672"/>
+            <a:ext cx="2466589" cy="1477328"/>
+          </a:xfrm>
+          <a:prstGeom prst="rect">
+            <a:avLst/>
+          </a:prstGeom>
+          <a:noFill/>
+        </p:spPr>
+        <p:txBody>
+          <a:bodyPr wrap="square" rtlCol="0">
+            <a:spAutoFit/>
+          </a:bodyPr>
+          <a:lstStyle/>
+          <a:p>
+            <a:r>
+              <a:rPr lang="en-GB" dirty="0"/>
+              <a:t>K9 follows the same code format as </a:t>
+            </a:r>
+            <a:r>
+              <a:rPr lang="en-GB" dirty="0" err="1"/>
+              <a:t>Gwiber</a:t>
+            </a:r>
+            <a:r>
+              <a:rPr lang="en-GB" dirty="0"/>
+              <a:t> just with the addition of the right zones and door.</a:t>
+            </a:r>
+          </a:p>
+        </p:txBody>
+      </p:sp>
+    </p:spTree>
+    <p:extLst>
+      <p:ext uri="{BB962C8B-B14F-4D97-AF65-F5344CB8AC3E}">
+        <p14:creationId xmlns:p14="http://schemas.microsoft.com/office/powerpoint/2010/main" val="2175222665"/>
+      </p:ext>
+    </p:extLst>
+  </p:cSld>
+  <p:clrMapOvr>
+    <a:masterClrMapping/>
+  </p:clrMapOvr>
+</p:sld>
+</file>
+
+<file path=ppt/slides/slide16.xml><?xml version="1.0" encoding="utf-8"?>
+<p:sld xmlns:a="http://schemas.openxmlformats.org/drawingml/2006/main" xmlns:r="http://schemas.openxmlformats.org/officeDocument/2006/relationships" xmlns:p="http://schemas.openxmlformats.org/presentationml/2006/main">
+  <p:cSld>
+    <p:spTree>
+      <p:nvGrpSpPr>
+        <p:cNvPr id="1" name="">
+          <a:extLst>
+            <a:ext uri="{FF2B5EF4-FFF2-40B4-BE49-F238E27FC236}">
+              <a16:creationId xmlns:a16="http://schemas.microsoft.com/office/drawing/2014/main" id="{65AD331C-8449-0DAD-D1C3-E85B448858B0}"/>
+            </a:ext>
+          </a:extLst>
+        </p:cNvPr>
+        <p:cNvGrpSpPr/>
+        <p:nvPr/>
+      </p:nvGrpSpPr>
+      <p:grpSpPr>
+        <a:xfrm>
+          <a:off x="0" y="0"/>
+          <a:ext cx="0" cy="0"/>
+          <a:chOff x="0" y="0"/>
+          <a:chExt cx="0" cy="0"/>
+        </a:xfrm>
+      </p:grpSpPr>
+      <p:sp>
+        <p:nvSpPr>
+          <p:cNvPr id="4" name="TextBox 3">
+            <a:extLst>
+              <a:ext uri="{FF2B5EF4-FFF2-40B4-BE49-F238E27FC236}">
+                <a16:creationId xmlns:a16="http://schemas.microsoft.com/office/drawing/2014/main" id="{99159D22-CEFB-AFF4-F638-1B2579888140}"/>
+              </a:ext>
+            </a:extLst>
+          </p:cNvPr>
+          <p:cNvSpPr txBox="1"/>
+          <p:nvPr/>
+        </p:nvSpPr>
+        <p:spPr>
+          <a:xfrm>
+            <a:off x="7894620" y="121250"/>
+            <a:ext cx="2269916" cy="338554"/>
+          </a:xfrm>
+          <a:prstGeom prst="rect">
+            <a:avLst/>
+          </a:prstGeom>
+          <a:noFill/>
+          <a:ln>
+            <a:solidFill>
+              <a:schemeClr val="tx1"/>
+            </a:solidFill>
+          </a:ln>
+        </p:spPr>
+        <p:txBody>
+          <a:bodyPr rot="0" spcFirstLastPara="0" vertOverflow="overflow" horzOverflow="overflow" vert="horz" wrap="square" lIns="91440" tIns="45720" rIns="91440" bIns="45720" numCol="1" spcCol="0" rtlCol="0" fromWordArt="0" anchor="t" anchorCtr="0" forceAA="0" compatLnSpc="1">
+            <a:prstTxWarp prst="textNoShape">
+              <a:avLst/>
+            </a:prstTxWarp>
+            <a:spAutoFit/>
+          </a:bodyPr>
+          <a:lstStyle/>
+          <a:p>
+            <a:r>
+              <a:rPr lang="en-GB" sz="1600" dirty="0"/>
+              <a:t>Date – 22/01/2026</a:t>
+            </a:r>
+          </a:p>
+        </p:txBody>
+      </p:sp>
+      <p:sp>
+        <p:nvSpPr>
+          <p:cNvPr id="2" name="TextBox 1">
+            <a:extLst>
+              <a:ext uri="{FF2B5EF4-FFF2-40B4-BE49-F238E27FC236}">
+                <a16:creationId xmlns:a16="http://schemas.microsoft.com/office/drawing/2014/main" id="{3C6BBB91-A2E6-AEA6-C6C4-20AC820CD169}"/>
+              </a:ext>
+            </a:extLst>
+          </p:cNvPr>
+          <p:cNvSpPr txBox="1"/>
+          <p:nvPr/>
+        </p:nvSpPr>
+        <p:spPr>
+          <a:xfrm>
+            <a:off x="5651845" y="121250"/>
+            <a:ext cx="2112147" cy="338554"/>
+          </a:xfrm>
+          <a:prstGeom prst="rect">
+            <a:avLst/>
+          </a:prstGeom>
+          <a:noFill/>
+          <a:ln>
+            <a:solidFill>
+              <a:schemeClr val="tx1"/>
+            </a:solidFill>
+          </a:ln>
+        </p:spPr>
+        <p:txBody>
+          <a:bodyPr rot="0" spcFirstLastPara="0" vertOverflow="overflow" horzOverflow="overflow" vert="horz" wrap="square" lIns="91440" tIns="45720" rIns="91440" bIns="45720" numCol="1" spcCol="0" rtlCol="0" fromWordArt="0" anchor="t" anchorCtr="0" forceAA="0" compatLnSpc="1">
+            <a:prstTxWarp prst="textNoShape">
+              <a:avLst/>
+            </a:prstTxWarp>
+            <a:spAutoFit/>
+          </a:bodyPr>
+          <a:lstStyle/>
+          <a:p>
+            <a:r>
+              <a:rPr lang="en-GB" sz="1600" dirty="0"/>
+              <a:t>Game Build V.0.6.4</a:t>
+            </a:r>
+          </a:p>
+        </p:txBody>
+      </p:sp>
+      <p:sp>
+        <p:nvSpPr>
+          <p:cNvPr id="3" name="TextBox 2">
+            <a:extLst>
+              <a:ext uri="{FF2B5EF4-FFF2-40B4-BE49-F238E27FC236}">
+                <a16:creationId xmlns:a16="http://schemas.microsoft.com/office/drawing/2014/main" id="{91C5E40A-822F-899E-6D80-3F311DDAF6A9}"/>
+              </a:ext>
+            </a:extLst>
+          </p:cNvPr>
+          <p:cNvSpPr txBox="1"/>
+          <p:nvPr/>
+        </p:nvSpPr>
+        <p:spPr>
+          <a:xfrm>
+            <a:off x="0" y="152027"/>
+            <a:ext cx="5576207" cy="3785652"/>
+          </a:xfrm>
+          <a:prstGeom prst="rect">
+            <a:avLst/>
+          </a:prstGeom>
+          <a:noFill/>
+          <a:ln>
+            <a:solidFill>
+              <a:schemeClr val="tx1"/>
+            </a:solidFill>
+          </a:ln>
+        </p:spPr>
+        <p:txBody>
+          <a:bodyPr rot="0" spcFirstLastPara="0" vertOverflow="overflow" horzOverflow="overflow" vert="horz" wrap="square" lIns="91440" tIns="45720" rIns="91440" bIns="45720" numCol="1" spcCol="0" rtlCol="0" fromWordArt="0" anchor="t" anchorCtr="0" forceAA="0" compatLnSpc="1">
+            <a:prstTxWarp prst="textNoShape">
+              <a:avLst/>
+            </a:prstTxWarp>
+            <a:spAutoFit/>
+          </a:bodyPr>
+          <a:lstStyle/>
+          <a:p>
+            <a:r>
+              <a:rPr lang="en-GB" sz="1200" dirty="0"/>
+              <a:t>I decreased the size of the current zones and then made the correct adjustments to the Camera and Enemies co-ordinates for where the zones are.</a:t>
+            </a:r>
+          </a:p>
+          <a:p>
+            <a:endParaRPr lang="en-GB" sz="1200" dirty="0"/>
+          </a:p>
+          <a:p>
+            <a:r>
+              <a:rPr lang="en-GB" sz="1200" dirty="0"/>
+              <a:t>I finished designing the buttons for the menu screen room and finished creating the death-screen room.</a:t>
+            </a:r>
+          </a:p>
+          <a:p>
+            <a:endParaRPr lang="en-GB" sz="1200" dirty="0"/>
+          </a:p>
+          <a:p>
+            <a:r>
+              <a:rPr lang="en-GB" sz="1200" dirty="0"/>
+              <a:t>The new starting room is now the menu screen room with buttons allowing the player to start game. I Have also made a 3</a:t>
+            </a:r>
+            <a:r>
+              <a:rPr lang="en-GB" sz="1200" baseline="30000" dirty="0"/>
+              <a:t>rd</a:t>
+            </a:r>
+            <a:r>
+              <a:rPr lang="en-GB" sz="1200" dirty="0"/>
+              <a:t> room for displaying the control schemes as an optional button for the player to use while in menu screen room.</a:t>
+            </a:r>
+          </a:p>
+          <a:p>
+            <a:endParaRPr lang="en-GB" sz="1200" dirty="0"/>
+          </a:p>
+          <a:p>
+            <a:r>
+              <a:rPr lang="en-GB" sz="1200" dirty="0"/>
+              <a:t>The Main zones such as the office were tricky to re-size so I did some maths and for the doors/vents to match the size of the new zones 400x225, I will divide their current size by 4.8 which was the divided decrease the camera zones shrunk by. 1920 divided by 400 = 4.8. So, the doors are 1000x1000, so I divide 1000 by 4.8 to get a more accurate measurement. 1000/4.8 is 208.3 to the nearest 10. So, to make it easier I’ll just shrink it to 208. For the main view doors, they are 200x740, however, I don’t need to divide their numbers for I can just use my eyes to size them to the new scales.</a:t>
+            </a:r>
+          </a:p>
+          <a:p>
+            <a:endParaRPr lang="en-GB" sz="1200" dirty="0"/>
+          </a:p>
+          <a:p>
+            <a:endParaRPr lang="en-GB" sz="1200" dirty="0"/>
+          </a:p>
+        </p:txBody>
+      </p:sp>
+      <p:sp>
+        <p:nvSpPr>
+          <p:cNvPr id="6" name="TextBox 5">
+            <a:extLst>
+              <a:ext uri="{FF2B5EF4-FFF2-40B4-BE49-F238E27FC236}">
+                <a16:creationId xmlns:a16="http://schemas.microsoft.com/office/drawing/2014/main" id="{BC19F5DA-D971-E655-3114-179D39E77071}"/>
+              </a:ext>
+            </a:extLst>
+          </p:cNvPr>
+          <p:cNvSpPr txBox="1"/>
+          <p:nvPr/>
+        </p:nvSpPr>
+        <p:spPr>
+          <a:xfrm>
+            <a:off x="8542002" y="612254"/>
+            <a:ext cx="3307343" cy="253916"/>
+          </a:xfrm>
+          <a:prstGeom prst="rect">
+            <a:avLst/>
+          </a:prstGeom>
+          <a:noFill/>
+          <a:ln>
+            <a:solidFill>
+              <a:schemeClr val="tx1"/>
+            </a:solidFill>
+          </a:ln>
+        </p:spPr>
+        <p:txBody>
+          <a:bodyPr rot="0" spcFirstLastPara="0" vertOverflow="overflow" horzOverflow="overflow" vert="horz" wrap="square" lIns="91440" tIns="45720" rIns="91440" bIns="45720" numCol="1" spcCol="0" rtlCol="0" fromWordArt="0" anchor="t" anchorCtr="0" forceAA="0" compatLnSpc="1">
+            <a:prstTxWarp prst="textNoShape">
+              <a:avLst/>
+            </a:prstTxWarp>
+            <a:spAutoFit/>
+          </a:bodyPr>
+          <a:lstStyle/>
+          <a:p>
+            <a:r>
+              <a:rPr lang="en-GB" sz="1050" dirty="0"/>
+              <a:t>What to do Next Session </a:t>
+            </a:r>
+          </a:p>
+        </p:txBody>
+      </p:sp>
+      <p:sp>
+        <p:nvSpPr>
+          <p:cNvPr id="19" name="TextBox 18">
+            <a:extLst>
+              <a:ext uri="{FF2B5EF4-FFF2-40B4-BE49-F238E27FC236}">
+                <a16:creationId xmlns:a16="http://schemas.microsoft.com/office/drawing/2014/main" id="{05CF4C08-117B-9194-B590-2430D0ADE4FB}"/>
+              </a:ext>
+            </a:extLst>
+          </p:cNvPr>
+          <p:cNvSpPr txBox="1"/>
+          <p:nvPr/>
+        </p:nvSpPr>
+        <p:spPr>
+          <a:xfrm>
+            <a:off x="5662412" y="720049"/>
+            <a:ext cx="2408464" cy="369332"/>
+          </a:xfrm>
+          <a:prstGeom prst="rect">
+            <a:avLst/>
+          </a:prstGeom>
+          <a:noFill/>
+        </p:spPr>
+        <p:txBody>
+          <a:bodyPr wrap="square" rtlCol="0">
+            <a:spAutoFit/>
+          </a:bodyPr>
+          <a:lstStyle/>
+          <a:p>
+            <a:r>
+              <a:rPr lang="en-GB" dirty="0"/>
+              <a:t> </a:t>
+            </a:r>
+          </a:p>
+        </p:txBody>
+      </p:sp>
+      <p:pic>
+        <p:nvPicPr>
+          <p:cNvPr id="23" name="Picture 22" descr="A screenshot of a computer&#10;&#10;AI-generated content may be incorrect.">
+            <a:extLst>
+              <a:ext uri="{FF2B5EF4-FFF2-40B4-BE49-F238E27FC236}">
+                <a16:creationId xmlns:a16="http://schemas.microsoft.com/office/drawing/2014/main" id="{5C3BAF57-CEBC-E822-3C04-1019C35AF6C4}"/>
+              </a:ext>
+            </a:extLst>
+          </p:cNvPr>
+          <p:cNvPicPr>
+            <a:picLocks noChangeAspect="1"/>
+          </p:cNvPicPr>
+          <p:nvPr/>
+        </p:nvPicPr>
+        <p:blipFill>
+          <a:blip r:embed="rId2"/>
+          <a:stretch>
+            <a:fillRect/>
+          </a:stretch>
+        </p:blipFill>
+        <p:spPr>
+          <a:xfrm>
+            <a:off x="215994" y="3569566"/>
+            <a:ext cx="2572109" cy="1943371"/>
+          </a:xfrm>
+          <a:prstGeom prst="rect">
+            <a:avLst/>
+          </a:prstGeom>
+        </p:spPr>
+      </p:pic>
+      <p:pic>
+        <p:nvPicPr>
+          <p:cNvPr id="25" name="Picture 24" descr="A screenshot of a computer&#10;&#10;AI-generated content may be incorrect.">
+            <a:extLst>
+              <a:ext uri="{FF2B5EF4-FFF2-40B4-BE49-F238E27FC236}">
+                <a16:creationId xmlns:a16="http://schemas.microsoft.com/office/drawing/2014/main" id="{C19EC527-655E-BA37-4AB1-8C1ADFD1B6E6}"/>
+              </a:ext>
+            </a:extLst>
+          </p:cNvPr>
+          <p:cNvPicPr>
+            <a:picLocks noChangeAspect="1"/>
+          </p:cNvPicPr>
+          <p:nvPr/>
+        </p:nvPicPr>
+        <p:blipFill>
+          <a:blip r:embed="rId3"/>
+          <a:stretch>
+            <a:fillRect/>
+          </a:stretch>
+        </p:blipFill>
+        <p:spPr>
+          <a:xfrm>
+            <a:off x="5706365" y="534613"/>
+            <a:ext cx="2705478" cy="2114845"/>
+          </a:xfrm>
+          <a:prstGeom prst="rect">
+            <a:avLst/>
+          </a:prstGeom>
+        </p:spPr>
+      </p:pic>
+      <p:pic>
+        <p:nvPicPr>
+          <p:cNvPr id="27" name="Picture 26" descr="A blue rectangle with white border&#10;&#10;AI-generated content may be incorrect.">
+            <a:extLst>
+              <a:ext uri="{FF2B5EF4-FFF2-40B4-BE49-F238E27FC236}">
+                <a16:creationId xmlns:a16="http://schemas.microsoft.com/office/drawing/2014/main" id="{B55928DA-C613-664F-E7D1-488E62CB1086}"/>
+              </a:ext>
+            </a:extLst>
+          </p:cNvPr>
+          <p:cNvPicPr>
+            <a:picLocks noChangeAspect="1"/>
+          </p:cNvPicPr>
+          <p:nvPr/>
+        </p:nvPicPr>
+        <p:blipFill>
+          <a:blip r:embed="rId4"/>
+          <a:stretch>
+            <a:fillRect/>
+          </a:stretch>
+        </p:blipFill>
+        <p:spPr>
+          <a:xfrm>
+            <a:off x="2949919" y="3429000"/>
+            <a:ext cx="1771897" cy="952633"/>
+          </a:xfrm>
+          <a:prstGeom prst="rect">
+            <a:avLst/>
+          </a:prstGeom>
+        </p:spPr>
+      </p:pic>
+      <p:pic>
+        <p:nvPicPr>
+          <p:cNvPr id="29" name="Picture 28">
+            <a:extLst>
+              <a:ext uri="{FF2B5EF4-FFF2-40B4-BE49-F238E27FC236}">
+                <a16:creationId xmlns:a16="http://schemas.microsoft.com/office/drawing/2014/main" id="{21705148-A5FF-6ED5-9DC6-5C61848F301C}"/>
+              </a:ext>
+            </a:extLst>
+          </p:cNvPr>
+          <p:cNvPicPr>
+            <a:picLocks noChangeAspect="1"/>
+          </p:cNvPicPr>
+          <p:nvPr/>
+        </p:nvPicPr>
+        <p:blipFill>
+          <a:blip r:embed="rId5"/>
+          <a:stretch>
+            <a:fillRect/>
+          </a:stretch>
+        </p:blipFill>
+        <p:spPr>
+          <a:xfrm>
+            <a:off x="215994" y="5633055"/>
+            <a:ext cx="10078857" cy="1009791"/>
+          </a:xfrm>
+          <a:prstGeom prst="rect">
+            <a:avLst/>
+          </a:prstGeom>
+        </p:spPr>
+      </p:pic>
+      <p:sp>
+        <p:nvSpPr>
+          <p:cNvPr id="30" name="TextBox 29">
+            <a:extLst>
+              <a:ext uri="{FF2B5EF4-FFF2-40B4-BE49-F238E27FC236}">
+                <a16:creationId xmlns:a16="http://schemas.microsoft.com/office/drawing/2014/main" id="{1CA8D09C-DF4E-54F0-847D-659B3EBD7337}"/>
+              </a:ext>
+            </a:extLst>
+          </p:cNvPr>
+          <p:cNvSpPr txBox="1"/>
+          <p:nvPr/>
+        </p:nvSpPr>
+        <p:spPr>
+          <a:xfrm>
+            <a:off x="5780314" y="2873829"/>
+            <a:ext cx="3307342" cy="2492990"/>
+          </a:xfrm>
+          <a:prstGeom prst="rect">
+            <a:avLst/>
+          </a:prstGeom>
+          <a:noFill/>
+        </p:spPr>
+        <p:txBody>
+          <a:bodyPr wrap="square" rtlCol="0">
+            <a:spAutoFit/>
+          </a:bodyPr>
+          <a:lstStyle/>
+          <a:p>
+            <a:r>
+              <a:rPr lang="en-GB" sz="1200" dirty="0"/>
+              <a:t>The Vents currently are 2000x1050. So, 2000/4.8 and 1050/4.8. 2000/4.8 = 416.7 to the nearest 10 so I’ll round it up to 417. 1050/4,8 = 218.75, so It will be rounded to 219.</a:t>
+            </a:r>
+          </a:p>
+          <a:p>
+            <a:endParaRPr lang="en-GB" sz="1200" dirty="0"/>
+          </a:p>
+          <a:p>
+            <a:r>
+              <a:rPr lang="en-GB" sz="1200" dirty="0"/>
+              <a:t>New vents sizes. Width 417, Height 219. Unfortunately, for no reason, I cannot resize the current vents correctly, so I will re-do them in their new sizes.</a:t>
+            </a:r>
+          </a:p>
+          <a:p>
+            <a:endParaRPr lang="en-GB" sz="1200" dirty="0"/>
+          </a:p>
+          <a:p>
+            <a:r>
+              <a:rPr lang="en-GB" sz="1200" dirty="0"/>
+              <a:t>The enemies have also been scaled down from 1040x1040 to 200x200. Besides Arach because he has a unique size, so for Arach its 200x133.</a:t>
+            </a:r>
+          </a:p>
+        </p:txBody>
+      </p:sp>
+      <p:pic>
+        <p:nvPicPr>
+          <p:cNvPr id="32" name="Picture 31" descr="A yellow x on a grey surface&#10;&#10;AI-generated content may be incorrect.">
+            <a:extLst>
+              <a:ext uri="{FF2B5EF4-FFF2-40B4-BE49-F238E27FC236}">
+                <a16:creationId xmlns:a16="http://schemas.microsoft.com/office/drawing/2014/main" id="{2547702E-3E1A-744C-56B9-B7E1EA1B5FBE}"/>
+              </a:ext>
+            </a:extLst>
+          </p:cNvPr>
+          <p:cNvPicPr>
+            <a:picLocks noChangeAspect="1"/>
+          </p:cNvPicPr>
+          <p:nvPr/>
+        </p:nvPicPr>
+        <p:blipFill>
+          <a:blip r:embed="rId6"/>
+          <a:stretch>
+            <a:fillRect/>
+          </a:stretch>
+        </p:blipFill>
+        <p:spPr>
+          <a:xfrm>
+            <a:off x="3004097" y="4416748"/>
+            <a:ext cx="2308281" cy="1181191"/>
+          </a:xfrm>
+          <a:prstGeom prst="rect">
+            <a:avLst/>
+          </a:prstGeom>
+        </p:spPr>
+      </p:pic>
+      <p:sp>
+        <p:nvSpPr>
+          <p:cNvPr id="33" name="TextBox 32">
+            <a:extLst>
+              <a:ext uri="{FF2B5EF4-FFF2-40B4-BE49-F238E27FC236}">
+                <a16:creationId xmlns:a16="http://schemas.microsoft.com/office/drawing/2014/main" id="{D777E7E7-6EAE-DCBD-4553-9625D56A5CC8}"/>
+              </a:ext>
+            </a:extLst>
+          </p:cNvPr>
+          <p:cNvSpPr txBox="1"/>
+          <p:nvPr/>
+        </p:nvSpPr>
+        <p:spPr>
+          <a:xfrm>
+            <a:off x="9242081" y="1799935"/>
+            <a:ext cx="2705478" cy="3785652"/>
+          </a:xfrm>
+          <a:prstGeom prst="rect">
+            <a:avLst/>
+          </a:prstGeom>
+          <a:noFill/>
+        </p:spPr>
+        <p:txBody>
+          <a:bodyPr wrap="square" rtlCol="0">
+            <a:spAutoFit/>
+          </a:bodyPr>
+          <a:lstStyle/>
+          <a:p>
+            <a:r>
+              <a:rPr lang="en-GB" sz="1200" dirty="0"/>
+              <a:t>After shrinking everything down and correcting the Co-ordinates of the Camera Positions, I attempted to make the game go full screen while not affecting the viewports size. However, I figured Out that I haven’t defined the size of each </a:t>
+            </a:r>
+            <a:r>
+              <a:rPr lang="en-GB" sz="1200" dirty="0" err="1"/>
+              <a:t>camerapos</a:t>
+            </a:r>
+            <a:r>
+              <a:rPr lang="en-GB" sz="1200" dirty="0"/>
+              <a:t> since the old code worked fine when everything was 1920x1080 but this time the zones are 400x225 and the viewport is offset. </a:t>
+            </a:r>
+          </a:p>
+          <a:p>
+            <a:endParaRPr lang="en-GB" sz="1200" dirty="0"/>
+          </a:p>
+          <a:p>
+            <a:r>
+              <a:rPr lang="en-GB" sz="1200" dirty="0"/>
+              <a:t>I have also removed smooth transitions and discovered that my camera code was reliant on smooth transition to create variables for the rest of the camera’s code to use. So, removing it caused the cameras to stop working. Visit test 9 for more details.</a:t>
+            </a:r>
+          </a:p>
+        </p:txBody>
+      </p:sp>
+    </p:spTree>
+    <p:extLst>
+      <p:ext uri="{BB962C8B-B14F-4D97-AF65-F5344CB8AC3E}">
+        <p14:creationId xmlns:p14="http://schemas.microsoft.com/office/powerpoint/2010/main" val="1769043216"/>
+      </p:ext>
+    </p:extLst>
+  </p:cSld>
+  <p:clrMapOvr>
+    <a:masterClrMapping/>
+  </p:clrMapOvr>
+</p:sld>
+</file>
+
+<file path=ppt/slides/slide17.xml><?xml version="1.0" encoding="utf-8"?>
+<p:sld xmlns:a="http://schemas.openxmlformats.org/drawingml/2006/main" xmlns:r="http://schemas.openxmlformats.org/officeDocument/2006/relationships" xmlns:p="http://schemas.openxmlformats.org/presentationml/2006/main">
+  <p:cSld>
+    <p:spTree>
+      <p:nvGrpSpPr>
         <p:cNvPr id="1" name=""/>
         <p:cNvGrpSpPr/>
         <p:nvPr/>
@@ -6510,7 +7629,7 @@
 </p:sld>
 </file>
 
-<file path=ppt/slides/slide16.xml><?xml version="1.0" encoding="utf-8"?>
+<file path=ppt/slides/slide18.xml><?xml version="1.0" encoding="utf-8"?>
 <p:sld xmlns:a="http://schemas.openxmlformats.org/drawingml/2006/main" xmlns:r="http://schemas.openxmlformats.org/officeDocument/2006/relationships" xmlns:p="http://schemas.openxmlformats.org/presentationml/2006/main">
   <p:cSld>
     <p:spTree>
@@ -7101,7 +8220,7 @@
 </p:sld>
 </file>
 
-<file path=ppt/slides/slide17.xml><?xml version="1.0" encoding="utf-8"?>
+<file path=ppt/slides/slide19.xml><?xml version="1.0" encoding="utf-8"?>
 <p:sld xmlns:a="http://schemas.openxmlformats.org/drawingml/2006/main" xmlns:r="http://schemas.openxmlformats.org/officeDocument/2006/relationships" xmlns:p="http://schemas.openxmlformats.org/presentationml/2006/main">
   <p:cSld>
     <p:spTree>
@@ -7625,7 +8744,399 @@
 </p:sld>
 </file>
 
-<file path=ppt/slides/slide18.xml><?xml version="1.0" encoding="utf-8"?>
+<file path=ppt/slides/slide2.xml><?xml version="1.0" encoding="utf-8"?>
+<p:sld xmlns:a="http://schemas.openxmlformats.org/drawingml/2006/main" xmlns:r="http://schemas.openxmlformats.org/officeDocument/2006/relationships" xmlns:p="http://schemas.openxmlformats.org/presentationml/2006/main">
+  <p:cSld>
+    <p:spTree>
+      <p:nvGrpSpPr>
+        <p:cNvPr id="1" name="">
+          <a:extLst>
+            <a:ext uri="{FF2B5EF4-FFF2-40B4-BE49-F238E27FC236}">
+              <a16:creationId xmlns:a16="http://schemas.microsoft.com/office/drawing/2014/main" id="{B2FB39EC-F8FE-ADA9-EA59-F1EC36434BDE}"/>
+            </a:ext>
+          </a:extLst>
+        </p:cNvPr>
+        <p:cNvGrpSpPr/>
+        <p:nvPr/>
+      </p:nvGrpSpPr>
+      <p:grpSpPr>
+        <a:xfrm>
+          <a:off x="0" y="0"/>
+          <a:ext cx="0" cy="0"/>
+          <a:chOff x="0" y="0"/>
+          <a:chExt cx="0" cy="0"/>
+        </a:xfrm>
+      </p:grpSpPr>
+      <p:sp>
+        <p:nvSpPr>
+          <p:cNvPr id="4" name="TextBox 3">
+            <a:extLst>
+              <a:ext uri="{FF2B5EF4-FFF2-40B4-BE49-F238E27FC236}">
+                <a16:creationId xmlns:a16="http://schemas.microsoft.com/office/drawing/2014/main" id="{576BDE55-6263-8575-7C13-EC317449D25F}"/>
+              </a:ext>
+            </a:extLst>
+          </p:cNvPr>
+          <p:cNvSpPr txBox="1"/>
+          <p:nvPr/>
+        </p:nvSpPr>
+        <p:spPr>
+          <a:xfrm>
+            <a:off x="7763992" y="90121"/>
+            <a:ext cx="1809641" cy="338554"/>
+          </a:xfrm>
+          <a:prstGeom prst="rect">
+            <a:avLst/>
+          </a:prstGeom>
+          <a:noFill/>
+          <a:ln>
+            <a:solidFill>
+              <a:schemeClr val="tx1"/>
+            </a:solidFill>
+          </a:ln>
+        </p:spPr>
+        <p:txBody>
+          <a:bodyPr rot="0" spcFirstLastPara="0" vertOverflow="overflow" horzOverflow="overflow" vert="horz" wrap="square" lIns="91440" tIns="45720" rIns="91440" bIns="45720" numCol="1" spcCol="0" rtlCol="0" fromWordArt="0" anchor="t" anchorCtr="0" forceAA="0" compatLnSpc="1">
+            <a:prstTxWarp prst="textNoShape">
+              <a:avLst/>
+            </a:prstTxWarp>
+            <a:spAutoFit/>
+          </a:bodyPr>
+          <a:lstStyle/>
+          <a:p>
+            <a:r>
+              <a:rPr lang="en-GB" sz="1600" dirty="0"/>
+              <a:t>Date – 24/11/2025</a:t>
+            </a:r>
+          </a:p>
+        </p:txBody>
+      </p:sp>
+      <p:sp>
+        <p:nvSpPr>
+          <p:cNvPr id="2" name="TextBox 1">
+            <a:extLst>
+              <a:ext uri="{FF2B5EF4-FFF2-40B4-BE49-F238E27FC236}">
+                <a16:creationId xmlns:a16="http://schemas.microsoft.com/office/drawing/2014/main" id="{6165D850-749B-B97D-752E-BEC348B613E1}"/>
+              </a:ext>
+            </a:extLst>
+          </p:cNvPr>
+          <p:cNvSpPr txBox="1"/>
+          <p:nvPr/>
+        </p:nvSpPr>
+        <p:spPr>
+          <a:xfrm>
+            <a:off x="5651845" y="90120"/>
+            <a:ext cx="1959856" cy="338554"/>
+          </a:xfrm>
+          <a:prstGeom prst="rect">
+            <a:avLst/>
+          </a:prstGeom>
+          <a:noFill/>
+          <a:ln>
+            <a:solidFill>
+              <a:schemeClr val="tx1"/>
+            </a:solidFill>
+          </a:ln>
+        </p:spPr>
+        <p:txBody>
+          <a:bodyPr rot="0" spcFirstLastPara="0" vertOverflow="overflow" horzOverflow="overflow" vert="horz" wrap="square" lIns="91440" tIns="45720" rIns="91440" bIns="45720" numCol="1" spcCol="0" rtlCol="0" fromWordArt="0" anchor="t" anchorCtr="0" forceAA="0" compatLnSpc="1">
+            <a:prstTxWarp prst="textNoShape">
+              <a:avLst/>
+            </a:prstTxWarp>
+            <a:spAutoFit/>
+          </a:bodyPr>
+          <a:lstStyle/>
+          <a:p>
+            <a:r>
+              <a:rPr lang="en-GB" sz="1600" dirty="0"/>
+              <a:t>Game Build V.0.1</a:t>
+            </a:r>
+          </a:p>
+        </p:txBody>
+      </p:sp>
+      <p:sp>
+        <p:nvSpPr>
+          <p:cNvPr id="3" name="TextBox 2">
+            <a:extLst>
+              <a:ext uri="{FF2B5EF4-FFF2-40B4-BE49-F238E27FC236}">
+                <a16:creationId xmlns:a16="http://schemas.microsoft.com/office/drawing/2014/main" id="{B05434DB-BE74-90C9-E4A8-6FC8304041B7}"/>
+              </a:ext>
+            </a:extLst>
+          </p:cNvPr>
+          <p:cNvSpPr txBox="1"/>
+          <p:nvPr/>
+        </p:nvSpPr>
+        <p:spPr>
+          <a:xfrm>
+            <a:off x="5648215" y="563289"/>
+            <a:ext cx="3926490" cy="4431983"/>
+          </a:xfrm>
+          <a:prstGeom prst="rect">
+            <a:avLst/>
+          </a:prstGeom>
+          <a:noFill/>
+          <a:ln>
+            <a:solidFill>
+              <a:schemeClr val="tx1"/>
+            </a:solidFill>
+          </a:ln>
+        </p:spPr>
+        <p:txBody>
+          <a:bodyPr rot="0" spcFirstLastPara="0" vertOverflow="overflow" horzOverflow="overflow" vert="horz" wrap="square" lIns="91440" tIns="45720" rIns="91440" bIns="45720" numCol="1" spcCol="0" rtlCol="0" fromWordArt="0" anchor="t" anchorCtr="0" forceAA="0" compatLnSpc="1">
+            <a:prstTxWarp prst="textNoShape">
+              <a:avLst/>
+            </a:prstTxWarp>
+            <a:spAutoFit/>
+          </a:bodyPr>
+          <a:lstStyle/>
+          <a:p>
+            <a:r>
+              <a:rPr lang="en-GB" sz="1400" dirty="0"/>
+              <a:t>Summary Of Session</a:t>
+            </a:r>
+          </a:p>
+          <a:p>
+            <a:endParaRPr lang="en-GB" sz="1400" dirty="0"/>
+          </a:p>
+          <a:p>
+            <a:r>
+              <a:rPr lang="en-GB" sz="1400" dirty="0"/>
+              <a:t>Colour coded each zone and named them correctly. These are to be used temporarily before the official designs are completed. The grey coloured zones are for the front views of both the vents and the doors.</a:t>
+            </a:r>
+          </a:p>
+          <a:p>
+            <a:endParaRPr lang="en-GB" sz="1400" dirty="0"/>
+          </a:p>
+          <a:p>
+            <a:r>
+              <a:rPr lang="en-GB" sz="1400" dirty="0"/>
+              <a:t>I have also Created a template for the Office.</a:t>
+            </a:r>
+          </a:p>
+          <a:p>
+            <a:r>
+              <a:rPr lang="en-GB" sz="1400" dirty="0"/>
+              <a:t>The Office will have a set size of 3000x1050, and the zones will have a set size of 2000x1050.</a:t>
+            </a:r>
+          </a:p>
+          <a:p>
+            <a:endParaRPr lang="en-GB" sz="1400" dirty="0"/>
+          </a:p>
+          <a:p>
+            <a:r>
+              <a:rPr lang="en-GB" sz="1400" dirty="0"/>
+              <a:t>The Buttons for both the vents and doors are made in Game Maker and will be 200x300px to have more flexibility in designing.</a:t>
+            </a:r>
+          </a:p>
+          <a:p>
+            <a:endParaRPr lang="en-GB" sz="1400" dirty="0"/>
+          </a:p>
+          <a:p>
+            <a:r>
+              <a:rPr lang="en-GB" sz="1400" dirty="0"/>
+              <a:t>The Camera button will start off being 300x100.</a:t>
+            </a:r>
+          </a:p>
+          <a:p>
+            <a:endParaRPr lang="en-GB" sz="1400" dirty="0"/>
+          </a:p>
+          <a:p>
+            <a:endParaRPr lang="en-GB" sz="1400" dirty="0"/>
+          </a:p>
+          <a:p>
+            <a:endParaRPr lang="en-GB" sz="1600" dirty="0"/>
+          </a:p>
+        </p:txBody>
+      </p:sp>
+      <p:sp>
+        <p:nvSpPr>
+          <p:cNvPr id="6" name="TextBox 5">
+            <a:extLst>
+              <a:ext uri="{FF2B5EF4-FFF2-40B4-BE49-F238E27FC236}">
+                <a16:creationId xmlns:a16="http://schemas.microsoft.com/office/drawing/2014/main" id="{5D546EC8-C3EF-D2D7-4576-CD84485BAD0C}"/>
+              </a:ext>
+            </a:extLst>
+          </p:cNvPr>
+          <p:cNvSpPr txBox="1"/>
+          <p:nvPr/>
+        </p:nvSpPr>
+        <p:spPr>
+          <a:xfrm>
+            <a:off x="9642445" y="54237"/>
+            <a:ext cx="2438400" cy="1754326"/>
+          </a:xfrm>
+          <a:prstGeom prst="rect">
+            <a:avLst/>
+          </a:prstGeom>
+          <a:noFill/>
+          <a:ln>
+            <a:solidFill>
+              <a:schemeClr val="tx1"/>
+            </a:solidFill>
+          </a:ln>
+        </p:spPr>
+        <p:txBody>
+          <a:bodyPr rot="0" spcFirstLastPara="0" vertOverflow="overflow" horzOverflow="overflow" vert="horz" wrap="square" lIns="91440" tIns="45720" rIns="91440" bIns="45720" numCol="1" spcCol="0" rtlCol="0" fromWordArt="0" anchor="t" anchorCtr="0" forceAA="0" compatLnSpc="1">
+            <a:prstTxWarp prst="textNoShape">
+              <a:avLst/>
+            </a:prstTxWarp>
+            <a:spAutoFit/>
+          </a:bodyPr>
+          <a:lstStyle/>
+          <a:p>
+            <a:r>
+              <a:rPr lang="en-GB" sz="1200" dirty="0"/>
+              <a:t>What to do for Next Session</a:t>
+            </a:r>
+          </a:p>
+          <a:p>
+            <a:endParaRPr lang="en-GB" sz="1200" dirty="0"/>
+          </a:p>
+          <a:p>
+            <a:r>
+              <a:rPr lang="en-GB" sz="1200" dirty="0"/>
+              <a:t>Allocate each zone to a location and name them specific to what contents are in it. For Example, 2 zones will be named obj_left_corridor and obj_left_corridor.</a:t>
+            </a:r>
+          </a:p>
+          <a:p>
+            <a:endParaRPr lang="en-GB" sz="1200" dirty="0"/>
+          </a:p>
+        </p:txBody>
+      </p:sp>
+      <p:pic>
+        <p:nvPicPr>
+          <p:cNvPr id="9" name="Picture 8">
+            <a:extLst>
+              <a:ext uri="{FF2B5EF4-FFF2-40B4-BE49-F238E27FC236}">
+                <a16:creationId xmlns:a16="http://schemas.microsoft.com/office/drawing/2014/main" id="{D5DA7A1B-0205-F5E4-D017-A101709C5534}"/>
+              </a:ext>
+            </a:extLst>
+          </p:cNvPr>
+          <p:cNvPicPr>
+            <a:picLocks noChangeAspect="1"/>
+          </p:cNvPicPr>
+          <p:nvPr/>
+        </p:nvPicPr>
+        <p:blipFill>
+          <a:blip r:embed="rId2"/>
+          <a:stretch>
+            <a:fillRect/>
+          </a:stretch>
+        </p:blipFill>
+        <p:spPr>
+          <a:xfrm>
+            <a:off x="35660" y="54237"/>
+            <a:ext cx="2581635" cy="2152950"/>
+          </a:xfrm>
+          <a:prstGeom prst="rect">
+            <a:avLst/>
+          </a:prstGeom>
+        </p:spPr>
+      </p:pic>
+      <p:pic>
+        <p:nvPicPr>
+          <p:cNvPr id="19" name="Picture 18">
+            <a:extLst>
+              <a:ext uri="{FF2B5EF4-FFF2-40B4-BE49-F238E27FC236}">
+                <a16:creationId xmlns:a16="http://schemas.microsoft.com/office/drawing/2014/main" id="{094D053A-FA5D-5E1A-4596-4B1AB3899244}"/>
+              </a:ext>
+            </a:extLst>
+          </p:cNvPr>
+          <p:cNvPicPr>
+            <a:picLocks noChangeAspect="1"/>
+          </p:cNvPicPr>
+          <p:nvPr/>
+        </p:nvPicPr>
+        <p:blipFill>
+          <a:blip r:embed="rId3"/>
+          <a:stretch>
+            <a:fillRect/>
+          </a:stretch>
+        </p:blipFill>
+        <p:spPr>
+          <a:xfrm>
+            <a:off x="3200014" y="90120"/>
+            <a:ext cx="2372056" cy="4239217"/>
+          </a:xfrm>
+          <a:prstGeom prst="rect">
+            <a:avLst/>
+          </a:prstGeom>
+        </p:spPr>
+      </p:pic>
+      <p:pic>
+        <p:nvPicPr>
+          <p:cNvPr id="23" name="Picture 22">
+            <a:extLst>
+              <a:ext uri="{FF2B5EF4-FFF2-40B4-BE49-F238E27FC236}">
+                <a16:creationId xmlns:a16="http://schemas.microsoft.com/office/drawing/2014/main" id="{BA939C8F-A31D-6446-512C-312CE13E262F}"/>
+              </a:ext>
+            </a:extLst>
+          </p:cNvPr>
+          <p:cNvPicPr>
+            <a:picLocks noChangeAspect="1"/>
+          </p:cNvPicPr>
+          <p:nvPr/>
+        </p:nvPicPr>
+        <p:blipFill>
+          <a:blip r:embed="rId4"/>
+          <a:srcRect r="3135"/>
+          <a:stretch>
+            <a:fillRect/>
+          </a:stretch>
+        </p:blipFill>
+        <p:spPr>
+          <a:xfrm>
+            <a:off x="149942" y="2348393"/>
+            <a:ext cx="2353069" cy="1495634"/>
+          </a:xfrm>
+          <a:prstGeom prst="rect">
+            <a:avLst/>
+          </a:prstGeom>
+        </p:spPr>
+      </p:pic>
+      <p:pic>
+        <p:nvPicPr>
+          <p:cNvPr id="25" name="Picture 24">
+            <a:extLst>
+              <a:ext uri="{FF2B5EF4-FFF2-40B4-BE49-F238E27FC236}">
+                <a16:creationId xmlns:a16="http://schemas.microsoft.com/office/drawing/2014/main" id="{366848E6-9BE0-02B5-CC0F-5C6426CD62E4}"/>
+              </a:ext>
+            </a:extLst>
+          </p:cNvPr>
+          <p:cNvPicPr>
+            <a:picLocks noChangeAspect="1"/>
+          </p:cNvPicPr>
+          <p:nvPr/>
+        </p:nvPicPr>
+        <p:blipFill>
+          <a:blip r:embed="rId5"/>
+          <a:stretch>
+            <a:fillRect/>
+          </a:stretch>
+        </p:blipFill>
+        <p:spPr>
+          <a:xfrm>
+            <a:off x="59421" y="4376015"/>
+            <a:ext cx="4326621" cy="2481985"/>
+          </a:xfrm>
+          <a:prstGeom prst="rect">
+            <a:avLst/>
+          </a:prstGeom>
+        </p:spPr>
+      </p:pic>
+    </p:spTree>
+    <p:extLst>
+      <p:ext uri="{BB962C8B-B14F-4D97-AF65-F5344CB8AC3E}">
+        <p14:creationId xmlns:p14="http://schemas.microsoft.com/office/powerpoint/2010/main" val="2368599957"/>
+      </p:ext>
+    </p:extLst>
+  </p:cSld>
+  <p:clrMapOvr>
+    <a:masterClrMapping/>
+  </p:clrMapOvr>
+</p:sld>
+</file>
+
+<file path=ppt/slides/slide20.xml><?xml version="1.0" encoding="utf-8"?>
 <p:sld xmlns:a="http://schemas.openxmlformats.org/drawingml/2006/main" xmlns:r="http://schemas.openxmlformats.org/officeDocument/2006/relationships" xmlns:p="http://schemas.openxmlformats.org/presentationml/2006/main">
   <p:cSld>
     <p:spTree>
@@ -7663,14 +9174,14 @@
           <p:nvPr>
             <p:extLst>
               <p:ext uri="{D42A27DB-BD31-4B8C-83A1-F6EECF244321}">
-                <p14:modId xmlns:p14="http://schemas.microsoft.com/office/powerpoint/2010/main" val="353336104"/>
+                <p14:modId xmlns:p14="http://schemas.microsoft.com/office/powerpoint/2010/main" val="576041408"/>
               </p:ext>
             </p:extLst>
           </p:nvPr>
         </p:nvGraphicFramePr>
         <p:xfrm>
           <a:off x="0" y="0"/>
-          <a:ext cx="11988463" cy="3827316"/>
+          <a:ext cx="11988463" cy="6340548"/>
         </p:xfrm>
         <a:graphic>
           <a:graphicData uri="http://schemas.openxmlformats.org/drawingml/2006/table">
@@ -8006,7 +9517,10 @@
                     <a:bodyPr/>
                     <a:lstStyle/>
                     <a:p>
-                      <a:endParaRPr lang="en-GB" sz="1100" dirty="0"/>
+                      <a:r>
+                        <a:rPr lang="en-GB" sz="1100" dirty="0"/>
+                        <a:t>Fixes will be made in the next session for Build V.0.6.3</a:t>
+                      </a:r>
                     </a:p>
                   </a:txBody>
                   <a:tcPr/>
@@ -8023,16 +9537,32 @@
                     <a:bodyPr/>
                     <a:lstStyle/>
                     <a:p>
+                      <a:r>
+                        <a:rPr lang="en-GB" sz="1100" dirty="0"/>
+                        <a:t>8. Build V.0.6.3</a:t>
+                      </a:r>
+                    </a:p>
+                    <a:p>
                       <a:endParaRPr lang="en-GB" sz="1100" dirty="0"/>
                     </a:p>
-                  </a:txBody>
-                  <a:tcPr/>
-                </a:tc>
-                <a:tc>
-                  <a:txBody>
-                    <a:bodyPr/>
-                    <a:lstStyle/>
-                    <a:p>
+                    <a:p>
+                      <a:r>
+                        <a:rPr lang="en-GB" sz="1100" dirty="0"/>
+                        <a:t>The Updated repaired code for enemy movement.</a:t>
+                      </a:r>
+                    </a:p>
+                  </a:txBody>
+                  <a:tcPr/>
+                </a:tc>
+                <a:tc>
+                  <a:txBody>
+                    <a:bodyPr/>
+                    <a:lstStyle/>
+                    <a:p>
+                      <a:r>
+                        <a:rPr lang="en-GB" sz="1100" dirty="0" err="1"/>
+                        <a:t>Rm_office</a:t>
+                      </a:r>
                       <a:endParaRPr lang="en-GB" sz="1100" dirty="0"/>
                     </a:p>
                   </a:txBody>
@@ -8043,37 +9573,116 @@
                     <a:bodyPr/>
                     <a:lstStyle/>
                     <a:p>
+                      <a:r>
+                        <a:rPr lang="en-GB" sz="1100" dirty="0" err="1"/>
+                        <a:t>Obj_gwiber</a:t>
+                      </a:r>
+                      <a:r>
+                        <a:rPr lang="en-GB" sz="1100" dirty="0"/>
+                        <a:t> and K9</a:t>
+                      </a:r>
+                    </a:p>
+                  </a:txBody>
+                  <a:tcPr/>
+                </a:tc>
+                <a:tc>
+                  <a:txBody>
+                    <a:bodyPr/>
+                    <a:lstStyle/>
+                    <a:p>
+                      <a:r>
+                        <a:rPr lang="en-GB" sz="1100" dirty="0"/>
+                        <a:t>When game starts </a:t>
+                      </a:r>
+                      <a:r>
+                        <a:rPr lang="en-GB" sz="1100" dirty="0" err="1"/>
+                        <a:t>Gwiber</a:t>
+                      </a:r>
+                      <a:r>
+                        <a:rPr lang="en-GB" sz="1100" dirty="0"/>
+                        <a:t> starts in zone 4 and makes his way to the office. If the office doors are closed </a:t>
+                      </a:r>
+                      <a:r>
+                        <a:rPr lang="en-GB" sz="1100" dirty="0" err="1"/>
+                        <a:t>Gwiber</a:t>
+                      </a:r>
+                      <a:r>
+                        <a:rPr lang="en-GB" sz="1100" dirty="0"/>
+                        <a:t> can’t enter zone 0. If </a:t>
+                      </a:r>
+                      <a:r>
+                        <a:rPr lang="en-GB" sz="1100" dirty="0" err="1"/>
+                        <a:t>Gwiber</a:t>
+                      </a:r>
+                      <a:r>
+                        <a:rPr lang="en-GB" sz="1100" dirty="0"/>
+                        <a:t> is in zone 0 but the door is now closed, he will retreat to zone 2.</a:t>
+                      </a:r>
+                    </a:p>
+                    <a:p>
                       <a:endParaRPr lang="en-GB" sz="1100" dirty="0"/>
                     </a:p>
-                  </a:txBody>
-                  <a:tcPr/>
-                </a:tc>
-                <a:tc>
-                  <a:txBody>
-                    <a:bodyPr/>
-                    <a:lstStyle/>
+                    <a:p>
+                      <a:r>
+                        <a:rPr lang="en-GB" sz="1100" dirty="0"/>
+                        <a:t>K9 starts in zone 5 where he decides whether to go left to CAM1 or right to CAM8. K9 only goes forwards, but when he’s at zone 2 (left door) or zone 7 (right door) if the doors are closed, he’ll go back to zone 5 then he will repeat this cycle.</a:t>
+                      </a:r>
+                    </a:p>
+                  </a:txBody>
+                  <a:tcPr/>
+                </a:tc>
+                <a:tc>
+                  <a:txBody>
+                    <a:bodyPr/>
+                    <a:lstStyle/>
+                    <a:p>
+                      <a:r>
+                        <a:rPr lang="en-GB" sz="1100" dirty="0" err="1"/>
+                        <a:t>Gwiber</a:t>
+                      </a:r>
+                      <a:r>
+                        <a:rPr lang="en-GB" sz="1100" dirty="0"/>
+                        <a:t> does exactly what he’s supposed to do and so does K9.</a:t>
+                      </a:r>
+                    </a:p>
                     <a:p>
                       <a:endParaRPr lang="en-GB" sz="1100" dirty="0"/>
                     </a:p>
-                  </a:txBody>
-                  <a:tcPr/>
-                </a:tc>
-                <a:tc>
-                  <a:txBody>
-                    <a:bodyPr/>
-                    <a:lstStyle/>
+                    <a:p>
+                      <a:r>
+                        <a:rPr lang="en-GB" sz="1100" dirty="0"/>
+                        <a:t>There are still no end game screen at this point so soon after jump-scaring from either K9 or </a:t>
+                      </a:r>
+                      <a:r>
+                        <a:rPr lang="en-GB" sz="1100" dirty="0" err="1"/>
+                        <a:t>Gwiber</a:t>
+                      </a:r>
+                      <a:r>
+                        <a:rPr lang="en-GB" sz="1100" dirty="0"/>
+                        <a:t> their movement freezes and they remain stationary.</a:t>
+                      </a:r>
+                    </a:p>
+                  </a:txBody>
+                  <a:tcPr/>
+                </a:tc>
+                <a:tc>
+                  <a:txBody>
+                    <a:bodyPr/>
+                    <a:lstStyle/>
+                    <a:p>
+                      <a:r>
+                        <a:rPr lang="en-GB" sz="1100" dirty="0"/>
+                        <a:t>I have added a death-screen room and started creating the buttons for the menu and death-screen.</a:t>
+                      </a:r>
+                    </a:p>
                     <a:p>
                       <a:endParaRPr lang="en-GB" sz="1100" dirty="0"/>
                     </a:p>
-                  </a:txBody>
-                  <a:tcPr/>
-                </a:tc>
-                <a:tc>
-                  <a:txBody>
-                    <a:bodyPr/>
-                    <a:lstStyle/>
-                    <a:p>
-                      <a:endParaRPr lang="en-GB" sz="1100" dirty="0"/>
+                    <a:p>
+                      <a:r>
+                        <a:rPr lang="en-GB" sz="1100" dirty="0"/>
+                        <a:t>The Jump-scare not appearing was fixed</a:t>
+                      </a:r>
                     </a:p>
                   </a:txBody>
                   <a:tcPr/>
@@ -8101,7 +9710,7 @@
 </p:sld>
 </file>
 
-<file path=ppt/slides/slide2.xml><?xml version="1.0" encoding="utf-8"?>
+<file path=ppt/slides/slide21.xml><?xml version="1.0" encoding="utf-8"?>
 <p:sld xmlns:a="http://schemas.openxmlformats.org/drawingml/2006/main" xmlns:r="http://schemas.openxmlformats.org/officeDocument/2006/relationships" xmlns:p="http://schemas.openxmlformats.org/presentationml/2006/main">
   <p:cSld>
     <p:spTree>
@@ -8109,7 +9718,7 @@
         <p:cNvPr id="1" name="">
           <a:extLst>
             <a:ext uri="{FF2B5EF4-FFF2-40B4-BE49-F238E27FC236}">
-              <a16:creationId xmlns:a16="http://schemas.microsoft.com/office/drawing/2014/main" id="{B2FB39EC-F8FE-ADA9-EA59-F1EC36434BDE}"/>
+              <a16:creationId xmlns:a16="http://schemas.microsoft.com/office/drawing/2014/main" id="{754E28F7-68C3-2BF9-469F-F81B9F201AE0}"/>
             </a:ext>
           </a:extLst>
         </p:cNvPr>
@@ -8124,366 +9733,437 @@
           <a:chExt cx="0" cy="0"/>
         </a:xfrm>
       </p:grpSpPr>
-      <p:sp>
-        <p:nvSpPr>
-          <p:cNvPr id="4" name="TextBox 3">
-            <a:extLst>
-              <a:ext uri="{FF2B5EF4-FFF2-40B4-BE49-F238E27FC236}">
-                <a16:creationId xmlns:a16="http://schemas.microsoft.com/office/drawing/2014/main" id="{576BDE55-6263-8575-7C13-EC317449D25F}"/>
-              </a:ext>
-            </a:extLst>
-          </p:cNvPr>
-          <p:cNvSpPr txBox="1"/>
-          <p:nvPr/>
-        </p:nvSpPr>
-        <p:spPr>
-          <a:xfrm>
-            <a:off x="7763992" y="90121"/>
-            <a:ext cx="1809641" cy="338554"/>
-          </a:xfrm>
-          <a:prstGeom prst="rect">
-            <a:avLst/>
-          </a:prstGeom>
-          <a:noFill/>
-          <a:ln>
-            <a:solidFill>
-              <a:schemeClr val="tx1"/>
-            </a:solidFill>
-          </a:ln>
-        </p:spPr>
-        <p:txBody>
-          <a:bodyPr rot="0" spcFirstLastPara="0" vertOverflow="overflow" horzOverflow="overflow" vert="horz" wrap="square" lIns="91440" tIns="45720" rIns="91440" bIns="45720" numCol="1" spcCol="0" rtlCol="0" fromWordArt="0" anchor="t" anchorCtr="0" forceAA="0" compatLnSpc="1">
-            <a:prstTxWarp prst="textNoShape">
-              <a:avLst/>
-            </a:prstTxWarp>
-            <a:spAutoFit/>
-          </a:bodyPr>
-          <a:lstStyle/>
-          <a:p>
-            <a:r>
-              <a:rPr lang="en-GB" sz="1600" dirty="0"/>
-              <a:t>Date – 24/11/2025</a:t>
-            </a:r>
-          </a:p>
-        </p:txBody>
-      </p:sp>
-      <p:sp>
-        <p:nvSpPr>
-          <p:cNvPr id="2" name="TextBox 1">
-            <a:extLst>
-              <a:ext uri="{FF2B5EF4-FFF2-40B4-BE49-F238E27FC236}">
-                <a16:creationId xmlns:a16="http://schemas.microsoft.com/office/drawing/2014/main" id="{6165D850-749B-B97D-752E-BEC348B613E1}"/>
-              </a:ext>
-            </a:extLst>
-          </p:cNvPr>
-          <p:cNvSpPr txBox="1"/>
-          <p:nvPr/>
-        </p:nvSpPr>
-        <p:spPr>
-          <a:xfrm>
-            <a:off x="5651845" y="90120"/>
-            <a:ext cx="1959856" cy="338554"/>
-          </a:xfrm>
-          <a:prstGeom prst="rect">
-            <a:avLst/>
-          </a:prstGeom>
-          <a:noFill/>
-          <a:ln>
-            <a:solidFill>
-              <a:schemeClr val="tx1"/>
-            </a:solidFill>
-          </a:ln>
-        </p:spPr>
-        <p:txBody>
-          <a:bodyPr rot="0" spcFirstLastPara="0" vertOverflow="overflow" horzOverflow="overflow" vert="horz" wrap="square" lIns="91440" tIns="45720" rIns="91440" bIns="45720" numCol="1" spcCol="0" rtlCol="0" fromWordArt="0" anchor="t" anchorCtr="0" forceAA="0" compatLnSpc="1">
-            <a:prstTxWarp prst="textNoShape">
-              <a:avLst/>
-            </a:prstTxWarp>
-            <a:spAutoFit/>
-          </a:bodyPr>
-          <a:lstStyle/>
-          <a:p>
-            <a:r>
-              <a:rPr lang="en-GB" sz="1600" dirty="0"/>
-              <a:t>Game Build V.0.1</a:t>
-            </a:r>
-          </a:p>
-        </p:txBody>
-      </p:sp>
-      <p:sp>
-        <p:nvSpPr>
-          <p:cNvPr id="3" name="TextBox 2">
-            <a:extLst>
-              <a:ext uri="{FF2B5EF4-FFF2-40B4-BE49-F238E27FC236}">
-                <a16:creationId xmlns:a16="http://schemas.microsoft.com/office/drawing/2014/main" id="{B05434DB-BE74-90C9-E4A8-6FC8304041B7}"/>
-              </a:ext>
-            </a:extLst>
-          </p:cNvPr>
-          <p:cNvSpPr txBox="1"/>
-          <p:nvPr/>
-        </p:nvSpPr>
-        <p:spPr>
-          <a:xfrm>
-            <a:off x="5648215" y="563289"/>
-            <a:ext cx="3926490" cy="4431983"/>
-          </a:xfrm>
-          <a:prstGeom prst="rect">
-            <a:avLst/>
-          </a:prstGeom>
-          <a:noFill/>
-          <a:ln>
-            <a:solidFill>
-              <a:schemeClr val="tx1"/>
-            </a:solidFill>
-          </a:ln>
-        </p:spPr>
-        <p:txBody>
-          <a:bodyPr rot="0" spcFirstLastPara="0" vertOverflow="overflow" horzOverflow="overflow" vert="horz" wrap="square" lIns="91440" tIns="45720" rIns="91440" bIns="45720" numCol="1" spcCol="0" rtlCol="0" fromWordArt="0" anchor="t" anchorCtr="0" forceAA="0" compatLnSpc="1">
-            <a:prstTxWarp prst="textNoShape">
-              <a:avLst/>
-            </a:prstTxWarp>
-            <a:spAutoFit/>
-          </a:bodyPr>
-          <a:lstStyle/>
-          <a:p>
-            <a:r>
-              <a:rPr lang="en-GB" sz="1400" dirty="0"/>
-              <a:t>Summary Of Session</a:t>
-            </a:r>
-          </a:p>
-          <a:p>
-            <a:endParaRPr lang="en-GB" sz="1400" dirty="0"/>
-          </a:p>
-          <a:p>
-            <a:r>
-              <a:rPr lang="en-GB" sz="1400" dirty="0"/>
-              <a:t>Colour coded each zone and named them correctly. These are to be used temporarily before the official designs are completed. The grey coloured zones are for the front views of both the vents and the doors.</a:t>
-            </a:r>
-          </a:p>
-          <a:p>
-            <a:endParaRPr lang="en-GB" sz="1400" dirty="0"/>
-          </a:p>
-          <a:p>
-            <a:r>
-              <a:rPr lang="en-GB" sz="1400" dirty="0"/>
-              <a:t>I have also Created a template for the Office.</a:t>
-            </a:r>
-          </a:p>
-          <a:p>
-            <a:r>
-              <a:rPr lang="en-GB" sz="1400" dirty="0"/>
-              <a:t>The Office will have a set size of 3000x1050, and the zones will have a set size of 2000x1050.</a:t>
-            </a:r>
-          </a:p>
-          <a:p>
-            <a:endParaRPr lang="en-GB" sz="1400" dirty="0"/>
-          </a:p>
-          <a:p>
-            <a:r>
-              <a:rPr lang="en-GB" sz="1400" dirty="0"/>
-              <a:t>The Buttons for both the vents and doors are made in Game Maker and will be 200x300px to have more flexibility in designing.</a:t>
-            </a:r>
-          </a:p>
-          <a:p>
-            <a:endParaRPr lang="en-GB" sz="1400" dirty="0"/>
-          </a:p>
-          <a:p>
-            <a:r>
-              <a:rPr lang="en-GB" sz="1400" dirty="0"/>
-              <a:t>The Camera button will start off being 300x100.</a:t>
-            </a:r>
-          </a:p>
-          <a:p>
-            <a:endParaRPr lang="en-GB" sz="1400" dirty="0"/>
-          </a:p>
-          <a:p>
-            <a:endParaRPr lang="en-GB" sz="1400" dirty="0"/>
-          </a:p>
-          <a:p>
-            <a:endParaRPr lang="en-GB" sz="1600" dirty="0"/>
-          </a:p>
-        </p:txBody>
-      </p:sp>
-      <p:sp>
-        <p:nvSpPr>
-          <p:cNvPr id="6" name="TextBox 5">
-            <a:extLst>
-              <a:ext uri="{FF2B5EF4-FFF2-40B4-BE49-F238E27FC236}">
-                <a16:creationId xmlns:a16="http://schemas.microsoft.com/office/drawing/2014/main" id="{5D546EC8-C3EF-D2D7-4576-CD84485BAD0C}"/>
-              </a:ext>
-            </a:extLst>
-          </p:cNvPr>
-          <p:cNvSpPr txBox="1"/>
-          <p:nvPr/>
-        </p:nvSpPr>
-        <p:spPr>
-          <a:xfrm>
-            <a:off x="9642445" y="54237"/>
-            <a:ext cx="2438400" cy="1754326"/>
-          </a:xfrm>
-          <a:prstGeom prst="rect">
-            <a:avLst/>
-          </a:prstGeom>
-          <a:noFill/>
-          <a:ln>
-            <a:solidFill>
-              <a:schemeClr val="tx1"/>
-            </a:solidFill>
-          </a:ln>
-        </p:spPr>
-        <p:txBody>
-          <a:bodyPr rot="0" spcFirstLastPara="0" vertOverflow="overflow" horzOverflow="overflow" vert="horz" wrap="square" lIns="91440" tIns="45720" rIns="91440" bIns="45720" numCol="1" spcCol="0" rtlCol="0" fromWordArt="0" anchor="t" anchorCtr="0" forceAA="0" compatLnSpc="1">
-            <a:prstTxWarp prst="textNoShape">
-              <a:avLst/>
-            </a:prstTxWarp>
-            <a:spAutoFit/>
-          </a:bodyPr>
-          <a:lstStyle/>
-          <a:p>
-            <a:r>
-              <a:rPr lang="en-GB" sz="1200" dirty="0"/>
-              <a:t>What to do for Next Session</a:t>
-            </a:r>
-          </a:p>
-          <a:p>
-            <a:endParaRPr lang="en-GB" sz="1200" dirty="0"/>
-          </a:p>
-          <a:p>
-            <a:r>
-              <a:rPr lang="en-GB" sz="1200" dirty="0"/>
-              <a:t>Allocate each zone to a location and name them specific to what contents are in it. For Example, 2 zones will be named obj_left_corridor and obj_left_corridor.</a:t>
-            </a:r>
-          </a:p>
-          <a:p>
-            <a:endParaRPr lang="en-GB" sz="1200" dirty="0"/>
-          </a:p>
-        </p:txBody>
-      </p:sp>
-      <p:pic>
-        <p:nvPicPr>
-          <p:cNvPr id="9" name="Picture 8">
-            <a:extLst>
-              <a:ext uri="{FF2B5EF4-FFF2-40B4-BE49-F238E27FC236}">
-                <a16:creationId xmlns:a16="http://schemas.microsoft.com/office/drawing/2014/main" id="{D5DA7A1B-0205-F5E4-D017-A101709C5534}"/>
-              </a:ext>
-            </a:extLst>
-          </p:cNvPr>
-          <p:cNvPicPr>
-            <a:picLocks noChangeAspect="1"/>
-          </p:cNvPicPr>
-          <p:nvPr/>
-        </p:nvPicPr>
-        <p:blipFill>
-          <a:blip r:embed="rId2"/>
-          <a:stretch>
-            <a:fillRect/>
-          </a:stretch>
-        </p:blipFill>
-        <p:spPr>
-          <a:xfrm>
-            <a:off x="35660" y="54237"/>
-            <a:ext cx="2581635" cy="2152950"/>
-          </a:xfrm>
-          <a:prstGeom prst="rect">
-            <a:avLst/>
-          </a:prstGeom>
-        </p:spPr>
-      </p:pic>
-      <p:pic>
-        <p:nvPicPr>
-          <p:cNvPr id="19" name="Picture 18">
-            <a:extLst>
-              <a:ext uri="{FF2B5EF4-FFF2-40B4-BE49-F238E27FC236}">
-                <a16:creationId xmlns:a16="http://schemas.microsoft.com/office/drawing/2014/main" id="{094D053A-FA5D-5E1A-4596-4B1AB3899244}"/>
-              </a:ext>
-            </a:extLst>
-          </p:cNvPr>
-          <p:cNvPicPr>
-            <a:picLocks noChangeAspect="1"/>
-          </p:cNvPicPr>
-          <p:nvPr/>
-        </p:nvPicPr>
-        <p:blipFill>
-          <a:blip r:embed="rId3"/>
-          <a:stretch>
-            <a:fillRect/>
-          </a:stretch>
-        </p:blipFill>
-        <p:spPr>
-          <a:xfrm>
-            <a:off x="3200014" y="90120"/>
-            <a:ext cx="2372056" cy="4239217"/>
-          </a:xfrm>
-          <a:prstGeom prst="rect">
-            <a:avLst/>
-          </a:prstGeom>
-        </p:spPr>
-      </p:pic>
-      <p:pic>
-        <p:nvPicPr>
-          <p:cNvPr id="23" name="Picture 22">
-            <a:extLst>
-              <a:ext uri="{FF2B5EF4-FFF2-40B4-BE49-F238E27FC236}">
-                <a16:creationId xmlns:a16="http://schemas.microsoft.com/office/drawing/2014/main" id="{BA939C8F-A31D-6446-512C-312CE13E262F}"/>
-              </a:ext>
-            </a:extLst>
-          </p:cNvPr>
-          <p:cNvPicPr>
-            <a:picLocks noChangeAspect="1"/>
-          </p:cNvPicPr>
-          <p:nvPr/>
-        </p:nvPicPr>
-        <p:blipFill>
-          <a:blip r:embed="rId4"/>
-          <a:srcRect r="3135"/>
-          <a:stretch>
-            <a:fillRect/>
-          </a:stretch>
-        </p:blipFill>
-        <p:spPr>
-          <a:xfrm>
-            <a:off x="149942" y="2348393"/>
-            <a:ext cx="2353069" cy="1495634"/>
-          </a:xfrm>
-          <a:prstGeom prst="rect">
-            <a:avLst/>
-          </a:prstGeom>
-        </p:spPr>
-      </p:pic>
-      <p:pic>
-        <p:nvPicPr>
-          <p:cNvPr id="25" name="Picture 24">
-            <a:extLst>
-              <a:ext uri="{FF2B5EF4-FFF2-40B4-BE49-F238E27FC236}">
-                <a16:creationId xmlns:a16="http://schemas.microsoft.com/office/drawing/2014/main" id="{366848E6-9BE0-02B5-CC0F-5C6426CD62E4}"/>
-              </a:ext>
-            </a:extLst>
-          </p:cNvPr>
-          <p:cNvPicPr>
-            <a:picLocks noChangeAspect="1"/>
-          </p:cNvPicPr>
-          <p:nvPr/>
-        </p:nvPicPr>
-        <p:blipFill>
-          <a:blip r:embed="rId5"/>
-          <a:stretch>
-            <a:fillRect/>
-          </a:stretch>
-        </p:blipFill>
-        <p:spPr>
-          <a:xfrm>
-            <a:off x="59421" y="4376015"/>
-            <a:ext cx="4326621" cy="2481985"/>
-          </a:xfrm>
-          <a:prstGeom prst="rect">
-            <a:avLst/>
-          </a:prstGeom>
-        </p:spPr>
-      </p:pic>
+      <p:graphicFrame>
+        <p:nvGraphicFramePr>
+          <p:cNvPr id="4" name="Table 3">
+            <a:extLst>
+              <a:ext uri="{FF2B5EF4-FFF2-40B4-BE49-F238E27FC236}">
+                <a16:creationId xmlns:a16="http://schemas.microsoft.com/office/drawing/2014/main" id="{2B6EA9D7-824A-31E8-D982-9A521123EE9A}"/>
+              </a:ext>
+            </a:extLst>
+          </p:cNvPr>
+          <p:cNvGraphicFramePr>
+            <a:graphicFrameLocks noGrp="1"/>
+          </p:cNvGraphicFramePr>
+          <p:nvPr>
+            <p:extLst>
+              <p:ext uri="{D42A27DB-BD31-4B8C-83A1-F6EECF244321}">
+                <p14:modId xmlns:p14="http://schemas.microsoft.com/office/powerpoint/2010/main" val="2127241330"/>
+              </p:ext>
+            </p:extLst>
+          </p:nvPr>
+        </p:nvGraphicFramePr>
+        <p:xfrm>
+          <a:off x="0" y="0"/>
+          <a:ext cx="11988463" cy="3994956"/>
+        </p:xfrm>
+        <a:graphic>
+          <a:graphicData uri="http://schemas.openxmlformats.org/drawingml/2006/table">
+            <a:tbl>
+              <a:tblPr firstRow="1" bandRow="1">
+                <a:tableStyleId>{5C22544A-7EE6-4342-B048-85BDC9FD1C3A}</a:tableStyleId>
+              </a:tblPr>
+              <a:tblGrid>
+                <a:gridCol w="1876424">
+                  <a:extLst>
+                    <a:ext uri="{9D8B030D-6E8A-4147-A177-3AD203B41FA5}">
+                      <a16:colId xmlns:a16="http://schemas.microsoft.com/office/drawing/2014/main" val="2041145262"/>
+                    </a:ext>
+                  </a:extLst>
+                </a:gridCol>
+                <a:gridCol w="2119731">
+                  <a:extLst>
+                    <a:ext uri="{9D8B030D-6E8A-4147-A177-3AD203B41FA5}">
+                      <a16:colId xmlns:a16="http://schemas.microsoft.com/office/drawing/2014/main" val="4080696647"/>
+                    </a:ext>
+                  </a:extLst>
+                </a:gridCol>
+                <a:gridCol w="1998077">
+                  <a:extLst>
+                    <a:ext uri="{9D8B030D-6E8A-4147-A177-3AD203B41FA5}">
+                      <a16:colId xmlns:a16="http://schemas.microsoft.com/office/drawing/2014/main" val="132880537"/>
+                    </a:ext>
+                  </a:extLst>
+                </a:gridCol>
+                <a:gridCol w="1998077">
+                  <a:extLst>
+                    <a:ext uri="{9D8B030D-6E8A-4147-A177-3AD203B41FA5}">
+                      <a16:colId xmlns:a16="http://schemas.microsoft.com/office/drawing/2014/main" val="786884226"/>
+                    </a:ext>
+                  </a:extLst>
+                </a:gridCol>
+                <a:gridCol w="1998077">
+                  <a:extLst>
+                    <a:ext uri="{9D8B030D-6E8A-4147-A177-3AD203B41FA5}">
+                      <a16:colId xmlns:a16="http://schemas.microsoft.com/office/drawing/2014/main" val="259252547"/>
+                    </a:ext>
+                  </a:extLst>
+                </a:gridCol>
+                <a:gridCol w="1998077">
+                  <a:extLst>
+                    <a:ext uri="{9D8B030D-6E8A-4147-A177-3AD203B41FA5}">
+                      <a16:colId xmlns:a16="http://schemas.microsoft.com/office/drawing/2014/main" val="3694476725"/>
+                    </a:ext>
+                  </a:extLst>
+                </a:gridCol>
+              </a:tblGrid>
+              <a:tr h="361950">
+                <a:tc>
+                  <a:txBody>
+                    <a:bodyPr/>
+                    <a:lstStyle/>
+                    <a:p>
+                      <a:r>
+                        <a:rPr lang="en-GB" sz="1100" dirty="0"/>
+                        <a:t>Test Number</a:t>
+                      </a:r>
+                    </a:p>
+                  </a:txBody>
+                  <a:tcPr/>
+                </a:tc>
+                <a:tc>
+                  <a:txBody>
+                    <a:bodyPr/>
+                    <a:lstStyle/>
+                    <a:p>
+                      <a:r>
+                        <a:rPr lang="en-GB" sz="1100" dirty="0"/>
+                        <a:t>Room</a:t>
+                      </a:r>
+                    </a:p>
+                  </a:txBody>
+                  <a:tcPr/>
+                </a:tc>
+                <a:tc>
+                  <a:txBody>
+                    <a:bodyPr/>
+                    <a:lstStyle/>
+                    <a:p>
+                      <a:r>
+                        <a:rPr lang="en-GB" sz="1100" dirty="0"/>
+                        <a:t>Objects Involved</a:t>
+                      </a:r>
+                    </a:p>
+                  </a:txBody>
+                  <a:tcPr/>
+                </a:tc>
+                <a:tc>
+                  <a:txBody>
+                    <a:bodyPr/>
+                    <a:lstStyle/>
+                    <a:p>
+                      <a:r>
+                        <a:rPr lang="en-GB" sz="1100" dirty="0"/>
+                        <a:t>Expected Outcome</a:t>
+                      </a:r>
+                    </a:p>
+                  </a:txBody>
+                  <a:tcPr/>
+                </a:tc>
+                <a:tc>
+                  <a:txBody>
+                    <a:bodyPr/>
+                    <a:lstStyle/>
+                    <a:p>
+                      <a:r>
+                        <a:rPr lang="en-GB" sz="1100" dirty="0"/>
+                        <a:t>Actual Outcome</a:t>
+                      </a:r>
+                    </a:p>
+                  </a:txBody>
+                  <a:tcPr/>
+                </a:tc>
+                <a:tc>
+                  <a:txBody>
+                    <a:bodyPr/>
+                    <a:lstStyle/>
+                    <a:p>
+                      <a:r>
+                        <a:rPr lang="en-GB" sz="1100" dirty="0"/>
+                        <a:t>Test Outcome</a:t>
+                      </a:r>
+                    </a:p>
+                  </a:txBody>
+                  <a:tcPr/>
+                </a:tc>
+                <a:extLst>
+                  <a:ext uri="{0D108BD9-81ED-4DB2-BD59-A6C34878D82A}">
+                    <a16:rowId xmlns:a16="http://schemas.microsoft.com/office/drawing/2014/main" val="1296324342"/>
+                  </a:ext>
+                </a:extLst>
+              </a:tr>
+              <a:tr h="598878">
+                <a:tc>
+                  <a:txBody>
+                    <a:bodyPr/>
+                    <a:lstStyle/>
+                    <a:p>
+                      <a:r>
+                        <a:rPr lang="en-GB" sz="1100" dirty="0"/>
+                        <a:t>Numerical Value of test beginning with 1.</a:t>
+                      </a:r>
+                    </a:p>
+                  </a:txBody>
+                  <a:tcPr/>
+                </a:tc>
+                <a:tc>
+                  <a:txBody>
+                    <a:bodyPr/>
+                    <a:lstStyle/>
+                    <a:p>
+                      <a:r>
+                        <a:rPr lang="en-GB" sz="1100" dirty="0"/>
+                        <a:t>What Room your test will be conducted in. </a:t>
+                      </a:r>
+                    </a:p>
+                  </a:txBody>
+                  <a:tcPr/>
+                </a:tc>
+                <a:tc>
+                  <a:txBody>
+                    <a:bodyPr/>
+                    <a:lstStyle/>
+                    <a:p>
+                      <a:r>
+                        <a:rPr lang="en-GB" sz="1100" dirty="0"/>
+                        <a:t>The Objects that your test will utilise during the test.</a:t>
+                      </a:r>
+                    </a:p>
+                  </a:txBody>
+                  <a:tcPr/>
+                </a:tc>
+                <a:tc>
+                  <a:txBody>
+                    <a:bodyPr/>
+                    <a:lstStyle/>
+                    <a:p>
+                      <a:r>
+                        <a:rPr lang="en-GB" sz="1100" dirty="0"/>
+                        <a:t>What is expected to happen during the test.</a:t>
+                      </a:r>
+                    </a:p>
+                  </a:txBody>
+                  <a:tcPr/>
+                </a:tc>
+                <a:tc>
+                  <a:txBody>
+                    <a:bodyPr/>
+                    <a:lstStyle/>
+                    <a:p>
+                      <a:r>
+                        <a:rPr lang="en-GB" sz="1100" dirty="0"/>
+                        <a:t>What Actually happened.</a:t>
+                      </a:r>
+                    </a:p>
+                  </a:txBody>
+                  <a:tcPr/>
+                </a:tc>
+                <a:tc>
+                  <a:txBody>
+                    <a:bodyPr/>
+                    <a:lstStyle/>
+                    <a:p>
+                      <a:r>
+                        <a:rPr lang="en-GB" sz="1100" dirty="0"/>
+                        <a:t>Did you have to do anything In reaction to the test? Fixing errors or changing code.</a:t>
+                      </a:r>
+                    </a:p>
+                  </a:txBody>
+                  <a:tcPr/>
+                </a:tc>
+                <a:extLst>
+                  <a:ext uri="{0D108BD9-81ED-4DB2-BD59-A6C34878D82A}">
+                    <a16:rowId xmlns:a16="http://schemas.microsoft.com/office/drawing/2014/main" val="892039820"/>
+                  </a:ext>
+                </a:extLst>
+              </a:tr>
+              <a:tr h="649481">
+                <a:tc>
+                  <a:txBody>
+                    <a:bodyPr/>
+                    <a:lstStyle/>
+                    <a:p>
+                      <a:r>
+                        <a:rPr lang="en-GB" sz="1100" dirty="0"/>
+                        <a:t>9. Build V.0.6.4</a:t>
+                      </a:r>
+                    </a:p>
+                  </a:txBody>
+                  <a:tcPr/>
+                </a:tc>
+                <a:tc>
+                  <a:txBody>
+                    <a:bodyPr/>
+                    <a:lstStyle/>
+                    <a:p>
+                      <a:r>
+                        <a:rPr lang="en-GB" sz="1100" dirty="0" err="1"/>
+                        <a:t>Rm_office</a:t>
+                      </a:r>
+                      <a:endParaRPr lang="en-GB" sz="1100" dirty="0"/>
+                    </a:p>
+                  </a:txBody>
+                  <a:tcPr/>
+                </a:tc>
+                <a:tc>
+                  <a:txBody>
+                    <a:bodyPr/>
+                    <a:lstStyle/>
+                    <a:p>
+                      <a:r>
+                        <a:rPr lang="en-GB" sz="1100" dirty="0" err="1"/>
+                        <a:t>Obj_camera_controller</a:t>
+                      </a:r>
+                      <a:r>
+                        <a:rPr lang="en-GB" sz="1100" dirty="0"/>
+                        <a:t> and </a:t>
+                      </a:r>
+                      <a:r>
+                        <a:rPr lang="en-GB" sz="1100" dirty="0" err="1"/>
+                        <a:t>obj_game_state</a:t>
+                      </a:r>
+                      <a:r>
+                        <a:rPr lang="en-GB" sz="1100" dirty="0"/>
+                        <a:t>.</a:t>
+                      </a:r>
+                    </a:p>
+                  </a:txBody>
+                  <a:tcPr/>
+                </a:tc>
+                <a:tc>
+                  <a:txBody>
+                    <a:bodyPr/>
+                    <a:lstStyle/>
+                    <a:p>
+                      <a:r>
+                        <a:rPr lang="en-GB" sz="1100" dirty="0"/>
+                        <a:t>When game starts, the game should be set to full screen and with the zones still being 400x225. Also, the smooth transition code has been removed due to that feature not being needed for the cameras.</a:t>
+                      </a:r>
+                    </a:p>
+                  </a:txBody>
+                  <a:tcPr/>
+                </a:tc>
+                <a:tc>
+                  <a:txBody>
+                    <a:bodyPr/>
+                    <a:lstStyle/>
+                    <a:p>
+                      <a:r>
+                        <a:rPr lang="en-GB" sz="1100" dirty="0"/>
+                        <a:t>The game doesn’t start in full screen correctly and the screen is blurry.</a:t>
+                      </a:r>
+                    </a:p>
+                    <a:p>
+                      <a:endParaRPr lang="en-GB" sz="1100" dirty="0"/>
+                    </a:p>
+                    <a:p>
+                      <a:r>
+                        <a:rPr lang="en-GB" sz="1100" dirty="0"/>
+                        <a:t>The removal of the smooth code caused the rest of the camera’s code to break. This is because when I first made the code, I considered transitions and made a place-holder one, but accidently made the place-holder also the essential part in creating variables for the camera code</a:t>
+                      </a:r>
+                    </a:p>
+                  </a:txBody>
+                  <a:tcPr/>
+                </a:tc>
+                <a:tc>
+                  <a:txBody>
+                    <a:bodyPr/>
+                    <a:lstStyle/>
+                    <a:p>
+                      <a:r>
+                        <a:rPr lang="en-GB" sz="1100" dirty="0"/>
+                        <a:t>I couldn’t fix the camera problem so, everything will return back to its </a:t>
+                      </a:r>
+                      <a:r>
+                        <a:rPr lang="en-GB" sz="1100"/>
+                        <a:t>normal size for now.</a:t>
+                      </a:r>
+                      <a:endParaRPr lang="en-GB" sz="1100" dirty="0"/>
+                    </a:p>
+                  </a:txBody>
+                  <a:tcPr/>
+                </a:tc>
+                <a:extLst>
+                  <a:ext uri="{0D108BD9-81ED-4DB2-BD59-A6C34878D82A}">
+                    <a16:rowId xmlns:a16="http://schemas.microsoft.com/office/drawing/2014/main" val="4028166049"/>
+                  </a:ext>
+                </a:extLst>
+              </a:tr>
+              <a:tr h="595728">
+                <a:tc>
+                  <a:txBody>
+                    <a:bodyPr/>
+                    <a:lstStyle/>
+                    <a:p>
+                      <a:endParaRPr lang="en-GB" sz="1100" dirty="0"/>
+                    </a:p>
+                  </a:txBody>
+                  <a:tcPr/>
+                </a:tc>
+                <a:tc>
+                  <a:txBody>
+                    <a:bodyPr/>
+                    <a:lstStyle/>
+                    <a:p>
+                      <a:endParaRPr lang="en-GB" sz="1100" dirty="0"/>
+                    </a:p>
+                  </a:txBody>
+                  <a:tcPr/>
+                </a:tc>
+                <a:tc>
+                  <a:txBody>
+                    <a:bodyPr/>
+                    <a:lstStyle/>
+                    <a:p>
+                      <a:endParaRPr lang="en-GB" sz="1100" dirty="0"/>
+                    </a:p>
+                  </a:txBody>
+                  <a:tcPr/>
+                </a:tc>
+                <a:tc>
+                  <a:txBody>
+                    <a:bodyPr/>
+                    <a:lstStyle/>
+                    <a:p>
+                      <a:endParaRPr lang="en-GB" sz="1100" dirty="0"/>
+                    </a:p>
+                  </a:txBody>
+                  <a:tcPr/>
+                </a:tc>
+                <a:tc>
+                  <a:txBody>
+                    <a:bodyPr/>
+                    <a:lstStyle/>
+                    <a:p>
+                      <a:endParaRPr lang="en-GB" sz="1100" dirty="0"/>
+                    </a:p>
+                  </a:txBody>
+                  <a:tcPr/>
+                </a:tc>
+                <a:tc>
+                  <a:txBody>
+                    <a:bodyPr/>
+                    <a:lstStyle/>
+                    <a:p>
+                      <a:endParaRPr lang="en-GB" sz="1100" dirty="0"/>
+                    </a:p>
+                  </a:txBody>
+                  <a:tcPr/>
+                </a:tc>
+                <a:extLst>
+                  <a:ext uri="{0D108BD9-81ED-4DB2-BD59-A6C34878D82A}">
+                    <a16:rowId xmlns:a16="http://schemas.microsoft.com/office/drawing/2014/main" val="2721134836"/>
+                  </a:ext>
+                </a:extLst>
+              </a:tr>
+            </a:tbl>
+          </a:graphicData>
+        </a:graphic>
+      </p:graphicFrame>
     </p:spTree>
     <p:extLst>
       <p:ext uri="{BB962C8B-B14F-4D97-AF65-F5344CB8AC3E}">
-        <p14:creationId xmlns:p14="http://schemas.microsoft.com/office/powerpoint/2010/main" val="2368599957"/>
+        <p14:creationId xmlns:p14="http://schemas.microsoft.com/office/powerpoint/2010/main" val="3077568774"/>
       </p:ext>
     </p:extLst>
   </p:cSld>

</xml_diff>

<commit_message>
Critical Failure V.0.6.5 Designing Phase 1
</commit_message>
<xml_diff>
--- a/Logs/Development Log and Alpha Testing.pptx
+++ b/Logs/Development Log and Alpha Testing.pptx
@@ -22,12 +22,13 @@
     <p:sldId id="274" r:id="rId16"/>
     <p:sldId id="275" r:id="rId17"/>
     <p:sldId id="277" r:id="rId18"/>
-    <p:sldId id="257" r:id="rId19"/>
-    <p:sldId id="267" r:id="rId20"/>
-    <p:sldId id="270" r:id="rId21"/>
-    <p:sldId id="272" r:id="rId22"/>
-    <p:sldId id="276" r:id="rId23"/>
-    <p:sldId id="278" r:id="rId24"/>
+    <p:sldId id="279" r:id="rId19"/>
+    <p:sldId id="257" r:id="rId20"/>
+    <p:sldId id="267" r:id="rId21"/>
+    <p:sldId id="270" r:id="rId22"/>
+    <p:sldId id="272" r:id="rId23"/>
+    <p:sldId id="276" r:id="rId24"/>
+    <p:sldId id="278" r:id="rId25"/>
   </p:sldIdLst>
   <p:sldSz cx="12192000" cy="6858000"/>
   <p:notesSz cx="6858000" cy="9144000"/>
@@ -7114,13 +7115,13 @@
             </a:r>
             <a:r>
               <a:rPr lang="en-GB" sz="1200" dirty="0"/>
-              <a:t> Object to originally move parallel to his movement code. So then is object appears.</a:t>
+              <a:t> Object to originally move parallel to his movement code. So, then the object appears.</a:t>
             </a:r>
           </a:p>
           <a:p>
             <a:r>
               <a:rPr lang="en-GB" sz="1200" dirty="0"/>
-              <a:t>Of course with the new positions of the zones.</a:t>
+              <a:t>Of course, with the new positions of the zones.</a:t>
             </a:r>
           </a:p>
           <a:p>
@@ -7138,7 +7139,7 @@
           <a:p>
             <a:r>
               <a:rPr lang="en-GB" sz="1200" dirty="0"/>
-              <a:t>Actually re-adding this code back has offered me the opportunity to have the enemies Jump-scares trigger when they are in zone 0 for the current trigger code doesn’t seem to work.</a:t>
+              <a:t>Re-adding this code back has offered me the opportunity to have the enemies Jump-scares trigger when they are physically in zone 0 for the current trigger code doesn’t seem to work in the movement code for the enemies..</a:t>
             </a:r>
           </a:p>
           <a:p>
@@ -7173,7 +7174,7 @@
         <p:spPr>
           <a:xfrm>
             <a:off x="8542002" y="612254"/>
-            <a:ext cx="3307343" cy="253916"/>
+            <a:ext cx="3307343" cy="1708160"/>
           </a:xfrm>
           <a:prstGeom prst="rect">
             <a:avLst/>
@@ -7199,6 +7200,45 @@
               <a:t>What to do Next Session </a:t>
             </a:r>
           </a:p>
+          <a:p>
+            <a:endParaRPr lang="en-GB" sz="1050" dirty="0"/>
+          </a:p>
+          <a:p>
+            <a:r>
+              <a:rPr lang="en-GB" sz="1050" dirty="0"/>
+              <a:t>Make Death Screen</a:t>
+            </a:r>
+          </a:p>
+          <a:p>
+            <a:endParaRPr lang="en-GB" sz="1050" dirty="0"/>
+          </a:p>
+          <a:p>
+            <a:r>
+              <a:rPr lang="en-GB" sz="1050" dirty="0"/>
+              <a:t>Create Menu Buttons and Death Screen buttons.</a:t>
+            </a:r>
+          </a:p>
+          <a:p>
+            <a:endParaRPr lang="en-GB" sz="1050" dirty="0"/>
+          </a:p>
+          <a:p>
+            <a:r>
+              <a:rPr lang="en-GB" sz="1050" dirty="0"/>
+              <a:t>Begin making Level 2</a:t>
+            </a:r>
+          </a:p>
+          <a:p>
+            <a:endParaRPr lang="en-GB" sz="1050" dirty="0"/>
+          </a:p>
+          <a:p>
+            <a:r>
+              <a:rPr lang="en-GB" sz="1050" dirty="0"/>
+              <a:t>Create Jump-Scares for rest of the enemies.</a:t>
+            </a:r>
+          </a:p>
+          <a:p>
+            <a:endParaRPr lang="en-GB" sz="1050" dirty="0"/>
+          </a:p>
         </p:txBody>
       </p:sp>
       <p:sp>
@@ -7341,7 +7381,7 @@
         <p:spPr>
           <a:xfrm>
             <a:off x="8324338" y="2618108"/>
-            <a:ext cx="2983197" cy="1785104"/>
+            <a:ext cx="2983197" cy="1954381"/>
           </a:xfrm>
           <a:prstGeom prst="rect">
             <a:avLst/>
@@ -7389,7 +7429,7 @@
           <a:p>
             <a:r>
               <a:rPr lang="en-GB" sz="1100" dirty="0"/>
-              <a:t>I also, re-attempted to re-do my camera code for I no longer wish to have smooth transition and I believe to have found a method that doesn’t require viewports. To ensure that I don’t lose the old code for safety reasons I will make Build V.0.6.5.</a:t>
+              <a:t>I also, re-attempted to re-do my camera code for I no longer wish to have smooth transition and I believe to have found a method that doesn’t require viewports. To ensure that I don’t lose the old code for safety reasons I will make Build V.0.6.5. This new code was tested in test 11 build V.0.6.5.</a:t>
             </a:r>
           </a:p>
         </p:txBody>
@@ -7408,6 +7448,245 @@
 </file>
 
 <file path=ppt/slides/slide18.xml><?xml version="1.0" encoding="utf-8"?>
+<p:sld xmlns:a="http://schemas.openxmlformats.org/drawingml/2006/main" xmlns:r="http://schemas.openxmlformats.org/officeDocument/2006/relationships" xmlns:p="http://schemas.openxmlformats.org/presentationml/2006/main">
+  <p:cSld>
+    <p:spTree>
+      <p:nvGrpSpPr>
+        <p:cNvPr id="1" name="">
+          <a:extLst>
+            <a:ext uri="{FF2B5EF4-FFF2-40B4-BE49-F238E27FC236}">
+              <a16:creationId xmlns:a16="http://schemas.microsoft.com/office/drawing/2014/main" id="{EE42C5E8-779C-7113-034F-7329FCC5DC5A}"/>
+            </a:ext>
+          </a:extLst>
+        </p:cNvPr>
+        <p:cNvGrpSpPr/>
+        <p:nvPr/>
+      </p:nvGrpSpPr>
+      <p:grpSpPr>
+        <a:xfrm>
+          <a:off x="0" y="0"/>
+          <a:ext cx="0" cy="0"/>
+          <a:chOff x="0" y="0"/>
+          <a:chExt cx="0" cy="0"/>
+        </a:xfrm>
+      </p:grpSpPr>
+      <p:sp>
+        <p:nvSpPr>
+          <p:cNvPr id="4" name="TextBox 3">
+            <a:extLst>
+              <a:ext uri="{FF2B5EF4-FFF2-40B4-BE49-F238E27FC236}">
+                <a16:creationId xmlns:a16="http://schemas.microsoft.com/office/drawing/2014/main" id="{9DC012F9-0808-A8B2-491D-A16C8FFA92E0}"/>
+              </a:ext>
+            </a:extLst>
+          </p:cNvPr>
+          <p:cNvSpPr txBox="1"/>
+          <p:nvPr/>
+        </p:nvSpPr>
+        <p:spPr>
+          <a:xfrm>
+            <a:off x="7894620" y="121250"/>
+            <a:ext cx="2269916" cy="338554"/>
+          </a:xfrm>
+          <a:prstGeom prst="rect">
+            <a:avLst/>
+          </a:prstGeom>
+          <a:noFill/>
+          <a:ln>
+            <a:solidFill>
+              <a:schemeClr val="tx1"/>
+            </a:solidFill>
+          </a:ln>
+        </p:spPr>
+        <p:txBody>
+          <a:bodyPr rot="0" spcFirstLastPara="0" vertOverflow="overflow" horzOverflow="overflow" vert="horz" wrap="square" lIns="91440" tIns="45720" rIns="91440" bIns="45720" numCol="1" spcCol="0" rtlCol="0" fromWordArt="0" anchor="t" anchorCtr="0" forceAA="0" compatLnSpc="1">
+            <a:prstTxWarp prst="textNoShape">
+              <a:avLst/>
+            </a:prstTxWarp>
+            <a:spAutoFit/>
+          </a:bodyPr>
+          <a:lstStyle/>
+          <a:p>
+            <a:r>
+              <a:rPr lang="en-GB" sz="1600" dirty="0"/>
+              <a:t>Date – 23/01/2026</a:t>
+            </a:r>
+          </a:p>
+        </p:txBody>
+      </p:sp>
+      <p:sp>
+        <p:nvSpPr>
+          <p:cNvPr id="2" name="TextBox 1">
+            <a:extLst>
+              <a:ext uri="{FF2B5EF4-FFF2-40B4-BE49-F238E27FC236}">
+                <a16:creationId xmlns:a16="http://schemas.microsoft.com/office/drawing/2014/main" id="{72322FD7-25B7-1D72-92EF-2B798F661297}"/>
+              </a:ext>
+            </a:extLst>
+          </p:cNvPr>
+          <p:cNvSpPr txBox="1"/>
+          <p:nvPr/>
+        </p:nvSpPr>
+        <p:spPr>
+          <a:xfrm>
+            <a:off x="5651845" y="121250"/>
+            <a:ext cx="2112147" cy="338554"/>
+          </a:xfrm>
+          <a:prstGeom prst="rect">
+            <a:avLst/>
+          </a:prstGeom>
+          <a:noFill/>
+          <a:ln>
+            <a:solidFill>
+              <a:schemeClr val="tx1"/>
+            </a:solidFill>
+          </a:ln>
+        </p:spPr>
+        <p:txBody>
+          <a:bodyPr rot="0" spcFirstLastPara="0" vertOverflow="overflow" horzOverflow="overflow" vert="horz" wrap="square" lIns="91440" tIns="45720" rIns="91440" bIns="45720" numCol="1" spcCol="0" rtlCol="0" fromWordArt="0" anchor="t" anchorCtr="0" forceAA="0" compatLnSpc="1">
+            <a:prstTxWarp prst="textNoShape">
+              <a:avLst/>
+            </a:prstTxWarp>
+            <a:spAutoFit/>
+          </a:bodyPr>
+          <a:lstStyle/>
+          <a:p>
+            <a:r>
+              <a:rPr lang="en-GB" sz="1600" dirty="0"/>
+              <a:t>Game Build V.0.6.5</a:t>
+            </a:r>
+          </a:p>
+        </p:txBody>
+      </p:sp>
+      <p:sp>
+        <p:nvSpPr>
+          <p:cNvPr id="3" name="TextBox 2">
+            <a:extLst>
+              <a:ext uri="{FF2B5EF4-FFF2-40B4-BE49-F238E27FC236}">
+                <a16:creationId xmlns:a16="http://schemas.microsoft.com/office/drawing/2014/main" id="{9AA725A4-F00C-30FC-D8E4-3F6F95150895}"/>
+              </a:ext>
+            </a:extLst>
+          </p:cNvPr>
+          <p:cNvSpPr txBox="1"/>
+          <p:nvPr/>
+        </p:nvSpPr>
+        <p:spPr>
+          <a:xfrm>
+            <a:off x="0" y="152027"/>
+            <a:ext cx="5576207" cy="1015663"/>
+          </a:xfrm>
+          <a:prstGeom prst="rect">
+            <a:avLst/>
+          </a:prstGeom>
+          <a:noFill/>
+          <a:ln>
+            <a:solidFill>
+              <a:schemeClr val="tx1"/>
+            </a:solidFill>
+          </a:ln>
+        </p:spPr>
+        <p:txBody>
+          <a:bodyPr rot="0" spcFirstLastPara="0" vertOverflow="overflow" horzOverflow="overflow" vert="horz" wrap="square" lIns="91440" tIns="45720" rIns="91440" bIns="45720" numCol="1" spcCol="0" rtlCol="0" fromWordArt="0" anchor="t" anchorCtr="0" forceAA="0" compatLnSpc="1">
+            <a:prstTxWarp prst="textNoShape">
+              <a:avLst/>
+            </a:prstTxWarp>
+            <a:spAutoFit/>
+          </a:bodyPr>
+          <a:lstStyle/>
+          <a:p>
+            <a:r>
+              <a:rPr lang="en-GB" sz="1200" dirty="0"/>
+              <a:t>Build V.0.6.5 has working enemies and the new camera controller is 95% completed.</a:t>
+            </a:r>
+          </a:p>
+          <a:p>
+            <a:endParaRPr lang="en-GB" sz="1200" dirty="0"/>
+          </a:p>
+          <a:p>
+            <a:r>
+              <a:rPr lang="en-GB" sz="1200" dirty="0"/>
+              <a:t>I have also finished designing the buttons and background for the menu and death screens.</a:t>
+            </a:r>
+          </a:p>
+        </p:txBody>
+      </p:sp>
+      <p:sp>
+        <p:nvSpPr>
+          <p:cNvPr id="19" name="TextBox 18">
+            <a:extLst>
+              <a:ext uri="{FF2B5EF4-FFF2-40B4-BE49-F238E27FC236}">
+                <a16:creationId xmlns:a16="http://schemas.microsoft.com/office/drawing/2014/main" id="{3048F452-7F46-83FF-AE44-1F1DF2811DE6}"/>
+              </a:ext>
+            </a:extLst>
+          </p:cNvPr>
+          <p:cNvSpPr txBox="1"/>
+          <p:nvPr/>
+        </p:nvSpPr>
+        <p:spPr>
+          <a:xfrm>
+            <a:off x="5662412" y="720049"/>
+            <a:ext cx="2408464" cy="369332"/>
+          </a:xfrm>
+          <a:prstGeom prst="rect">
+            <a:avLst/>
+          </a:prstGeom>
+          <a:noFill/>
+        </p:spPr>
+        <p:txBody>
+          <a:bodyPr wrap="square" rtlCol="0">
+            <a:spAutoFit/>
+          </a:bodyPr>
+          <a:lstStyle/>
+          <a:p>
+            <a:r>
+              <a:rPr lang="en-GB" dirty="0"/>
+              <a:t> </a:t>
+            </a:r>
+          </a:p>
+        </p:txBody>
+      </p:sp>
+      <p:pic>
+        <p:nvPicPr>
+          <p:cNvPr id="13" name="Picture 12" descr="A black screen with red text&#10;&#10;AI-generated content may be incorrect.">
+            <a:extLst>
+              <a:ext uri="{FF2B5EF4-FFF2-40B4-BE49-F238E27FC236}">
+                <a16:creationId xmlns:a16="http://schemas.microsoft.com/office/drawing/2014/main" id="{4A0E843E-6A43-5905-48C7-0C71659B19E3}"/>
+              </a:ext>
+            </a:extLst>
+          </p:cNvPr>
+          <p:cNvPicPr>
+            <a:picLocks noChangeAspect="1"/>
+          </p:cNvPicPr>
+          <p:nvPr/>
+        </p:nvPicPr>
+        <p:blipFill>
+          <a:blip r:embed="rId2"/>
+          <a:stretch>
+            <a:fillRect/>
+          </a:stretch>
+        </p:blipFill>
+        <p:spPr>
+          <a:xfrm>
+            <a:off x="344527" y="1427935"/>
+            <a:ext cx="6363391" cy="3775204"/>
+          </a:xfrm>
+          <a:prstGeom prst="rect">
+            <a:avLst/>
+          </a:prstGeom>
+        </p:spPr>
+      </p:pic>
+    </p:spTree>
+    <p:extLst>
+      <p:ext uri="{BB962C8B-B14F-4D97-AF65-F5344CB8AC3E}">
+        <p14:creationId xmlns:p14="http://schemas.microsoft.com/office/powerpoint/2010/main" val="3310580404"/>
+      </p:ext>
+    </p:extLst>
+  </p:cSld>
+  <p:clrMapOvr>
+    <a:masterClrMapping/>
+  </p:clrMapOvr>
+</p:sld>
+</file>
+
+<file path=ppt/slides/slide19.xml><?xml version="1.0" encoding="utf-8"?>
 <p:sld xmlns:a="http://schemas.openxmlformats.org/drawingml/2006/main" xmlns:r="http://schemas.openxmlformats.org/officeDocument/2006/relationships" xmlns:p="http://schemas.openxmlformats.org/presentationml/2006/main">
   <p:cSld>
     <p:spTree>
@@ -8220,7 +8499,399 @@
 </p:sld>
 </file>
 
-<file path=ppt/slides/slide19.xml><?xml version="1.0" encoding="utf-8"?>
+<file path=ppt/slides/slide2.xml><?xml version="1.0" encoding="utf-8"?>
+<p:sld xmlns:a="http://schemas.openxmlformats.org/drawingml/2006/main" xmlns:r="http://schemas.openxmlformats.org/officeDocument/2006/relationships" xmlns:p="http://schemas.openxmlformats.org/presentationml/2006/main">
+  <p:cSld>
+    <p:spTree>
+      <p:nvGrpSpPr>
+        <p:cNvPr id="1" name="">
+          <a:extLst>
+            <a:ext uri="{FF2B5EF4-FFF2-40B4-BE49-F238E27FC236}">
+              <a16:creationId xmlns:a16="http://schemas.microsoft.com/office/drawing/2014/main" id="{B2FB39EC-F8FE-ADA9-EA59-F1EC36434BDE}"/>
+            </a:ext>
+          </a:extLst>
+        </p:cNvPr>
+        <p:cNvGrpSpPr/>
+        <p:nvPr/>
+      </p:nvGrpSpPr>
+      <p:grpSpPr>
+        <a:xfrm>
+          <a:off x="0" y="0"/>
+          <a:ext cx="0" cy="0"/>
+          <a:chOff x="0" y="0"/>
+          <a:chExt cx="0" cy="0"/>
+        </a:xfrm>
+      </p:grpSpPr>
+      <p:sp>
+        <p:nvSpPr>
+          <p:cNvPr id="4" name="TextBox 3">
+            <a:extLst>
+              <a:ext uri="{FF2B5EF4-FFF2-40B4-BE49-F238E27FC236}">
+                <a16:creationId xmlns:a16="http://schemas.microsoft.com/office/drawing/2014/main" id="{576BDE55-6263-8575-7C13-EC317449D25F}"/>
+              </a:ext>
+            </a:extLst>
+          </p:cNvPr>
+          <p:cNvSpPr txBox="1"/>
+          <p:nvPr/>
+        </p:nvSpPr>
+        <p:spPr>
+          <a:xfrm>
+            <a:off x="7763992" y="90121"/>
+            <a:ext cx="1809641" cy="338554"/>
+          </a:xfrm>
+          <a:prstGeom prst="rect">
+            <a:avLst/>
+          </a:prstGeom>
+          <a:noFill/>
+          <a:ln>
+            <a:solidFill>
+              <a:schemeClr val="tx1"/>
+            </a:solidFill>
+          </a:ln>
+        </p:spPr>
+        <p:txBody>
+          <a:bodyPr rot="0" spcFirstLastPara="0" vertOverflow="overflow" horzOverflow="overflow" vert="horz" wrap="square" lIns="91440" tIns="45720" rIns="91440" bIns="45720" numCol="1" spcCol="0" rtlCol="0" fromWordArt="0" anchor="t" anchorCtr="0" forceAA="0" compatLnSpc="1">
+            <a:prstTxWarp prst="textNoShape">
+              <a:avLst/>
+            </a:prstTxWarp>
+            <a:spAutoFit/>
+          </a:bodyPr>
+          <a:lstStyle/>
+          <a:p>
+            <a:r>
+              <a:rPr lang="en-GB" sz="1600" dirty="0"/>
+              <a:t>Date – 24/11/2025</a:t>
+            </a:r>
+          </a:p>
+        </p:txBody>
+      </p:sp>
+      <p:sp>
+        <p:nvSpPr>
+          <p:cNvPr id="2" name="TextBox 1">
+            <a:extLst>
+              <a:ext uri="{FF2B5EF4-FFF2-40B4-BE49-F238E27FC236}">
+                <a16:creationId xmlns:a16="http://schemas.microsoft.com/office/drawing/2014/main" id="{6165D850-749B-B97D-752E-BEC348B613E1}"/>
+              </a:ext>
+            </a:extLst>
+          </p:cNvPr>
+          <p:cNvSpPr txBox="1"/>
+          <p:nvPr/>
+        </p:nvSpPr>
+        <p:spPr>
+          <a:xfrm>
+            <a:off x="5651845" y="90120"/>
+            <a:ext cx="1959856" cy="338554"/>
+          </a:xfrm>
+          <a:prstGeom prst="rect">
+            <a:avLst/>
+          </a:prstGeom>
+          <a:noFill/>
+          <a:ln>
+            <a:solidFill>
+              <a:schemeClr val="tx1"/>
+            </a:solidFill>
+          </a:ln>
+        </p:spPr>
+        <p:txBody>
+          <a:bodyPr rot="0" spcFirstLastPara="0" vertOverflow="overflow" horzOverflow="overflow" vert="horz" wrap="square" lIns="91440" tIns="45720" rIns="91440" bIns="45720" numCol="1" spcCol="0" rtlCol="0" fromWordArt="0" anchor="t" anchorCtr="0" forceAA="0" compatLnSpc="1">
+            <a:prstTxWarp prst="textNoShape">
+              <a:avLst/>
+            </a:prstTxWarp>
+            <a:spAutoFit/>
+          </a:bodyPr>
+          <a:lstStyle/>
+          <a:p>
+            <a:r>
+              <a:rPr lang="en-GB" sz="1600" dirty="0"/>
+              <a:t>Game Build V.0.1</a:t>
+            </a:r>
+          </a:p>
+        </p:txBody>
+      </p:sp>
+      <p:sp>
+        <p:nvSpPr>
+          <p:cNvPr id="3" name="TextBox 2">
+            <a:extLst>
+              <a:ext uri="{FF2B5EF4-FFF2-40B4-BE49-F238E27FC236}">
+                <a16:creationId xmlns:a16="http://schemas.microsoft.com/office/drawing/2014/main" id="{B05434DB-BE74-90C9-E4A8-6FC8304041B7}"/>
+              </a:ext>
+            </a:extLst>
+          </p:cNvPr>
+          <p:cNvSpPr txBox="1"/>
+          <p:nvPr/>
+        </p:nvSpPr>
+        <p:spPr>
+          <a:xfrm>
+            <a:off x="5648215" y="563289"/>
+            <a:ext cx="3926490" cy="4431983"/>
+          </a:xfrm>
+          <a:prstGeom prst="rect">
+            <a:avLst/>
+          </a:prstGeom>
+          <a:noFill/>
+          <a:ln>
+            <a:solidFill>
+              <a:schemeClr val="tx1"/>
+            </a:solidFill>
+          </a:ln>
+        </p:spPr>
+        <p:txBody>
+          <a:bodyPr rot="0" spcFirstLastPara="0" vertOverflow="overflow" horzOverflow="overflow" vert="horz" wrap="square" lIns="91440" tIns="45720" rIns="91440" bIns="45720" numCol="1" spcCol="0" rtlCol="0" fromWordArt="0" anchor="t" anchorCtr="0" forceAA="0" compatLnSpc="1">
+            <a:prstTxWarp prst="textNoShape">
+              <a:avLst/>
+            </a:prstTxWarp>
+            <a:spAutoFit/>
+          </a:bodyPr>
+          <a:lstStyle/>
+          <a:p>
+            <a:r>
+              <a:rPr lang="en-GB" sz="1400" dirty="0"/>
+              <a:t>Summary Of Session</a:t>
+            </a:r>
+          </a:p>
+          <a:p>
+            <a:endParaRPr lang="en-GB" sz="1400" dirty="0"/>
+          </a:p>
+          <a:p>
+            <a:r>
+              <a:rPr lang="en-GB" sz="1400" dirty="0"/>
+              <a:t>Colour coded each zone and named them correctly. These are to be used temporarily before the official designs are completed. The grey coloured zones are for the front views of both the vents and the doors.</a:t>
+            </a:r>
+          </a:p>
+          <a:p>
+            <a:endParaRPr lang="en-GB" sz="1400" dirty="0"/>
+          </a:p>
+          <a:p>
+            <a:r>
+              <a:rPr lang="en-GB" sz="1400" dirty="0"/>
+              <a:t>I have also Created a template for the Office.</a:t>
+            </a:r>
+          </a:p>
+          <a:p>
+            <a:r>
+              <a:rPr lang="en-GB" sz="1400" dirty="0"/>
+              <a:t>The Office will have a set size of 3000x1050, and the zones will have a set size of 2000x1050.</a:t>
+            </a:r>
+          </a:p>
+          <a:p>
+            <a:endParaRPr lang="en-GB" sz="1400" dirty="0"/>
+          </a:p>
+          <a:p>
+            <a:r>
+              <a:rPr lang="en-GB" sz="1400" dirty="0"/>
+              <a:t>The Buttons for both the vents and doors are made in Game Maker and will be 200x300px to have more flexibility in designing.</a:t>
+            </a:r>
+          </a:p>
+          <a:p>
+            <a:endParaRPr lang="en-GB" sz="1400" dirty="0"/>
+          </a:p>
+          <a:p>
+            <a:r>
+              <a:rPr lang="en-GB" sz="1400" dirty="0"/>
+              <a:t>The Camera button will start off being 300x100.</a:t>
+            </a:r>
+          </a:p>
+          <a:p>
+            <a:endParaRPr lang="en-GB" sz="1400" dirty="0"/>
+          </a:p>
+          <a:p>
+            <a:endParaRPr lang="en-GB" sz="1400" dirty="0"/>
+          </a:p>
+          <a:p>
+            <a:endParaRPr lang="en-GB" sz="1600" dirty="0"/>
+          </a:p>
+        </p:txBody>
+      </p:sp>
+      <p:sp>
+        <p:nvSpPr>
+          <p:cNvPr id="6" name="TextBox 5">
+            <a:extLst>
+              <a:ext uri="{FF2B5EF4-FFF2-40B4-BE49-F238E27FC236}">
+                <a16:creationId xmlns:a16="http://schemas.microsoft.com/office/drawing/2014/main" id="{5D546EC8-C3EF-D2D7-4576-CD84485BAD0C}"/>
+              </a:ext>
+            </a:extLst>
+          </p:cNvPr>
+          <p:cNvSpPr txBox="1"/>
+          <p:nvPr/>
+        </p:nvSpPr>
+        <p:spPr>
+          <a:xfrm>
+            <a:off x="9642445" y="54237"/>
+            <a:ext cx="2438400" cy="1754326"/>
+          </a:xfrm>
+          <a:prstGeom prst="rect">
+            <a:avLst/>
+          </a:prstGeom>
+          <a:noFill/>
+          <a:ln>
+            <a:solidFill>
+              <a:schemeClr val="tx1"/>
+            </a:solidFill>
+          </a:ln>
+        </p:spPr>
+        <p:txBody>
+          <a:bodyPr rot="0" spcFirstLastPara="0" vertOverflow="overflow" horzOverflow="overflow" vert="horz" wrap="square" lIns="91440" tIns="45720" rIns="91440" bIns="45720" numCol="1" spcCol="0" rtlCol="0" fromWordArt="0" anchor="t" anchorCtr="0" forceAA="0" compatLnSpc="1">
+            <a:prstTxWarp prst="textNoShape">
+              <a:avLst/>
+            </a:prstTxWarp>
+            <a:spAutoFit/>
+          </a:bodyPr>
+          <a:lstStyle/>
+          <a:p>
+            <a:r>
+              <a:rPr lang="en-GB" sz="1200" dirty="0"/>
+              <a:t>What to do for Next Session</a:t>
+            </a:r>
+          </a:p>
+          <a:p>
+            <a:endParaRPr lang="en-GB" sz="1200" dirty="0"/>
+          </a:p>
+          <a:p>
+            <a:r>
+              <a:rPr lang="en-GB" sz="1200" dirty="0"/>
+              <a:t>Allocate each zone to a location and name them specific to what contents are in it. For Example, 2 zones will be named obj_left_corridor and obj_left_corridor.</a:t>
+            </a:r>
+          </a:p>
+          <a:p>
+            <a:endParaRPr lang="en-GB" sz="1200" dirty="0"/>
+          </a:p>
+        </p:txBody>
+      </p:sp>
+      <p:pic>
+        <p:nvPicPr>
+          <p:cNvPr id="9" name="Picture 8">
+            <a:extLst>
+              <a:ext uri="{FF2B5EF4-FFF2-40B4-BE49-F238E27FC236}">
+                <a16:creationId xmlns:a16="http://schemas.microsoft.com/office/drawing/2014/main" id="{D5DA7A1B-0205-F5E4-D017-A101709C5534}"/>
+              </a:ext>
+            </a:extLst>
+          </p:cNvPr>
+          <p:cNvPicPr>
+            <a:picLocks noChangeAspect="1"/>
+          </p:cNvPicPr>
+          <p:nvPr/>
+        </p:nvPicPr>
+        <p:blipFill>
+          <a:blip r:embed="rId2"/>
+          <a:stretch>
+            <a:fillRect/>
+          </a:stretch>
+        </p:blipFill>
+        <p:spPr>
+          <a:xfrm>
+            <a:off x="35660" y="54237"/>
+            <a:ext cx="2581635" cy="2152950"/>
+          </a:xfrm>
+          <a:prstGeom prst="rect">
+            <a:avLst/>
+          </a:prstGeom>
+        </p:spPr>
+      </p:pic>
+      <p:pic>
+        <p:nvPicPr>
+          <p:cNvPr id="19" name="Picture 18">
+            <a:extLst>
+              <a:ext uri="{FF2B5EF4-FFF2-40B4-BE49-F238E27FC236}">
+                <a16:creationId xmlns:a16="http://schemas.microsoft.com/office/drawing/2014/main" id="{094D053A-FA5D-5E1A-4596-4B1AB3899244}"/>
+              </a:ext>
+            </a:extLst>
+          </p:cNvPr>
+          <p:cNvPicPr>
+            <a:picLocks noChangeAspect="1"/>
+          </p:cNvPicPr>
+          <p:nvPr/>
+        </p:nvPicPr>
+        <p:blipFill>
+          <a:blip r:embed="rId3"/>
+          <a:stretch>
+            <a:fillRect/>
+          </a:stretch>
+        </p:blipFill>
+        <p:spPr>
+          <a:xfrm>
+            <a:off x="3200014" y="90120"/>
+            <a:ext cx="2372056" cy="4239217"/>
+          </a:xfrm>
+          <a:prstGeom prst="rect">
+            <a:avLst/>
+          </a:prstGeom>
+        </p:spPr>
+      </p:pic>
+      <p:pic>
+        <p:nvPicPr>
+          <p:cNvPr id="23" name="Picture 22">
+            <a:extLst>
+              <a:ext uri="{FF2B5EF4-FFF2-40B4-BE49-F238E27FC236}">
+                <a16:creationId xmlns:a16="http://schemas.microsoft.com/office/drawing/2014/main" id="{BA939C8F-A31D-6446-512C-312CE13E262F}"/>
+              </a:ext>
+            </a:extLst>
+          </p:cNvPr>
+          <p:cNvPicPr>
+            <a:picLocks noChangeAspect="1"/>
+          </p:cNvPicPr>
+          <p:nvPr/>
+        </p:nvPicPr>
+        <p:blipFill>
+          <a:blip r:embed="rId4"/>
+          <a:srcRect r="3135"/>
+          <a:stretch>
+            <a:fillRect/>
+          </a:stretch>
+        </p:blipFill>
+        <p:spPr>
+          <a:xfrm>
+            <a:off x="149942" y="2348393"/>
+            <a:ext cx="2353069" cy="1495634"/>
+          </a:xfrm>
+          <a:prstGeom prst="rect">
+            <a:avLst/>
+          </a:prstGeom>
+        </p:spPr>
+      </p:pic>
+      <p:pic>
+        <p:nvPicPr>
+          <p:cNvPr id="25" name="Picture 24">
+            <a:extLst>
+              <a:ext uri="{FF2B5EF4-FFF2-40B4-BE49-F238E27FC236}">
+                <a16:creationId xmlns:a16="http://schemas.microsoft.com/office/drawing/2014/main" id="{366848E6-9BE0-02B5-CC0F-5C6426CD62E4}"/>
+              </a:ext>
+            </a:extLst>
+          </p:cNvPr>
+          <p:cNvPicPr>
+            <a:picLocks noChangeAspect="1"/>
+          </p:cNvPicPr>
+          <p:nvPr/>
+        </p:nvPicPr>
+        <p:blipFill>
+          <a:blip r:embed="rId5"/>
+          <a:stretch>
+            <a:fillRect/>
+          </a:stretch>
+        </p:blipFill>
+        <p:spPr>
+          <a:xfrm>
+            <a:off x="59421" y="4376015"/>
+            <a:ext cx="4326621" cy="2481985"/>
+          </a:xfrm>
+          <a:prstGeom prst="rect">
+            <a:avLst/>
+          </a:prstGeom>
+        </p:spPr>
+      </p:pic>
+    </p:spTree>
+    <p:extLst>
+      <p:ext uri="{BB962C8B-B14F-4D97-AF65-F5344CB8AC3E}">
+        <p14:creationId xmlns:p14="http://schemas.microsoft.com/office/powerpoint/2010/main" val="2368599957"/>
+      </p:ext>
+    </p:extLst>
+  </p:cSld>
+  <p:clrMapOvr>
+    <a:masterClrMapping/>
+  </p:clrMapOvr>
+</p:sld>
+</file>
+
+<file path=ppt/slides/slide20.xml><?xml version="1.0" encoding="utf-8"?>
 <p:sld xmlns:a="http://schemas.openxmlformats.org/drawingml/2006/main" xmlns:r="http://schemas.openxmlformats.org/officeDocument/2006/relationships" xmlns:p="http://schemas.openxmlformats.org/presentationml/2006/main">
   <p:cSld>
     <p:spTree>
@@ -8811,399 +9482,7 @@
 </p:sld>
 </file>
 
-<file path=ppt/slides/slide2.xml><?xml version="1.0" encoding="utf-8"?>
-<p:sld xmlns:a="http://schemas.openxmlformats.org/drawingml/2006/main" xmlns:r="http://schemas.openxmlformats.org/officeDocument/2006/relationships" xmlns:p="http://schemas.openxmlformats.org/presentationml/2006/main">
-  <p:cSld>
-    <p:spTree>
-      <p:nvGrpSpPr>
-        <p:cNvPr id="1" name="">
-          <a:extLst>
-            <a:ext uri="{FF2B5EF4-FFF2-40B4-BE49-F238E27FC236}">
-              <a16:creationId xmlns:a16="http://schemas.microsoft.com/office/drawing/2014/main" id="{B2FB39EC-F8FE-ADA9-EA59-F1EC36434BDE}"/>
-            </a:ext>
-          </a:extLst>
-        </p:cNvPr>
-        <p:cNvGrpSpPr/>
-        <p:nvPr/>
-      </p:nvGrpSpPr>
-      <p:grpSpPr>
-        <a:xfrm>
-          <a:off x="0" y="0"/>
-          <a:ext cx="0" cy="0"/>
-          <a:chOff x="0" y="0"/>
-          <a:chExt cx="0" cy="0"/>
-        </a:xfrm>
-      </p:grpSpPr>
-      <p:sp>
-        <p:nvSpPr>
-          <p:cNvPr id="4" name="TextBox 3">
-            <a:extLst>
-              <a:ext uri="{FF2B5EF4-FFF2-40B4-BE49-F238E27FC236}">
-                <a16:creationId xmlns:a16="http://schemas.microsoft.com/office/drawing/2014/main" id="{576BDE55-6263-8575-7C13-EC317449D25F}"/>
-              </a:ext>
-            </a:extLst>
-          </p:cNvPr>
-          <p:cNvSpPr txBox="1"/>
-          <p:nvPr/>
-        </p:nvSpPr>
-        <p:spPr>
-          <a:xfrm>
-            <a:off x="7763992" y="90121"/>
-            <a:ext cx="1809641" cy="338554"/>
-          </a:xfrm>
-          <a:prstGeom prst="rect">
-            <a:avLst/>
-          </a:prstGeom>
-          <a:noFill/>
-          <a:ln>
-            <a:solidFill>
-              <a:schemeClr val="tx1"/>
-            </a:solidFill>
-          </a:ln>
-        </p:spPr>
-        <p:txBody>
-          <a:bodyPr rot="0" spcFirstLastPara="0" vertOverflow="overflow" horzOverflow="overflow" vert="horz" wrap="square" lIns="91440" tIns="45720" rIns="91440" bIns="45720" numCol="1" spcCol="0" rtlCol="0" fromWordArt="0" anchor="t" anchorCtr="0" forceAA="0" compatLnSpc="1">
-            <a:prstTxWarp prst="textNoShape">
-              <a:avLst/>
-            </a:prstTxWarp>
-            <a:spAutoFit/>
-          </a:bodyPr>
-          <a:lstStyle/>
-          <a:p>
-            <a:r>
-              <a:rPr lang="en-GB" sz="1600" dirty="0"/>
-              <a:t>Date – 24/11/2025</a:t>
-            </a:r>
-          </a:p>
-        </p:txBody>
-      </p:sp>
-      <p:sp>
-        <p:nvSpPr>
-          <p:cNvPr id="2" name="TextBox 1">
-            <a:extLst>
-              <a:ext uri="{FF2B5EF4-FFF2-40B4-BE49-F238E27FC236}">
-                <a16:creationId xmlns:a16="http://schemas.microsoft.com/office/drawing/2014/main" id="{6165D850-749B-B97D-752E-BEC348B613E1}"/>
-              </a:ext>
-            </a:extLst>
-          </p:cNvPr>
-          <p:cNvSpPr txBox="1"/>
-          <p:nvPr/>
-        </p:nvSpPr>
-        <p:spPr>
-          <a:xfrm>
-            <a:off x="5651845" y="90120"/>
-            <a:ext cx="1959856" cy="338554"/>
-          </a:xfrm>
-          <a:prstGeom prst="rect">
-            <a:avLst/>
-          </a:prstGeom>
-          <a:noFill/>
-          <a:ln>
-            <a:solidFill>
-              <a:schemeClr val="tx1"/>
-            </a:solidFill>
-          </a:ln>
-        </p:spPr>
-        <p:txBody>
-          <a:bodyPr rot="0" spcFirstLastPara="0" vertOverflow="overflow" horzOverflow="overflow" vert="horz" wrap="square" lIns="91440" tIns="45720" rIns="91440" bIns="45720" numCol="1" spcCol="0" rtlCol="0" fromWordArt="0" anchor="t" anchorCtr="0" forceAA="0" compatLnSpc="1">
-            <a:prstTxWarp prst="textNoShape">
-              <a:avLst/>
-            </a:prstTxWarp>
-            <a:spAutoFit/>
-          </a:bodyPr>
-          <a:lstStyle/>
-          <a:p>
-            <a:r>
-              <a:rPr lang="en-GB" sz="1600" dirty="0"/>
-              <a:t>Game Build V.0.1</a:t>
-            </a:r>
-          </a:p>
-        </p:txBody>
-      </p:sp>
-      <p:sp>
-        <p:nvSpPr>
-          <p:cNvPr id="3" name="TextBox 2">
-            <a:extLst>
-              <a:ext uri="{FF2B5EF4-FFF2-40B4-BE49-F238E27FC236}">
-                <a16:creationId xmlns:a16="http://schemas.microsoft.com/office/drawing/2014/main" id="{B05434DB-BE74-90C9-E4A8-6FC8304041B7}"/>
-              </a:ext>
-            </a:extLst>
-          </p:cNvPr>
-          <p:cNvSpPr txBox="1"/>
-          <p:nvPr/>
-        </p:nvSpPr>
-        <p:spPr>
-          <a:xfrm>
-            <a:off x="5648215" y="563289"/>
-            <a:ext cx="3926490" cy="4431983"/>
-          </a:xfrm>
-          <a:prstGeom prst="rect">
-            <a:avLst/>
-          </a:prstGeom>
-          <a:noFill/>
-          <a:ln>
-            <a:solidFill>
-              <a:schemeClr val="tx1"/>
-            </a:solidFill>
-          </a:ln>
-        </p:spPr>
-        <p:txBody>
-          <a:bodyPr rot="0" spcFirstLastPara="0" vertOverflow="overflow" horzOverflow="overflow" vert="horz" wrap="square" lIns="91440" tIns="45720" rIns="91440" bIns="45720" numCol="1" spcCol="0" rtlCol="0" fromWordArt="0" anchor="t" anchorCtr="0" forceAA="0" compatLnSpc="1">
-            <a:prstTxWarp prst="textNoShape">
-              <a:avLst/>
-            </a:prstTxWarp>
-            <a:spAutoFit/>
-          </a:bodyPr>
-          <a:lstStyle/>
-          <a:p>
-            <a:r>
-              <a:rPr lang="en-GB" sz="1400" dirty="0"/>
-              <a:t>Summary Of Session</a:t>
-            </a:r>
-          </a:p>
-          <a:p>
-            <a:endParaRPr lang="en-GB" sz="1400" dirty="0"/>
-          </a:p>
-          <a:p>
-            <a:r>
-              <a:rPr lang="en-GB" sz="1400" dirty="0"/>
-              <a:t>Colour coded each zone and named them correctly. These are to be used temporarily before the official designs are completed. The grey coloured zones are for the front views of both the vents and the doors.</a:t>
-            </a:r>
-          </a:p>
-          <a:p>
-            <a:endParaRPr lang="en-GB" sz="1400" dirty="0"/>
-          </a:p>
-          <a:p>
-            <a:r>
-              <a:rPr lang="en-GB" sz="1400" dirty="0"/>
-              <a:t>I have also Created a template for the Office.</a:t>
-            </a:r>
-          </a:p>
-          <a:p>
-            <a:r>
-              <a:rPr lang="en-GB" sz="1400" dirty="0"/>
-              <a:t>The Office will have a set size of 3000x1050, and the zones will have a set size of 2000x1050.</a:t>
-            </a:r>
-          </a:p>
-          <a:p>
-            <a:endParaRPr lang="en-GB" sz="1400" dirty="0"/>
-          </a:p>
-          <a:p>
-            <a:r>
-              <a:rPr lang="en-GB" sz="1400" dirty="0"/>
-              <a:t>The Buttons for both the vents and doors are made in Game Maker and will be 200x300px to have more flexibility in designing.</a:t>
-            </a:r>
-          </a:p>
-          <a:p>
-            <a:endParaRPr lang="en-GB" sz="1400" dirty="0"/>
-          </a:p>
-          <a:p>
-            <a:r>
-              <a:rPr lang="en-GB" sz="1400" dirty="0"/>
-              <a:t>The Camera button will start off being 300x100.</a:t>
-            </a:r>
-          </a:p>
-          <a:p>
-            <a:endParaRPr lang="en-GB" sz="1400" dirty="0"/>
-          </a:p>
-          <a:p>
-            <a:endParaRPr lang="en-GB" sz="1400" dirty="0"/>
-          </a:p>
-          <a:p>
-            <a:endParaRPr lang="en-GB" sz="1600" dirty="0"/>
-          </a:p>
-        </p:txBody>
-      </p:sp>
-      <p:sp>
-        <p:nvSpPr>
-          <p:cNvPr id="6" name="TextBox 5">
-            <a:extLst>
-              <a:ext uri="{FF2B5EF4-FFF2-40B4-BE49-F238E27FC236}">
-                <a16:creationId xmlns:a16="http://schemas.microsoft.com/office/drawing/2014/main" id="{5D546EC8-C3EF-D2D7-4576-CD84485BAD0C}"/>
-              </a:ext>
-            </a:extLst>
-          </p:cNvPr>
-          <p:cNvSpPr txBox="1"/>
-          <p:nvPr/>
-        </p:nvSpPr>
-        <p:spPr>
-          <a:xfrm>
-            <a:off x="9642445" y="54237"/>
-            <a:ext cx="2438400" cy="1754326"/>
-          </a:xfrm>
-          <a:prstGeom prst="rect">
-            <a:avLst/>
-          </a:prstGeom>
-          <a:noFill/>
-          <a:ln>
-            <a:solidFill>
-              <a:schemeClr val="tx1"/>
-            </a:solidFill>
-          </a:ln>
-        </p:spPr>
-        <p:txBody>
-          <a:bodyPr rot="0" spcFirstLastPara="0" vertOverflow="overflow" horzOverflow="overflow" vert="horz" wrap="square" lIns="91440" tIns="45720" rIns="91440" bIns="45720" numCol="1" spcCol="0" rtlCol="0" fromWordArt="0" anchor="t" anchorCtr="0" forceAA="0" compatLnSpc="1">
-            <a:prstTxWarp prst="textNoShape">
-              <a:avLst/>
-            </a:prstTxWarp>
-            <a:spAutoFit/>
-          </a:bodyPr>
-          <a:lstStyle/>
-          <a:p>
-            <a:r>
-              <a:rPr lang="en-GB" sz="1200" dirty="0"/>
-              <a:t>What to do for Next Session</a:t>
-            </a:r>
-          </a:p>
-          <a:p>
-            <a:endParaRPr lang="en-GB" sz="1200" dirty="0"/>
-          </a:p>
-          <a:p>
-            <a:r>
-              <a:rPr lang="en-GB" sz="1200" dirty="0"/>
-              <a:t>Allocate each zone to a location and name them specific to what contents are in it. For Example, 2 zones will be named obj_left_corridor and obj_left_corridor.</a:t>
-            </a:r>
-          </a:p>
-          <a:p>
-            <a:endParaRPr lang="en-GB" sz="1200" dirty="0"/>
-          </a:p>
-        </p:txBody>
-      </p:sp>
-      <p:pic>
-        <p:nvPicPr>
-          <p:cNvPr id="9" name="Picture 8">
-            <a:extLst>
-              <a:ext uri="{FF2B5EF4-FFF2-40B4-BE49-F238E27FC236}">
-                <a16:creationId xmlns:a16="http://schemas.microsoft.com/office/drawing/2014/main" id="{D5DA7A1B-0205-F5E4-D017-A101709C5534}"/>
-              </a:ext>
-            </a:extLst>
-          </p:cNvPr>
-          <p:cNvPicPr>
-            <a:picLocks noChangeAspect="1"/>
-          </p:cNvPicPr>
-          <p:nvPr/>
-        </p:nvPicPr>
-        <p:blipFill>
-          <a:blip r:embed="rId2"/>
-          <a:stretch>
-            <a:fillRect/>
-          </a:stretch>
-        </p:blipFill>
-        <p:spPr>
-          <a:xfrm>
-            <a:off x="35660" y="54237"/>
-            <a:ext cx="2581635" cy="2152950"/>
-          </a:xfrm>
-          <a:prstGeom prst="rect">
-            <a:avLst/>
-          </a:prstGeom>
-        </p:spPr>
-      </p:pic>
-      <p:pic>
-        <p:nvPicPr>
-          <p:cNvPr id="19" name="Picture 18">
-            <a:extLst>
-              <a:ext uri="{FF2B5EF4-FFF2-40B4-BE49-F238E27FC236}">
-                <a16:creationId xmlns:a16="http://schemas.microsoft.com/office/drawing/2014/main" id="{094D053A-FA5D-5E1A-4596-4B1AB3899244}"/>
-              </a:ext>
-            </a:extLst>
-          </p:cNvPr>
-          <p:cNvPicPr>
-            <a:picLocks noChangeAspect="1"/>
-          </p:cNvPicPr>
-          <p:nvPr/>
-        </p:nvPicPr>
-        <p:blipFill>
-          <a:blip r:embed="rId3"/>
-          <a:stretch>
-            <a:fillRect/>
-          </a:stretch>
-        </p:blipFill>
-        <p:spPr>
-          <a:xfrm>
-            <a:off x="3200014" y="90120"/>
-            <a:ext cx="2372056" cy="4239217"/>
-          </a:xfrm>
-          <a:prstGeom prst="rect">
-            <a:avLst/>
-          </a:prstGeom>
-        </p:spPr>
-      </p:pic>
-      <p:pic>
-        <p:nvPicPr>
-          <p:cNvPr id="23" name="Picture 22">
-            <a:extLst>
-              <a:ext uri="{FF2B5EF4-FFF2-40B4-BE49-F238E27FC236}">
-                <a16:creationId xmlns:a16="http://schemas.microsoft.com/office/drawing/2014/main" id="{BA939C8F-A31D-6446-512C-312CE13E262F}"/>
-              </a:ext>
-            </a:extLst>
-          </p:cNvPr>
-          <p:cNvPicPr>
-            <a:picLocks noChangeAspect="1"/>
-          </p:cNvPicPr>
-          <p:nvPr/>
-        </p:nvPicPr>
-        <p:blipFill>
-          <a:blip r:embed="rId4"/>
-          <a:srcRect r="3135"/>
-          <a:stretch>
-            <a:fillRect/>
-          </a:stretch>
-        </p:blipFill>
-        <p:spPr>
-          <a:xfrm>
-            <a:off x="149942" y="2348393"/>
-            <a:ext cx="2353069" cy="1495634"/>
-          </a:xfrm>
-          <a:prstGeom prst="rect">
-            <a:avLst/>
-          </a:prstGeom>
-        </p:spPr>
-      </p:pic>
-      <p:pic>
-        <p:nvPicPr>
-          <p:cNvPr id="25" name="Picture 24">
-            <a:extLst>
-              <a:ext uri="{FF2B5EF4-FFF2-40B4-BE49-F238E27FC236}">
-                <a16:creationId xmlns:a16="http://schemas.microsoft.com/office/drawing/2014/main" id="{366848E6-9BE0-02B5-CC0F-5C6426CD62E4}"/>
-              </a:ext>
-            </a:extLst>
-          </p:cNvPr>
-          <p:cNvPicPr>
-            <a:picLocks noChangeAspect="1"/>
-          </p:cNvPicPr>
-          <p:nvPr/>
-        </p:nvPicPr>
-        <p:blipFill>
-          <a:blip r:embed="rId5"/>
-          <a:stretch>
-            <a:fillRect/>
-          </a:stretch>
-        </p:blipFill>
-        <p:spPr>
-          <a:xfrm>
-            <a:off x="59421" y="4376015"/>
-            <a:ext cx="4326621" cy="2481985"/>
-          </a:xfrm>
-          <a:prstGeom prst="rect">
-            <a:avLst/>
-          </a:prstGeom>
-        </p:spPr>
-      </p:pic>
-    </p:spTree>
-    <p:extLst>
-      <p:ext uri="{BB962C8B-B14F-4D97-AF65-F5344CB8AC3E}">
-        <p14:creationId xmlns:p14="http://schemas.microsoft.com/office/powerpoint/2010/main" val="2368599957"/>
-      </p:ext>
-    </p:extLst>
-  </p:cSld>
-  <p:clrMapOvr>
-    <a:masterClrMapping/>
-  </p:clrMapOvr>
-</p:sld>
-</file>
-
-<file path=ppt/slides/slide20.xml><?xml version="1.0" encoding="utf-8"?>
+<file path=ppt/slides/slide21.xml><?xml version="1.0" encoding="utf-8"?>
 <p:sld xmlns:a="http://schemas.openxmlformats.org/drawingml/2006/main" xmlns:r="http://schemas.openxmlformats.org/officeDocument/2006/relationships" xmlns:p="http://schemas.openxmlformats.org/presentationml/2006/main">
   <p:cSld>
     <p:spTree>
@@ -9727,7 +10006,7 @@
 </p:sld>
 </file>
 
-<file path=ppt/slides/slide21.xml><?xml version="1.0" encoding="utf-8"?>
+<file path=ppt/slides/slide22.xml><?xml version="1.0" encoding="utf-8"?>
 <p:sld xmlns:a="http://schemas.openxmlformats.org/drawingml/2006/main" xmlns:r="http://schemas.openxmlformats.org/officeDocument/2006/relationships" xmlns:p="http://schemas.openxmlformats.org/presentationml/2006/main">
   <p:cSld>
     <p:spTree>
@@ -10301,7 +10580,7 @@
 </p:sld>
 </file>
 
-<file path=ppt/slides/slide22.xml><?xml version="1.0" encoding="utf-8"?>
+<file path=ppt/slides/slide23.xml><?xml version="1.0" encoding="utf-8"?>
 <p:sld xmlns:a="http://schemas.openxmlformats.org/drawingml/2006/main" xmlns:r="http://schemas.openxmlformats.org/officeDocument/2006/relationships" xmlns:p="http://schemas.openxmlformats.org/presentationml/2006/main">
   <p:cSld>
     <p:spTree>
@@ -10801,7 +11080,7 @@
 </p:sld>
 </file>
 
-<file path=ppt/slides/slide23.xml><?xml version="1.0" encoding="utf-8"?>
+<file path=ppt/slides/slide24.xml><?xml version="1.0" encoding="utf-8"?>
 <p:sld xmlns:a="http://schemas.openxmlformats.org/drawingml/2006/main" xmlns:r="http://schemas.openxmlformats.org/officeDocument/2006/relationships" xmlns:p="http://schemas.openxmlformats.org/presentationml/2006/main">
   <p:cSld>
     <p:spTree>
@@ -10839,14 +11118,14 @@
           <p:nvPr>
             <p:extLst>
               <p:ext uri="{D42A27DB-BD31-4B8C-83A1-F6EECF244321}">
-                <p14:modId xmlns:p14="http://schemas.microsoft.com/office/powerpoint/2010/main" val="2887785680"/>
+                <p14:modId xmlns:p14="http://schemas.microsoft.com/office/powerpoint/2010/main" val="406784268"/>
               </p:ext>
             </p:extLst>
           </p:nvPr>
         </p:nvGraphicFramePr>
         <p:xfrm>
           <a:off x="0" y="0"/>
-          <a:ext cx="11988463" cy="2206037"/>
+          <a:ext cx="11988463" cy="2486196"/>
         </p:xfrm>
         <a:graphic>
           <a:graphicData uri="http://schemas.openxmlformats.org/drawingml/2006/table">
@@ -11076,7 +11355,7 @@
                     <a:p>
                       <a:r>
                         <a:rPr lang="en-GB" sz="1100" dirty="0"/>
-                        <a:t>11. Build V.0.6.4</a:t>
+                        <a:t>11. Build V.0.6.5</a:t>
                       </a:r>
                     </a:p>
                   </a:txBody>
@@ -11115,17 +11394,23 @@
                     <a:bodyPr/>
                     <a:lstStyle/>
                     <a:p>
-                      <a:endParaRPr lang="en-GB" sz="1100" dirty="0"/>
-                    </a:p>
-                  </a:txBody>
-                  <a:tcPr/>
-                </a:tc>
-                <a:tc>
-                  <a:txBody>
-                    <a:bodyPr/>
-                    <a:lstStyle/>
-                    <a:p>
-                      <a:endParaRPr lang="en-GB" sz="1100" dirty="0"/>
+                      <a:r>
+                        <a:rPr lang="en-GB" sz="1100" dirty="0"/>
+                        <a:t>When the game starts, the view should only be for the main office at the correct size.</a:t>
+                      </a:r>
+                    </a:p>
+                  </a:txBody>
+                  <a:tcPr/>
+                </a:tc>
+                <a:tc>
+                  <a:txBody>
+                    <a:bodyPr/>
+                    <a:lstStyle/>
+                    <a:p>
+                      <a:r>
+                        <a:rPr lang="en-GB" sz="1100" dirty="0"/>
+                        <a:t>The view was set, however the view is stretched vertically and no matter that the dimensions are it continues to stretch.</a:t>
+                      </a:r>
                     </a:p>
                   </a:txBody>
                   <a:tcPr/>

</xml_diff>

<commit_message>
Small additions to V.0.6.5
</commit_message>
<xml_diff>
--- a/Logs/Development Log and Alpha Testing.pptx
+++ b/Logs/Development Log and Alpha Testing.pptx
@@ -7897,7 +7897,7 @@
         <p:spPr>
           <a:xfrm>
             <a:off x="0" y="152027"/>
-            <a:ext cx="5576207" cy="2123658"/>
+            <a:ext cx="5576207" cy="2862322"/>
           </a:xfrm>
           <a:prstGeom prst="rect">
             <a:avLst/>
@@ -7941,9 +7941,6 @@
             </a:r>
           </a:p>
           <a:p>
-            <a:endParaRPr lang="en-GB" sz="1200" dirty="0"/>
-          </a:p>
-          <a:p>
             <a:r>
               <a:rPr lang="en-GB" sz="1200" dirty="0"/>
               <a:t>In total there are 20 zones for level 2. I do need to note that every time I add a new zone, I need to update the script and the value that the buttons represent. 14/20 of these zones are camera zones for both the player and the enemies.</a:t>
@@ -7955,7 +7952,7 @@
           <a:p>
             <a:r>
               <a:rPr lang="en-GB" sz="1200" dirty="0"/>
-              <a:t>Also the new updated camera </a:t>
+              <a:t>Also, the new updated camera </a:t>
             </a:r>
             <a:r>
               <a:rPr lang="en-GB" sz="1200" dirty="0" err="1"/>
@@ -7964,6 +7961,21 @@
             <a:r>
               <a:rPr lang="en-GB" sz="1200" dirty="0"/>
               <a:t> layout is much bigger meaning I will have to try and work around the camera view, at least for zone 1 (Camera Hud).</a:t>
+            </a:r>
+          </a:p>
+          <a:p>
+            <a:endParaRPr lang="en-GB" sz="1200" dirty="0"/>
+          </a:p>
+          <a:p>
+            <a:r>
+              <a:rPr lang="en-GB" sz="1200" dirty="0"/>
+              <a:t>Also, added some Place-holder sound effects to use for key parts of the games like enemy movement and doors closing.</a:t>
+            </a:r>
+          </a:p>
+          <a:p>
+            <a:r>
+              <a:rPr lang="en-GB" sz="1200" dirty="0"/>
+              <a:t>Also, for some reason, when game starts somehow level 2 is affecting level 1 so all I get is a dark screen when I click start.</a:t>
             </a:r>
           </a:p>
         </p:txBody>
@@ -8020,7 +8032,7 @@
         </p:blipFill>
         <p:spPr>
           <a:xfrm>
-            <a:off x="171450" y="2372609"/>
+            <a:off x="171450" y="2968602"/>
             <a:ext cx="3671000" cy="3531986"/>
           </a:xfrm>
           <a:prstGeom prst="rect">
@@ -8058,6 +8070,74 @@
           </a:prstGeom>
         </p:spPr>
       </p:pic>
+      <p:sp>
+        <p:nvSpPr>
+          <p:cNvPr id="12" name="TextBox 11">
+            <a:extLst>
+              <a:ext uri="{FF2B5EF4-FFF2-40B4-BE49-F238E27FC236}">
+                <a16:creationId xmlns:a16="http://schemas.microsoft.com/office/drawing/2014/main" id="{A6FC876D-35D5-9302-B91E-374FFBB6B310}"/>
+              </a:ext>
+            </a:extLst>
+          </p:cNvPr>
+          <p:cNvSpPr txBox="1"/>
+          <p:nvPr/>
+        </p:nvSpPr>
+        <p:spPr>
+          <a:xfrm>
+            <a:off x="9570683" y="508708"/>
+            <a:ext cx="2073729" cy="2462213"/>
+          </a:xfrm>
+          <a:prstGeom prst="rect">
+            <a:avLst/>
+          </a:prstGeom>
+          <a:noFill/>
+        </p:spPr>
+        <p:txBody>
+          <a:bodyPr wrap="square" rtlCol="0">
+            <a:spAutoFit/>
+          </a:bodyPr>
+          <a:lstStyle/>
+          <a:p>
+            <a:r>
+              <a:rPr lang="en-GB" sz="1400" dirty="0"/>
+              <a:t>What to Do next session</a:t>
+            </a:r>
+          </a:p>
+          <a:p>
+            <a:endParaRPr lang="en-GB" sz="1400" dirty="0"/>
+          </a:p>
+          <a:p>
+            <a:r>
+              <a:rPr lang="en-GB" sz="1400" dirty="0"/>
+              <a:t>Finish Enemies code based on new zones.</a:t>
+            </a:r>
+          </a:p>
+          <a:p>
+            <a:endParaRPr lang="en-GB" sz="1400" dirty="0"/>
+          </a:p>
+          <a:p>
+            <a:r>
+              <a:rPr lang="en-GB" sz="1400" dirty="0"/>
+              <a:t>Solve Room problem</a:t>
+            </a:r>
+          </a:p>
+          <a:p>
+            <a:endParaRPr lang="en-GB" sz="1400" dirty="0"/>
+          </a:p>
+          <a:p>
+            <a:endParaRPr lang="en-GB" sz="1400" dirty="0"/>
+          </a:p>
+          <a:p>
+            <a:endParaRPr lang="en-GB" sz="1400" dirty="0"/>
+          </a:p>
+          <a:p>
+            <a:endParaRPr lang="en-GB" sz="1400" dirty="0"/>
+          </a:p>
+          <a:p>
+            <a:endParaRPr lang="en-GB" sz="1400" dirty="0"/>
+          </a:p>
+        </p:txBody>
+      </p:sp>
     </p:spTree>
     <p:extLst>
       <p:ext uri="{BB962C8B-B14F-4D97-AF65-F5344CB8AC3E}">

</xml_diff>

<commit_message>
Fixed Level 2 Critical Failure V.0.6.5
</commit_message>
<xml_diff>
--- a/Logs/Development Log and Alpha Testing.pptx
+++ b/Logs/Development Log and Alpha Testing.pptx
@@ -24,12 +24,13 @@
     <p:sldId id="277" r:id="rId18"/>
     <p:sldId id="279" r:id="rId19"/>
     <p:sldId id="280" r:id="rId20"/>
-    <p:sldId id="257" r:id="rId21"/>
-    <p:sldId id="267" r:id="rId22"/>
-    <p:sldId id="270" r:id="rId23"/>
-    <p:sldId id="272" r:id="rId24"/>
-    <p:sldId id="276" r:id="rId25"/>
-    <p:sldId id="278" r:id="rId26"/>
+    <p:sldId id="281" r:id="rId21"/>
+    <p:sldId id="257" r:id="rId22"/>
+    <p:sldId id="267" r:id="rId23"/>
+    <p:sldId id="270" r:id="rId24"/>
+    <p:sldId id="272" r:id="rId25"/>
+    <p:sldId id="276" r:id="rId26"/>
+    <p:sldId id="278" r:id="rId27"/>
   </p:sldIdLst>
   <p:sldSz cx="12192000" cy="6858000"/>
   <p:notesSz cx="6858000" cy="9144000"/>
@@ -8070,74 +8071,6 @@
           </a:prstGeom>
         </p:spPr>
       </p:pic>
-      <p:sp>
-        <p:nvSpPr>
-          <p:cNvPr id="12" name="TextBox 11">
-            <a:extLst>
-              <a:ext uri="{FF2B5EF4-FFF2-40B4-BE49-F238E27FC236}">
-                <a16:creationId xmlns:a16="http://schemas.microsoft.com/office/drawing/2014/main" id="{A6FC876D-35D5-9302-B91E-374FFBB6B310}"/>
-              </a:ext>
-            </a:extLst>
-          </p:cNvPr>
-          <p:cNvSpPr txBox="1"/>
-          <p:nvPr/>
-        </p:nvSpPr>
-        <p:spPr>
-          <a:xfrm>
-            <a:off x="9570683" y="508708"/>
-            <a:ext cx="2073729" cy="2462213"/>
-          </a:xfrm>
-          <a:prstGeom prst="rect">
-            <a:avLst/>
-          </a:prstGeom>
-          <a:noFill/>
-        </p:spPr>
-        <p:txBody>
-          <a:bodyPr wrap="square" rtlCol="0">
-            <a:spAutoFit/>
-          </a:bodyPr>
-          <a:lstStyle/>
-          <a:p>
-            <a:r>
-              <a:rPr lang="en-GB" sz="1400" dirty="0"/>
-              <a:t>What to Do next session</a:t>
-            </a:r>
-          </a:p>
-          <a:p>
-            <a:endParaRPr lang="en-GB" sz="1400" dirty="0"/>
-          </a:p>
-          <a:p>
-            <a:r>
-              <a:rPr lang="en-GB" sz="1400" dirty="0"/>
-              <a:t>Finish Enemies code based on new zones.</a:t>
-            </a:r>
-          </a:p>
-          <a:p>
-            <a:endParaRPr lang="en-GB" sz="1400" dirty="0"/>
-          </a:p>
-          <a:p>
-            <a:r>
-              <a:rPr lang="en-GB" sz="1400" dirty="0"/>
-              <a:t>Solve Room problem</a:t>
-            </a:r>
-          </a:p>
-          <a:p>
-            <a:endParaRPr lang="en-GB" sz="1400" dirty="0"/>
-          </a:p>
-          <a:p>
-            <a:endParaRPr lang="en-GB" sz="1400" dirty="0"/>
-          </a:p>
-          <a:p>
-            <a:endParaRPr lang="en-GB" sz="1400" dirty="0"/>
-          </a:p>
-          <a:p>
-            <a:endParaRPr lang="en-GB" sz="1400" dirty="0"/>
-          </a:p>
-          <a:p>
-            <a:endParaRPr lang="en-GB" sz="1400" dirty="0"/>
-          </a:p>
-        </p:txBody>
-      </p:sp>
     </p:spTree>
     <p:extLst>
       <p:ext uri="{BB962C8B-B14F-4D97-AF65-F5344CB8AC3E}">
@@ -8544,6 +8477,365 @@
 </file>
 
 <file path=ppt/slides/slide20.xml><?xml version="1.0" encoding="utf-8"?>
+<p:sld xmlns:a="http://schemas.openxmlformats.org/drawingml/2006/main" xmlns:r="http://schemas.openxmlformats.org/officeDocument/2006/relationships" xmlns:p="http://schemas.openxmlformats.org/presentationml/2006/main">
+  <p:cSld>
+    <p:spTree>
+      <p:nvGrpSpPr>
+        <p:cNvPr id="1" name="">
+          <a:extLst>
+            <a:ext uri="{FF2B5EF4-FFF2-40B4-BE49-F238E27FC236}">
+              <a16:creationId xmlns:a16="http://schemas.microsoft.com/office/drawing/2014/main" id="{DFDA9345-4628-A3C1-2D0D-7A1BE0C93B4B}"/>
+            </a:ext>
+          </a:extLst>
+        </p:cNvPr>
+        <p:cNvGrpSpPr/>
+        <p:nvPr/>
+      </p:nvGrpSpPr>
+      <p:grpSpPr>
+        <a:xfrm>
+          <a:off x="0" y="0"/>
+          <a:ext cx="0" cy="0"/>
+          <a:chOff x="0" y="0"/>
+          <a:chExt cx="0" cy="0"/>
+        </a:xfrm>
+      </p:grpSpPr>
+      <p:sp>
+        <p:nvSpPr>
+          <p:cNvPr id="4" name="TextBox 3">
+            <a:extLst>
+              <a:ext uri="{FF2B5EF4-FFF2-40B4-BE49-F238E27FC236}">
+                <a16:creationId xmlns:a16="http://schemas.microsoft.com/office/drawing/2014/main" id="{63A7A869-587A-4435-F2BD-37298F2AF70A}"/>
+              </a:ext>
+            </a:extLst>
+          </p:cNvPr>
+          <p:cNvSpPr txBox="1"/>
+          <p:nvPr/>
+        </p:nvSpPr>
+        <p:spPr>
+          <a:xfrm>
+            <a:off x="7894620" y="121250"/>
+            <a:ext cx="2269916" cy="338554"/>
+          </a:xfrm>
+          <a:prstGeom prst="rect">
+            <a:avLst/>
+          </a:prstGeom>
+          <a:noFill/>
+          <a:ln>
+            <a:solidFill>
+              <a:schemeClr val="tx1"/>
+            </a:solidFill>
+          </a:ln>
+        </p:spPr>
+        <p:txBody>
+          <a:bodyPr rot="0" spcFirstLastPara="0" vertOverflow="overflow" horzOverflow="overflow" vert="horz" wrap="square" lIns="91440" tIns="45720" rIns="91440" bIns="45720" numCol="1" spcCol="0" rtlCol="0" fromWordArt="0" anchor="t" anchorCtr="0" forceAA="0" compatLnSpc="1">
+            <a:prstTxWarp prst="textNoShape">
+              <a:avLst/>
+            </a:prstTxWarp>
+            <a:spAutoFit/>
+          </a:bodyPr>
+          <a:lstStyle/>
+          <a:p>
+            <a:r>
+              <a:rPr lang="en-GB" sz="1600" dirty="0"/>
+              <a:t>Date – 26/01/2026</a:t>
+            </a:r>
+          </a:p>
+        </p:txBody>
+      </p:sp>
+      <p:sp>
+        <p:nvSpPr>
+          <p:cNvPr id="2" name="TextBox 1">
+            <a:extLst>
+              <a:ext uri="{FF2B5EF4-FFF2-40B4-BE49-F238E27FC236}">
+                <a16:creationId xmlns:a16="http://schemas.microsoft.com/office/drawing/2014/main" id="{00C0F9FF-1952-A285-05A3-B7251FBE5424}"/>
+              </a:ext>
+            </a:extLst>
+          </p:cNvPr>
+          <p:cNvSpPr txBox="1"/>
+          <p:nvPr/>
+        </p:nvSpPr>
+        <p:spPr>
+          <a:xfrm>
+            <a:off x="5651845" y="121250"/>
+            <a:ext cx="2112147" cy="338554"/>
+          </a:xfrm>
+          <a:prstGeom prst="rect">
+            <a:avLst/>
+          </a:prstGeom>
+          <a:noFill/>
+          <a:ln>
+            <a:solidFill>
+              <a:schemeClr val="tx1"/>
+            </a:solidFill>
+          </a:ln>
+        </p:spPr>
+        <p:txBody>
+          <a:bodyPr rot="0" spcFirstLastPara="0" vertOverflow="overflow" horzOverflow="overflow" vert="horz" wrap="square" lIns="91440" tIns="45720" rIns="91440" bIns="45720" numCol="1" spcCol="0" rtlCol="0" fromWordArt="0" anchor="t" anchorCtr="0" forceAA="0" compatLnSpc="1">
+            <a:prstTxWarp prst="textNoShape">
+              <a:avLst/>
+            </a:prstTxWarp>
+            <a:spAutoFit/>
+          </a:bodyPr>
+          <a:lstStyle/>
+          <a:p>
+            <a:r>
+              <a:rPr lang="en-GB" sz="1600" dirty="0"/>
+              <a:t>Game Build V.0.6.5</a:t>
+            </a:r>
+          </a:p>
+        </p:txBody>
+      </p:sp>
+      <p:sp>
+        <p:nvSpPr>
+          <p:cNvPr id="3" name="TextBox 2">
+            <a:extLst>
+              <a:ext uri="{FF2B5EF4-FFF2-40B4-BE49-F238E27FC236}">
+                <a16:creationId xmlns:a16="http://schemas.microsoft.com/office/drawing/2014/main" id="{CA69D0FE-BAFE-3A86-FFF6-BC078FFB9587}"/>
+              </a:ext>
+            </a:extLst>
+          </p:cNvPr>
+          <p:cNvSpPr txBox="1"/>
+          <p:nvPr/>
+        </p:nvSpPr>
+        <p:spPr>
+          <a:xfrm>
+            <a:off x="0" y="152027"/>
+            <a:ext cx="5576207" cy="1938992"/>
+          </a:xfrm>
+          <a:prstGeom prst="rect">
+            <a:avLst/>
+          </a:prstGeom>
+          <a:noFill/>
+          <a:ln>
+            <a:solidFill>
+              <a:schemeClr val="tx1"/>
+            </a:solidFill>
+          </a:ln>
+        </p:spPr>
+        <p:txBody>
+          <a:bodyPr rot="0" spcFirstLastPara="0" vertOverflow="overflow" horzOverflow="overflow" vert="horz" wrap="square" lIns="91440" tIns="45720" rIns="91440" bIns="45720" numCol="1" spcCol="0" rtlCol="0" fromWordArt="0" anchor="t" anchorCtr="0" forceAA="0" compatLnSpc="1">
+            <a:prstTxWarp prst="textNoShape">
+              <a:avLst/>
+            </a:prstTxWarp>
+            <a:spAutoFit/>
+          </a:bodyPr>
+          <a:lstStyle/>
+          <a:p>
+            <a:r>
+              <a:rPr lang="en-GB" sz="1200" dirty="0"/>
+              <a:t>This an continuation of the previous slide. I have discovered the problem, and it was my lack of care. I was making edits to the same camera controller level 1 was using.</a:t>
+            </a:r>
+          </a:p>
+          <a:p>
+            <a:endParaRPr lang="en-GB" sz="1200" dirty="0"/>
+          </a:p>
+          <a:p>
+            <a:r>
+              <a:rPr lang="en-GB" sz="1200" dirty="0"/>
+              <a:t>I’ve made two controllers now both for their respective rooms and I’ve restored the original Camera Controller.</a:t>
+            </a:r>
+          </a:p>
+          <a:p>
+            <a:endParaRPr lang="en-GB" sz="1200" dirty="0"/>
+          </a:p>
+          <a:p>
+            <a:r>
+              <a:rPr lang="en-GB" sz="1200" dirty="0"/>
+              <a:t>Turns out I need duplicate versions of everything that uses the </a:t>
+            </a:r>
+            <a:r>
+              <a:rPr lang="en-GB" sz="1200" dirty="0" err="1"/>
+              <a:t>change_camera_script</a:t>
+            </a:r>
+            <a:r>
+              <a:rPr lang="en-GB" sz="1200" dirty="0"/>
+              <a:t> to have the camera work for each new room.</a:t>
+            </a:r>
+          </a:p>
+          <a:p>
+            <a:endParaRPr lang="en-GB" sz="1200" dirty="0"/>
+          </a:p>
+        </p:txBody>
+      </p:sp>
+      <p:sp>
+        <p:nvSpPr>
+          <p:cNvPr id="12" name="TextBox 11">
+            <a:extLst>
+              <a:ext uri="{FF2B5EF4-FFF2-40B4-BE49-F238E27FC236}">
+                <a16:creationId xmlns:a16="http://schemas.microsoft.com/office/drawing/2014/main" id="{E4657D6D-732E-851C-6391-3731DE728E98}"/>
+              </a:ext>
+            </a:extLst>
+          </p:cNvPr>
+          <p:cNvSpPr txBox="1"/>
+          <p:nvPr/>
+        </p:nvSpPr>
+        <p:spPr>
+          <a:xfrm>
+            <a:off x="9570683" y="508708"/>
+            <a:ext cx="2073729" cy="2677656"/>
+          </a:xfrm>
+          <a:prstGeom prst="rect">
+            <a:avLst/>
+          </a:prstGeom>
+          <a:noFill/>
+        </p:spPr>
+        <p:txBody>
+          <a:bodyPr wrap="square" rtlCol="0">
+            <a:spAutoFit/>
+          </a:bodyPr>
+          <a:lstStyle/>
+          <a:p>
+            <a:r>
+              <a:rPr lang="en-GB" sz="1400" dirty="0"/>
+              <a:t>What to Do next session</a:t>
+            </a:r>
+          </a:p>
+          <a:p>
+            <a:endParaRPr lang="en-GB" sz="1400" dirty="0"/>
+          </a:p>
+          <a:p>
+            <a:r>
+              <a:rPr lang="en-GB" sz="1400" dirty="0"/>
+              <a:t>Finish Enemies code based on new zones.</a:t>
+            </a:r>
+          </a:p>
+          <a:p>
+            <a:endParaRPr lang="en-GB" sz="1400" dirty="0"/>
+          </a:p>
+          <a:p>
+            <a:r>
+              <a:rPr lang="en-GB" sz="1400" dirty="0"/>
+              <a:t>Start on Level 3</a:t>
+            </a:r>
+          </a:p>
+          <a:p>
+            <a:endParaRPr lang="en-GB" sz="1400" dirty="0"/>
+          </a:p>
+          <a:p>
+            <a:r>
+              <a:rPr lang="en-GB" sz="1400"/>
+              <a:t>Code Arach</a:t>
+            </a:r>
+            <a:endParaRPr lang="en-GB" sz="1400" dirty="0"/>
+          </a:p>
+          <a:p>
+            <a:endParaRPr lang="en-GB" sz="1400" dirty="0"/>
+          </a:p>
+          <a:p>
+            <a:endParaRPr lang="en-GB" sz="1400" dirty="0"/>
+          </a:p>
+          <a:p>
+            <a:endParaRPr lang="en-GB" sz="1400" dirty="0"/>
+          </a:p>
+          <a:p>
+            <a:endParaRPr lang="en-GB" sz="1400" dirty="0"/>
+          </a:p>
+        </p:txBody>
+      </p:sp>
+      <p:pic>
+        <p:nvPicPr>
+          <p:cNvPr id="6" name="Picture 5" descr="A screenshot of a computer&#10;&#10;AI-generated content may be incorrect.">
+            <a:extLst>
+              <a:ext uri="{FF2B5EF4-FFF2-40B4-BE49-F238E27FC236}">
+                <a16:creationId xmlns:a16="http://schemas.microsoft.com/office/drawing/2014/main" id="{662060B5-0FB4-40CF-4218-4D8024EBE90C}"/>
+              </a:ext>
+            </a:extLst>
+          </p:cNvPr>
+          <p:cNvPicPr>
+            <a:picLocks noChangeAspect="1"/>
+          </p:cNvPicPr>
+          <p:nvPr/>
+        </p:nvPicPr>
+        <p:blipFill>
+          <a:blip r:embed="rId2"/>
+          <a:stretch>
+            <a:fillRect/>
+          </a:stretch>
+        </p:blipFill>
+        <p:spPr>
+          <a:xfrm>
+            <a:off x="547588" y="2610492"/>
+            <a:ext cx="2019582" cy="543001"/>
+          </a:xfrm>
+          <a:prstGeom prst="rect">
+            <a:avLst/>
+          </a:prstGeom>
+        </p:spPr>
+      </p:pic>
+      <p:pic>
+        <p:nvPicPr>
+          <p:cNvPr id="10" name="Picture 9">
+            <a:extLst>
+              <a:ext uri="{FF2B5EF4-FFF2-40B4-BE49-F238E27FC236}">
+                <a16:creationId xmlns:a16="http://schemas.microsoft.com/office/drawing/2014/main" id="{E9603090-F2BE-8DAF-A1C6-06B389A2D6DF}"/>
+              </a:ext>
+            </a:extLst>
+          </p:cNvPr>
+          <p:cNvPicPr>
+            <a:picLocks noChangeAspect="1"/>
+          </p:cNvPicPr>
+          <p:nvPr/>
+        </p:nvPicPr>
+        <p:blipFill>
+          <a:blip r:embed="rId3"/>
+          <a:stretch>
+            <a:fillRect/>
+          </a:stretch>
+        </p:blipFill>
+        <p:spPr>
+          <a:xfrm>
+            <a:off x="662512" y="3771884"/>
+            <a:ext cx="2229161" cy="228632"/>
+          </a:xfrm>
+          <a:prstGeom prst="rect">
+            <a:avLst/>
+          </a:prstGeom>
+        </p:spPr>
+      </p:pic>
+      <p:pic>
+        <p:nvPicPr>
+          <p:cNvPr id="14" name="Picture 13" descr="A screen shot of a computer program&#10;&#10;AI-generated content may be incorrect.">
+            <a:extLst>
+              <a:ext uri="{FF2B5EF4-FFF2-40B4-BE49-F238E27FC236}">
+                <a16:creationId xmlns:a16="http://schemas.microsoft.com/office/drawing/2014/main" id="{7AAF0E6D-B186-0978-16A8-40F8067C20B9}"/>
+              </a:ext>
+            </a:extLst>
+          </p:cNvPr>
+          <p:cNvPicPr>
+            <a:picLocks noChangeAspect="1"/>
+          </p:cNvPicPr>
+          <p:nvPr/>
+        </p:nvPicPr>
+        <p:blipFill>
+          <a:blip r:embed="rId4"/>
+          <a:stretch>
+            <a:fillRect/>
+          </a:stretch>
+        </p:blipFill>
+        <p:spPr>
+          <a:xfrm>
+            <a:off x="3174544" y="3400882"/>
+            <a:ext cx="4039164" cy="1438476"/>
+          </a:xfrm>
+          <a:prstGeom prst="rect">
+            <a:avLst/>
+          </a:prstGeom>
+        </p:spPr>
+      </p:pic>
+    </p:spTree>
+    <p:extLst>
+      <p:ext uri="{BB962C8B-B14F-4D97-AF65-F5344CB8AC3E}">
+        <p14:creationId xmlns:p14="http://schemas.microsoft.com/office/powerpoint/2010/main" val="3270231402"/>
+      </p:ext>
+    </p:extLst>
+  </p:cSld>
+  <p:clrMapOvr>
+    <a:masterClrMapping/>
+  </p:clrMapOvr>
+</p:sld>
+</file>
+
+<file path=ppt/slides/slide21.xml><?xml version="1.0" encoding="utf-8"?>
 <p:sld xmlns:a="http://schemas.openxmlformats.org/drawingml/2006/main" xmlns:r="http://schemas.openxmlformats.org/officeDocument/2006/relationships" xmlns:p="http://schemas.openxmlformats.org/presentationml/2006/main">
   <p:cSld>
     <p:spTree>
@@ -9356,7 +9648,7 @@
 </p:sld>
 </file>
 
-<file path=ppt/slides/slide21.xml><?xml version="1.0" encoding="utf-8"?>
+<file path=ppt/slides/slide22.xml><?xml version="1.0" encoding="utf-8"?>
 <p:sld xmlns:a="http://schemas.openxmlformats.org/drawingml/2006/main" xmlns:r="http://schemas.openxmlformats.org/officeDocument/2006/relationships" xmlns:p="http://schemas.openxmlformats.org/presentationml/2006/main">
   <p:cSld>
     <p:spTree>
@@ -9947,7 +10239,7 @@
 </p:sld>
 </file>
 
-<file path=ppt/slides/slide22.xml><?xml version="1.0" encoding="utf-8"?>
+<file path=ppt/slides/slide23.xml><?xml version="1.0" encoding="utf-8"?>
 <p:sld xmlns:a="http://schemas.openxmlformats.org/drawingml/2006/main" xmlns:r="http://schemas.openxmlformats.org/officeDocument/2006/relationships" xmlns:p="http://schemas.openxmlformats.org/presentationml/2006/main">
   <p:cSld>
     <p:spTree>
@@ -10471,7 +10763,7 @@
 </p:sld>
 </file>
 
-<file path=ppt/slides/slide23.xml><?xml version="1.0" encoding="utf-8"?>
+<file path=ppt/slides/slide24.xml><?xml version="1.0" encoding="utf-8"?>
 <p:sld xmlns:a="http://schemas.openxmlformats.org/drawingml/2006/main" xmlns:r="http://schemas.openxmlformats.org/officeDocument/2006/relationships" xmlns:p="http://schemas.openxmlformats.org/presentationml/2006/main">
   <p:cSld>
     <p:spTree>
@@ -11045,7 +11337,7 @@
 </p:sld>
 </file>
 
-<file path=ppt/slides/slide24.xml><?xml version="1.0" encoding="utf-8"?>
+<file path=ppt/slides/slide25.xml><?xml version="1.0" encoding="utf-8"?>
 <p:sld xmlns:a="http://schemas.openxmlformats.org/drawingml/2006/main" xmlns:r="http://schemas.openxmlformats.org/officeDocument/2006/relationships" xmlns:p="http://schemas.openxmlformats.org/presentationml/2006/main">
   <p:cSld>
     <p:spTree>
@@ -11545,7 +11837,7 @@
 </p:sld>
 </file>
 
-<file path=ppt/slides/slide25.xml><?xml version="1.0" encoding="utf-8"?>
+<file path=ppt/slides/slide26.xml><?xml version="1.0" encoding="utf-8"?>
 <p:sld xmlns:a="http://schemas.openxmlformats.org/drawingml/2006/main" xmlns:r="http://schemas.openxmlformats.org/officeDocument/2006/relationships" xmlns:p="http://schemas.openxmlformats.org/presentationml/2006/main">
   <p:cSld>
     <p:spTree>
@@ -11583,14 +11875,14 @@
           <p:nvPr>
             <p:extLst>
               <p:ext uri="{D42A27DB-BD31-4B8C-83A1-F6EECF244321}">
-                <p14:modId xmlns:p14="http://schemas.microsoft.com/office/powerpoint/2010/main" val="406784268"/>
+                <p14:modId xmlns:p14="http://schemas.microsoft.com/office/powerpoint/2010/main" val="1129103549"/>
               </p:ext>
             </p:extLst>
           </p:nvPr>
         </p:nvGraphicFramePr>
         <p:xfrm>
           <a:off x="0" y="0"/>
-          <a:ext cx="11988463" cy="2486196"/>
+          <a:ext cx="11988463" cy="2987748"/>
         </p:xfrm>
         <a:graphic>
           <a:graphicData uri="http://schemas.openxmlformats.org/drawingml/2006/table">
@@ -11902,57 +12194,79 @@
                     <a:bodyPr/>
                     <a:lstStyle/>
                     <a:p>
-                      <a:endParaRPr lang="en-GB" sz="1100" dirty="0"/>
-                    </a:p>
-                  </a:txBody>
-                  <a:tcPr/>
-                </a:tc>
-                <a:tc>
-                  <a:txBody>
-                    <a:bodyPr/>
-                    <a:lstStyle/>
-                    <a:p>
-                      <a:endParaRPr lang="en-GB" sz="1100" dirty="0"/>
-                    </a:p>
-                  </a:txBody>
-                  <a:tcPr/>
-                </a:tc>
-                <a:tc>
-                  <a:txBody>
-                    <a:bodyPr/>
-                    <a:lstStyle/>
-                    <a:p>
-                      <a:endParaRPr lang="en-GB" sz="1100" dirty="0"/>
-                    </a:p>
-                  </a:txBody>
-                  <a:tcPr/>
-                </a:tc>
-                <a:tc>
-                  <a:txBody>
-                    <a:bodyPr/>
-                    <a:lstStyle/>
-                    <a:p>
-                      <a:endParaRPr lang="en-GB" sz="1100" dirty="0"/>
-                    </a:p>
-                  </a:txBody>
-                  <a:tcPr/>
-                </a:tc>
-                <a:tc>
-                  <a:txBody>
-                    <a:bodyPr/>
-                    <a:lstStyle/>
-                    <a:p>
-                      <a:endParaRPr lang="en-GB" sz="1100" dirty="0"/>
-                    </a:p>
-                  </a:txBody>
-                  <a:tcPr/>
-                </a:tc>
-                <a:tc>
-                  <a:txBody>
-                    <a:bodyPr/>
-                    <a:lstStyle/>
-                    <a:p>
-                      <a:endParaRPr lang="en-GB" sz="1100" dirty="0"/>
+                      <a:r>
+                        <a:rPr lang="en-GB" sz="1100" dirty="0"/>
+                        <a:t>12. Build V.0.6.5</a:t>
+                      </a:r>
+                    </a:p>
+                  </a:txBody>
+                  <a:tcPr/>
+                </a:tc>
+                <a:tc>
+                  <a:txBody>
+                    <a:bodyPr/>
+                    <a:lstStyle/>
+                    <a:p>
+                      <a:r>
+                        <a:rPr lang="en-GB" sz="1100" dirty="0"/>
+                        <a:t>Rm_level1</a:t>
+                      </a:r>
+                    </a:p>
+                  </a:txBody>
+                  <a:tcPr/>
+                </a:tc>
+                <a:tc>
+                  <a:txBody>
+                    <a:bodyPr/>
+                    <a:lstStyle/>
+                    <a:p>
+                      <a:r>
+                        <a:rPr lang="en-GB" sz="1100" dirty="0" err="1"/>
+                        <a:t>Obj_camera_controller</a:t>
+                      </a:r>
+                      <a:r>
+                        <a:rPr lang="en-GB" sz="1100" dirty="0"/>
+                        <a:t> and door controller</a:t>
+                      </a:r>
+                    </a:p>
+                  </a:txBody>
+                  <a:tcPr/>
+                </a:tc>
+                <a:tc>
+                  <a:txBody>
+                    <a:bodyPr/>
+                    <a:lstStyle/>
+                    <a:p>
+                      <a:r>
+                        <a:rPr lang="en-GB" sz="1100" dirty="0"/>
+                        <a:t>When I close either the left or right door a sound will play signifying the fact the door has been closed.</a:t>
+                      </a:r>
+                    </a:p>
+                  </a:txBody>
+                  <a:tcPr/>
+                </a:tc>
+                <a:tc>
+                  <a:txBody>
+                    <a:bodyPr/>
+                    <a:lstStyle/>
+                    <a:p>
+                      <a:r>
+                        <a:rPr lang="en-GB" sz="1100" dirty="0"/>
+                        <a:t>Game breaks when trying to move to a up-close zone but this can just be a simple cause of when I tried altering the camera controllers code incorrectly.</a:t>
+                      </a:r>
+                    </a:p>
+                  </a:txBody>
+                  <a:tcPr/>
+                </a:tc>
+                <a:tc>
+                  <a:txBody>
+                    <a:bodyPr/>
+                    <a:lstStyle/>
+                    <a:p>
+                      <a:r>
+                        <a:rPr lang="en-GB" sz="1100" dirty="0"/>
+                        <a:t>Fixed it, it was just because I altered the wrongly, now its fixed and I’m making duplicate Versions Of the Objects to have work in Level 2.</a:t>
+                      </a:r>
                     </a:p>
                   </a:txBody>
                   <a:tcPr/>

</xml_diff>

<commit_message>
Critical Failure V.0.7 pt 2
Arach 75% coded and level timer added.
</commit_message>
<xml_diff>
--- a/Logs/Development Log and Alpha Testing.pptx
+++ b/Logs/Development Log and Alpha Testing.pptx
@@ -10114,7 +10114,7 @@
         <p:spPr>
           <a:xfrm>
             <a:off x="0" y="152027"/>
-            <a:ext cx="5576207" cy="830997"/>
+            <a:ext cx="5576207" cy="2123658"/>
           </a:xfrm>
           <a:prstGeom prst="rect">
             <a:avLst/>
@@ -10146,13 +10146,34 @@
           <a:p>
             <a:r>
               <a:rPr lang="en-GB" sz="1200" dirty="0"/>
-              <a:t>Total Zones are </a:t>
-            </a:r>
-            <a:r>
-              <a:rPr lang="en-GB" sz="1200"/>
-              <a:t>now </a:t>
-            </a:r>
+              <a:t>Total Zones are now 25.</a:t>
+            </a:r>
+          </a:p>
+          <a:p>
             <a:endParaRPr lang="en-GB" sz="1200" dirty="0"/>
+          </a:p>
+          <a:p>
+            <a:r>
+              <a:rPr lang="en-GB" sz="1200" dirty="0"/>
+              <a:t>Just like in the making of Level 2, I have made duplicate version of almost every Object, which are unique to level 3 only.</a:t>
+            </a:r>
+          </a:p>
+          <a:p>
+            <a:endParaRPr lang="en-GB" sz="1200" dirty="0"/>
+          </a:p>
+          <a:p>
+            <a:r>
+              <a:rPr lang="en-GB" sz="1200" dirty="0"/>
+              <a:t>To code Arach, I copied the zone 2 movement from </a:t>
+            </a:r>
+            <a:r>
+              <a:rPr lang="en-GB" sz="1200" dirty="0" err="1"/>
+              <a:t>Gwiber</a:t>
+            </a:r>
+            <a:r>
+              <a:rPr lang="en-GB" sz="1200" dirty="0"/>
+              <a:t>. After changing the variables, Arach will respond to the vent states and only go between zones 5 and 8 but cannot be seen, giving the impression he’s in the vent.</a:t>
+            </a:r>
           </a:p>
         </p:txBody>
       </p:sp>
@@ -10225,7 +10246,7 @@
         </p:blipFill>
         <p:spPr>
           <a:xfrm>
-            <a:off x="205157" y="2047598"/>
+            <a:off x="6018129" y="1213856"/>
             <a:ext cx="5001323" cy="4658375"/>
           </a:xfrm>
           <a:prstGeom prst="rect">

</xml_diff>

<commit_message>
Critical Failure V.0.7.1 pt2
</commit_message>
<xml_diff>
--- a/Logs/Development Log and Alpha Testing.pptx
+++ b/Logs/Development Log and Alpha Testing.pptx
@@ -309,7 +309,7 @@
           <a:p>
             <a:fld id="{846CE7D5-CF57-46EF-B807-FDD0502418D4}" type="datetimeFigureOut">
               <a:rPr lang="en-GB" smtClean="0"/>
-              <a:t>28/01/2026</a:t>
+              <a:t>29/01/2026</a:t>
             </a:fld>
             <a:endParaRPr lang="en-GB"/>
           </a:p>
@@ -479,7 +479,7 @@
           <a:p>
             <a:fld id="{846CE7D5-CF57-46EF-B807-FDD0502418D4}" type="datetimeFigureOut">
               <a:rPr lang="en-GB" smtClean="0"/>
-              <a:t>28/01/2026</a:t>
+              <a:t>29/01/2026</a:t>
             </a:fld>
             <a:endParaRPr lang="en-GB"/>
           </a:p>
@@ -659,7 +659,7 @@
           <a:p>
             <a:fld id="{846CE7D5-CF57-46EF-B807-FDD0502418D4}" type="datetimeFigureOut">
               <a:rPr lang="en-GB" smtClean="0"/>
-              <a:t>28/01/2026</a:t>
+              <a:t>29/01/2026</a:t>
             </a:fld>
             <a:endParaRPr lang="en-GB"/>
           </a:p>
@@ -829,7 +829,7 @@
           <a:p>
             <a:fld id="{846CE7D5-CF57-46EF-B807-FDD0502418D4}" type="datetimeFigureOut">
               <a:rPr lang="en-GB" smtClean="0"/>
-              <a:t>28/01/2026</a:t>
+              <a:t>29/01/2026</a:t>
             </a:fld>
             <a:endParaRPr lang="en-GB"/>
           </a:p>
@@ -1075,7 +1075,7 @@
           <a:p>
             <a:fld id="{846CE7D5-CF57-46EF-B807-FDD0502418D4}" type="datetimeFigureOut">
               <a:rPr lang="en-GB" smtClean="0"/>
-              <a:t>28/01/2026</a:t>
+              <a:t>29/01/2026</a:t>
             </a:fld>
             <a:endParaRPr lang="en-GB"/>
           </a:p>
@@ -1307,7 +1307,7 @@
           <a:p>
             <a:fld id="{846CE7D5-CF57-46EF-B807-FDD0502418D4}" type="datetimeFigureOut">
               <a:rPr lang="en-GB" smtClean="0"/>
-              <a:t>28/01/2026</a:t>
+              <a:t>29/01/2026</a:t>
             </a:fld>
             <a:endParaRPr lang="en-GB"/>
           </a:p>
@@ -1674,7 +1674,7 @@
           <a:p>
             <a:fld id="{846CE7D5-CF57-46EF-B807-FDD0502418D4}" type="datetimeFigureOut">
               <a:rPr lang="en-GB" smtClean="0"/>
-              <a:t>28/01/2026</a:t>
+              <a:t>29/01/2026</a:t>
             </a:fld>
             <a:endParaRPr lang="en-GB"/>
           </a:p>
@@ -1792,7 +1792,7 @@
           <a:p>
             <a:fld id="{846CE7D5-CF57-46EF-B807-FDD0502418D4}" type="datetimeFigureOut">
               <a:rPr lang="en-GB" smtClean="0"/>
-              <a:t>28/01/2026</a:t>
+              <a:t>29/01/2026</a:t>
             </a:fld>
             <a:endParaRPr lang="en-GB"/>
           </a:p>
@@ -1887,7 +1887,7 @@
           <a:p>
             <a:fld id="{846CE7D5-CF57-46EF-B807-FDD0502418D4}" type="datetimeFigureOut">
               <a:rPr lang="en-GB" smtClean="0"/>
-              <a:t>28/01/2026</a:t>
+              <a:t>29/01/2026</a:t>
             </a:fld>
             <a:endParaRPr lang="en-GB"/>
           </a:p>
@@ -2164,7 +2164,7 @@
           <a:p>
             <a:fld id="{846CE7D5-CF57-46EF-B807-FDD0502418D4}" type="datetimeFigureOut">
               <a:rPr lang="en-GB" smtClean="0"/>
-              <a:t>28/01/2026</a:t>
+              <a:t>29/01/2026</a:t>
             </a:fld>
             <a:endParaRPr lang="en-GB"/>
           </a:p>
@@ -2421,7 +2421,7 @@
           <a:p>
             <a:fld id="{846CE7D5-CF57-46EF-B807-FDD0502418D4}" type="datetimeFigureOut">
               <a:rPr lang="en-GB" smtClean="0"/>
-              <a:t>28/01/2026</a:t>
+              <a:t>29/01/2026</a:t>
             </a:fld>
             <a:endParaRPr lang="en-GB"/>
           </a:p>
@@ -2634,7 +2634,7 @@
           <a:p>
             <a:fld id="{846CE7D5-CF57-46EF-B807-FDD0502418D4}" type="datetimeFigureOut">
               <a:rPr lang="en-GB" smtClean="0"/>
-              <a:t>28/01/2026</a:t>
+              <a:t>29/01/2026</a:t>
             </a:fld>
             <a:endParaRPr lang="en-GB"/>
           </a:p>
@@ -10051,7 +10051,7 @@
           <a:p>
             <a:r>
               <a:rPr lang="en-GB" sz="1600" dirty="0"/>
-              <a:t>Date – 28/01/2026</a:t>
+              <a:t>Date – 29/01/2026</a:t>
             </a:r>
           </a:p>
         </p:txBody>
@@ -10094,7 +10094,7 @@
           <a:p>
             <a:r>
               <a:rPr lang="en-GB" sz="1600" dirty="0"/>
-              <a:t>Game Build V.0.7</a:t>
+              <a:t>Game Build V.0.7/.1</a:t>
             </a:r>
           </a:p>
         </p:txBody>
@@ -10114,7 +10114,7 @@
         <p:spPr>
           <a:xfrm>
             <a:off x="0" y="152027"/>
-            <a:ext cx="5576207" cy="2123658"/>
+            <a:ext cx="5576207" cy="3600986"/>
           </a:xfrm>
           <a:prstGeom prst="rect">
             <a:avLst/>
@@ -10137,7 +10137,7 @@
           <a:p>
             <a:r>
               <a:rPr lang="en-GB" sz="1200" dirty="0"/>
-              <a:t>For Level 2 to level 3 I have added 6 more Camera zones making Level 3 the biggest level with 20 different camera zones.</a:t>
+              <a:t>Arach’s code allows him to move between zones 5 and 8. During this, if the front vent is open while he’s in camera 5, he will proceed to go on the offensive but just a second after the attack timer begins Arach plays a vent sound so the player can have time to react fast enough to close the vent. This plays the same for when he is in camera 8.</a:t>
             </a:r>
           </a:p>
           <a:p>
@@ -10146,7 +10146,7 @@
           <a:p>
             <a:r>
               <a:rPr lang="en-GB" sz="1200" dirty="0"/>
-              <a:t>Total Zones are now 25.</a:t>
+              <a:t>I can now move onto my next build V.0.7.1 where I’ll begin designing the prototype and begin transferring the level 3 objects into level 4 which is easier for, I do not plan to add more zones at this time.</a:t>
             </a:r>
           </a:p>
           <a:p>
@@ -10155,7 +10155,7 @@
           <a:p>
             <a:r>
               <a:rPr lang="en-GB" sz="1200" dirty="0"/>
-              <a:t>Just like in the making of Level 2, I have made duplicate version of almost every Object, which are unique to level 3 only.</a:t>
+              <a:t>Also, making Level 4 was a breeze since I didn’t need any more new zones meaning I could just copy level 3 without needing to change much besides variable names.</a:t>
             </a:r>
           </a:p>
           <a:p>
@@ -10164,15 +10164,32 @@
           <a:p>
             <a:r>
               <a:rPr lang="en-GB" sz="1200" dirty="0"/>
-              <a:t>To code Arach, I copied the zone 2 movement from </a:t>
+              <a:t>If you are looking through my versions, you might have noticed that I recently started using </a:t>
             </a:r>
             <a:r>
               <a:rPr lang="en-GB" sz="1200" dirty="0" err="1"/>
-              <a:t>Gwiber</a:t>
+              <a:t>lvl</a:t>
             </a:r>
             <a:r>
               <a:rPr lang="en-GB" sz="1200" dirty="0"/>
-              <a:t>. After changing the variables, Arach will respond to the vent states and only go between zones 5 and 8 but cannot be seen, giving the impression he’s in the vent.</a:t>
+              <a:t> instead of level. This was done just to safe time and make naming much easier to do. So, </a:t>
+            </a:r>
+            <a:r>
+              <a:rPr lang="en-GB" sz="1200" dirty="0" err="1"/>
+              <a:t>lvl</a:t>
+            </a:r>
+            <a:r>
+              <a:rPr lang="en-GB" sz="1200" dirty="0"/>
+              <a:t> is just Level.</a:t>
+            </a:r>
+          </a:p>
+          <a:p>
+            <a:endParaRPr lang="en-GB" sz="1200" dirty="0"/>
+          </a:p>
+          <a:p>
+            <a:r>
+              <a:rPr lang="en-GB" sz="1200" dirty="0"/>
+              <a:t>To make Prototype I will use level 3 K9 as the foundation for the prototypes code.</a:t>
             </a:r>
           </a:p>
         </p:txBody>
@@ -10191,8 +10208,8 @@
         </p:nvSpPr>
         <p:spPr>
           <a:xfrm>
-            <a:off x="10057716" y="641202"/>
-            <a:ext cx="2073729" cy="1169551"/>
+            <a:off x="8555487" y="722845"/>
+            <a:ext cx="2073729" cy="1384995"/>
           </a:xfrm>
           <a:prstGeom prst="rect">
             <a:avLst/>
@@ -10222,14 +10239,17 @@
           <a:p>
             <a:endParaRPr lang="en-GB" sz="1400" dirty="0"/>
           </a:p>
+          <a:p>
+            <a:endParaRPr lang="en-GB" sz="1400" dirty="0"/>
+          </a:p>
         </p:txBody>
       </p:sp>
       <p:pic>
         <p:nvPicPr>
-          <p:cNvPr id="7" name="Picture 6">
-            <a:extLst>
-              <a:ext uri="{FF2B5EF4-FFF2-40B4-BE49-F238E27FC236}">
-                <a16:creationId xmlns:a16="http://schemas.microsoft.com/office/drawing/2014/main" id="{1908A037-B617-984F-6CCC-E76B77FEAD3F}"/>
+          <p:cNvPr id="11" name="Picture 10" descr="A screen shot of a computer&#10;&#10;AI-generated content may be incorrect.">
+            <a:extLst>
+              <a:ext uri="{FF2B5EF4-FFF2-40B4-BE49-F238E27FC236}">
+                <a16:creationId xmlns:a16="http://schemas.microsoft.com/office/drawing/2014/main" id="{4560D85E-4DCB-4F35-6ADC-A6787A918037}"/>
               </a:ext>
             </a:extLst>
           </p:cNvPr>
@@ -10246,8 +10266,38 @@
         </p:blipFill>
         <p:spPr>
           <a:xfrm>
-            <a:off x="6018129" y="1213856"/>
-            <a:ext cx="5001323" cy="4658375"/>
+            <a:off x="6533679" y="5709053"/>
+            <a:ext cx="4991797" cy="676369"/>
+          </a:xfrm>
+          <a:prstGeom prst="rect">
+            <a:avLst/>
+          </a:prstGeom>
+        </p:spPr>
+      </p:pic>
+      <p:pic>
+        <p:nvPicPr>
+          <p:cNvPr id="14" name="Picture 13" descr="A screen shot of a computer program&#10;&#10;AI-generated content may be incorrect.">
+            <a:extLst>
+              <a:ext uri="{FF2B5EF4-FFF2-40B4-BE49-F238E27FC236}">
+                <a16:creationId xmlns:a16="http://schemas.microsoft.com/office/drawing/2014/main" id="{E1164DD6-C6E7-C4EB-CACF-C7BB87978DDB}"/>
+              </a:ext>
+            </a:extLst>
+          </p:cNvPr>
+          <p:cNvPicPr>
+            <a:picLocks noChangeAspect="1"/>
+          </p:cNvPicPr>
+          <p:nvPr/>
+        </p:nvPicPr>
+        <p:blipFill>
+          <a:blip r:embed="rId3"/>
+          <a:stretch>
+            <a:fillRect/>
+          </a:stretch>
+        </p:blipFill>
+        <p:spPr>
+          <a:xfrm>
+            <a:off x="6407670" y="1439343"/>
+            <a:ext cx="4553585" cy="4039164"/>
           </a:xfrm>
           <a:prstGeom prst="rect">
             <a:avLst/>
@@ -14360,14 +14410,14 @@
           <p:nvPr>
             <p:extLst>
               <p:ext uri="{D42A27DB-BD31-4B8C-83A1-F6EECF244321}">
-                <p14:modId xmlns:p14="http://schemas.microsoft.com/office/powerpoint/2010/main" val="4280467226"/>
+                <p14:modId xmlns:p14="http://schemas.microsoft.com/office/powerpoint/2010/main" val="3689435829"/>
               </p:ext>
             </p:extLst>
           </p:nvPr>
         </p:nvGraphicFramePr>
         <p:xfrm>
           <a:off x="0" y="0"/>
-          <a:ext cx="11988463" cy="5352684"/>
+          <a:ext cx="11988463" cy="6691068"/>
         </p:xfrm>
         <a:graphic>
           <a:graphicData uri="http://schemas.openxmlformats.org/drawingml/2006/table">
@@ -14835,6 +14885,36 @@
                     <a:bodyPr/>
                     <a:lstStyle/>
                     <a:p>
+                      <a:r>
+                        <a:rPr lang="en-GB" sz="1100" dirty="0"/>
+                        <a:t>17. Build V.0.7</a:t>
+                      </a:r>
+                    </a:p>
+                  </a:txBody>
+                  <a:tcPr/>
+                </a:tc>
+                <a:tc>
+                  <a:txBody>
+                    <a:bodyPr/>
+                    <a:lstStyle/>
+                    <a:p>
+                      <a:r>
+                        <a:rPr lang="en-GB" sz="1100" dirty="0"/>
+                        <a:t>Rm_level3</a:t>
+                      </a:r>
+                    </a:p>
+                  </a:txBody>
+                  <a:tcPr/>
+                </a:tc>
+                <a:tc>
+                  <a:txBody>
+                    <a:bodyPr/>
+                    <a:lstStyle/>
+                    <a:p>
+                      <a:r>
+                        <a:rPr lang="en-GB" sz="1100" dirty="0" err="1"/>
+                        <a:t>Obj_amcd_arach</a:t>
+                      </a:r>
                       <a:endParaRPr lang="en-GB" sz="1100" dirty="0"/>
                     </a:p>
                   </a:txBody>
@@ -14845,47 +14925,44 @@
                     <a:bodyPr/>
                     <a:lstStyle/>
                     <a:p>
-                      <a:endParaRPr lang="en-GB" sz="1100" dirty="0"/>
-                    </a:p>
-                  </a:txBody>
-                  <a:tcPr/>
-                </a:tc>
-                <a:tc>
-                  <a:txBody>
-                    <a:bodyPr/>
-                    <a:lstStyle/>
-                    <a:p>
-                      <a:endParaRPr lang="en-GB" sz="1100" dirty="0"/>
-                    </a:p>
-                  </a:txBody>
-                  <a:tcPr/>
-                </a:tc>
-                <a:tc>
-                  <a:txBody>
-                    <a:bodyPr/>
-                    <a:lstStyle/>
-                    <a:p>
-                      <a:endParaRPr lang="en-GB" sz="1100" dirty="0"/>
-                    </a:p>
-                  </a:txBody>
-                  <a:tcPr/>
-                </a:tc>
-                <a:tc>
-                  <a:txBody>
-                    <a:bodyPr/>
-                    <a:lstStyle/>
-                    <a:p>
-                      <a:endParaRPr lang="en-GB" sz="1100" dirty="0"/>
-                    </a:p>
-                  </a:txBody>
-                  <a:tcPr/>
-                </a:tc>
-                <a:tc>
-                  <a:txBody>
-                    <a:bodyPr/>
-                    <a:lstStyle/>
-                    <a:p>
-                      <a:endParaRPr lang="en-GB" sz="1100" dirty="0"/>
+                      <a:r>
+                        <a:rPr lang="en-GB" sz="1100" dirty="0"/>
+                        <a:t>When Arach is on zone 5 and the front vent is open, Arach will start his attack timer and just a second after play the vent crawling sound. When the attack timer = 0 and the front vent is still open. He jump-scares the player. If the door is closed, he will retreat back to zone 5 or 8.</a:t>
+                      </a:r>
+                    </a:p>
+                  </a:txBody>
+                  <a:tcPr/>
+                </a:tc>
+                <a:tc>
+                  <a:txBody>
+                    <a:bodyPr/>
+                    <a:lstStyle/>
+                    <a:p>
+                      <a:r>
+                        <a:rPr lang="en-GB" sz="1100" dirty="0"/>
+                        <a:t>Arach moved instantly from 5  to 8 but remains there and his </a:t>
+                      </a:r>
+                      <a:r>
+                        <a:rPr lang="en-GB" sz="1100" dirty="0" err="1"/>
+                        <a:t>attacktimer</a:t>
+                      </a:r>
+                      <a:r>
+                        <a:rPr lang="en-GB" sz="1100" dirty="0"/>
+                        <a:t> doesn’t reset. This is most likely due to my poor effort of converting K9’s code for Arach. I will re-attempt Arach by duplicating K9 and just having it be Arach and limited to 2 zones.</a:t>
+                      </a:r>
+                    </a:p>
+                  </a:txBody>
+                  <a:tcPr/>
+                </a:tc>
+                <a:tc>
+                  <a:txBody>
+                    <a:bodyPr/>
+                    <a:lstStyle/>
+                    <a:p>
+                      <a:r>
+                        <a:rPr lang="en-GB" sz="1100" dirty="0"/>
+                        <a:t>The fix was easily made. All I did was duplicate K9’s code and re-named the variables to Arach and only gave him two zones to move between. He now functions perfectly, makes a sound when he’s about to attack and he moves between zone 5 and 8.</a:t>
+                      </a:r>
                     </a:p>
                   </a:txBody>
                   <a:tcPr/>
@@ -14902,57 +14979,75 @@
                     <a:bodyPr/>
                     <a:lstStyle/>
                     <a:p>
-                      <a:endParaRPr lang="en-GB" sz="1100" dirty="0"/>
-                    </a:p>
-                  </a:txBody>
-                  <a:tcPr/>
-                </a:tc>
-                <a:tc>
-                  <a:txBody>
-                    <a:bodyPr/>
-                    <a:lstStyle/>
-                    <a:p>
-                      <a:endParaRPr lang="en-GB" sz="1100" dirty="0"/>
-                    </a:p>
-                  </a:txBody>
-                  <a:tcPr/>
-                </a:tc>
-                <a:tc>
-                  <a:txBody>
-                    <a:bodyPr/>
-                    <a:lstStyle/>
-                    <a:p>
-                      <a:endParaRPr lang="en-GB" sz="1100" dirty="0"/>
-                    </a:p>
-                  </a:txBody>
-                  <a:tcPr/>
-                </a:tc>
-                <a:tc>
-                  <a:txBody>
-                    <a:bodyPr/>
-                    <a:lstStyle/>
-                    <a:p>
-                      <a:endParaRPr lang="en-GB" sz="1100" dirty="0"/>
-                    </a:p>
-                  </a:txBody>
-                  <a:tcPr/>
-                </a:tc>
-                <a:tc>
-                  <a:txBody>
-                    <a:bodyPr/>
-                    <a:lstStyle/>
-                    <a:p>
-                      <a:endParaRPr lang="en-GB" sz="1100" dirty="0"/>
-                    </a:p>
-                  </a:txBody>
-                  <a:tcPr/>
-                </a:tc>
-                <a:tc>
-                  <a:txBody>
-                    <a:bodyPr/>
-                    <a:lstStyle/>
-                    <a:p>
-                      <a:endParaRPr lang="en-GB" sz="1100" dirty="0"/>
+                      <a:r>
+                        <a:rPr lang="en-GB" sz="1100" dirty="0"/>
+                        <a:t>18. Build V.0.7.1</a:t>
+                      </a:r>
+                    </a:p>
+                  </a:txBody>
+                  <a:tcPr/>
+                </a:tc>
+                <a:tc>
+                  <a:txBody>
+                    <a:bodyPr/>
+                    <a:lstStyle/>
+                    <a:p>
+                      <a:r>
+                        <a:rPr lang="en-GB" sz="1100" dirty="0"/>
+                        <a:t>All levels</a:t>
+                      </a:r>
+                    </a:p>
+                  </a:txBody>
+                  <a:tcPr/>
+                </a:tc>
+                <a:tc>
+                  <a:txBody>
+                    <a:bodyPr/>
+                    <a:lstStyle/>
+                    <a:p>
+                      <a:r>
+                        <a:rPr lang="en-GB" sz="1100" dirty="0"/>
+                        <a:t>Object buttons</a:t>
+                      </a:r>
+                    </a:p>
+                  </a:txBody>
+                  <a:tcPr/>
+                </a:tc>
+                <a:tc>
+                  <a:txBody>
+                    <a:bodyPr/>
+                    <a:lstStyle/>
+                    <a:p>
+                      <a:r>
+                        <a:rPr lang="en-GB" sz="1100" dirty="0"/>
+                        <a:t>When mouse hovers over movement buttons and open/close camera buttons, the buttons events trigger.</a:t>
+                      </a:r>
+                    </a:p>
+                  </a:txBody>
+                  <a:tcPr/>
+                </a:tc>
+                <a:tc>
+                  <a:txBody>
+                    <a:bodyPr/>
+                    <a:lstStyle/>
+                    <a:p>
+                      <a:r>
+                        <a:rPr lang="en-GB" sz="1100" dirty="0"/>
+                        <a:t>Yes, the buttons do trigger when mouse enters the objects area.</a:t>
+                      </a:r>
+                    </a:p>
+                  </a:txBody>
+                  <a:tcPr/>
+                </a:tc>
+                <a:tc>
+                  <a:txBody>
+                    <a:bodyPr/>
+                    <a:lstStyle/>
+                    <a:p>
+                      <a:r>
+                        <a:rPr lang="en-GB" sz="1100" dirty="0"/>
+                        <a:t>I have decided not to go forward with this idea but I’ll leave this here as evidence of experimentation.</a:t>
+                      </a:r>
                     </a:p>
                   </a:txBody>
                   <a:tcPr/>

</xml_diff>

<commit_message>
Critical Failure V.0.7.2 The Prototype
Prototypes movement code done and so is the rest of the enemies this version is the 2nd to last one that needs added code then the game is 100% coded besides some designs.
</commit_message>
<xml_diff>
--- a/Logs/Development Log and Alpha Testing.pptx
+++ b/Logs/Development Log and Alpha Testing.pptx
@@ -29,13 +29,14 @@
     <p:sldId id="283" r:id="rId23"/>
     <p:sldId id="285" r:id="rId24"/>
     <p:sldId id="286" r:id="rId25"/>
-    <p:sldId id="257" r:id="rId26"/>
-    <p:sldId id="267" r:id="rId27"/>
-    <p:sldId id="270" r:id="rId28"/>
-    <p:sldId id="272" r:id="rId29"/>
-    <p:sldId id="276" r:id="rId30"/>
-    <p:sldId id="278" r:id="rId31"/>
-    <p:sldId id="284" r:id="rId32"/>
+    <p:sldId id="287" r:id="rId26"/>
+    <p:sldId id="257" r:id="rId27"/>
+    <p:sldId id="267" r:id="rId28"/>
+    <p:sldId id="270" r:id="rId29"/>
+    <p:sldId id="272" r:id="rId30"/>
+    <p:sldId id="276" r:id="rId31"/>
+    <p:sldId id="278" r:id="rId32"/>
+    <p:sldId id="284" r:id="rId33"/>
   </p:sldIdLst>
   <p:sldSz cx="12192000" cy="6858000"/>
   <p:notesSz cx="6858000" cy="9144000"/>
@@ -10114,7 +10115,7 @@
         <p:spPr>
           <a:xfrm>
             <a:off x="0" y="152027"/>
-            <a:ext cx="5576207" cy="3600986"/>
+            <a:ext cx="5576207" cy="4524315"/>
           </a:xfrm>
           <a:prstGeom prst="rect">
             <a:avLst/>
@@ -10192,55 +10193,32 @@
               <a:t>To make Prototype I will use level 3 K9 as the foundation for the prototypes code.</a:t>
             </a:r>
           </a:p>
-        </p:txBody>
-      </p:sp>
-      <p:sp>
-        <p:nvSpPr>
-          <p:cNvPr id="12" name="TextBox 11">
-            <a:extLst>
-              <a:ext uri="{FF2B5EF4-FFF2-40B4-BE49-F238E27FC236}">
-                <a16:creationId xmlns:a16="http://schemas.microsoft.com/office/drawing/2014/main" id="{AC84ABBC-F0AD-4A94-2998-F05AAA42C866}"/>
-              </a:ext>
-            </a:extLst>
-          </p:cNvPr>
-          <p:cNvSpPr txBox="1"/>
-          <p:nvPr/>
-        </p:nvSpPr>
-        <p:spPr>
-          <a:xfrm>
-            <a:off x="8555487" y="722845"/>
-            <a:ext cx="2073729" cy="1384995"/>
-          </a:xfrm>
-          <a:prstGeom prst="rect">
-            <a:avLst/>
-          </a:prstGeom>
-          <a:noFill/>
-        </p:spPr>
-        <p:txBody>
-          <a:bodyPr wrap="square" rtlCol="0">
-            <a:spAutoFit/>
-          </a:bodyPr>
-          <a:lstStyle/>
-          <a:p>
-            <a:r>
-              <a:rPr lang="en-GB" sz="1400" dirty="0"/>
-              <a:t>What to Do next session</a:t>
-            </a:r>
-          </a:p>
-          <a:p>
-            <a:endParaRPr lang="en-GB" sz="1400" dirty="0"/>
-          </a:p>
-          <a:p>
-            <a:endParaRPr lang="en-GB" sz="1400" dirty="0"/>
-          </a:p>
-          <a:p>
-            <a:endParaRPr lang="en-GB" sz="1400" dirty="0"/>
-          </a:p>
-          <a:p>
-            <a:endParaRPr lang="en-GB" sz="1400" dirty="0"/>
-          </a:p>
-          <a:p>
-            <a:endParaRPr lang="en-GB" sz="1400" dirty="0"/>
+          <a:p>
+            <a:endParaRPr lang="en-GB" sz="1200" dirty="0"/>
+          </a:p>
+          <a:p>
+            <a:r>
+              <a:rPr lang="en-GB" sz="1200" dirty="0"/>
+              <a:t>Finally Prototypes design is completed.</a:t>
+            </a:r>
+          </a:p>
+          <a:p>
+            <a:r>
+              <a:rPr lang="en-GB" sz="1200" dirty="0"/>
+              <a:t>I always planned for him to me a fusion</a:t>
+            </a:r>
+          </a:p>
+          <a:p>
+            <a:r>
+              <a:rPr lang="en-GB" sz="1200" dirty="0"/>
+              <a:t>Of the other AMCD’s and I think it came</a:t>
+            </a:r>
+          </a:p>
+          <a:p>
+            <a:r>
+              <a:rPr lang="en-GB" sz="1200" dirty="0"/>
+              <a:t>Out perfectly.</a:t>
+            </a:r>
           </a:p>
         </p:txBody>
       </p:sp>
@@ -10298,6 +10276,36 @@
           <a:xfrm>
             <a:off x="6407670" y="1439343"/>
             <a:ext cx="4553585" cy="4039164"/>
+          </a:xfrm>
+          <a:prstGeom prst="rect">
+            <a:avLst/>
+          </a:prstGeom>
+        </p:spPr>
+      </p:pic>
+      <p:pic>
+        <p:nvPicPr>
+          <p:cNvPr id="6" name="Picture 5" descr="A screenshot of a computer screen&#10;&#10;AI-generated content may be incorrect.">
+            <a:extLst>
+              <a:ext uri="{FF2B5EF4-FFF2-40B4-BE49-F238E27FC236}">
+                <a16:creationId xmlns:a16="http://schemas.microsoft.com/office/drawing/2014/main" id="{722DC87C-C839-85D9-FAF5-F2BF44603B15}"/>
+              </a:ext>
+            </a:extLst>
+          </p:cNvPr>
+          <p:cNvPicPr>
+            <a:picLocks noChangeAspect="1"/>
+          </p:cNvPicPr>
+          <p:nvPr/>
+        </p:nvPicPr>
+        <p:blipFill>
+          <a:blip r:embed="rId4"/>
+          <a:stretch>
+            <a:fillRect/>
+          </a:stretch>
+        </p:blipFill>
+        <p:spPr>
+          <a:xfrm>
+            <a:off x="2694874" y="3985262"/>
+            <a:ext cx="2963448" cy="2751488"/>
           </a:xfrm>
           <a:prstGeom prst="rect">
             <a:avLst/>
@@ -10318,6 +10326,373 @@
 </file>
 
 <file path=ppt/slides/slide25.xml><?xml version="1.0" encoding="utf-8"?>
+<p:sld xmlns:a="http://schemas.openxmlformats.org/drawingml/2006/main" xmlns:r="http://schemas.openxmlformats.org/officeDocument/2006/relationships" xmlns:p="http://schemas.openxmlformats.org/presentationml/2006/main">
+  <p:cSld>
+    <p:spTree>
+      <p:nvGrpSpPr>
+        <p:cNvPr id="1" name="">
+          <a:extLst>
+            <a:ext uri="{FF2B5EF4-FFF2-40B4-BE49-F238E27FC236}">
+              <a16:creationId xmlns:a16="http://schemas.microsoft.com/office/drawing/2014/main" id="{1964A59C-A830-8604-FCEE-F5252D38F9E1}"/>
+            </a:ext>
+          </a:extLst>
+        </p:cNvPr>
+        <p:cNvGrpSpPr/>
+        <p:nvPr/>
+      </p:nvGrpSpPr>
+      <p:grpSpPr>
+        <a:xfrm>
+          <a:off x="0" y="0"/>
+          <a:ext cx="0" cy="0"/>
+          <a:chOff x="0" y="0"/>
+          <a:chExt cx="0" cy="0"/>
+        </a:xfrm>
+      </p:grpSpPr>
+      <p:sp>
+        <p:nvSpPr>
+          <p:cNvPr id="4" name="TextBox 3">
+            <a:extLst>
+              <a:ext uri="{FF2B5EF4-FFF2-40B4-BE49-F238E27FC236}">
+                <a16:creationId xmlns:a16="http://schemas.microsoft.com/office/drawing/2014/main" id="{FB338D4A-55EF-DFF3-7166-23A778A7C0D6}"/>
+              </a:ext>
+            </a:extLst>
+          </p:cNvPr>
+          <p:cNvSpPr txBox="1"/>
+          <p:nvPr/>
+        </p:nvSpPr>
+        <p:spPr>
+          <a:xfrm>
+            <a:off x="7894620" y="121250"/>
+            <a:ext cx="2269916" cy="338554"/>
+          </a:xfrm>
+          <a:prstGeom prst="rect">
+            <a:avLst/>
+          </a:prstGeom>
+          <a:noFill/>
+          <a:ln>
+            <a:solidFill>
+              <a:schemeClr val="tx1"/>
+            </a:solidFill>
+          </a:ln>
+        </p:spPr>
+        <p:txBody>
+          <a:bodyPr rot="0" spcFirstLastPara="0" vertOverflow="overflow" horzOverflow="overflow" vert="horz" wrap="square" lIns="91440" tIns="45720" rIns="91440" bIns="45720" numCol="1" spcCol="0" rtlCol="0" fromWordArt="0" anchor="t" anchorCtr="0" forceAA="0" compatLnSpc="1">
+            <a:prstTxWarp prst="textNoShape">
+              <a:avLst/>
+            </a:prstTxWarp>
+            <a:spAutoFit/>
+          </a:bodyPr>
+          <a:lstStyle/>
+          <a:p>
+            <a:r>
+              <a:rPr lang="en-GB" sz="1600" dirty="0"/>
+              <a:t>Date – 29/01/2026</a:t>
+            </a:r>
+          </a:p>
+        </p:txBody>
+      </p:sp>
+      <p:sp>
+        <p:nvSpPr>
+          <p:cNvPr id="2" name="TextBox 1">
+            <a:extLst>
+              <a:ext uri="{FF2B5EF4-FFF2-40B4-BE49-F238E27FC236}">
+                <a16:creationId xmlns:a16="http://schemas.microsoft.com/office/drawing/2014/main" id="{21128225-20AA-F6B7-3FEB-4DEC1E8A6E68}"/>
+              </a:ext>
+            </a:extLst>
+          </p:cNvPr>
+          <p:cNvSpPr txBox="1"/>
+          <p:nvPr/>
+        </p:nvSpPr>
+        <p:spPr>
+          <a:xfrm>
+            <a:off x="5651845" y="121250"/>
+            <a:ext cx="2112147" cy="338554"/>
+          </a:xfrm>
+          <a:prstGeom prst="rect">
+            <a:avLst/>
+          </a:prstGeom>
+          <a:noFill/>
+          <a:ln>
+            <a:solidFill>
+              <a:schemeClr val="tx1"/>
+            </a:solidFill>
+          </a:ln>
+        </p:spPr>
+        <p:txBody>
+          <a:bodyPr rot="0" spcFirstLastPara="0" vertOverflow="overflow" horzOverflow="overflow" vert="horz" wrap="square" lIns="91440" tIns="45720" rIns="91440" bIns="45720" numCol="1" spcCol="0" rtlCol="0" fromWordArt="0" anchor="t" anchorCtr="0" forceAA="0" compatLnSpc="1">
+            <a:prstTxWarp prst="textNoShape">
+              <a:avLst/>
+            </a:prstTxWarp>
+            <a:spAutoFit/>
+          </a:bodyPr>
+          <a:lstStyle/>
+          <a:p>
+            <a:r>
+              <a:rPr lang="en-GB" sz="1600" dirty="0"/>
+              <a:t>Game Build V.0.7.1</a:t>
+            </a:r>
+          </a:p>
+        </p:txBody>
+      </p:sp>
+      <p:sp>
+        <p:nvSpPr>
+          <p:cNvPr id="3" name="TextBox 2">
+            <a:extLst>
+              <a:ext uri="{FF2B5EF4-FFF2-40B4-BE49-F238E27FC236}">
+                <a16:creationId xmlns:a16="http://schemas.microsoft.com/office/drawing/2014/main" id="{4CC9AE2D-BE2D-4E45-7F1B-DF6BE48BEF73}"/>
+              </a:ext>
+            </a:extLst>
+          </p:cNvPr>
+          <p:cNvSpPr txBox="1"/>
+          <p:nvPr/>
+        </p:nvSpPr>
+        <p:spPr>
+          <a:xfrm>
+            <a:off x="0" y="152027"/>
+            <a:ext cx="5576207" cy="3970318"/>
+          </a:xfrm>
+          <a:prstGeom prst="rect">
+            <a:avLst/>
+          </a:prstGeom>
+          <a:noFill/>
+          <a:ln>
+            <a:solidFill>
+              <a:schemeClr val="tx1"/>
+            </a:solidFill>
+          </a:ln>
+        </p:spPr>
+        <p:txBody>
+          <a:bodyPr rot="0" spcFirstLastPara="0" vertOverflow="overflow" horzOverflow="overflow" vert="horz" wrap="square" lIns="91440" tIns="45720" rIns="91440" bIns="45720" numCol="1" spcCol="0" rtlCol="0" fromWordArt="0" anchor="t" anchorCtr="0" forceAA="0" compatLnSpc="1">
+            <a:prstTxWarp prst="textNoShape">
+              <a:avLst/>
+            </a:prstTxWarp>
+            <a:spAutoFit/>
+          </a:bodyPr>
+          <a:lstStyle/>
+          <a:p>
+            <a:r>
+              <a:rPr lang="en-GB" sz="1200" dirty="0"/>
+              <a:t>Continuation.</a:t>
+            </a:r>
+          </a:p>
+          <a:p>
+            <a:endParaRPr lang="en-GB" sz="1200" dirty="0"/>
+          </a:p>
+          <a:p>
+            <a:r>
+              <a:rPr lang="en-GB" sz="1200" dirty="0"/>
+              <a:t>The Prototype or AMCD 00 will just like its design take attributes from the other AMCD’s into itself.</a:t>
+            </a:r>
+          </a:p>
+          <a:p>
+            <a:endParaRPr lang="en-GB" sz="1200" dirty="0"/>
+          </a:p>
+          <a:p>
+            <a:r>
+              <a:rPr lang="en-GB" sz="1200" u="sng" dirty="0"/>
+              <a:t>Prototype will have…</a:t>
+            </a:r>
+          </a:p>
+          <a:p>
+            <a:r>
+              <a:rPr lang="en-GB" sz="1200" dirty="0"/>
+              <a:t>K9 speed</a:t>
+            </a:r>
+          </a:p>
+          <a:p>
+            <a:r>
+              <a:rPr lang="en-GB" sz="1200" dirty="0"/>
+              <a:t>Bulker waiting Time</a:t>
+            </a:r>
+          </a:p>
+          <a:p>
+            <a:r>
+              <a:rPr lang="en-GB" sz="1200" dirty="0" err="1"/>
+              <a:t>Gwiber’s</a:t>
+            </a:r>
+            <a:r>
+              <a:rPr lang="en-GB" sz="1200" dirty="0"/>
+              <a:t> low </a:t>
+            </a:r>
+            <a:r>
+              <a:rPr lang="en-GB" sz="1200"/>
+              <a:t>sound movement.</a:t>
+            </a:r>
+          </a:p>
+          <a:p>
+            <a:r>
+              <a:rPr lang="en-GB" sz="1200" dirty="0"/>
+              <a:t>Arach Audio </a:t>
+            </a:r>
+          </a:p>
+          <a:p>
+            <a:r>
+              <a:rPr lang="en-GB" sz="1200" dirty="0"/>
+              <a:t>For coding the Prototypes code will be setup similarly to K9 with adjustments made of all the AMCD’s behaviours into Prototype.</a:t>
+            </a:r>
+          </a:p>
+          <a:p>
+            <a:endParaRPr lang="en-GB" sz="1200" dirty="0"/>
+          </a:p>
+          <a:p>
+            <a:r>
+              <a:rPr lang="en-GB" sz="1200" dirty="0"/>
+              <a:t>there will also be 2 special features for the prototype to increase its difficulty.</a:t>
+            </a:r>
+          </a:p>
+          <a:p>
+            <a:endParaRPr lang="en-GB" sz="1200" dirty="0"/>
+          </a:p>
+          <a:p>
+            <a:pPr marL="228600" indent="-228600">
+              <a:buAutoNum type="arabicPeriod"/>
+            </a:pPr>
+            <a:r>
+              <a:rPr lang="en-GB" sz="1200" dirty="0"/>
+              <a:t>Random movement times. This will make Prototype unpredictable and require you to be constantly active on the camera’s or else he’ll reach your office while your distracted by Arach.</a:t>
+            </a:r>
+          </a:p>
+          <a:p>
+            <a:pPr marL="228600" indent="-228600">
+              <a:buAutoNum type="arabicPeriod"/>
+            </a:pPr>
+            <a:r>
+              <a:rPr lang="en-GB" sz="1200" dirty="0"/>
+              <a:t>Fake sounds. The Prototype will sometimes make fake sounds, tricking the player into thinking he’s moved or is about to attack.</a:t>
+            </a:r>
+          </a:p>
+          <a:p>
+            <a:endParaRPr lang="en-GB" sz="1200" dirty="0"/>
+          </a:p>
+        </p:txBody>
+      </p:sp>
+      <p:sp>
+        <p:nvSpPr>
+          <p:cNvPr id="12" name="TextBox 11">
+            <a:extLst>
+              <a:ext uri="{FF2B5EF4-FFF2-40B4-BE49-F238E27FC236}">
+                <a16:creationId xmlns:a16="http://schemas.microsoft.com/office/drawing/2014/main" id="{030308C4-355A-2456-55F1-B1A59C3FFB3C}"/>
+              </a:ext>
+            </a:extLst>
+          </p:cNvPr>
+          <p:cNvSpPr txBox="1"/>
+          <p:nvPr/>
+        </p:nvSpPr>
+        <p:spPr>
+          <a:xfrm>
+            <a:off x="8555487" y="722845"/>
+            <a:ext cx="2073729" cy="5909310"/>
+          </a:xfrm>
+          <a:prstGeom prst="rect">
+            <a:avLst/>
+          </a:prstGeom>
+          <a:noFill/>
+        </p:spPr>
+        <p:txBody>
+          <a:bodyPr wrap="square" rtlCol="0">
+            <a:spAutoFit/>
+          </a:bodyPr>
+          <a:lstStyle/>
+          <a:p>
+            <a:r>
+              <a:rPr lang="en-GB" sz="1400" dirty="0"/>
+              <a:t>What to Do next session</a:t>
+            </a:r>
+          </a:p>
+          <a:p>
+            <a:endParaRPr lang="en-GB" sz="1400" dirty="0"/>
+          </a:p>
+          <a:p>
+            <a:r>
+              <a:rPr lang="en-GB" sz="1400" dirty="0"/>
+              <a:t>Design Zones</a:t>
+            </a:r>
+          </a:p>
+          <a:p>
+            <a:endParaRPr lang="en-GB" sz="1400" dirty="0"/>
+          </a:p>
+          <a:p>
+            <a:r>
+              <a:rPr lang="en-GB" sz="1400" dirty="0"/>
+              <a:t>Find suitable Place Holder sounds</a:t>
+            </a:r>
+          </a:p>
+          <a:p>
+            <a:endParaRPr lang="en-GB" sz="1400" dirty="0"/>
+          </a:p>
+          <a:p>
+            <a:r>
+              <a:rPr lang="en-GB" sz="1400" dirty="0"/>
+              <a:t>Make level 5 with all the AMCD’s.</a:t>
+            </a:r>
+          </a:p>
+          <a:p>
+            <a:endParaRPr lang="en-GB" sz="1400" dirty="0"/>
+          </a:p>
+          <a:p>
+            <a:r>
+              <a:rPr lang="en-GB" sz="1400" dirty="0"/>
+              <a:t>Adjust enemies code for more balanced gameplay.</a:t>
+            </a:r>
+          </a:p>
+          <a:p>
+            <a:endParaRPr lang="en-GB" sz="1400" dirty="0"/>
+          </a:p>
+          <a:p>
+            <a:r>
+              <a:rPr lang="en-GB" sz="1400" dirty="0"/>
+              <a:t>Display level timer.</a:t>
+            </a:r>
+          </a:p>
+          <a:p>
+            <a:endParaRPr lang="en-GB" sz="1400" dirty="0"/>
+          </a:p>
+          <a:p>
+            <a:r>
+              <a:rPr lang="en-GB" sz="1400" dirty="0"/>
+              <a:t>Re-do Health Bar.</a:t>
+            </a:r>
+          </a:p>
+          <a:p>
+            <a:endParaRPr lang="en-GB" sz="1400" dirty="0"/>
+          </a:p>
+          <a:p>
+            <a:r>
+              <a:rPr lang="en-GB" sz="1400" dirty="0"/>
+              <a:t>Finally, in the main menu add the Soundtrack I created for Critical Failure.</a:t>
+            </a:r>
+          </a:p>
+          <a:p>
+            <a:endParaRPr lang="en-GB" sz="1400" dirty="0"/>
+          </a:p>
+          <a:p>
+            <a:endParaRPr lang="en-GB" sz="1400" dirty="0"/>
+          </a:p>
+          <a:p>
+            <a:endParaRPr lang="en-GB" sz="1400" dirty="0"/>
+          </a:p>
+          <a:p>
+            <a:endParaRPr lang="en-GB" sz="1400" dirty="0"/>
+          </a:p>
+          <a:p>
+            <a:endParaRPr lang="en-GB" sz="1400" dirty="0"/>
+          </a:p>
+        </p:txBody>
+      </p:sp>
+    </p:spTree>
+    <p:extLst>
+      <p:ext uri="{BB962C8B-B14F-4D97-AF65-F5344CB8AC3E}">
+        <p14:creationId xmlns:p14="http://schemas.microsoft.com/office/powerpoint/2010/main" val="2078405328"/>
+      </p:ext>
+    </p:extLst>
+  </p:cSld>
+  <p:clrMapOvr>
+    <a:masterClrMapping/>
+  </p:clrMapOvr>
+</p:sld>
+</file>
+
+<file path=ppt/slides/slide26.xml><?xml version="1.0" encoding="utf-8"?>
 <p:sld xmlns:a="http://schemas.openxmlformats.org/drawingml/2006/main" xmlns:r="http://schemas.openxmlformats.org/officeDocument/2006/relationships" xmlns:p="http://schemas.openxmlformats.org/presentationml/2006/main">
   <p:cSld>
     <p:spTree>
@@ -11130,7 +11505,7 @@
 </p:sld>
 </file>
 
-<file path=ppt/slides/slide26.xml><?xml version="1.0" encoding="utf-8"?>
+<file path=ppt/slides/slide27.xml><?xml version="1.0" encoding="utf-8"?>
 <p:sld xmlns:a="http://schemas.openxmlformats.org/drawingml/2006/main" xmlns:r="http://schemas.openxmlformats.org/officeDocument/2006/relationships" xmlns:p="http://schemas.openxmlformats.org/presentationml/2006/main">
   <p:cSld>
     <p:spTree>
@@ -11721,7 +12096,7 @@
 </p:sld>
 </file>
 
-<file path=ppt/slides/slide27.xml><?xml version="1.0" encoding="utf-8"?>
+<file path=ppt/slides/slide28.xml><?xml version="1.0" encoding="utf-8"?>
 <p:sld xmlns:a="http://schemas.openxmlformats.org/drawingml/2006/main" xmlns:r="http://schemas.openxmlformats.org/officeDocument/2006/relationships" xmlns:p="http://schemas.openxmlformats.org/presentationml/2006/main">
   <p:cSld>
     <p:spTree>
@@ -12245,7 +12620,7 @@
 </p:sld>
 </file>
 
-<file path=ppt/slides/slide28.xml><?xml version="1.0" encoding="utf-8"?>
+<file path=ppt/slides/slide29.xml><?xml version="1.0" encoding="utf-8"?>
 <p:sld xmlns:a="http://schemas.openxmlformats.org/drawingml/2006/main" xmlns:r="http://schemas.openxmlformats.org/officeDocument/2006/relationships" xmlns:p="http://schemas.openxmlformats.org/presentationml/2006/main">
   <p:cSld>
     <p:spTree>
@@ -12819,7 +13194,363 @@
 </p:sld>
 </file>
 
-<file path=ppt/slides/slide29.xml><?xml version="1.0" encoding="utf-8"?>
+<file path=ppt/slides/slide3.xml><?xml version="1.0" encoding="utf-8"?>
+<p:sld xmlns:a="http://schemas.openxmlformats.org/drawingml/2006/main" xmlns:r="http://schemas.openxmlformats.org/officeDocument/2006/relationships" xmlns:p="http://schemas.openxmlformats.org/presentationml/2006/main">
+  <p:cSld>
+    <p:spTree>
+      <p:nvGrpSpPr>
+        <p:cNvPr id="1" name="">
+          <a:extLst>
+            <a:ext uri="{FF2B5EF4-FFF2-40B4-BE49-F238E27FC236}">
+              <a16:creationId xmlns:a16="http://schemas.microsoft.com/office/drawing/2014/main" id="{B71AF447-2503-6E06-EB64-6A29C299795D}"/>
+            </a:ext>
+          </a:extLst>
+        </p:cNvPr>
+        <p:cNvGrpSpPr/>
+        <p:nvPr/>
+      </p:nvGrpSpPr>
+      <p:grpSpPr>
+        <a:xfrm>
+          <a:off x="0" y="0"/>
+          <a:ext cx="0" cy="0"/>
+          <a:chOff x="0" y="0"/>
+          <a:chExt cx="0" cy="0"/>
+        </a:xfrm>
+      </p:grpSpPr>
+      <p:sp>
+        <p:nvSpPr>
+          <p:cNvPr id="4" name="TextBox 3">
+            <a:extLst>
+              <a:ext uri="{FF2B5EF4-FFF2-40B4-BE49-F238E27FC236}">
+                <a16:creationId xmlns:a16="http://schemas.microsoft.com/office/drawing/2014/main" id="{3ABD7D05-D183-64C6-1BA1-72453612143E}"/>
+              </a:ext>
+            </a:extLst>
+          </p:cNvPr>
+          <p:cNvSpPr txBox="1"/>
+          <p:nvPr/>
+        </p:nvSpPr>
+        <p:spPr>
+          <a:xfrm>
+            <a:off x="7763992" y="90121"/>
+            <a:ext cx="1809641" cy="338554"/>
+          </a:xfrm>
+          <a:prstGeom prst="rect">
+            <a:avLst/>
+          </a:prstGeom>
+          <a:noFill/>
+          <a:ln>
+            <a:solidFill>
+              <a:schemeClr val="tx1"/>
+            </a:solidFill>
+          </a:ln>
+        </p:spPr>
+        <p:txBody>
+          <a:bodyPr rot="0" spcFirstLastPara="0" vertOverflow="overflow" horzOverflow="overflow" vert="horz" wrap="square" lIns="91440" tIns="45720" rIns="91440" bIns="45720" numCol="1" spcCol="0" rtlCol="0" fromWordArt="0" anchor="t" anchorCtr="0" forceAA="0" compatLnSpc="1">
+            <a:prstTxWarp prst="textNoShape">
+              <a:avLst/>
+            </a:prstTxWarp>
+            <a:spAutoFit/>
+          </a:bodyPr>
+          <a:lstStyle/>
+          <a:p>
+            <a:r>
+              <a:rPr lang="en-GB" sz="1600" dirty="0"/>
+              <a:t>Date – 24/11/2025</a:t>
+            </a:r>
+          </a:p>
+        </p:txBody>
+      </p:sp>
+      <p:sp>
+        <p:nvSpPr>
+          <p:cNvPr id="2" name="TextBox 1">
+            <a:extLst>
+              <a:ext uri="{FF2B5EF4-FFF2-40B4-BE49-F238E27FC236}">
+                <a16:creationId xmlns:a16="http://schemas.microsoft.com/office/drawing/2014/main" id="{3E37F77A-82C0-2039-AD51-40366B52EBEB}"/>
+              </a:ext>
+            </a:extLst>
+          </p:cNvPr>
+          <p:cNvSpPr txBox="1"/>
+          <p:nvPr/>
+        </p:nvSpPr>
+        <p:spPr>
+          <a:xfrm>
+            <a:off x="5651845" y="90120"/>
+            <a:ext cx="1959856" cy="338554"/>
+          </a:xfrm>
+          <a:prstGeom prst="rect">
+            <a:avLst/>
+          </a:prstGeom>
+          <a:noFill/>
+          <a:ln>
+            <a:solidFill>
+              <a:schemeClr val="tx1"/>
+            </a:solidFill>
+          </a:ln>
+        </p:spPr>
+        <p:txBody>
+          <a:bodyPr rot="0" spcFirstLastPara="0" vertOverflow="overflow" horzOverflow="overflow" vert="horz" wrap="square" lIns="91440" tIns="45720" rIns="91440" bIns="45720" numCol="1" spcCol="0" rtlCol="0" fromWordArt="0" anchor="t" anchorCtr="0" forceAA="0" compatLnSpc="1">
+            <a:prstTxWarp prst="textNoShape">
+              <a:avLst/>
+            </a:prstTxWarp>
+            <a:spAutoFit/>
+          </a:bodyPr>
+          <a:lstStyle/>
+          <a:p>
+            <a:r>
+              <a:rPr lang="en-GB" sz="1600" dirty="0"/>
+              <a:t>Game Build V.0.1</a:t>
+            </a:r>
+          </a:p>
+        </p:txBody>
+      </p:sp>
+      <p:sp>
+        <p:nvSpPr>
+          <p:cNvPr id="3" name="TextBox 2">
+            <a:extLst>
+              <a:ext uri="{FF2B5EF4-FFF2-40B4-BE49-F238E27FC236}">
+                <a16:creationId xmlns:a16="http://schemas.microsoft.com/office/drawing/2014/main" id="{2886F3E7-61E5-445C-5038-15B1F86B5A87}"/>
+              </a:ext>
+            </a:extLst>
+          </p:cNvPr>
+          <p:cNvSpPr txBox="1"/>
+          <p:nvPr/>
+        </p:nvSpPr>
+        <p:spPr>
+          <a:xfrm>
+            <a:off x="5642854" y="578678"/>
+            <a:ext cx="3926490" cy="3354765"/>
+          </a:xfrm>
+          <a:prstGeom prst="rect">
+            <a:avLst/>
+          </a:prstGeom>
+          <a:noFill/>
+          <a:ln>
+            <a:solidFill>
+              <a:schemeClr val="tx1"/>
+            </a:solidFill>
+          </a:ln>
+        </p:spPr>
+        <p:txBody>
+          <a:bodyPr rot="0" spcFirstLastPara="0" vertOverflow="overflow" horzOverflow="overflow" vert="horz" wrap="square" lIns="91440" tIns="45720" rIns="91440" bIns="45720" numCol="1" spcCol="0" rtlCol="0" fromWordArt="0" anchor="t" anchorCtr="0" forceAA="0" compatLnSpc="1">
+            <a:prstTxWarp prst="textNoShape">
+              <a:avLst/>
+            </a:prstTxWarp>
+            <a:spAutoFit/>
+          </a:bodyPr>
+          <a:lstStyle/>
+          <a:p>
+            <a:r>
+              <a:rPr lang="en-GB" sz="1400" dirty="0"/>
+              <a:t>Summary Of Session</a:t>
+            </a:r>
+          </a:p>
+          <a:p>
+            <a:endParaRPr lang="en-GB" sz="1400" dirty="0"/>
+          </a:p>
+          <a:p>
+            <a:r>
+              <a:rPr lang="en-GB" sz="1400" dirty="0"/>
+              <a:t>I used View port feature on game maker to have the main camera be focused on the office.</a:t>
+            </a:r>
+          </a:p>
+          <a:p>
+            <a:endParaRPr lang="en-GB" sz="1400" dirty="0"/>
+          </a:p>
+          <a:p>
+            <a:r>
+              <a:rPr lang="en-GB" sz="1400" dirty="0"/>
+              <a:t>The code below is the camera, that when I put in camera_apply or shift view onto a button Object it will change OBJ_Camera’s position within the room. It is not done yet but is a massive leap in completing one of my most advanced mechanics.</a:t>
+            </a:r>
+          </a:p>
+          <a:p>
+            <a:endParaRPr lang="en-GB" sz="1400" dirty="0"/>
+          </a:p>
+          <a:p>
+            <a:endParaRPr lang="en-GB" sz="1400" dirty="0"/>
+          </a:p>
+          <a:p>
+            <a:endParaRPr lang="en-GB" sz="1400" dirty="0"/>
+          </a:p>
+          <a:p>
+            <a:endParaRPr lang="en-GB" sz="1600" dirty="0"/>
+          </a:p>
+        </p:txBody>
+      </p:sp>
+      <p:sp>
+        <p:nvSpPr>
+          <p:cNvPr id="6" name="TextBox 5">
+            <a:extLst>
+              <a:ext uri="{FF2B5EF4-FFF2-40B4-BE49-F238E27FC236}">
+                <a16:creationId xmlns:a16="http://schemas.microsoft.com/office/drawing/2014/main" id="{6C671371-B8F1-97C1-D2C5-BD2850E814D7}"/>
+              </a:ext>
+            </a:extLst>
+          </p:cNvPr>
+          <p:cNvSpPr txBox="1"/>
+          <p:nvPr/>
+        </p:nvSpPr>
+        <p:spPr>
+          <a:xfrm>
+            <a:off x="9642445" y="54237"/>
+            <a:ext cx="2438400" cy="1569660"/>
+          </a:xfrm>
+          <a:prstGeom prst="rect">
+            <a:avLst/>
+          </a:prstGeom>
+          <a:noFill/>
+          <a:ln>
+            <a:solidFill>
+              <a:schemeClr val="tx1"/>
+            </a:solidFill>
+          </a:ln>
+        </p:spPr>
+        <p:txBody>
+          <a:bodyPr rot="0" spcFirstLastPara="0" vertOverflow="overflow" horzOverflow="overflow" vert="horz" wrap="square" lIns="91440" tIns="45720" rIns="91440" bIns="45720" numCol="1" spcCol="0" rtlCol="0" fromWordArt="0" anchor="t" anchorCtr="0" forceAA="0" compatLnSpc="1">
+            <a:prstTxWarp prst="textNoShape">
+              <a:avLst/>
+            </a:prstTxWarp>
+            <a:spAutoFit/>
+          </a:bodyPr>
+          <a:lstStyle/>
+          <a:p>
+            <a:r>
+              <a:rPr lang="en-GB" sz="1200" dirty="0"/>
+              <a:t>What to do for Next Session</a:t>
+            </a:r>
+          </a:p>
+          <a:p>
+            <a:endParaRPr lang="en-GB" sz="1200" dirty="0"/>
+          </a:p>
+          <a:p>
+            <a:r>
+              <a:rPr lang="en-GB" sz="1200" dirty="0"/>
+              <a:t>Continue working on sprites and setting the game up ready for all the coding, so adding in all the assets/files.</a:t>
+            </a:r>
+          </a:p>
+          <a:p>
+            <a:endParaRPr lang="en-GB" sz="1200" dirty="0"/>
+          </a:p>
+          <a:p>
+            <a:endParaRPr lang="en-GB" sz="1200" dirty="0"/>
+          </a:p>
+        </p:txBody>
+      </p:sp>
+      <p:pic>
+        <p:nvPicPr>
+          <p:cNvPr id="27" name="Picture 26">
+            <a:extLst>
+              <a:ext uri="{FF2B5EF4-FFF2-40B4-BE49-F238E27FC236}">
+                <a16:creationId xmlns:a16="http://schemas.microsoft.com/office/drawing/2014/main" id="{F677CB03-D1DC-CB3F-CAE0-F8B146FE754F}"/>
+              </a:ext>
+            </a:extLst>
+          </p:cNvPr>
+          <p:cNvPicPr>
+            <a:picLocks noChangeAspect="1"/>
+          </p:cNvPicPr>
+          <p:nvPr/>
+        </p:nvPicPr>
+        <p:blipFill>
+          <a:blip r:embed="rId2"/>
+          <a:stretch>
+            <a:fillRect/>
+          </a:stretch>
+        </p:blipFill>
+        <p:spPr>
+          <a:xfrm>
+            <a:off x="231941" y="754545"/>
+            <a:ext cx="2512691" cy="5638018"/>
+          </a:xfrm>
+          <a:prstGeom prst="rect">
+            <a:avLst/>
+          </a:prstGeom>
+        </p:spPr>
+      </p:pic>
+      <p:sp>
+        <p:nvSpPr>
+          <p:cNvPr id="5" name="TextBox 4">
+            <a:extLst>
+              <a:ext uri="{FF2B5EF4-FFF2-40B4-BE49-F238E27FC236}">
+                <a16:creationId xmlns:a16="http://schemas.microsoft.com/office/drawing/2014/main" id="{3C6B70CF-F758-8FF9-4535-1E2605546C2E}"/>
+              </a:ext>
+            </a:extLst>
+          </p:cNvPr>
+          <p:cNvSpPr txBox="1"/>
+          <p:nvPr/>
+        </p:nvSpPr>
+        <p:spPr>
+          <a:xfrm>
+            <a:off x="0" y="54237"/>
+            <a:ext cx="1959856" cy="584775"/>
+          </a:xfrm>
+          <a:prstGeom prst="rect">
+            <a:avLst/>
+          </a:prstGeom>
+          <a:noFill/>
+          <a:ln>
+            <a:solidFill>
+              <a:schemeClr val="tx1"/>
+            </a:solidFill>
+          </a:ln>
+        </p:spPr>
+        <p:txBody>
+          <a:bodyPr rot="0" spcFirstLastPara="0" vertOverflow="overflow" horzOverflow="overflow" vert="horz" wrap="square" lIns="91440" tIns="45720" rIns="91440" bIns="45720" numCol="1" spcCol="0" rtlCol="0" fromWordArt="0" anchor="t" anchorCtr="0" forceAA="0" compatLnSpc="1">
+            <a:prstTxWarp prst="textNoShape">
+              <a:avLst/>
+            </a:prstTxWarp>
+            <a:spAutoFit/>
+          </a:bodyPr>
+          <a:lstStyle/>
+          <a:p>
+            <a:r>
+              <a:rPr lang="en-GB" sz="1600" dirty="0"/>
+              <a:t>Continuation of previous slide.</a:t>
+            </a:r>
+          </a:p>
+        </p:txBody>
+      </p:sp>
+      <p:pic>
+        <p:nvPicPr>
+          <p:cNvPr id="11" name="Picture 10">
+            <a:extLst>
+              <a:ext uri="{FF2B5EF4-FFF2-40B4-BE49-F238E27FC236}">
+                <a16:creationId xmlns:a16="http://schemas.microsoft.com/office/drawing/2014/main" id="{10266355-A36C-5972-ED51-B27E7586F80B}"/>
+              </a:ext>
+            </a:extLst>
+          </p:cNvPr>
+          <p:cNvPicPr>
+            <a:picLocks noChangeAspect="1"/>
+          </p:cNvPicPr>
+          <p:nvPr/>
+        </p:nvPicPr>
+        <p:blipFill>
+          <a:blip r:embed="rId3"/>
+          <a:stretch>
+            <a:fillRect/>
+          </a:stretch>
+        </p:blipFill>
+        <p:spPr>
+          <a:xfrm>
+            <a:off x="3038494" y="3756230"/>
+            <a:ext cx="8921565" cy="2581366"/>
+          </a:xfrm>
+          <a:prstGeom prst="rect">
+            <a:avLst/>
+          </a:prstGeom>
+        </p:spPr>
+      </p:pic>
+    </p:spTree>
+    <p:extLst>
+      <p:ext uri="{BB962C8B-B14F-4D97-AF65-F5344CB8AC3E}">
+        <p14:creationId xmlns:p14="http://schemas.microsoft.com/office/powerpoint/2010/main" val="3460468714"/>
+      </p:ext>
+    </p:extLst>
+  </p:cSld>
+  <p:clrMapOvr>
+    <a:masterClrMapping/>
+  </p:clrMapOvr>
+</p:sld>
+</file>
+
+<file path=ppt/slides/slide30.xml><?xml version="1.0" encoding="utf-8"?>
 <p:sld xmlns:a="http://schemas.openxmlformats.org/drawingml/2006/main" xmlns:r="http://schemas.openxmlformats.org/officeDocument/2006/relationships" xmlns:p="http://schemas.openxmlformats.org/presentationml/2006/main">
   <p:cSld>
     <p:spTree>
@@ -13319,363 +14050,7 @@
 </p:sld>
 </file>
 
-<file path=ppt/slides/slide3.xml><?xml version="1.0" encoding="utf-8"?>
-<p:sld xmlns:a="http://schemas.openxmlformats.org/drawingml/2006/main" xmlns:r="http://schemas.openxmlformats.org/officeDocument/2006/relationships" xmlns:p="http://schemas.openxmlformats.org/presentationml/2006/main">
-  <p:cSld>
-    <p:spTree>
-      <p:nvGrpSpPr>
-        <p:cNvPr id="1" name="">
-          <a:extLst>
-            <a:ext uri="{FF2B5EF4-FFF2-40B4-BE49-F238E27FC236}">
-              <a16:creationId xmlns:a16="http://schemas.microsoft.com/office/drawing/2014/main" id="{B71AF447-2503-6E06-EB64-6A29C299795D}"/>
-            </a:ext>
-          </a:extLst>
-        </p:cNvPr>
-        <p:cNvGrpSpPr/>
-        <p:nvPr/>
-      </p:nvGrpSpPr>
-      <p:grpSpPr>
-        <a:xfrm>
-          <a:off x="0" y="0"/>
-          <a:ext cx="0" cy="0"/>
-          <a:chOff x="0" y="0"/>
-          <a:chExt cx="0" cy="0"/>
-        </a:xfrm>
-      </p:grpSpPr>
-      <p:sp>
-        <p:nvSpPr>
-          <p:cNvPr id="4" name="TextBox 3">
-            <a:extLst>
-              <a:ext uri="{FF2B5EF4-FFF2-40B4-BE49-F238E27FC236}">
-                <a16:creationId xmlns:a16="http://schemas.microsoft.com/office/drawing/2014/main" id="{3ABD7D05-D183-64C6-1BA1-72453612143E}"/>
-              </a:ext>
-            </a:extLst>
-          </p:cNvPr>
-          <p:cNvSpPr txBox="1"/>
-          <p:nvPr/>
-        </p:nvSpPr>
-        <p:spPr>
-          <a:xfrm>
-            <a:off x="7763992" y="90121"/>
-            <a:ext cx="1809641" cy="338554"/>
-          </a:xfrm>
-          <a:prstGeom prst="rect">
-            <a:avLst/>
-          </a:prstGeom>
-          <a:noFill/>
-          <a:ln>
-            <a:solidFill>
-              <a:schemeClr val="tx1"/>
-            </a:solidFill>
-          </a:ln>
-        </p:spPr>
-        <p:txBody>
-          <a:bodyPr rot="0" spcFirstLastPara="0" vertOverflow="overflow" horzOverflow="overflow" vert="horz" wrap="square" lIns="91440" tIns="45720" rIns="91440" bIns="45720" numCol="1" spcCol="0" rtlCol="0" fromWordArt="0" anchor="t" anchorCtr="0" forceAA="0" compatLnSpc="1">
-            <a:prstTxWarp prst="textNoShape">
-              <a:avLst/>
-            </a:prstTxWarp>
-            <a:spAutoFit/>
-          </a:bodyPr>
-          <a:lstStyle/>
-          <a:p>
-            <a:r>
-              <a:rPr lang="en-GB" sz="1600" dirty="0"/>
-              <a:t>Date – 24/11/2025</a:t>
-            </a:r>
-          </a:p>
-        </p:txBody>
-      </p:sp>
-      <p:sp>
-        <p:nvSpPr>
-          <p:cNvPr id="2" name="TextBox 1">
-            <a:extLst>
-              <a:ext uri="{FF2B5EF4-FFF2-40B4-BE49-F238E27FC236}">
-                <a16:creationId xmlns:a16="http://schemas.microsoft.com/office/drawing/2014/main" id="{3E37F77A-82C0-2039-AD51-40366B52EBEB}"/>
-              </a:ext>
-            </a:extLst>
-          </p:cNvPr>
-          <p:cNvSpPr txBox="1"/>
-          <p:nvPr/>
-        </p:nvSpPr>
-        <p:spPr>
-          <a:xfrm>
-            <a:off x="5651845" y="90120"/>
-            <a:ext cx="1959856" cy="338554"/>
-          </a:xfrm>
-          <a:prstGeom prst="rect">
-            <a:avLst/>
-          </a:prstGeom>
-          <a:noFill/>
-          <a:ln>
-            <a:solidFill>
-              <a:schemeClr val="tx1"/>
-            </a:solidFill>
-          </a:ln>
-        </p:spPr>
-        <p:txBody>
-          <a:bodyPr rot="0" spcFirstLastPara="0" vertOverflow="overflow" horzOverflow="overflow" vert="horz" wrap="square" lIns="91440" tIns="45720" rIns="91440" bIns="45720" numCol="1" spcCol="0" rtlCol="0" fromWordArt="0" anchor="t" anchorCtr="0" forceAA="0" compatLnSpc="1">
-            <a:prstTxWarp prst="textNoShape">
-              <a:avLst/>
-            </a:prstTxWarp>
-            <a:spAutoFit/>
-          </a:bodyPr>
-          <a:lstStyle/>
-          <a:p>
-            <a:r>
-              <a:rPr lang="en-GB" sz="1600" dirty="0"/>
-              <a:t>Game Build V.0.1</a:t>
-            </a:r>
-          </a:p>
-        </p:txBody>
-      </p:sp>
-      <p:sp>
-        <p:nvSpPr>
-          <p:cNvPr id="3" name="TextBox 2">
-            <a:extLst>
-              <a:ext uri="{FF2B5EF4-FFF2-40B4-BE49-F238E27FC236}">
-                <a16:creationId xmlns:a16="http://schemas.microsoft.com/office/drawing/2014/main" id="{2886F3E7-61E5-445C-5038-15B1F86B5A87}"/>
-              </a:ext>
-            </a:extLst>
-          </p:cNvPr>
-          <p:cNvSpPr txBox="1"/>
-          <p:nvPr/>
-        </p:nvSpPr>
-        <p:spPr>
-          <a:xfrm>
-            <a:off x="5642854" y="578678"/>
-            <a:ext cx="3926490" cy="3354765"/>
-          </a:xfrm>
-          <a:prstGeom prst="rect">
-            <a:avLst/>
-          </a:prstGeom>
-          <a:noFill/>
-          <a:ln>
-            <a:solidFill>
-              <a:schemeClr val="tx1"/>
-            </a:solidFill>
-          </a:ln>
-        </p:spPr>
-        <p:txBody>
-          <a:bodyPr rot="0" spcFirstLastPara="0" vertOverflow="overflow" horzOverflow="overflow" vert="horz" wrap="square" lIns="91440" tIns="45720" rIns="91440" bIns="45720" numCol="1" spcCol="0" rtlCol="0" fromWordArt="0" anchor="t" anchorCtr="0" forceAA="0" compatLnSpc="1">
-            <a:prstTxWarp prst="textNoShape">
-              <a:avLst/>
-            </a:prstTxWarp>
-            <a:spAutoFit/>
-          </a:bodyPr>
-          <a:lstStyle/>
-          <a:p>
-            <a:r>
-              <a:rPr lang="en-GB" sz="1400" dirty="0"/>
-              <a:t>Summary Of Session</a:t>
-            </a:r>
-          </a:p>
-          <a:p>
-            <a:endParaRPr lang="en-GB" sz="1400" dirty="0"/>
-          </a:p>
-          <a:p>
-            <a:r>
-              <a:rPr lang="en-GB" sz="1400" dirty="0"/>
-              <a:t>I used View port feature on game maker to have the main camera be focused on the office.</a:t>
-            </a:r>
-          </a:p>
-          <a:p>
-            <a:endParaRPr lang="en-GB" sz="1400" dirty="0"/>
-          </a:p>
-          <a:p>
-            <a:r>
-              <a:rPr lang="en-GB" sz="1400" dirty="0"/>
-              <a:t>The code below is the camera, that when I put in camera_apply or shift view onto a button Object it will change OBJ_Camera’s position within the room. It is not done yet but is a massive leap in completing one of my most advanced mechanics.</a:t>
-            </a:r>
-          </a:p>
-          <a:p>
-            <a:endParaRPr lang="en-GB" sz="1400" dirty="0"/>
-          </a:p>
-          <a:p>
-            <a:endParaRPr lang="en-GB" sz="1400" dirty="0"/>
-          </a:p>
-          <a:p>
-            <a:endParaRPr lang="en-GB" sz="1400" dirty="0"/>
-          </a:p>
-          <a:p>
-            <a:endParaRPr lang="en-GB" sz="1600" dirty="0"/>
-          </a:p>
-        </p:txBody>
-      </p:sp>
-      <p:sp>
-        <p:nvSpPr>
-          <p:cNvPr id="6" name="TextBox 5">
-            <a:extLst>
-              <a:ext uri="{FF2B5EF4-FFF2-40B4-BE49-F238E27FC236}">
-                <a16:creationId xmlns:a16="http://schemas.microsoft.com/office/drawing/2014/main" id="{6C671371-B8F1-97C1-D2C5-BD2850E814D7}"/>
-              </a:ext>
-            </a:extLst>
-          </p:cNvPr>
-          <p:cNvSpPr txBox="1"/>
-          <p:nvPr/>
-        </p:nvSpPr>
-        <p:spPr>
-          <a:xfrm>
-            <a:off x="9642445" y="54237"/>
-            <a:ext cx="2438400" cy="1569660"/>
-          </a:xfrm>
-          <a:prstGeom prst="rect">
-            <a:avLst/>
-          </a:prstGeom>
-          <a:noFill/>
-          <a:ln>
-            <a:solidFill>
-              <a:schemeClr val="tx1"/>
-            </a:solidFill>
-          </a:ln>
-        </p:spPr>
-        <p:txBody>
-          <a:bodyPr rot="0" spcFirstLastPara="0" vertOverflow="overflow" horzOverflow="overflow" vert="horz" wrap="square" lIns="91440" tIns="45720" rIns="91440" bIns="45720" numCol="1" spcCol="0" rtlCol="0" fromWordArt="0" anchor="t" anchorCtr="0" forceAA="0" compatLnSpc="1">
-            <a:prstTxWarp prst="textNoShape">
-              <a:avLst/>
-            </a:prstTxWarp>
-            <a:spAutoFit/>
-          </a:bodyPr>
-          <a:lstStyle/>
-          <a:p>
-            <a:r>
-              <a:rPr lang="en-GB" sz="1200" dirty="0"/>
-              <a:t>What to do for Next Session</a:t>
-            </a:r>
-          </a:p>
-          <a:p>
-            <a:endParaRPr lang="en-GB" sz="1200" dirty="0"/>
-          </a:p>
-          <a:p>
-            <a:r>
-              <a:rPr lang="en-GB" sz="1200" dirty="0"/>
-              <a:t>Continue working on sprites and setting the game up ready for all the coding, so adding in all the assets/files.</a:t>
-            </a:r>
-          </a:p>
-          <a:p>
-            <a:endParaRPr lang="en-GB" sz="1200" dirty="0"/>
-          </a:p>
-          <a:p>
-            <a:endParaRPr lang="en-GB" sz="1200" dirty="0"/>
-          </a:p>
-        </p:txBody>
-      </p:sp>
-      <p:pic>
-        <p:nvPicPr>
-          <p:cNvPr id="27" name="Picture 26">
-            <a:extLst>
-              <a:ext uri="{FF2B5EF4-FFF2-40B4-BE49-F238E27FC236}">
-                <a16:creationId xmlns:a16="http://schemas.microsoft.com/office/drawing/2014/main" id="{F677CB03-D1DC-CB3F-CAE0-F8B146FE754F}"/>
-              </a:ext>
-            </a:extLst>
-          </p:cNvPr>
-          <p:cNvPicPr>
-            <a:picLocks noChangeAspect="1"/>
-          </p:cNvPicPr>
-          <p:nvPr/>
-        </p:nvPicPr>
-        <p:blipFill>
-          <a:blip r:embed="rId2"/>
-          <a:stretch>
-            <a:fillRect/>
-          </a:stretch>
-        </p:blipFill>
-        <p:spPr>
-          <a:xfrm>
-            <a:off x="231941" y="754545"/>
-            <a:ext cx="2512691" cy="5638018"/>
-          </a:xfrm>
-          <a:prstGeom prst="rect">
-            <a:avLst/>
-          </a:prstGeom>
-        </p:spPr>
-      </p:pic>
-      <p:sp>
-        <p:nvSpPr>
-          <p:cNvPr id="5" name="TextBox 4">
-            <a:extLst>
-              <a:ext uri="{FF2B5EF4-FFF2-40B4-BE49-F238E27FC236}">
-                <a16:creationId xmlns:a16="http://schemas.microsoft.com/office/drawing/2014/main" id="{3C6B70CF-F758-8FF9-4535-1E2605546C2E}"/>
-              </a:ext>
-            </a:extLst>
-          </p:cNvPr>
-          <p:cNvSpPr txBox="1"/>
-          <p:nvPr/>
-        </p:nvSpPr>
-        <p:spPr>
-          <a:xfrm>
-            <a:off x="0" y="54237"/>
-            <a:ext cx="1959856" cy="584775"/>
-          </a:xfrm>
-          <a:prstGeom prst="rect">
-            <a:avLst/>
-          </a:prstGeom>
-          <a:noFill/>
-          <a:ln>
-            <a:solidFill>
-              <a:schemeClr val="tx1"/>
-            </a:solidFill>
-          </a:ln>
-        </p:spPr>
-        <p:txBody>
-          <a:bodyPr rot="0" spcFirstLastPara="0" vertOverflow="overflow" horzOverflow="overflow" vert="horz" wrap="square" lIns="91440" tIns="45720" rIns="91440" bIns="45720" numCol="1" spcCol="0" rtlCol="0" fromWordArt="0" anchor="t" anchorCtr="0" forceAA="0" compatLnSpc="1">
-            <a:prstTxWarp prst="textNoShape">
-              <a:avLst/>
-            </a:prstTxWarp>
-            <a:spAutoFit/>
-          </a:bodyPr>
-          <a:lstStyle/>
-          <a:p>
-            <a:r>
-              <a:rPr lang="en-GB" sz="1600" dirty="0"/>
-              <a:t>Continuation of previous slide.</a:t>
-            </a:r>
-          </a:p>
-        </p:txBody>
-      </p:sp>
-      <p:pic>
-        <p:nvPicPr>
-          <p:cNvPr id="11" name="Picture 10">
-            <a:extLst>
-              <a:ext uri="{FF2B5EF4-FFF2-40B4-BE49-F238E27FC236}">
-                <a16:creationId xmlns:a16="http://schemas.microsoft.com/office/drawing/2014/main" id="{10266355-A36C-5972-ED51-B27E7586F80B}"/>
-              </a:ext>
-            </a:extLst>
-          </p:cNvPr>
-          <p:cNvPicPr>
-            <a:picLocks noChangeAspect="1"/>
-          </p:cNvPicPr>
-          <p:nvPr/>
-        </p:nvPicPr>
-        <p:blipFill>
-          <a:blip r:embed="rId3"/>
-          <a:stretch>
-            <a:fillRect/>
-          </a:stretch>
-        </p:blipFill>
-        <p:spPr>
-          <a:xfrm>
-            <a:off x="3038494" y="3756230"/>
-            <a:ext cx="8921565" cy="2581366"/>
-          </a:xfrm>
-          <a:prstGeom prst="rect">
-            <a:avLst/>
-          </a:prstGeom>
-        </p:spPr>
-      </p:pic>
-    </p:spTree>
-    <p:extLst>
-      <p:ext uri="{BB962C8B-B14F-4D97-AF65-F5344CB8AC3E}">
-        <p14:creationId xmlns:p14="http://schemas.microsoft.com/office/powerpoint/2010/main" val="3460468714"/>
-      </p:ext>
-    </p:extLst>
-  </p:cSld>
-  <p:clrMapOvr>
-    <a:masterClrMapping/>
-  </p:clrMapOvr>
-</p:sld>
-</file>
-
-<file path=ppt/slides/slide30.xml><?xml version="1.0" encoding="utf-8"?>
+<file path=ppt/slides/slide31.xml><?xml version="1.0" encoding="utf-8"?>
 <p:sld xmlns:a="http://schemas.openxmlformats.org/drawingml/2006/main" xmlns:r="http://schemas.openxmlformats.org/officeDocument/2006/relationships" xmlns:p="http://schemas.openxmlformats.org/presentationml/2006/main">
   <p:cSld>
     <p:spTree>
@@ -14372,7 +14747,7 @@
 </p:sld>
 </file>
 
-<file path=ppt/slides/slide31.xml><?xml version="1.0" encoding="utf-8"?>
+<file path=ppt/slides/slide32.xml><?xml version="1.0" encoding="utf-8"?>
 <p:sld xmlns:a="http://schemas.openxmlformats.org/drawingml/2006/main" xmlns:r="http://schemas.openxmlformats.org/officeDocument/2006/relationships" xmlns:p="http://schemas.openxmlformats.org/presentationml/2006/main">
   <p:cSld>
     <p:spTree>

</xml_diff>

<commit_message>
Critical Failure V.0.7.2 pt 3
</commit_message>
<xml_diff>
--- a/Logs/Development Log and Alpha Testing.pptx
+++ b/Logs/Development Log and Alpha Testing.pptx
@@ -30,13 +30,15 @@
     <p:sldId id="285" r:id="rId24"/>
     <p:sldId id="286" r:id="rId25"/>
     <p:sldId id="287" r:id="rId26"/>
-    <p:sldId id="257" r:id="rId27"/>
-    <p:sldId id="267" r:id="rId28"/>
-    <p:sldId id="270" r:id="rId29"/>
-    <p:sldId id="272" r:id="rId30"/>
-    <p:sldId id="276" r:id="rId31"/>
-    <p:sldId id="278" r:id="rId32"/>
-    <p:sldId id="284" r:id="rId33"/>
+    <p:sldId id="288" r:id="rId27"/>
+    <p:sldId id="257" r:id="rId28"/>
+    <p:sldId id="267" r:id="rId29"/>
+    <p:sldId id="270" r:id="rId30"/>
+    <p:sldId id="272" r:id="rId31"/>
+    <p:sldId id="276" r:id="rId32"/>
+    <p:sldId id="278" r:id="rId33"/>
+    <p:sldId id="284" r:id="rId34"/>
+    <p:sldId id="289" r:id="rId35"/>
   </p:sldIdLst>
   <p:sldSz cx="12192000" cy="6858000"/>
   <p:notesSz cx="6858000" cy="9144000"/>
@@ -310,7 +312,7 @@
           <a:p>
             <a:fld id="{846CE7D5-CF57-46EF-B807-FDD0502418D4}" type="datetimeFigureOut">
               <a:rPr lang="en-GB" smtClean="0"/>
-              <a:t>29/01/2026</a:t>
+              <a:t>30/01/2026</a:t>
             </a:fld>
             <a:endParaRPr lang="en-GB"/>
           </a:p>
@@ -480,7 +482,7 @@
           <a:p>
             <a:fld id="{846CE7D5-CF57-46EF-B807-FDD0502418D4}" type="datetimeFigureOut">
               <a:rPr lang="en-GB" smtClean="0"/>
-              <a:t>29/01/2026</a:t>
+              <a:t>30/01/2026</a:t>
             </a:fld>
             <a:endParaRPr lang="en-GB"/>
           </a:p>
@@ -660,7 +662,7 @@
           <a:p>
             <a:fld id="{846CE7D5-CF57-46EF-B807-FDD0502418D4}" type="datetimeFigureOut">
               <a:rPr lang="en-GB" smtClean="0"/>
-              <a:t>29/01/2026</a:t>
+              <a:t>30/01/2026</a:t>
             </a:fld>
             <a:endParaRPr lang="en-GB"/>
           </a:p>
@@ -830,7 +832,7 @@
           <a:p>
             <a:fld id="{846CE7D5-CF57-46EF-B807-FDD0502418D4}" type="datetimeFigureOut">
               <a:rPr lang="en-GB" smtClean="0"/>
-              <a:t>29/01/2026</a:t>
+              <a:t>30/01/2026</a:t>
             </a:fld>
             <a:endParaRPr lang="en-GB"/>
           </a:p>
@@ -1076,7 +1078,7 @@
           <a:p>
             <a:fld id="{846CE7D5-CF57-46EF-B807-FDD0502418D4}" type="datetimeFigureOut">
               <a:rPr lang="en-GB" smtClean="0"/>
-              <a:t>29/01/2026</a:t>
+              <a:t>30/01/2026</a:t>
             </a:fld>
             <a:endParaRPr lang="en-GB"/>
           </a:p>
@@ -1308,7 +1310,7 @@
           <a:p>
             <a:fld id="{846CE7D5-CF57-46EF-B807-FDD0502418D4}" type="datetimeFigureOut">
               <a:rPr lang="en-GB" smtClean="0"/>
-              <a:t>29/01/2026</a:t>
+              <a:t>30/01/2026</a:t>
             </a:fld>
             <a:endParaRPr lang="en-GB"/>
           </a:p>
@@ -1675,7 +1677,7 @@
           <a:p>
             <a:fld id="{846CE7D5-CF57-46EF-B807-FDD0502418D4}" type="datetimeFigureOut">
               <a:rPr lang="en-GB" smtClean="0"/>
-              <a:t>29/01/2026</a:t>
+              <a:t>30/01/2026</a:t>
             </a:fld>
             <a:endParaRPr lang="en-GB"/>
           </a:p>
@@ -1793,7 +1795,7 @@
           <a:p>
             <a:fld id="{846CE7D5-CF57-46EF-B807-FDD0502418D4}" type="datetimeFigureOut">
               <a:rPr lang="en-GB" smtClean="0"/>
-              <a:t>29/01/2026</a:t>
+              <a:t>30/01/2026</a:t>
             </a:fld>
             <a:endParaRPr lang="en-GB"/>
           </a:p>
@@ -1888,7 +1890,7 @@
           <a:p>
             <a:fld id="{846CE7D5-CF57-46EF-B807-FDD0502418D4}" type="datetimeFigureOut">
               <a:rPr lang="en-GB" smtClean="0"/>
-              <a:t>29/01/2026</a:t>
+              <a:t>30/01/2026</a:t>
             </a:fld>
             <a:endParaRPr lang="en-GB"/>
           </a:p>
@@ -2165,7 +2167,7 @@
           <a:p>
             <a:fld id="{846CE7D5-CF57-46EF-B807-FDD0502418D4}" type="datetimeFigureOut">
               <a:rPr lang="en-GB" smtClean="0"/>
-              <a:t>29/01/2026</a:t>
+              <a:t>30/01/2026</a:t>
             </a:fld>
             <a:endParaRPr lang="en-GB"/>
           </a:p>
@@ -2422,7 +2424,7 @@
           <a:p>
             <a:fld id="{846CE7D5-CF57-46EF-B807-FDD0502418D4}" type="datetimeFigureOut">
               <a:rPr lang="en-GB" smtClean="0"/>
-              <a:t>29/01/2026</a:t>
+              <a:t>30/01/2026</a:t>
             </a:fld>
             <a:endParaRPr lang="en-GB"/>
           </a:p>
@@ -2635,7 +2637,7 @@
           <a:p>
             <a:fld id="{846CE7D5-CF57-46EF-B807-FDD0502418D4}" type="datetimeFigureOut">
               <a:rPr lang="en-GB" smtClean="0"/>
-              <a:t>29/01/2026</a:t>
+              <a:t>30/01/2026</a:t>
             </a:fld>
             <a:endParaRPr lang="en-GB"/>
           </a:p>
@@ -10697,6 +10699,285 @@
   <p:cSld>
     <p:spTree>
       <p:nvGrpSpPr>
+        <p:cNvPr id="1" name="">
+          <a:extLst>
+            <a:ext uri="{FF2B5EF4-FFF2-40B4-BE49-F238E27FC236}">
+              <a16:creationId xmlns:a16="http://schemas.microsoft.com/office/drawing/2014/main" id="{1964A59C-A830-8604-FCEE-F5252D38F9E1}"/>
+            </a:ext>
+          </a:extLst>
+        </p:cNvPr>
+        <p:cNvGrpSpPr/>
+        <p:nvPr/>
+      </p:nvGrpSpPr>
+      <p:grpSpPr>
+        <a:xfrm>
+          <a:off x="0" y="0"/>
+          <a:ext cx="0" cy="0"/>
+          <a:chOff x="0" y="0"/>
+          <a:chExt cx="0" cy="0"/>
+        </a:xfrm>
+      </p:grpSpPr>
+      <p:sp>
+        <p:nvSpPr>
+          <p:cNvPr id="4" name="TextBox 3">
+            <a:extLst>
+              <a:ext uri="{FF2B5EF4-FFF2-40B4-BE49-F238E27FC236}">
+                <a16:creationId xmlns:a16="http://schemas.microsoft.com/office/drawing/2014/main" id="{FB338D4A-55EF-DFF3-7166-23A778A7C0D6}"/>
+              </a:ext>
+            </a:extLst>
+          </p:cNvPr>
+          <p:cNvSpPr txBox="1"/>
+          <p:nvPr/>
+        </p:nvSpPr>
+        <p:spPr>
+          <a:xfrm>
+            <a:off x="7894620" y="121250"/>
+            <a:ext cx="2269916" cy="338554"/>
+          </a:xfrm>
+          <a:prstGeom prst="rect">
+            <a:avLst/>
+          </a:prstGeom>
+          <a:noFill/>
+          <a:ln>
+            <a:solidFill>
+              <a:schemeClr val="tx1"/>
+            </a:solidFill>
+          </a:ln>
+        </p:spPr>
+        <p:txBody>
+          <a:bodyPr rot="0" spcFirstLastPara="0" vertOverflow="overflow" horzOverflow="overflow" vert="horz" wrap="square" lIns="91440" tIns="45720" rIns="91440" bIns="45720" numCol="1" spcCol="0" rtlCol="0" fromWordArt="0" anchor="t" anchorCtr="0" forceAA="0" compatLnSpc="1">
+            <a:prstTxWarp prst="textNoShape">
+              <a:avLst/>
+            </a:prstTxWarp>
+            <a:spAutoFit/>
+          </a:bodyPr>
+          <a:lstStyle/>
+          <a:p>
+            <a:r>
+              <a:rPr lang="en-GB" sz="1600" dirty="0"/>
+              <a:t>Date – 30/01/2026</a:t>
+            </a:r>
+          </a:p>
+        </p:txBody>
+      </p:sp>
+      <p:sp>
+        <p:nvSpPr>
+          <p:cNvPr id="2" name="TextBox 1">
+            <a:extLst>
+              <a:ext uri="{FF2B5EF4-FFF2-40B4-BE49-F238E27FC236}">
+                <a16:creationId xmlns:a16="http://schemas.microsoft.com/office/drawing/2014/main" id="{21128225-20AA-F6B7-3FEB-4DEC1E8A6E68}"/>
+              </a:ext>
+            </a:extLst>
+          </p:cNvPr>
+          <p:cNvSpPr txBox="1"/>
+          <p:nvPr/>
+        </p:nvSpPr>
+        <p:spPr>
+          <a:xfrm>
+            <a:off x="5651845" y="121250"/>
+            <a:ext cx="2112147" cy="338554"/>
+          </a:xfrm>
+          <a:prstGeom prst="rect">
+            <a:avLst/>
+          </a:prstGeom>
+          <a:noFill/>
+          <a:ln>
+            <a:solidFill>
+              <a:schemeClr val="tx1"/>
+            </a:solidFill>
+          </a:ln>
+        </p:spPr>
+        <p:txBody>
+          <a:bodyPr rot="0" spcFirstLastPara="0" vertOverflow="overflow" horzOverflow="overflow" vert="horz" wrap="square" lIns="91440" tIns="45720" rIns="91440" bIns="45720" numCol="1" spcCol="0" rtlCol="0" fromWordArt="0" anchor="t" anchorCtr="0" forceAA="0" compatLnSpc="1">
+            <a:prstTxWarp prst="textNoShape">
+              <a:avLst/>
+            </a:prstTxWarp>
+            <a:spAutoFit/>
+          </a:bodyPr>
+          <a:lstStyle/>
+          <a:p>
+            <a:r>
+              <a:rPr lang="en-GB" sz="1600" dirty="0"/>
+              <a:t>Game Build V.0.7.2</a:t>
+            </a:r>
+          </a:p>
+        </p:txBody>
+      </p:sp>
+      <p:sp>
+        <p:nvSpPr>
+          <p:cNvPr id="3" name="TextBox 2">
+            <a:extLst>
+              <a:ext uri="{FF2B5EF4-FFF2-40B4-BE49-F238E27FC236}">
+                <a16:creationId xmlns:a16="http://schemas.microsoft.com/office/drawing/2014/main" id="{4CC9AE2D-BE2D-4E45-7F1B-DF6BE48BEF73}"/>
+              </a:ext>
+            </a:extLst>
+          </p:cNvPr>
+          <p:cNvSpPr txBox="1"/>
+          <p:nvPr/>
+        </p:nvSpPr>
+        <p:spPr>
+          <a:xfrm>
+            <a:off x="0" y="121250"/>
+            <a:ext cx="5576207" cy="3970318"/>
+          </a:xfrm>
+          <a:prstGeom prst="rect">
+            <a:avLst/>
+          </a:prstGeom>
+          <a:noFill/>
+          <a:ln>
+            <a:solidFill>
+              <a:schemeClr val="tx1"/>
+            </a:solidFill>
+          </a:ln>
+        </p:spPr>
+        <p:txBody>
+          <a:bodyPr rot="0" spcFirstLastPara="0" vertOverflow="overflow" horzOverflow="overflow" vert="horz" wrap="square" lIns="91440" tIns="45720" rIns="91440" bIns="45720" numCol="1" spcCol="0" rtlCol="0" fromWordArt="0" anchor="t" anchorCtr="0" forceAA="0" compatLnSpc="1">
+            <a:prstTxWarp prst="textNoShape">
+              <a:avLst/>
+            </a:prstTxWarp>
+            <a:spAutoFit/>
+          </a:bodyPr>
+          <a:lstStyle/>
+          <a:p>
+            <a:r>
+              <a:rPr lang="en-GB" sz="1200" dirty="0"/>
+              <a:t>This part is the next big step In completing all the code for my game and refining it to full functionality.</a:t>
+            </a:r>
+          </a:p>
+          <a:p>
+            <a:endParaRPr lang="en-GB" sz="1200" dirty="0"/>
+          </a:p>
+          <a:p>
+            <a:r>
+              <a:rPr lang="en-GB" sz="1200" dirty="0"/>
+              <a:t>This session, I implemented Bulkers long waiting time at door to the Prototype.</a:t>
+            </a:r>
+          </a:p>
+          <a:p>
+            <a:endParaRPr lang="en-GB" sz="1200" dirty="0"/>
+          </a:p>
+          <a:p>
+            <a:r>
+              <a:rPr lang="en-GB" sz="1200" dirty="0"/>
+              <a:t>The Game will Run at 60fps. Doing this allows me to get the correct amount of time in seconds or minutes in game by using the equation (frames = minutes × 60 × </a:t>
+            </a:r>
+            <a:r>
+              <a:rPr lang="en-GB" sz="1200" dirty="0" err="1"/>
+              <a:t>room_speed</a:t>
+            </a:r>
+            <a:r>
+              <a:rPr lang="en-GB" sz="1200" dirty="0"/>
+              <a:t>). This will allow me to properly adjust the timers used by objects in each level. </a:t>
+            </a:r>
+          </a:p>
+          <a:p>
+            <a:endParaRPr lang="en-GB" sz="1200" dirty="0"/>
+          </a:p>
+          <a:p>
+            <a:r>
+              <a:rPr lang="en-GB" sz="1200" dirty="0"/>
+              <a:t>I have also implemented a Pause screen during the levels, just in case the player wishes to go back to main menu or take a break.</a:t>
+            </a:r>
+          </a:p>
+          <a:p>
+            <a:endParaRPr lang="en-GB" sz="1200" dirty="0"/>
+          </a:p>
+          <a:p>
+            <a:r>
+              <a:rPr lang="en-GB" sz="1200" dirty="0"/>
+              <a:t>Narratively, the game would take the main character 12 hours to survive until 12pm. However, that time doesn’t translate well in terms of gameplay. So the level will be 7 minutes and 30 seconds long and the </a:t>
+            </a:r>
+            <a:r>
+              <a:rPr lang="en-GB" sz="1200" dirty="0" err="1"/>
+              <a:t>level_timer</a:t>
+            </a:r>
+            <a:r>
+              <a:rPr lang="en-GB" sz="1200" dirty="0"/>
+              <a:t> will change its sprite based off what stage the timer is at. So the level using the equation is frames for 10minutes of gameplay per level. 25,200</a:t>
+            </a:r>
+          </a:p>
+          <a:p>
+            <a:endParaRPr lang="en-GB" sz="1200" dirty="0"/>
+          </a:p>
+          <a:p>
+            <a:r>
+              <a:rPr lang="en-GB" sz="1200" dirty="0"/>
+              <a:t>I’ve also added new rooms for the levels for when the player completes a night that has a transition into the next room.</a:t>
+            </a:r>
+          </a:p>
+        </p:txBody>
+      </p:sp>
+      <p:sp>
+        <p:nvSpPr>
+          <p:cNvPr id="12" name="TextBox 11">
+            <a:extLst>
+              <a:ext uri="{FF2B5EF4-FFF2-40B4-BE49-F238E27FC236}">
+                <a16:creationId xmlns:a16="http://schemas.microsoft.com/office/drawing/2014/main" id="{030308C4-355A-2456-55F1-B1A59C3FFB3C}"/>
+              </a:ext>
+            </a:extLst>
+          </p:cNvPr>
+          <p:cNvSpPr txBox="1"/>
+          <p:nvPr/>
+        </p:nvSpPr>
+        <p:spPr>
+          <a:xfrm>
+            <a:off x="8555487" y="722845"/>
+            <a:ext cx="2073729" cy="1600438"/>
+          </a:xfrm>
+          <a:prstGeom prst="rect">
+            <a:avLst/>
+          </a:prstGeom>
+          <a:noFill/>
+        </p:spPr>
+        <p:txBody>
+          <a:bodyPr wrap="square" rtlCol="0">
+            <a:spAutoFit/>
+          </a:bodyPr>
+          <a:lstStyle/>
+          <a:p>
+            <a:r>
+              <a:rPr lang="en-GB" sz="1400" dirty="0"/>
+              <a:t>What to Do next session</a:t>
+            </a:r>
+          </a:p>
+          <a:p>
+            <a:endParaRPr lang="en-GB" sz="1400" dirty="0"/>
+          </a:p>
+          <a:p>
+            <a:endParaRPr lang="en-GB" sz="1400" dirty="0"/>
+          </a:p>
+          <a:p>
+            <a:endParaRPr lang="en-GB" sz="1400" dirty="0"/>
+          </a:p>
+          <a:p>
+            <a:endParaRPr lang="en-GB" sz="1400" dirty="0"/>
+          </a:p>
+          <a:p>
+            <a:endParaRPr lang="en-GB" sz="1400" dirty="0"/>
+          </a:p>
+          <a:p>
+            <a:endParaRPr lang="en-GB" sz="1400" dirty="0"/>
+          </a:p>
+        </p:txBody>
+      </p:sp>
+    </p:spTree>
+    <p:extLst>
+      <p:ext uri="{BB962C8B-B14F-4D97-AF65-F5344CB8AC3E}">
+        <p14:creationId xmlns:p14="http://schemas.microsoft.com/office/powerpoint/2010/main" val="3428172884"/>
+      </p:ext>
+    </p:extLst>
+  </p:cSld>
+  <p:clrMapOvr>
+    <a:masterClrMapping/>
+  </p:clrMapOvr>
+</p:sld>
+</file>
+
+<file path=ppt/slides/slide27.xml><?xml version="1.0" encoding="utf-8"?>
+<p:sld xmlns:a="http://schemas.openxmlformats.org/drawingml/2006/main" xmlns:r="http://schemas.openxmlformats.org/officeDocument/2006/relationships" xmlns:p="http://schemas.openxmlformats.org/presentationml/2006/main">
+  <p:cSld>
+    <p:spTree>
+      <p:nvGrpSpPr>
         <p:cNvPr id="1" name=""/>
         <p:cNvGrpSpPr/>
         <p:nvPr/>
@@ -11505,7 +11786,7 @@
 </p:sld>
 </file>
 
-<file path=ppt/slides/slide27.xml><?xml version="1.0" encoding="utf-8"?>
+<file path=ppt/slides/slide28.xml><?xml version="1.0" encoding="utf-8"?>
 <p:sld xmlns:a="http://schemas.openxmlformats.org/drawingml/2006/main" xmlns:r="http://schemas.openxmlformats.org/officeDocument/2006/relationships" xmlns:p="http://schemas.openxmlformats.org/presentationml/2006/main">
   <p:cSld>
     <p:spTree>
@@ -12096,7 +12377,7 @@
 </p:sld>
 </file>
 
-<file path=ppt/slides/slide28.xml><?xml version="1.0" encoding="utf-8"?>
+<file path=ppt/slides/slide29.xml><?xml version="1.0" encoding="utf-8"?>
 <p:sld xmlns:a="http://schemas.openxmlformats.org/drawingml/2006/main" xmlns:r="http://schemas.openxmlformats.org/officeDocument/2006/relationships" xmlns:p="http://schemas.openxmlformats.org/presentationml/2006/main">
   <p:cSld>
     <p:spTree>
@@ -12620,7 +12901,363 @@
 </p:sld>
 </file>
 
-<file path=ppt/slides/slide29.xml><?xml version="1.0" encoding="utf-8"?>
+<file path=ppt/slides/slide3.xml><?xml version="1.0" encoding="utf-8"?>
+<p:sld xmlns:a="http://schemas.openxmlformats.org/drawingml/2006/main" xmlns:r="http://schemas.openxmlformats.org/officeDocument/2006/relationships" xmlns:p="http://schemas.openxmlformats.org/presentationml/2006/main">
+  <p:cSld>
+    <p:spTree>
+      <p:nvGrpSpPr>
+        <p:cNvPr id="1" name="">
+          <a:extLst>
+            <a:ext uri="{FF2B5EF4-FFF2-40B4-BE49-F238E27FC236}">
+              <a16:creationId xmlns:a16="http://schemas.microsoft.com/office/drawing/2014/main" id="{B71AF447-2503-6E06-EB64-6A29C299795D}"/>
+            </a:ext>
+          </a:extLst>
+        </p:cNvPr>
+        <p:cNvGrpSpPr/>
+        <p:nvPr/>
+      </p:nvGrpSpPr>
+      <p:grpSpPr>
+        <a:xfrm>
+          <a:off x="0" y="0"/>
+          <a:ext cx="0" cy="0"/>
+          <a:chOff x="0" y="0"/>
+          <a:chExt cx="0" cy="0"/>
+        </a:xfrm>
+      </p:grpSpPr>
+      <p:sp>
+        <p:nvSpPr>
+          <p:cNvPr id="4" name="TextBox 3">
+            <a:extLst>
+              <a:ext uri="{FF2B5EF4-FFF2-40B4-BE49-F238E27FC236}">
+                <a16:creationId xmlns:a16="http://schemas.microsoft.com/office/drawing/2014/main" id="{3ABD7D05-D183-64C6-1BA1-72453612143E}"/>
+              </a:ext>
+            </a:extLst>
+          </p:cNvPr>
+          <p:cNvSpPr txBox="1"/>
+          <p:nvPr/>
+        </p:nvSpPr>
+        <p:spPr>
+          <a:xfrm>
+            <a:off x="7763992" y="90121"/>
+            <a:ext cx="1809641" cy="338554"/>
+          </a:xfrm>
+          <a:prstGeom prst="rect">
+            <a:avLst/>
+          </a:prstGeom>
+          <a:noFill/>
+          <a:ln>
+            <a:solidFill>
+              <a:schemeClr val="tx1"/>
+            </a:solidFill>
+          </a:ln>
+        </p:spPr>
+        <p:txBody>
+          <a:bodyPr rot="0" spcFirstLastPara="0" vertOverflow="overflow" horzOverflow="overflow" vert="horz" wrap="square" lIns="91440" tIns="45720" rIns="91440" bIns="45720" numCol="1" spcCol="0" rtlCol="0" fromWordArt="0" anchor="t" anchorCtr="0" forceAA="0" compatLnSpc="1">
+            <a:prstTxWarp prst="textNoShape">
+              <a:avLst/>
+            </a:prstTxWarp>
+            <a:spAutoFit/>
+          </a:bodyPr>
+          <a:lstStyle/>
+          <a:p>
+            <a:r>
+              <a:rPr lang="en-GB" sz="1600" dirty="0"/>
+              <a:t>Date – 24/11/2025</a:t>
+            </a:r>
+          </a:p>
+        </p:txBody>
+      </p:sp>
+      <p:sp>
+        <p:nvSpPr>
+          <p:cNvPr id="2" name="TextBox 1">
+            <a:extLst>
+              <a:ext uri="{FF2B5EF4-FFF2-40B4-BE49-F238E27FC236}">
+                <a16:creationId xmlns:a16="http://schemas.microsoft.com/office/drawing/2014/main" id="{3E37F77A-82C0-2039-AD51-40366B52EBEB}"/>
+              </a:ext>
+            </a:extLst>
+          </p:cNvPr>
+          <p:cNvSpPr txBox="1"/>
+          <p:nvPr/>
+        </p:nvSpPr>
+        <p:spPr>
+          <a:xfrm>
+            <a:off x="5651845" y="90120"/>
+            <a:ext cx="1959856" cy="338554"/>
+          </a:xfrm>
+          <a:prstGeom prst="rect">
+            <a:avLst/>
+          </a:prstGeom>
+          <a:noFill/>
+          <a:ln>
+            <a:solidFill>
+              <a:schemeClr val="tx1"/>
+            </a:solidFill>
+          </a:ln>
+        </p:spPr>
+        <p:txBody>
+          <a:bodyPr rot="0" spcFirstLastPara="0" vertOverflow="overflow" horzOverflow="overflow" vert="horz" wrap="square" lIns="91440" tIns="45720" rIns="91440" bIns="45720" numCol="1" spcCol="0" rtlCol="0" fromWordArt="0" anchor="t" anchorCtr="0" forceAA="0" compatLnSpc="1">
+            <a:prstTxWarp prst="textNoShape">
+              <a:avLst/>
+            </a:prstTxWarp>
+            <a:spAutoFit/>
+          </a:bodyPr>
+          <a:lstStyle/>
+          <a:p>
+            <a:r>
+              <a:rPr lang="en-GB" sz="1600" dirty="0"/>
+              <a:t>Game Build V.0.1</a:t>
+            </a:r>
+          </a:p>
+        </p:txBody>
+      </p:sp>
+      <p:sp>
+        <p:nvSpPr>
+          <p:cNvPr id="3" name="TextBox 2">
+            <a:extLst>
+              <a:ext uri="{FF2B5EF4-FFF2-40B4-BE49-F238E27FC236}">
+                <a16:creationId xmlns:a16="http://schemas.microsoft.com/office/drawing/2014/main" id="{2886F3E7-61E5-445C-5038-15B1F86B5A87}"/>
+              </a:ext>
+            </a:extLst>
+          </p:cNvPr>
+          <p:cNvSpPr txBox="1"/>
+          <p:nvPr/>
+        </p:nvSpPr>
+        <p:spPr>
+          <a:xfrm>
+            <a:off x="5642854" y="578678"/>
+            <a:ext cx="3926490" cy="3354765"/>
+          </a:xfrm>
+          <a:prstGeom prst="rect">
+            <a:avLst/>
+          </a:prstGeom>
+          <a:noFill/>
+          <a:ln>
+            <a:solidFill>
+              <a:schemeClr val="tx1"/>
+            </a:solidFill>
+          </a:ln>
+        </p:spPr>
+        <p:txBody>
+          <a:bodyPr rot="0" spcFirstLastPara="0" vertOverflow="overflow" horzOverflow="overflow" vert="horz" wrap="square" lIns="91440" tIns="45720" rIns="91440" bIns="45720" numCol="1" spcCol="0" rtlCol="0" fromWordArt="0" anchor="t" anchorCtr="0" forceAA="0" compatLnSpc="1">
+            <a:prstTxWarp prst="textNoShape">
+              <a:avLst/>
+            </a:prstTxWarp>
+            <a:spAutoFit/>
+          </a:bodyPr>
+          <a:lstStyle/>
+          <a:p>
+            <a:r>
+              <a:rPr lang="en-GB" sz="1400" dirty="0"/>
+              <a:t>Summary Of Session</a:t>
+            </a:r>
+          </a:p>
+          <a:p>
+            <a:endParaRPr lang="en-GB" sz="1400" dirty="0"/>
+          </a:p>
+          <a:p>
+            <a:r>
+              <a:rPr lang="en-GB" sz="1400" dirty="0"/>
+              <a:t>I used View port feature on game maker to have the main camera be focused on the office.</a:t>
+            </a:r>
+          </a:p>
+          <a:p>
+            <a:endParaRPr lang="en-GB" sz="1400" dirty="0"/>
+          </a:p>
+          <a:p>
+            <a:r>
+              <a:rPr lang="en-GB" sz="1400" dirty="0"/>
+              <a:t>The code below is the camera, that when I put in camera_apply or shift view onto a button Object it will change OBJ_Camera’s position within the room. It is not done yet but is a massive leap in completing one of my most advanced mechanics.</a:t>
+            </a:r>
+          </a:p>
+          <a:p>
+            <a:endParaRPr lang="en-GB" sz="1400" dirty="0"/>
+          </a:p>
+          <a:p>
+            <a:endParaRPr lang="en-GB" sz="1400" dirty="0"/>
+          </a:p>
+          <a:p>
+            <a:endParaRPr lang="en-GB" sz="1400" dirty="0"/>
+          </a:p>
+          <a:p>
+            <a:endParaRPr lang="en-GB" sz="1600" dirty="0"/>
+          </a:p>
+        </p:txBody>
+      </p:sp>
+      <p:sp>
+        <p:nvSpPr>
+          <p:cNvPr id="6" name="TextBox 5">
+            <a:extLst>
+              <a:ext uri="{FF2B5EF4-FFF2-40B4-BE49-F238E27FC236}">
+                <a16:creationId xmlns:a16="http://schemas.microsoft.com/office/drawing/2014/main" id="{6C671371-B8F1-97C1-D2C5-BD2850E814D7}"/>
+              </a:ext>
+            </a:extLst>
+          </p:cNvPr>
+          <p:cNvSpPr txBox="1"/>
+          <p:nvPr/>
+        </p:nvSpPr>
+        <p:spPr>
+          <a:xfrm>
+            <a:off x="9642445" y="54237"/>
+            <a:ext cx="2438400" cy="1569660"/>
+          </a:xfrm>
+          <a:prstGeom prst="rect">
+            <a:avLst/>
+          </a:prstGeom>
+          <a:noFill/>
+          <a:ln>
+            <a:solidFill>
+              <a:schemeClr val="tx1"/>
+            </a:solidFill>
+          </a:ln>
+        </p:spPr>
+        <p:txBody>
+          <a:bodyPr rot="0" spcFirstLastPara="0" vertOverflow="overflow" horzOverflow="overflow" vert="horz" wrap="square" lIns="91440" tIns="45720" rIns="91440" bIns="45720" numCol="1" spcCol="0" rtlCol="0" fromWordArt="0" anchor="t" anchorCtr="0" forceAA="0" compatLnSpc="1">
+            <a:prstTxWarp prst="textNoShape">
+              <a:avLst/>
+            </a:prstTxWarp>
+            <a:spAutoFit/>
+          </a:bodyPr>
+          <a:lstStyle/>
+          <a:p>
+            <a:r>
+              <a:rPr lang="en-GB" sz="1200" dirty="0"/>
+              <a:t>What to do for Next Session</a:t>
+            </a:r>
+          </a:p>
+          <a:p>
+            <a:endParaRPr lang="en-GB" sz="1200" dirty="0"/>
+          </a:p>
+          <a:p>
+            <a:r>
+              <a:rPr lang="en-GB" sz="1200" dirty="0"/>
+              <a:t>Continue working on sprites and setting the game up ready for all the coding, so adding in all the assets/files.</a:t>
+            </a:r>
+          </a:p>
+          <a:p>
+            <a:endParaRPr lang="en-GB" sz="1200" dirty="0"/>
+          </a:p>
+          <a:p>
+            <a:endParaRPr lang="en-GB" sz="1200" dirty="0"/>
+          </a:p>
+        </p:txBody>
+      </p:sp>
+      <p:pic>
+        <p:nvPicPr>
+          <p:cNvPr id="27" name="Picture 26">
+            <a:extLst>
+              <a:ext uri="{FF2B5EF4-FFF2-40B4-BE49-F238E27FC236}">
+                <a16:creationId xmlns:a16="http://schemas.microsoft.com/office/drawing/2014/main" id="{F677CB03-D1DC-CB3F-CAE0-F8B146FE754F}"/>
+              </a:ext>
+            </a:extLst>
+          </p:cNvPr>
+          <p:cNvPicPr>
+            <a:picLocks noChangeAspect="1"/>
+          </p:cNvPicPr>
+          <p:nvPr/>
+        </p:nvPicPr>
+        <p:blipFill>
+          <a:blip r:embed="rId2"/>
+          <a:stretch>
+            <a:fillRect/>
+          </a:stretch>
+        </p:blipFill>
+        <p:spPr>
+          <a:xfrm>
+            <a:off x="231941" y="754545"/>
+            <a:ext cx="2512691" cy="5638018"/>
+          </a:xfrm>
+          <a:prstGeom prst="rect">
+            <a:avLst/>
+          </a:prstGeom>
+        </p:spPr>
+      </p:pic>
+      <p:sp>
+        <p:nvSpPr>
+          <p:cNvPr id="5" name="TextBox 4">
+            <a:extLst>
+              <a:ext uri="{FF2B5EF4-FFF2-40B4-BE49-F238E27FC236}">
+                <a16:creationId xmlns:a16="http://schemas.microsoft.com/office/drawing/2014/main" id="{3C6B70CF-F758-8FF9-4535-1E2605546C2E}"/>
+              </a:ext>
+            </a:extLst>
+          </p:cNvPr>
+          <p:cNvSpPr txBox="1"/>
+          <p:nvPr/>
+        </p:nvSpPr>
+        <p:spPr>
+          <a:xfrm>
+            <a:off x="0" y="54237"/>
+            <a:ext cx="1959856" cy="584775"/>
+          </a:xfrm>
+          <a:prstGeom prst="rect">
+            <a:avLst/>
+          </a:prstGeom>
+          <a:noFill/>
+          <a:ln>
+            <a:solidFill>
+              <a:schemeClr val="tx1"/>
+            </a:solidFill>
+          </a:ln>
+        </p:spPr>
+        <p:txBody>
+          <a:bodyPr rot="0" spcFirstLastPara="0" vertOverflow="overflow" horzOverflow="overflow" vert="horz" wrap="square" lIns="91440" tIns="45720" rIns="91440" bIns="45720" numCol="1" spcCol="0" rtlCol="0" fromWordArt="0" anchor="t" anchorCtr="0" forceAA="0" compatLnSpc="1">
+            <a:prstTxWarp prst="textNoShape">
+              <a:avLst/>
+            </a:prstTxWarp>
+            <a:spAutoFit/>
+          </a:bodyPr>
+          <a:lstStyle/>
+          <a:p>
+            <a:r>
+              <a:rPr lang="en-GB" sz="1600" dirty="0"/>
+              <a:t>Continuation of previous slide.</a:t>
+            </a:r>
+          </a:p>
+        </p:txBody>
+      </p:sp>
+      <p:pic>
+        <p:nvPicPr>
+          <p:cNvPr id="11" name="Picture 10">
+            <a:extLst>
+              <a:ext uri="{FF2B5EF4-FFF2-40B4-BE49-F238E27FC236}">
+                <a16:creationId xmlns:a16="http://schemas.microsoft.com/office/drawing/2014/main" id="{10266355-A36C-5972-ED51-B27E7586F80B}"/>
+              </a:ext>
+            </a:extLst>
+          </p:cNvPr>
+          <p:cNvPicPr>
+            <a:picLocks noChangeAspect="1"/>
+          </p:cNvPicPr>
+          <p:nvPr/>
+        </p:nvPicPr>
+        <p:blipFill>
+          <a:blip r:embed="rId3"/>
+          <a:stretch>
+            <a:fillRect/>
+          </a:stretch>
+        </p:blipFill>
+        <p:spPr>
+          <a:xfrm>
+            <a:off x="3038494" y="3756230"/>
+            <a:ext cx="8921565" cy="2581366"/>
+          </a:xfrm>
+          <a:prstGeom prst="rect">
+            <a:avLst/>
+          </a:prstGeom>
+        </p:spPr>
+      </p:pic>
+    </p:spTree>
+    <p:extLst>
+      <p:ext uri="{BB962C8B-B14F-4D97-AF65-F5344CB8AC3E}">
+        <p14:creationId xmlns:p14="http://schemas.microsoft.com/office/powerpoint/2010/main" val="3460468714"/>
+      </p:ext>
+    </p:extLst>
+  </p:cSld>
+  <p:clrMapOvr>
+    <a:masterClrMapping/>
+  </p:clrMapOvr>
+</p:sld>
+</file>
+
+<file path=ppt/slides/slide30.xml><?xml version="1.0" encoding="utf-8"?>
 <p:sld xmlns:a="http://schemas.openxmlformats.org/drawingml/2006/main" xmlns:r="http://schemas.openxmlformats.org/officeDocument/2006/relationships" xmlns:p="http://schemas.openxmlformats.org/presentationml/2006/main">
   <p:cSld>
     <p:spTree>
@@ -13194,363 +13831,7 @@
 </p:sld>
 </file>
 
-<file path=ppt/slides/slide3.xml><?xml version="1.0" encoding="utf-8"?>
-<p:sld xmlns:a="http://schemas.openxmlformats.org/drawingml/2006/main" xmlns:r="http://schemas.openxmlformats.org/officeDocument/2006/relationships" xmlns:p="http://schemas.openxmlformats.org/presentationml/2006/main">
-  <p:cSld>
-    <p:spTree>
-      <p:nvGrpSpPr>
-        <p:cNvPr id="1" name="">
-          <a:extLst>
-            <a:ext uri="{FF2B5EF4-FFF2-40B4-BE49-F238E27FC236}">
-              <a16:creationId xmlns:a16="http://schemas.microsoft.com/office/drawing/2014/main" id="{B71AF447-2503-6E06-EB64-6A29C299795D}"/>
-            </a:ext>
-          </a:extLst>
-        </p:cNvPr>
-        <p:cNvGrpSpPr/>
-        <p:nvPr/>
-      </p:nvGrpSpPr>
-      <p:grpSpPr>
-        <a:xfrm>
-          <a:off x="0" y="0"/>
-          <a:ext cx="0" cy="0"/>
-          <a:chOff x="0" y="0"/>
-          <a:chExt cx="0" cy="0"/>
-        </a:xfrm>
-      </p:grpSpPr>
-      <p:sp>
-        <p:nvSpPr>
-          <p:cNvPr id="4" name="TextBox 3">
-            <a:extLst>
-              <a:ext uri="{FF2B5EF4-FFF2-40B4-BE49-F238E27FC236}">
-                <a16:creationId xmlns:a16="http://schemas.microsoft.com/office/drawing/2014/main" id="{3ABD7D05-D183-64C6-1BA1-72453612143E}"/>
-              </a:ext>
-            </a:extLst>
-          </p:cNvPr>
-          <p:cNvSpPr txBox="1"/>
-          <p:nvPr/>
-        </p:nvSpPr>
-        <p:spPr>
-          <a:xfrm>
-            <a:off x="7763992" y="90121"/>
-            <a:ext cx="1809641" cy="338554"/>
-          </a:xfrm>
-          <a:prstGeom prst="rect">
-            <a:avLst/>
-          </a:prstGeom>
-          <a:noFill/>
-          <a:ln>
-            <a:solidFill>
-              <a:schemeClr val="tx1"/>
-            </a:solidFill>
-          </a:ln>
-        </p:spPr>
-        <p:txBody>
-          <a:bodyPr rot="0" spcFirstLastPara="0" vertOverflow="overflow" horzOverflow="overflow" vert="horz" wrap="square" lIns="91440" tIns="45720" rIns="91440" bIns="45720" numCol="1" spcCol="0" rtlCol="0" fromWordArt="0" anchor="t" anchorCtr="0" forceAA="0" compatLnSpc="1">
-            <a:prstTxWarp prst="textNoShape">
-              <a:avLst/>
-            </a:prstTxWarp>
-            <a:spAutoFit/>
-          </a:bodyPr>
-          <a:lstStyle/>
-          <a:p>
-            <a:r>
-              <a:rPr lang="en-GB" sz="1600" dirty="0"/>
-              <a:t>Date – 24/11/2025</a:t>
-            </a:r>
-          </a:p>
-        </p:txBody>
-      </p:sp>
-      <p:sp>
-        <p:nvSpPr>
-          <p:cNvPr id="2" name="TextBox 1">
-            <a:extLst>
-              <a:ext uri="{FF2B5EF4-FFF2-40B4-BE49-F238E27FC236}">
-                <a16:creationId xmlns:a16="http://schemas.microsoft.com/office/drawing/2014/main" id="{3E37F77A-82C0-2039-AD51-40366B52EBEB}"/>
-              </a:ext>
-            </a:extLst>
-          </p:cNvPr>
-          <p:cNvSpPr txBox="1"/>
-          <p:nvPr/>
-        </p:nvSpPr>
-        <p:spPr>
-          <a:xfrm>
-            <a:off x="5651845" y="90120"/>
-            <a:ext cx="1959856" cy="338554"/>
-          </a:xfrm>
-          <a:prstGeom prst="rect">
-            <a:avLst/>
-          </a:prstGeom>
-          <a:noFill/>
-          <a:ln>
-            <a:solidFill>
-              <a:schemeClr val="tx1"/>
-            </a:solidFill>
-          </a:ln>
-        </p:spPr>
-        <p:txBody>
-          <a:bodyPr rot="0" spcFirstLastPara="0" vertOverflow="overflow" horzOverflow="overflow" vert="horz" wrap="square" lIns="91440" tIns="45720" rIns="91440" bIns="45720" numCol="1" spcCol="0" rtlCol="0" fromWordArt="0" anchor="t" anchorCtr="0" forceAA="0" compatLnSpc="1">
-            <a:prstTxWarp prst="textNoShape">
-              <a:avLst/>
-            </a:prstTxWarp>
-            <a:spAutoFit/>
-          </a:bodyPr>
-          <a:lstStyle/>
-          <a:p>
-            <a:r>
-              <a:rPr lang="en-GB" sz="1600" dirty="0"/>
-              <a:t>Game Build V.0.1</a:t>
-            </a:r>
-          </a:p>
-        </p:txBody>
-      </p:sp>
-      <p:sp>
-        <p:nvSpPr>
-          <p:cNvPr id="3" name="TextBox 2">
-            <a:extLst>
-              <a:ext uri="{FF2B5EF4-FFF2-40B4-BE49-F238E27FC236}">
-                <a16:creationId xmlns:a16="http://schemas.microsoft.com/office/drawing/2014/main" id="{2886F3E7-61E5-445C-5038-15B1F86B5A87}"/>
-              </a:ext>
-            </a:extLst>
-          </p:cNvPr>
-          <p:cNvSpPr txBox="1"/>
-          <p:nvPr/>
-        </p:nvSpPr>
-        <p:spPr>
-          <a:xfrm>
-            <a:off x="5642854" y="578678"/>
-            <a:ext cx="3926490" cy="3354765"/>
-          </a:xfrm>
-          <a:prstGeom prst="rect">
-            <a:avLst/>
-          </a:prstGeom>
-          <a:noFill/>
-          <a:ln>
-            <a:solidFill>
-              <a:schemeClr val="tx1"/>
-            </a:solidFill>
-          </a:ln>
-        </p:spPr>
-        <p:txBody>
-          <a:bodyPr rot="0" spcFirstLastPara="0" vertOverflow="overflow" horzOverflow="overflow" vert="horz" wrap="square" lIns="91440" tIns="45720" rIns="91440" bIns="45720" numCol="1" spcCol="0" rtlCol="0" fromWordArt="0" anchor="t" anchorCtr="0" forceAA="0" compatLnSpc="1">
-            <a:prstTxWarp prst="textNoShape">
-              <a:avLst/>
-            </a:prstTxWarp>
-            <a:spAutoFit/>
-          </a:bodyPr>
-          <a:lstStyle/>
-          <a:p>
-            <a:r>
-              <a:rPr lang="en-GB" sz="1400" dirty="0"/>
-              <a:t>Summary Of Session</a:t>
-            </a:r>
-          </a:p>
-          <a:p>
-            <a:endParaRPr lang="en-GB" sz="1400" dirty="0"/>
-          </a:p>
-          <a:p>
-            <a:r>
-              <a:rPr lang="en-GB" sz="1400" dirty="0"/>
-              <a:t>I used View port feature on game maker to have the main camera be focused on the office.</a:t>
-            </a:r>
-          </a:p>
-          <a:p>
-            <a:endParaRPr lang="en-GB" sz="1400" dirty="0"/>
-          </a:p>
-          <a:p>
-            <a:r>
-              <a:rPr lang="en-GB" sz="1400" dirty="0"/>
-              <a:t>The code below is the camera, that when I put in camera_apply or shift view onto a button Object it will change OBJ_Camera’s position within the room. It is not done yet but is a massive leap in completing one of my most advanced mechanics.</a:t>
-            </a:r>
-          </a:p>
-          <a:p>
-            <a:endParaRPr lang="en-GB" sz="1400" dirty="0"/>
-          </a:p>
-          <a:p>
-            <a:endParaRPr lang="en-GB" sz="1400" dirty="0"/>
-          </a:p>
-          <a:p>
-            <a:endParaRPr lang="en-GB" sz="1400" dirty="0"/>
-          </a:p>
-          <a:p>
-            <a:endParaRPr lang="en-GB" sz="1600" dirty="0"/>
-          </a:p>
-        </p:txBody>
-      </p:sp>
-      <p:sp>
-        <p:nvSpPr>
-          <p:cNvPr id="6" name="TextBox 5">
-            <a:extLst>
-              <a:ext uri="{FF2B5EF4-FFF2-40B4-BE49-F238E27FC236}">
-                <a16:creationId xmlns:a16="http://schemas.microsoft.com/office/drawing/2014/main" id="{6C671371-B8F1-97C1-D2C5-BD2850E814D7}"/>
-              </a:ext>
-            </a:extLst>
-          </p:cNvPr>
-          <p:cNvSpPr txBox="1"/>
-          <p:nvPr/>
-        </p:nvSpPr>
-        <p:spPr>
-          <a:xfrm>
-            <a:off x="9642445" y="54237"/>
-            <a:ext cx="2438400" cy="1569660"/>
-          </a:xfrm>
-          <a:prstGeom prst="rect">
-            <a:avLst/>
-          </a:prstGeom>
-          <a:noFill/>
-          <a:ln>
-            <a:solidFill>
-              <a:schemeClr val="tx1"/>
-            </a:solidFill>
-          </a:ln>
-        </p:spPr>
-        <p:txBody>
-          <a:bodyPr rot="0" spcFirstLastPara="0" vertOverflow="overflow" horzOverflow="overflow" vert="horz" wrap="square" lIns="91440" tIns="45720" rIns="91440" bIns="45720" numCol="1" spcCol="0" rtlCol="0" fromWordArt="0" anchor="t" anchorCtr="0" forceAA="0" compatLnSpc="1">
-            <a:prstTxWarp prst="textNoShape">
-              <a:avLst/>
-            </a:prstTxWarp>
-            <a:spAutoFit/>
-          </a:bodyPr>
-          <a:lstStyle/>
-          <a:p>
-            <a:r>
-              <a:rPr lang="en-GB" sz="1200" dirty="0"/>
-              <a:t>What to do for Next Session</a:t>
-            </a:r>
-          </a:p>
-          <a:p>
-            <a:endParaRPr lang="en-GB" sz="1200" dirty="0"/>
-          </a:p>
-          <a:p>
-            <a:r>
-              <a:rPr lang="en-GB" sz="1200" dirty="0"/>
-              <a:t>Continue working on sprites and setting the game up ready for all the coding, so adding in all the assets/files.</a:t>
-            </a:r>
-          </a:p>
-          <a:p>
-            <a:endParaRPr lang="en-GB" sz="1200" dirty="0"/>
-          </a:p>
-          <a:p>
-            <a:endParaRPr lang="en-GB" sz="1200" dirty="0"/>
-          </a:p>
-        </p:txBody>
-      </p:sp>
-      <p:pic>
-        <p:nvPicPr>
-          <p:cNvPr id="27" name="Picture 26">
-            <a:extLst>
-              <a:ext uri="{FF2B5EF4-FFF2-40B4-BE49-F238E27FC236}">
-                <a16:creationId xmlns:a16="http://schemas.microsoft.com/office/drawing/2014/main" id="{F677CB03-D1DC-CB3F-CAE0-F8B146FE754F}"/>
-              </a:ext>
-            </a:extLst>
-          </p:cNvPr>
-          <p:cNvPicPr>
-            <a:picLocks noChangeAspect="1"/>
-          </p:cNvPicPr>
-          <p:nvPr/>
-        </p:nvPicPr>
-        <p:blipFill>
-          <a:blip r:embed="rId2"/>
-          <a:stretch>
-            <a:fillRect/>
-          </a:stretch>
-        </p:blipFill>
-        <p:spPr>
-          <a:xfrm>
-            <a:off x="231941" y="754545"/>
-            <a:ext cx="2512691" cy="5638018"/>
-          </a:xfrm>
-          <a:prstGeom prst="rect">
-            <a:avLst/>
-          </a:prstGeom>
-        </p:spPr>
-      </p:pic>
-      <p:sp>
-        <p:nvSpPr>
-          <p:cNvPr id="5" name="TextBox 4">
-            <a:extLst>
-              <a:ext uri="{FF2B5EF4-FFF2-40B4-BE49-F238E27FC236}">
-                <a16:creationId xmlns:a16="http://schemas.microsoft.com/office/drawing/2014/main" id="{3C6B70CF-F758-8FF9-4535-1E2605546C2E}"/>
-              </a:ext>
-            </a:extLst>
-          </p:cNvPr>
-          <p:cNvSpPr txBox="1"/>
-          <p:nvPr/>
-        </p:nvSpPr>
-        <p:spPr>
-          <a:xfrm>
-            <a:off x="0" y="54237"/>
-            <a:ext cx="1959856" cy="584775"/>
-          </a:xfrm>
-          <a:prstGeom prst="rect">
-            <a:avLst/>
-          </a:prstGeom>
-          <a:noFill/>
-          <a:ln>
-            <a:solidFill>
-              <a:schemeClr val="tx1"/>
-            </a:solidFill>
-          </a:ln>
-        </p:spPr>
-        <p:txBody>
-          <a:bodyPr rot="0" spcFirstLastPara="0" vertOverflow="overflow" horzOverflow="overflow" vert="horz" wrap="square" lIns="91440" tIns="45720" rIns="91440" bIns="45720" numCol="1" spcCol="0" rtlCol="0" fromWordArt="0" anchor="t" anchorCtr="0" forceAA="0" compatLnSpc="1">
-            <a:prstTxWarp prst="textNoShape">
-              <a:avLst/>
-            </a:prstTxWarp>
-            <a:spAutoFit/>
-          </a:bodyPr>
-          <a:lstStyle/>
-          <a:p>
-            <a:r>
-              <a:rPr lang="en-GB" sz="1600" dirty="0"/>
-              <a:t>Continuation of previous slide.</a:t>
-            </a:r>
-          </a:p>
-        </p:txBody>
-      </p:sp>
-      <p:pic>
-        <p:nvPicPr>
-          <p:cNvPr id="11" name="Picture 10">
-            <a:extLst>
-              <a:ext uri="{FF2B5EF4-FFF2-40B4-BE49-F238E27FC236}">
-                <a16:creationId xmlns:a16="http://schemas.microsoft.com/office/drawing/2014/main" id="{10266355-A36C-5972-ED51-B27E7586F80B}"/>
-              </a:ext>
-            </a:extLst>
-          </p:cNvPr>
-          <p:cNvPicPr>
-            <a:picLocks noChangeAspect="1"/>
-          </p:cNvPicPr>
-          <p:nvPr/>
-        </p:nvPicPr>
-        <p:blipFill>
-          <a:blip r:embed="rId3"/>
-          <a:stretch>
-            <a:fillRect/>
-          </a:stretch>
-        </p:blipFill>
-        <p:spPr>
-          <a:xfrm>
-            <a:off x="3038494" y="3756230"/>
-            <a:ext cx="8921565" cy="2581366"/>
-          </a:xfrm>
-          <a:prstGeom prst="rect">
-            <a:avLst/>
-          </a:prstGeom>
-        </p:spPr>
-      </p:pic>
-    </p:spTree>
-    <p:extLst>
-      <p:ext uri="{BB962C8B-B14F-4D97-AF65-F5344CB8AC3E}">
-        <p14:creationId xmlns:p14="http://schemas.microsoft.com/office/powerpoint/2010/main" val="3460468714"/>
-      </p:ext>
-    </p:extLst>
-  </p:cSld>
-  <p:clrMapOvr>
-    <a:masterClrMapping/>
-  </p:clrMapOvr>
-</p:sld>
-</file>
-
-<file path=ppt/slides/slide30.xml><?xml version="1.0" encoding="utf-8"?>
+<file path=ppt/slides/slide31.xml><?xml version="1.0" encoding="utf-8"?>
 <p:sld xmlns:a="http://schemas.openxmlformats.org/drawingml/2006/main" xmlns:r="http://schemas.openxmlformats.org/officeDocument/2006/relationships" xmlns:p="http://schemas.openxmlformats.org/presentationml/2006/main">
   <p:cSld>
     <p:spTree>
@@ -14050,7 +14331,7 @@
 </p:sld>
 </file>
 
-<file path=ppt/slides/slide31.xml><?xml version="1.0" encoding="utf-8"?>
+<file path=ppt/slides/slide32.xml><?xml version="1.0" encoding="utf-8"?>
 <p:sld xmlns:a="http://schemas.openxmlformats.org/drawingml/2006/main" xmlns:r="http://schemas.openxmlformats.org/officeDocument/2006/relationships" xmlns:p="http://schemas.openxmlformats.org/presentationml/2006/main">
   <p:cSld>
     <p:spTree>
@@ -14747,7 +15028,7 @@
 </p:sld>
 </file>
 
-<file path=ppt/slides/slide32.xml><?xml version="1.0" encoding="utf-8"?>
+<file path=ppt/slides/slide33.xml><?xml version="1.0" encoding="utf-8"?>
 <p:sld xmlns:a="http://schemas.openxmlformats.org/drawingml/2006/main" xmlns:r="http://schemas.openxmlformats.org/officeDocument/2006/relationships" xmlns:p="http://schemas.openxmlformats.org/presentationml/2006/main">
   <p:cSld>
     <p:spTree>
@@ -15441,6 +15722,387 @@
     <p:extLst>
       <p:ext uri="{BB962C8B-B14F-4D97-AF65-F5344CB8AC3E}">
         <p14:creationId xmlns:p14="http://schemas.microsoft.com/office/powerpoint/2010/main" val="606327639"/>
+      </p:ext>
+    </p:extLst>
+  </p:cSld>
+  <p:clrMapOvr>
+    <a:masterClrMapping/>
+  </p:clrMapOvr>
+</p:sld>
+</file>
+
+<file path=ppt/slides/slide34.xml><?xml version="1.0" encoding="utf-8"?>
+<p:sld xmlns:a="http://schemas.openxmlformats.org/drawingml/2006/main" xmlns:r="http://schemas.openxmlformats.org/officeDocument/2006/relationships" xmlns:p="http://schemas.openxmlformats.org/presentationml/2006/main">
+  <p:cSld>
+    <p:spTree>
+      <p:nvGrpSpPr>
+        <p:cNvPr id="1" name="">
+          <a:extLst>
+            <a:ext uri="{FF2B5EF4-FFF2-40B4-BE49-F238E27FC236}">
+              <a16:creationId xmlns:a16="http://schemas.microsoft.com/office/drawing/2014/main" id="{5D41923B-5999-0B23-540A-58EEAFCD4A87}"/>
+            </a:ext>
+          </a:extLst>
+        </p:cNvPr>
+        <p:cNvGrpSpPr/>
+        <p:nvPr/>
+      </p:nvGrpSpPr>
+      <p:grpSpPr>
+        <a:xfrm>
+          <a:off x="0" y="0"/>
+          <a:ext cx="0" cy="0"/>
+          <a:chOff x="0" y="0"/>
+          <a:chExt cx="0" cy="0"/>
+        </a:xfrm>
+      </p:grpSpPr>
+      <p:graphicFrame>
+        <p:nvGraphicFramePr>
+          <p:cNvPr id="4" name="Table 3">
+            <a:extLst>
+              <a:ext uri="{FF2B5EF4-FFF2-40B4-BE49-F238E27FC236}">
+                <a16:creationId xmlns:a16="http://schemas.microsoft.com/office/drawing/2014/main" id="{51A6647C-FBCD-3264-D6DE-89DA6D95A238}"/>
+              </a:ext>
+            </a:extLst>
+          </p:cNvPr>
+          <p:cNvGraphicFramePr>
+            <a:graphicFrameLocks noGrp="1"/>
+          </p:cNvGraphicFramePr>
+          <p:nvPr>
+            <p:extLst>
+              <p:ext uri="{D42A27DB-BD31-4B8C-83A1-F6EECF244321}">
+                <p14:modId xmlns:p14="http://schemas.microsoft.com/office/powerpoint/2010/main" val="144520860"/>
+              </p:ext>
+            </p:extLst>
+          </p:nvPr>
+        </p:nvGraphicFramePr>
+        <p:xfrm>
+          <a:off x="0" y="0"/>
+          <a:ext cx="11988463" cy="2728668"/>
+        </p:xfrm>
+        <a:graphic>
+          <a:graphicData uri="http://schemas.openxmlformats.org/drawingml/2006/table">
+            <a:tbl>
+              <a:tblPr firstRow="1" bandRow="1">
+                <a:tableStyleId>{5C22544A-7EE6-4342-B048-85BDC9FD1C3A}</a:tableStyleId>
+              </a:tblPr>
+              <a:tblGrid>
+                <a:gridCol w="1876424">
+                  <a:extLst>
+                    <a:ext uri="{9D8B030D-6E8A-4147-A177-3AD203B41FA5}">
+                      <a16:colId xmlns:a16="http://schemas.microsoft.com/office/drawing/2014/main" val="2041145262"/>
+                    </a:ext>
+                  </a:extLst>
+                </a:gridCol>
+                <a:gridCol w="2119731">
+                  <a:extLst>
+                    <a:ext uri="{9D8B030D-6E8A-4147-A177-3AD203B41FA5}">
+                      <a16:colId xmlns:a16="http://schemas.microsoft.com/office/drawing/2014/main" val="4080696647"/>
+                    </a:ext>
+                  </a:extLst>
+                </a:gridCol>
+                <a:gridCol w="1998077">
+                  <a:extLst>
+                    <a:ext uri="{9D8B030D-6E8A-4147-A177-3AD203B41FA5}">
+                      <a16:colId xmlns:a16="http://schemas.microsoft.com/office/drawing/2014/main" val="132880537"/>
+                    </a:ext>
+                  </a:extLst>
+                </a:gridCol>
+                <a:gridCol w="1998077">
+                  <a:extLst>
+                    <a:ext uri="{9D8B030D-6E8A-4147-A177-3AD203B41FA5}">
+                      <a16:colId xmlns:a16="http://schemas.microsoft.com/office/drawing/2014/main" val="786884226"/>
+                    </a:ext>
+                  </a:extLst>
+                </a:gridCol>
+                <a:gridCol w="1998077">
+                  <a:extLst>
+                    <a:ext uri="{9D8B030D-6E8A-4147-A177-3AD203B41FA5}">
+                      <a16:colId xmlns:a16="http://schemas.microsoft.com/office/drawing/2014/main" val="259252547"/>
+                    </a:ext>
+                  </a:extLst>
+                </a:gridCol>
+                <a:gridCol w="1998077">
+                  <a:extLst>
+                    <a:ext uri="{9D8B030D-6E8A-4147-A177-3AD203B41FA5}">
+                      <a16:colId xmlns:a16="http://schemas.microsoft.com/office/drawing/2014/main" val="3694476725"/>
+                    </a:ext>
+                  </a:extLst>
+                </a:gridCol>
+              </a:tblGrid>
+              <a:tr h="361950">
+                <a:tc>
+                  <a:txBody>
+                    <a:bodyPr/>
+                    <a:lstStyle/>
+                    <a:p>
+                      <a:r>
+                        <a:rPr lang="en-GB" sz="1100" dirty="0"/>
+                        <a:t>Test Number</a:t>
+                      </a:r>
+                    </a:p>
+                  </a:txBody>
+                  <a:tcPr/>
+                </a:tc>
+                <a:tc>
+                  <a:txBody>
+                    <a:bodyPr/>
+                    <a:lstStyle/>
+                    <a:p>
+                      <a:r>
+                        <a:rPr lang="en-GB" sz="1100" dirty="0"/>
+                        <a:t>Room</a:t>
+                      </a:r>
+                    </a:p>
+                  </a:txBody>
+                  <a:tcPr/>
+                </a:tc>
+                <a:tc>
+                  <a:txBody>
+                    <a:bodyPr/>
+                    <a:lstStyle/>
+                    <a:p>
+                      <a:r>
+                        <a:rPr lang="en-GB" sz="1100" dirty="0"/>
+                        <a:t>Objects Involved</a:t>
+                      </a:r>
+                    </a:p>
+                  </a:txBody>
+                  <a:tcPr/>
+                </a:tc>
+                <a:tc>
+                  <a:txBody>
+                    <a:bodyPr/>
+                    <a:lstStyle/>
+                    <a:p>
+                      <a:r>
+                        <a:rPr lang="en-GB" sz="1100" dirty="0"/>
+                        <a:t>Expected Outcome</a:t>
+                      </a:r>
+                    </a:p>
+                  </a:txBody>
+                  <a:tcPr/>
+                </a:tc>
+                <a:tc>
+                  <a:txBody>
+                    <a:bodyPr/>
+                    <a:lstStyle/>
+                    <a:p>
+                      <a:r>
+                        <a:rPr lang="en-GB" sz="1100" dirty="0"/>
+                        <a:t>Actual Outcome</a:t>
+                      </a:r>
+                    </a:p>
+                  </a:txBody>
+                  <a:tcPr/>
+                </a:tc>
+                <a:tc>
+                  <a:txBody>
+                    <a:bodyPr/>
+                    <a:lstStyle/>
+                    <a:p>
+                      <a:r>
+                        <a:rPr lang="en-GB" sz="1100" dirty="0"/>
+                        <a:t>Test Outcome</a:t>
+                      </a:r>
+                    </a:p>
+                  </a:txBody>
+                  <a:tcPr/>
+                </a:tc>
+                <a:extLst>
+                  <a:ext uri="{0D108BD9-81ED-4DB2-BD59-A6C34878D82A}">
+                    <a16:rowId xmlns:a16="http://schemas.microsoft.com/office/drawing/2014/main" val="1296324342"/>
+                  </a:ext>
+                </a:extLst>
+              </a:tr>
+              <a:tr h="598878">
+                <a:tc>
+                  <a:txBody>
+                    <a:bodyPr/>
+                    <a:lstStyle/>
+                    <a:p>
+                      <a:r>
+                        <a:rPr lang="en-GB" sz="1100" dirty="0"/>
+                        <a:t>Numerical Value of test beginning with 1.</a:t>
+                      </a:r>
+                    </a:p>
+                  </a:txBody>
+                  <a:tcPr/>
+                </a:tc>
+                <a:tc>
+                  <a:txBody>
+                    <a:bodyPr/>
+                    <a:lstStyle/>
+                    <a:p>
+                      <a:r>
+                        <a:rPr lang="en-GB" sz="1100" dirty="0"/>
+                        <a:t>What Room your test will be conducted in. </a:t>
+                      </a:r>
+                    </a:p>
+                  </a:txBody>
+                  <a:tcPr/>
+                </a:tc>
+                <a:tc>
+                  <a:txBody>
+                    <a:bodyPr/>
+                    <a:lstStyle/>
+                    <a:p>
+                      <a:r>
+                        <a:rPr lang="en-GB" sz="1100" dirty="0"/>
+                        <a:t>The Objects that your test will utilise during the test.</a:t>
+                      </a:r>
+                    </a:p>
+                  </a:txBody>
+                  <a:tcPr/>
+                </a:tc>
+                <a:tc>
+                  <a:txBody>
+                    <a:bodyPr/>
+                    <a:lstStyle/>
+                    <a:p>
+                      <a:r>
+                        <a:rPr lang="en-GB" sz="1100" dirty="0"/>
+                        <a:t>What is expected to happen during the test.</a:t>
+                      </a:r>
+                    </a:p>
+                  </a:txBody>
+                  <a:tcPr/>
+                </a:tc>
+                <a:tc>
+                  <a:txBody>
+                    <a:bodyPr/>
+                    <a:lstStyle/>
+                    <a:p>
+                      <a:r>
+                        <a:rPr lang="en-GB" sz="1100" dirty="0"/>
+                        <a:t>What Actually happened.</a:t>
+                      </a:r>
+                    </a:p>
+                  </a:txBody>
+                  <a:tcPr/>
+                </a:tc>
+                <a:tc>
+                  <a:txBody>
+                    <a:bodyPr/>
+                    <a:lstStyle/>
+                    <a:p>
+                      <a:r>
+                        <a:rPr lang="en-GB" sz="1100" dirty="0"/>
+                        <a:t>Did you have to do anything In reaction to the test? Fixing errors or changing code.</a:t>
+                      </a:r>
+                    </a:p>
+                  </a:txBody>
+                  <a:tcPr/>
+                </a:tc>
+                <a:extLst>
+                  <a:ext uri="{0D108BD9-81ED-4DB2-BD59-A6C34878D82A}">
+                    <a16:rowId xmlns:a16="http://schemas.microsoft.com/office/drawing/2014/main" val="892039820"/>
+                  </a:ext>
+                </a:extLst>
+              </a:tr>
+              <a:tr h="649481">
+                <a:tc>
+                  <a:txBody>
+                    <a:bodyPr/>
+                    <a:lstStyle/>
+                    <a:p>
+                      <a:r>
+                        <a:rPr lang="en-GB" sz="1100" dirty="0"/>
+                        <a:t>19. Build V.0.7.2</a:t>
+                      </a:r>
+                    </a:p>
+                  </a:txBody>
+                  <a:tcPr/>
+                </a:tc>
+                <a:tc>
+                  <a:txBody>
+                    <a:bodyPr/>
+                    <a:lstStyle/>
+                    <a:p>
+                      <a:r>
+                        <a:rPr lang="en-GB" sz="1100" dirty="0"/>
+                        <a:t>Rm_level4</a:t>
+                      </a:r>
+                    </a:p>
+                  </a:txBody>
+                  <a:tcPr/>
+                </a:tc>
+                <a:tc>
+                  <a:txBody>
+                    <a:bodyPr/>
+                    <a:lstStyle/>
+                    <a:p>
+                      <a:pPr marL="0" marR="0" lvl="0" indent="0" algn="l" defTabSz="914400" rtl="0" eaLnBrk="1" fontAlgn="auto" latinLnBrk="0" hangingPunct="1">
+                        <a:lnSpc>
+                          <a:spcPct val="100000"/>
+                        </a:lnSpc>
+                        <a:spcBef>
+                          <a:spcPts val="0"/>
+                        </a:spcBef>
+                        <a:spcAft>
+                          <a:spcPts val="0"/>
+                        </a:spcAft>
+                        <a:buClrTx/>
+                        <a:buSzTx/>
+                        <a:buFontTx/>
+                        <a:buNone/>
+                        <a:tabLst/>
+                        <a:defRPr/>
+                      </a:pPr>
+                      <a:r>
+                        <a:rPr lang="en-GB" sz="1100" dirty="0" err="1"/>
+                        <a:t>Obj_amcd_prototype</a:t>
+                      </a:r>
+                      <a:endParaRPr lang="en-GB" sz="1100" dirty="0"/>
+                    </a:p>
+                  </a:txBody>
+                  <a:tcPr/>
+                </a:tc>
+                <a:tc>
+                  <a:txBody>
+                    <a:bodyPr/>
+                    <a:lstStyle/>
+                    <a:p>
+                      <a:r>
+                        <a:rPr lang="en-GB" sz="1100" dirty="0"/>
+                        <a:t>Prototype has full access to every single zone in the level. Just like bulker as well, if he is watched he slows down. When he is at cam 2 or 7 if the door is closed he’ll wait there for a long time before moving away. He can also move to random zones from that point.</a:t>
+                      </a:r>
+                    </a:p>
+                  </a:txBody>
+                  <a:tcPr/>
+                </a:tc>
+                <a:tc>
+                  <a:txBody>
+                    <a:bodyPr/>
+                    <a:lstStyle/>
+                    <a:p>
+                      <a:endParaRPr lang="en-GB" sz="1100" dirty="0"/>
+                    </a:p>
+                  </a:txBody>
+                  <a:tcPr/>
+                </a:tc>
+                <a:tc>
+                  <a:txBody>
+                    <a:bodyPr/>
+                    <a:lstStyle/>
+                    <a:p>
+                      <a:endParaRPr lang="en-GB" sz="1100" dirty="0"/>
+                    </a:p>
+                  </a:txBody>
+                  <a:tcPr/>
+                </a:tc>
+                <a:extLst>
+                  <a:ext uri="{0D108BD9-81ED-4DB2-BD59-A6C34878D82A}">
+                    <a16:rowId xmlns:a16="http://schemas.microsoft.com/office/drawing/2014/main" val="4028166049"/>
+                  </a:ext>
+                </a:extLst>
+              </a:tr>
+            </a:tbl>
+          </a:graphicData>
+        </a:graphic>
+      </p:graphicFrame>
+    </p:spTree>
+    <p:extLst>
+      <p:ext uri="{BB962C8B-B14F-4D97-AF65-F5344CB8AC3E}">
+        <p14:creationId xmlns:p14="http://schemas.microsoft.com/office/powerpoint/2010/main" val="3685646310"/>
       </p:ext>
     </p:extLst>
   </p:cSld>

</xml_diff>

<commit_message>
Critical Failure V.09.2 PT 2
</commit_message>
<xml_diff>
--- a/Logs/Development Log and Alpha Testing.pptx
+++ b/Logs/Development Log and Alpha Testing.pptx
@@ -34,14 +34,15 @@
     <p:sldId id="290" r:id="rId28"/>
     <p:sldId id="291" r:id="rId29"/>
     <p:sldId id="292" r:id="rId30"/>
-    <p:sldId id="257" r:id="rId31"/>
-    <p:sldId id="267" r:id="rId32"/>
-    <p:sldId id="270" r:id="rId33"/>
-    <p:sldId id="272" r:id="rId34"/>
-    <p:sldId id="276" r:id="rId35"/>
-    <p:sldId id="278" r:id="rId36"/>
-    <p:sldId id="284" r:id="rId37"/>
-    <p:sldId id="289" r:id="rId38"/>
+    <p:sldId id="293" r:id="rId31"/>
+    <p:sldId id="257" r:id="rId32"/>
+    <p:sldId id="267" r:id="rId33"/>
+    <p:sldId id="270" r:id="rId34"/>
+    <p:sldId id="272" r:id="rId35"/>
+    <p:sldId id="276" r:id="rId36"/>
+    <p:sldId id="278" r:id="rId37"/>
+    <p:sldId id="284" r:id="rId38"/>
+    <p:sldId id="289" r:id="rId39"/>
   </p:sldIdLst>
   <p:sldSz cx="12192000" cy="6858000"/>
   <p:notesSz cx="6858000" cy="9144000"/>
@@ -315,7 +316,7 @@
           <a:p>
             <a:fld id="{846CE7D5-CF57-46EF-B807-FDD0502418D4}" type="datetimeFigureOut">
               <a:rPr lang="en-GB" smtClean="0"/>
-              <a:t>02/02/2026</a:t>
+              <a:t>03/02/2026</a:t>
             </a:fld>
             <a:endParaRPr lang="en-GB"/>
           </a:p>
@@ -485,7 +486,7 @@
           <a:p>
             <a:fld id="{846CE7D5-CF57-46EF-B807-FDD0502418D4}" type="datetimeFigureOut">
               <a:rPr lang="en-GB" smtClean="0"/>
-              <a:t>02/02/2026</a:t>
+              <a:t>03/02/2026</a:t>
             </a:fld>
             <a:endParaRPr lang="en-GB"/>
           </a:p>
@@ -665,7 +666,7 @@
           <a:p>
             <a:fld id="{846CE7D5-CF57-46EF-B807-FDD0502418D4}" type="datetimeFigureOut">
               <a:rPr lang="en-GB" smtClean="0"/>
-              <a:t>02/02/2026</a:t>
+              <a:t>03/02/2026</a:t>
             </a:fld>
             <a:endParaRPr lang="en-GB"/>
           </a:p>
@@ -835,7 +836,7 @@
           <a:p>
             <a:fld id="{846CE7D5-CF57-46EF-B807-FDD0502418D4}" type="datetimeFigureOut">
               <a:rPr lang="en-GB" smtClean="0"/>
-              <a:t>02/02/2026</a:t>
+              <a:t>03/02/2026</a:t>
             </a:fld>
             <a:endParaRPr lang="en-GB"/>
           </a:p>
@@ -1081,7 +1082,7 @@
           <a:p>
             <a:fld id="{846CE7D5-CF57-46EF-B807-FDD0502418D4}" type="datetimeFigureOut">
               <a:rPr lang="en-GB" smtClean="0"/>
-              <a:t>02/02/2026</a:t>
+              <a:t>03/02/2026</a:t>
             </a:fld>
             <a:endParaRPr lang="en-GB"/>
           </a:p>
@@ -1313,7 +1314,7 @@
           <a:p>
             <a:fld id="{846CE7D5-CF57-46EF-B807-FDD0502418D4}" type="datetimeFigureOut">
               <a:rPr lang="en-GB" smtClean="0"/>
-              <a:t>02/02/2026</a:t>
+              <a:t>03/02/2026</a:t>
             </a:fld>
             <a:endParaRPr lang="en-GB"/>
           </a:p>
@@ -1680,7 +1681,7 @@
           <a:p>
             <a:fld id="{846CE7D5-CF57-46EF-B807-FDD0502418D4}" type="datetimeFigureOut">
               <a:rPr lang="en-GB" smtClean="0"/>
-              <a:t>02/02/2026</a:t>
+              <a:t>03/02/2026</a:t>
             </a:fld>
             <a:endParaRPr lang="en-GB"/>
           </a:p>
@@ -1798,7 +1799,7 @@
           <a:p>
             <a:fld id="{846CE7D5-CF57-46EF-B807-FDD0502418D4}" type="datetimeFigureOut">
               <a:rPr lang="en-GB" smtClean="0"/>
-              <a:t>02/02/2026</a:t>
+              <a:t>03/02/2026</a:t>
             </a:fld>
             <a:endParaRPr lang="en-GB"/>
           </a:p>
@@ -1893,7 +1894,7 @@
           <a:p>
             <a:fld id="{846CE7D5-CF57-46EF-B807-FDD0502418D4}" type="datetimeFigureOut">
               <a:rPr lang="en-GB" smtClean="0"/>
-              <a:t>02/02/2026</a:t>
+              <a:t>03/02/2026</a:t>
             </a:fld>
             <a:endParaRPr lang="en-GB"/>
           </a:p>
@@ -2170,7 +2171,7 @@
           <a:p>
             <a:fld id="{846CE7D5-CF57-46EF-B807-FDD0502418D4}" type="datetimeFigureOut">
               <a:rPr lang="en-GB" smtClean="0"/>
-              <a:t>02/02/2026</a:t>
+              <a:t>03/02/2026</a:t>
             </a:fld>
             <a:endParaRPr lang="en-GB"/>
           </a:p>
@@ -2427,7 +2428,7 @@
           <a:p>
             <a:fld id="{846CE7D5-CF57-46EF-B807-FDD0502418D4}" type="datetimeFigureOut">
               <a:rPr lang="en-GB" smtClean="0"/>
-              <a:t>02/02/2026</a:t>
+              <a:t>03/02/2026</a:t>
             </a:fld>
             <a:endParaRPr lang="en-GB"/>
           </a:p>
@@ -2640,7 +2641,7 @@
           <a:p>
             <a:fld id="{846CE7D5-CF57-46EF-B807-FDD0502418D4}" type="datetimeFigureOut">
               <a:rPr lang="en-GB" smtClean="0"/>
-              <a:t>02/02/2026</a:t>
+              <a:t>03/02/2026</a:t>
             </a:fld>
             <a:endParaRPr lang="en-GB"/>
           </a:p>
@@ -12423,6 +12424,302 @@
   <p:cSld>
     <p:spTree>
       <p:nvGrpSpPr>
+        <p:cNvPr id="1" name="">
+          <a:extLst>
+            <a:ext uri="{FF2B5EF4-FFF2-40B4-BE49-F238E27FC236}">
+              <a16:creationId xmlns:a16="http://schemas.microsoft.com/office/drawing/2014/main" id="{5537BAA7-7F44-F9F3-9424-C0010C550B15}"/>
+            </a:ext>
+          </a:extLst>
+        </p:cNvPr>
+        <p:cNvGrpSpPr/>
+        <p:nvPr/>
+      </p:nvGrpSpPr>
+      <p:grpSpPr>
+        <a:xfrm>
+          <a:off x="0" y="0"/>
+          <a:ext cx="0" cy="0"/>
+          <a:chOff x="0" y="0"/>
+          <a:chExt cx="0" cy="0"/>
+        </a:xfrm>
+      </p:grpSpPr>
+      <p:sp>
+        <p:nvSpPr>
+          <p:cNvPr id="4" name="TextBox 3">
+            <a:extLst>
+              <a:ext uri="{FF2B5EF4-FFF2-40B4-BE49-F238E27FC236}">
+                <a16:creationId xmlns:a16="http://schemas.microsoft.com/office/drawing/2014/main" id="{1C3134BE-59EF-5D80-3127-3B2BF32DE3E7}"/>
+              </a:ext>
+            </a:extLst>
+          </p:cNvPr>
+          <p:cNvSpPr txBox="1"/>
+          <p:nvPr/>
+        </p:nvSpPr>
+        <p:spPr>
+          <a:xfrm>
+            <a:off x="7894620" y="121250"/>
+            <a:ext cx="2269916" cy="338554"/>
+          </a:xfrm>
+          <a:prstGeom prst="rect">
+            <a:avLst/>
+          </a:prstGeom>
+          <a:noFill/>
+          <a:ln>
+            <a:solidFill>
+              <a:schemeClr val="tx1"/>
+            </a:solidFill>
+          </a:ln>
+        </p:spPr>
+        <p:txBody>
+          <a:bodyPr rot="0" spcFirstLastPara="0" vertOverflow="overflow" horzOverflow="overflow" vert="horz" wrap="square" lIns="91440" tIns="45720" rIns="91440" bIns="45720" numCol="1" spcCol="0" rtlCol="0" fromWordArt="0" anchor="t" anchorCtr="0" forceAA="0" compatLnSpc="1">
+            <a:prstTxWarp prst="textNoShape">
+              <a:avLst/>
+            </a:prstTxWarp>
+            <a:spAutoFit/>
+          </a:bodyPr>
+          <a:lstStyle/>
+          <a:p>
+            <a:r>
+              <a:rPr lang="en-GB" sz="1600" dirty="0"/>
+              <a:t>Date – 3/02/2026</a:t>
+            </a:r>
+          </a:p>
+        </p:txBody>
+      </p:sp>
+      <p:sp>
+        <p:nvSpPr>
+          <p:cNvPr id="2" name="TextBox 1">
+            <a:extLst>
+              <a:ext uri="{FF2B5EF4-FFF2-40B4-BE49-F238E27FC236}">
+                <a16:creationId xmlns:a16="http://schemas.microsoft.com/office/drawing/2014/main" id="{C2FED3F3-5484-58D8-A667-E41109861B87}"/>
+              </a:ext>
+            </a:extLst>
+          </p:cNvPr>
+          <p:cNvSpPr txBox="1"/>
+          <p:nvPr/>
+        </p:nvSpPr>
+        <p:spPr>
+          <a:xfrm>
+            <a:off x="5679340" y="121250"/>
+            <a:ext cx="2112147" cy="338554"/>
+          </a:xfrm>
+          <a:prstGeom prst="rect">
+            <a:avLst/>
+          </a:prstGeom>
+          <a:noFill/>
+          <a:ln>
+            <a:solidFill>
+              <a:schemeClr val="tx1"/>
+            </a:solidFill>
+          </a:ln>
+        </p:spPr>
+        <p:txBody>
+          <a:bodyPr rot="0" spcFirstLastPara="0" vertOverflow="overflow" horzOverflow="overflow" vert="horz" wrap="square" lIns="91440" tIns="45720" rIns="91440" bIns="45720" numCol="1" spcCol="0" rtlCol="0" fromWordArt="0" anchor="t" anchorCtr="0" forceAA="0" compatLnSpc="1">
+            <a:prstTxWarp prst="textNoShape">
+              <a:avLst/>
+            </a:prstTxWarp>
+            <a:spAutoFit/>
+          </a:bodyPr>
+          <a:lstStyle/>
+          <a:p>
+            <a:r>
+              <a:rPr lang="en-GB" sz="1600" dirty="0"/>
+              <a:t>Game Build V.0.8.2</a:t>
+            </a:r>
+          </a:p>
+        </p:txBody>
+      </p:sp>
+      <p:sp>
+        <p:nvSpPr>
+          <p:cNvPr id="3" name="TextBox 2">
+            <a:extLst>
+              <a:ext uri="{FF2B5EF4-FFF2-40B4-BE49-F238E27FC236}">
+                <a16:creationId xmlns:a16="http://schemas.microsoft.com/office/drawing/2014/main" id="{45552579-2D3F-D93B-FD25-557A695335B5}"/>
+              </a:ext>
+            </a:extLst>
+          </p:cNvPr>
+          <p:cNvSpPr txBox="1"/>
+          <p:nvPr/>
+        </p:nvSpPr>
+        <p:spPr>
+          <a:xfrm>
+            <a:off x="0" y="121250"/>
+            <a:ext cx="5576207" cy="2492990"/>
+          </a:xfrm>
+          <a:prstGeom prst="rect">
+            <a:avLst/>
+          </a:prstGeom>
+          <a:noFill/>
+          <a:ln>
+            <a:solidFill>
+              <a:schemeClr val="tx1"/>
+            </a:solidFill>
+          </a:ln>
+        </p:spPr>
+        <p:txBody>
+          <a:bodyPr rot="0" spcFirstLastPara="0" vertOverflow="overflow" horzOverflow="overflow" vert="horz" wrap="square" lIns="91440" tIns="45720" rIns="91440" bIns="45720" numCol="1" spcCol="0" rtlCol="0" fromWordArt="0" anchor="t" anchorCtr="0" forceAA="0" compatLnSpc="1">
+            <a:prstTxWarp prst="textNoShape">
+              <a:avLst/>
+            </a:prstTxWarp>
+            <a:spAutoFit/>
+          </a:bodyPr>
+          <a:lstStyle/>
+          <a:p>
+            <a:r>
+              <a:rPr lang="en-GB" sz="1200" dirty="0"/>
+              <a:t>In this session I adjusted the enemies and all of the timers to giver critical failure more appropriate gameplay. I also fixed the Cam 7 problem and adjusted the oxygen depletion.</a:t>
+            </a:r>
+          </a:p>
+          <a:p>
+            <a:endParaRPr lang="en-GB" sz="1200" dirty="0"/>
+          </a:p>
+          <a:p>
+            <a:r>
+              <a:rPr lang="en-GB" sz="1200" dirty="0"/>
+              <a:t>I also, added some more sounds into the game such as for cameras and enemy movement.</a:t>
+            </a:r>
+          </a:p>
+          <a:p>
+            <a:endParaRPr lang="en-GB" sz="1200" dirty="0"/>
+          </a:p>
+          <a:p>
+            <a:r>
+              <a:rPr lang="en-GB" sz="1200" dirty="0"/>
+              <a:t>I also Started Drawing in the enemy versions of my now designed zones. In addition, I’ve made a new category of zones in which if 2 or more enemies are in the same zone then they’ll both appear.</a:t>
+            </a:r>
+          </a:p>
+          <a:p>
+            <a:endParaRPr lang="en-GB" sz="1200" dirty="0"/>
+          </a:p>
+          <a:p>
+            <a:r>
+              <a:rPr lang="en-GB" sz="1200" dirty="0"/>
+              <a:t>I also made a small fix and that was to remove the oxygen flash sprite after death for it continued to persist throughout all rooms.</a:t>
+            </a:r>
+          </a:p>
+        </p:txBody>
+      </p:sp>
+      <p:sp>
+        <p:nvSpPr>
+          <p:cNvPr id="12" name="TextBox 11">
+            <a:extLst>
+              <a:ext uri="{FF2B5EF4-FFF2-40B4-BE49-F238E27FC236}">
+                <a16:creationId xmlns:a16="http://schemas.microsoft.com/office/drawing/2014/main" id="{CFEDDD55-0318-0FCA-A5C1-B75438787764}"/>
+              </a:ext>
+            </a:extLst>
+          </p:cNvPr>
+          <p:cNvSpPr txBox="1"/>
+          <p:nvPr/>
+        </p:nvSpPr>
+        <p:spPr>
+          <a:xfrm>
+            <a:off x="8555487" y="722845"/>
+            <a:ext cx="2073729" cy="3108543"/>
+          </a:xfrm>
+          <a:prstGeom prst="rect">
+            <a:avLst/>
+          </a:prstGeom>
+          <a:noFill/>
+        </p:spPr>
+        <p:txBody>
+          <a:bodyPr wrap="square" rtlCol="0">
+            <a:spAutoFit/>
+          </a:bodyPr>
+          <a:lstStyle/>
+          <a:p>
+            <a:r>
+              <a:rPr lang="en-GB" sz="1400" dirty="0"/>
+              <a:t>What to Do next session</a:t>
+            </a:r>
+          </a:p>
+          <a:p>
+            <a:endParaRPr lang="en-GB" sz="1400" dirty="0"/>
+          </a:p>
+          <a:p>
+            <a:endParaRPr lang="en-GB" sz="1400" dirty="0"/>
+          </a:p>
+          <a:p>
+            <a:endParaRPr lang="en-GB" sz="1400" dirty="0"/>
+          </a:p>
+          <a:p>
+            <a:endParaRPr lang="en-GB" sz="1400" dirty="0"/>
+          </a:p>
+          <a:p>
+            <a:endParaRPr lang="en-GB" sz="1400" dirty="0"/>
+          </a:p>
+          <a:p>
+            <a:endParaRPr lang="en-GB" sz="1400" dirty="0"/>
+          </a:p>
+          <a:p>
+            <a:endParaRPr lang="en-GB" sz="1400" dirty="0"/>
+          </a:p>
+          <a:p>
+            <a:endParaRPr lang="en-GB" sz="1400" dirty="0"/>
+          </a:p>
+          <a:p>
+            <a:endParaRPr lang="en-GB" sz="1400" dirty="0"/>
+          </a:p>
+          <a:p>
+            <a:endParaRPr lang="en-GB" sz="1400" dirty="0"/>
+          </a:p>
+          <a:p>
+            <a:endParaRPr lang="en-GB" sz="1400" dirty="0"/>
+          </a:p>
+          <a:p>
+            <a:endParaRPr lang="en-GB" sz="1400" dirty="0"/>
+          </a:p>
+          <a:p>
+            <a:endParaRPr lang="en-GB" sz="1400" dirty="0"/>
+          </a:p>
+        </p:txBody>
+      </p:sp>
+      <p:pic>
+        <p:nvPicPr>
+          <p:cNvPr id="6" name="Picture 5" descr="A screen shot of a computer program&#10;&#10;AI-generated content may be incorrect.">
+            <a:extLst>
+              <a:ext uri="{FF2B5EF4-FFF2-40B4-BE49-F238E27FC236}">
+                <a16:creationId xmlns:a16="http://schemas.microsoft.com/office/drawing/2014/main" id="{C12717CB-D8ED-885B-B386-78C6AAE29FCE}"/>
+              </a:ext>
+            </a:extLst>
+          </p:cNvPr>
+          <p:cNvPicPr>
+            <a:picLocks noChangeAspect="1"/>
+          </p:cNvPicPr>
+          <p:nvPr/>
+        </p:nvPicPr>
+        <p:blipFill>
+          <a:blip r:embed="rId2"/>
+          <a:stretch>
+            <a:fillRect/>
+          </a:stretch>
+        </p:blipFill>
+        <p:spPr>
+          <a:xfrm>
+            <a:off x="6529248" y="1869422"/>
+            <a:ext cx="2524477" cy="2857899"/>
+          </a:xfrm>
+          <a:prstGeom prst="rect">
+            <a:avLst/>
+          </a:prstGeom>
+        </p:spPr>
+      </p:pic>
+    </p:spTree>
+    <p:extLst>
+      <p:ext uri="{BB962C8B-B14F-4D97-AF65-F5344CB8AC3E}">
+        <p14:creationId xmlns:p14="http://schemas.microsoft.com/office/powerpoint/2010/main" val="893523285"/>
+      </p:ext>
+    </p:extLst>
+  </p:cSld>
+  <p:clrMapOvr>
+    <a:masterClrMapping/>
+  </p:clrMapOvr>
+</p:sld>
+</file>
+
+<file path=ppt/slides/slide31.xml><?xml version="1.0" encoding="utf-8"?>
+<p:sld xmlns:a="http://schemas.openxmlformats.org/drawingml/2006/main" xmlns:r="http://schemas.openxmlformats.org/officeDocument/2006/relationships" xmlns:p="http://schemas.openxmlformats.org/presentationml/2006/main">
+  <p:cSld>
+    <p:spTree>
+      <p:nvGrpSpPr>
         <p:cNvPr id="1" name=""/>
         <p:cNvGrpSpPr/>
         <p:nvPr/>
@@ -13231,7 +13528,7 @@
 </p:sld>
 </file>
 
-<file path=ppt/slides/slide31.xml><?xml version="1.0" encoding="utf-8"?>
+<file path=ppt/slides/slide32.xml><?xml version="1.0" encoding="utf-8"?>
 <p:sld xmlns:a="http://schemas.openxmlformats.org/drawingml/2006/main" xmlns:r="http://schemas.openxmlformats.org/officeDocument/2006/relationships" xmlns:p="http://schemas.openxmlformats.org/presentationml/2006/main">
   <p:cSld>
     <p:spTree>
@@ -13822,7 +14119,7 @@
 </p:sld>
 </file>
 
-<file path=ppt/slides/slide32.xml><?xml version="1.0" encoding="utf-8"?>
+<file path=ppt/slides/slide33.xml><?xml version="1.0" encoding="utf-8"?>
 <p:sld xmlns:a="http://schemas.openxmlformats.org/drawingml/2006/main" xmlns:r="http://schemas.openxmlformats.org/officeDocument/2006/relationships" xmlns:p="http://schemas.openxmlformats.org/presentationml/2006/main">
   <p:cSld>
     <p:spTree>
@@ -14346,7 +14643,7 @@
 </p:sld>
 </file>
 
-<file path=ppt/slides/slide33.xml><?xml version="1.0" encoding="utf-8"?>
+<file path=ppt/slides/slide34.xml><?xml version="1.0" encoding="utf-8"?>
 <p:sld xmlns:a="http://schemas.openxmlformats.org/drawingml/2006/main" xmlns:r="http://schemas.openxmlformats.org/officeDocument/2006/relationships" xmlns:p="http://schemas.openxmlformats.org/presentationml/2006/main">
   <p:cSld>
     <p:spTree>
@@ -14860,7 +15157,7 @@
 </p:sld>
 </file>
 
-<file path=ppt/slides/slide34.xml><?xml version="1.0" encoding="utf-8"?>
+<file path=ppt/slides/slide35.xml><?xml version="1.0" encoding="utf-8"?>
 <p:sld xmlns:a="http://schemas.openxmlformats.org/drawingml/2006/main" xmlns:r="http://schemas.openxmlformats.org/officeDocument/2006/relationships" xmlns:p="http://schemas.openxmlformats.org/presentationml/2006/main">
   <p:cSld>
     <p:spTree>
@@ -15352,7 +15649,7 @@
 </p:sld>
 </file>
 
-<file path=ppt/slides/slide35.xml><?xml version="1.0" encoding="utf-8"?>
+<file path=ppt/slides/slide36.xml><?xml version="1.0" encoding="utf-8"?>
 <p:sld xmlns:a="http://schemas.openxmlformats.org/drawingml/2006/main" xmlns:r="http://schemas.openxmlformats.org/officeDocument/2006/relationships" xmlns:p="http://schemas.openxmlformats.org/presentationml/2006/main">
   <p:cSld>
     <p:spTree>
@@ -16033,7 +16330,7 @@
 </p:sld>
 </file>
 
-<file path=ppt/slides/slide36.xml><?xml version="1.0" encoding="utf-8"?>
+<file path=ppt/slides/slide37.xml><?xml version="1.0" encoding="utf-8"?>
 <p:sld xmlns:a="http://schemas.openxmlformats.org/drawingml/2006/main" xmlns:r="http://schemas.openxmlformats.org/officeDocument/2006/relationships" xmlns:p="http://schemas.openxmlformats.org/presentationml/2006/main">
   <p:cSld>
     <p:spTree>
@@ -16736,7 +17033,7 @@
 </p:sld>
 </file>
 
-<file path=ppt/slides/slide37.xml><?xml version="1.0" encoding="utf-8"?>
+<file path=ppt/slides/slide38.xml><?xml version="1.0" encoding="utf-8"?>
 <p:sld xmlns:a="http://schemas.openxmlformats.org/drawingml/2006/main" xmlns:r="http://schemas.openxmlformats.org/officeDocument/2006/relationships" xmlns:p="http://schemas.openxmlformats.org/presentationml/2006/main">
   <p:cSld>
     <p:spTree>

</xml_diff>

<commit_message>
Critical Failure V.0.9.3 Pt 3
</commit_message>
<xml_diff>
--- a/Logs/Development Log and Alpha Testing.pptx
+++ b/Logs/Development Log and Alpha Testing.pptx
@@ -36,14 +36,15 @@
     <p:sldId id="292" r:id="rId30"/>
     <p:sldId id="293" r:id="rId31"/>
     <p:sldId id="294" r:id="rId32"/>
-    <p:sldId id="257" r:id="rId33"/>
-    <p:sldId id="267" r:id="rId34"/>
-    <p:sldId id="270" r:id="rId35"/>
-    <p:sldId id="272" r:id="rId36"/>
-    <p:sldId id="276" r:id="rId37"/>
-    <p:sldId id="278" r:id="rId38"/>
-    <p:sldId id="284" r:id="rId39"/>
-    <p:sldId id="289" r:id="rId40"/>
+    <p:sldId id="295" r:id="rId33"/>
+    <p:sldId id="257" r:id="rId34"/>
+    <p:sldId id="267" r:id="rId35"/>
+    <p:sldId id="270" r:id="rId36"/>
+    <p:sldId id="272" r:id="rId37"/>
+    <p:sldId id="276" r:id="rId38"/>
+    <p:sldId id="278" r:id="rId39"/>
+    <p:sldId id="284" r:id="rId40"/>
+    <p:sldId id="289" r:id="rId41"/>
   </p:sldIdLst>
   <p:sldSz cx="12192000" cy="6858000"/>
   <p:notesSz cx="6858000" cy="9144000"/>
@@ -317,7 +318,7 @@
           <a:p>
             <a:fld id="{846CE7D5-CF57-46EF-B807-FDD0502418D4}" type="datetimeFigureOut">
               <a:rPr lang="en-GB" smtClean="0"/>
-              <a:t>05/02/2026</a:t>
+              <a:t>09/02/2026</a:t>
             </a:fld>
             <a:endParaRPr lang="en-GB"/>
           </a:p>
@@ -487,7 +488,7 @@
           <a:p>
             <a:fld id="{846CE7D5-CF57-46EF-B807-FDD0502418D4}" type="datetimeFigureOut">
               <a:rPr lang="en-GB" smtClean="0"/>
-              <a:t>05/02/2026</a:t>
+              <a:t>09/02/2026</a:t>
             </a:fld>
             <a:endParaRPr lang="en-GB"/>
           </a:p>
@@ -667,7 +668,7 @@
           <a:p>
             <a:fld id="{846CE7D5-CF57-46EF-B807-FDD0502418D4}" type="datetimeFigureOut">
               <a:rPr lang="en-GB" smtClean="0"/>
-              <a:t>05/02/2026</a:t>
+              <a:t>09/02/2026</a:t>
             </a:fld>
             <a:endParaRPr lang="en-GB"/>
           </a:p>
@@ -837,7 +838,7 @@
           <a:p>
             <a:fld id="{846CE7D5-CF57-46EF-B807-FDD0502418D4}" type="datetimeFigureOut">
               <a:rPr lang="en-GB" smtClean="0"/>
-              <a:t>05/02/2026</a:t>
+              <a:t>09/02/2026</a:t>
             </a:fld>
             <a:endParaRPr lang="en-GB"/>
           </a:p>
@@ -1083,7 +1084,7 @@
           <a:p>
             <a:fld id="{846CE7D5-CF57-46EF-B807-FDD0502418D4}" type="datetimeFigureOut">
               <a:rPr lang="en-GB" smtClean="0"/>
-              <a:t>05/02/2026</a:t>
+              <a:t>09/02/2026</a:t>
             </a:fld>
             <a:endParaRPr lang="en-GB"/>
           </a:p>
@@ -1315,7 +1316,7 @@
           <a:p>
             <a:fld id="{846CE7D5-CF57-46EF-B807-FDD0502418D4}" type="datetimeFigureOut">
               <a:rPr lang="en-GB" smtClean="0"/>
-              <a:t>05/02/2026</a:t>
+              <a:t>09/02/2026</a:t>
             </a:fld>
             <a:endParaRPr lang="en-GB"/>
           </a:p>
@@ -1682,7 +1683,7 @@
           <a:p>
             <a:fld id="{846CE7D5-CF57-46EF-B807-FDD0502418D4}" type="datetimeFigureOut">
               <a:rPr lang="en-GB" smtClean="0"/>
-              <a:t>05/02/2026</a:t>
+              <a:t>09/02/2026</a:t>
             </a:fld>
             <a:endParaRPr lang="en-GB"/>
           </a:p>
@@ -1800,7 +1801,7 @@
           <a:p>
             <a:fld id="{846CE7D5-CF57-46EF-B807-FDD0502418D4}" type="datetimeFigureOut">
               <a:rPr lang="en-GB" smtClean="0"/>
-              <a:t>05/02/2026</a:t>
+              <a:t>09/02/2026</a:t>
             </a:fld>
             <a:endParaRPr lang="en-GB"/>
           </a:p>
@@ -1895,7 +1896,7 @@
           <a:p>
             <a:fld id="{846CE7D5-CF57-46EF-B807-FDD0502418D4}" type="datetimeFigureOut">
               <a:rPr lang="en-GB" smtClean="0"/>
-              <a:t>05/02/2026</a:t>
+              <a:t>09/02/2026</a:t>
             </a:fld>
             <a:endParaRPr lang="en-GB"/>
           </a:p>
@@ -2172,7 +2173,7 @@
           <a:p>
             <a:fld id="{846CE7D5-CF57-46EF-B807-FDD0502418D4}" type="datetimeFigureOut">
               <a:rPr lang="en-GB" smtClean="0"/>
-              <a:t>05/02/2026</a:t>
+              <a:t>09/02/2026</a:t>
             </a:fld>
             <a:endParaRPr lang="en-GB"/>
           </a:p>
@@ -2429,7 +2430,7 @@
           <a:p>
             <a:fld id="{846CE7D5-CF57-46EF-B807-FDD0502418D4}" type="datetimeFigureOut">
               <a:rPr lang="en-GB" smtClean="0"/>
-              <a:t>05/02/2026</a:t>
+              <a:t>09/02/2026</a:t>
             </a:fld>
             <a:endParaRPr lang="en-GB"/>
           </a:p>
@@ -2642,7 +2643,7 @@
           <a:p>
             <a:fld id="{846CE7D5-CF57-46EF-B807-FDD0502418D4}" type="datetimeFigureOut">
               <a:rPr lang="en-GB" smtClean="0"/>
-              <a:t>05/02/2026</a:t>
+              <a:t>09/02/2026</a:t>
             </a:fld>
             <a:endParaRPr lang="en-GB"/>
           </a:p>
@@ -13003,8 +13004,8 @@
         </p:nvSpPr>
         <p:spPr>
           <a:xfrm>
-            <a:off x="9845444" y="607618"/>
-            <a:ext cx="2073729" cy="3108543"/>
+            <a:off x="8090807" y="2361528"/>
+            <a:ext cx="2073729" cy="4185761"/>
           </a:xfrm>
           <a:prstGeom prst="rect">
             <a:avLst/>
@@ -13024,6 +13025,21 @@
           </a:p>
           <a:p>
             <a:endParaRPr lang="en-GB" sz="1400" dirty="0"/>
+          </a:p>
+          <a:p>
+            <a:r>
+              <a:rPr lang="en-GB" sz="1400" dirty="0"/>
+              <a:t>Make zone change sprite controller.</a:t>
+            </a:r>
+          </a:p>
+          <a:p>
+            <a:endParaRPr lang="en-GB" sz="1400" dirty="0"/>
+          </a:p>
+          <a:p>
+            <a:r>
+              <a:rPr lang="en-GB" sz="1400" dirty="0"/>
+              <a:t>Design Double Zones for enemies.</a:t>
+            </a:r>
           </a:p>
           <a:p>
             <a:endParaRPr lang="en-GB" sz="1400" dirty="0"/>
@@ -13137,6 +13153,453 @@
 </file>
 
 <file path=ppt/slides/slide32.xml><?xml version="1.0" encoding="utf-8"?>
+<p:sld xmlns:a="http://schemas.openxmlformats.org/drawingml/2006/main" xmlns:r="http://schemas.openxmlformats.org/officeDocument/2006/relationships" xmlns:p="http://schemas.openxmlformats.org/presentationml/2006/main">
+  <p:cSld>
+    <p:spTree>
+      <p:nvGrpSpPr>
+        <p:cNvPr id="1" name="">
+          <a:extLst>
+            <a:ext uri="{FF2B5EF4-FFF2-40B4-BE49-F238E27FC236}">
+              <a16:creationId xmlns:a16="http://schemas.microsoft.com/office/drawing/2014/main" id="{9FEDECF1-DA48-4B67-A7A6-DE398EF4ED12}"/>
+            </a:ext>
+          </a:extLst>
+        </p:cNvPr>
+        <p:cNvGrpSpPr/>
+        <p:nvPr/>
+      </p:nvGrpSpPr>
+      <p:grpSpPr>
+        <a:xfrm>
+          <a:off x="0" y="0"/>
+          <a:ext cx="0" cy="0"/>
+          <a:chOff x="0" y="0"/>
+          <a:chExt cx="0" cy="0"/>
+        </a:xfrm>
+      </p:grpSpPr>
+      <p:sp>
+        <p:nvSpPr>
+          <p:cNvPr id="4" name="TextBox 3">
+            <a:extLst>
+              <a:ext uri="{FF2B5EF4-FFF2-40B4-BE49-F238E27FC236}">
+                <a16:creationId xmlns:a16="http://schemas.microsoft.com/office/drawing/2014/main" id="{F429FFFD-FA54-2184-B750-40D60A7B7016}"/>
+              </a:ext>
+            </a:extLst>
+          </p:cNvPr>
+          <p:cNvSpPr txBox="1"/>
+          <p:nvPr/>
+        </p:nvSpPr>
+        <p:spPr>
+          <a:xfrm>
+            <a:off x="5015350" y="107525"/>
+            <a:ext cx="2269916" cy="338554"/>
+          </a:xfrm>
+          <a:prstGeom prst="rect">
+            <a:avLst/>
+          </a:prstGeom>
+          <a:noFill/>
+          <a:ln>
+            <a:solidFill>
+              <a:schemeClr val="tx1"/>
+            </a:solidFill>
+          </a:ln>
+        </p:spPr>
+        <p:txBody>
+          <a:bodyPr rot="0" spcFirstLastPara="0" vertOverflow="overflow" horzOverflow="overflow" vert="horz" wrap="square" lIns="91440" tIns="45720" rIns="91440" bIns="45720" numCol="1" spcCol="0" rtlCol="0" fromWordArt="0" anchor="t" anchorCtr="0" forceAA="0" compatLnSpc="1">
+            <a:prstTxWarp prst="textNoShape">
+              <a:avLst/>
+            </a:prstTxWarp>
+            <a:spAutoFit/>
+          </a:bodyPr>
+          <a:lstStyle/>
+          <a:p>
+            <a:r>
+              <a:rPr lang="en-GB" sz="1600" dirty="0"/>
+              <a:t>Date – 9/02/2026</a:t>
+            </a:r>
+          </a:p>
+        </p:txBody>
+      </p:sp>
+      <p:sp>
+        <p:nvSpPr>
+          <p:cNvPr id="2" name="TextBox 1">
+            <a:extLst>
+              <a:ext uri="{FF2B5EF4-FFF2-40B4-BE49-F238E27FC236}">
+                <a16:creationId xmlns:a16="http://schemas.microsoft.com/office/drawing/2014/main" id="{E123AF8E-C573-278C-31F7-DEF436DA3087}"/>
+              </a:ext>
+            </a:extLst>
+          </p:cNvPr>
+          <p:cNvSpPr txBox="1"/>
+          <p:nvPr/>
+        </p:nvSpPr>
+        <p:spPr>
+          <a:xfrm>
+            <a:off x="5015350" y="542303"/>
+            <a:ext cx="2112147" cy="338554"/>
+          </a:xfrm>
+          <a:prstGeom prst="rect">
+            <a:avLst/>
+          </a:prstGeom>
+          <a:noFill/>
+          <a:ln>
+            <a:solidFill>
+              <a:schemeClr val="tx1"/>
+            </a:solidFill>
+          </a:ln>
+        </p:spPr>
+        <p:txBody>
+          <a:bodyPr rot="0" spcFirstLastPara="0" vertOverflow="overflow" horzOverflow="overflow" vert="horz" wrap="square" lIns="91440" tIns="45720" rIns="91440" bIns="45720" numCol="1" spcCol="0" rtlCol="0" fromWordArt="0" anchor="t" anchorCtr="0" forceAA="0" compatLnSpc="1">
+            <a:prstTxWarp prst="textNoShape">
+              <a:avLst/>
+            </a:prstTxWarp>
+            <a:spAutoFit/>
+          </a:bodyPr>
+          <a:lstStyle/>
+          <a:p>
+            <a:r>
+              <a:rPr lang="en-GB" sz="1600" dirty="0"/>
+              <a:t>Game Build V.0.9.3</a:t>
+            </a:r>
+          </a:p>
+        </p:txBody>
+      </p:sp>
+      <p:sp>
+        <p:nvSpPr>
+          <p:cNvPr id="3" name="TextBox 2">
+            <a:extLst>
+              <a:ext uri="{FF2B5EF4-FFF2-40B4-BE49-F238E27FC236}">
+                <a16:creationId xmlns:a16="http://schemas.microsoft.com/office/drawing/2014/main" id="{B02B0936-5426-F729-E947-C7D9B8AEEA64}"/>
+              </a:ext>
+            </a:extLst>
+          </p:cNvPr>
+          <p:cNvSpPr txBox="1"/>
+          <p:nvPr/>
+        </p:nvSpPr>
+        <p:spPr>
+          <a:xfrm>
+            <a:off x="0" y="121250"/>
+            <a:ext cx="4906736" cy="6740307"/>
+          </a:xfrm>
+          <a:prstGeom prst="rect">
+            <a:avLst/>
+          </a:prstGeom>
+          <a:noFill/>
+          <a:ln>
+            <a:solidFill>
+              <a:schemeClr val="tx1"/>
+            </a:solidFill>
+          </a:ln>
+        </p:spPr>
+        <p:txBody>
+          <a:bodyPr rot="0" spcFirstLastPara="0" vertOverflow="overflow" horzOverflow="overflow" vert="horz" wrap="square" lIns="91440" tIns="45720" rIns="91440" bIns="45720" numCol="1" spcCol="0" rtlCol="0" fromWordArt="0" anchor="t" anchorCtr="0" forceAA="0" compatLnSpc="1">
+            <a:prstTxWarp prst="textNoShape">
+              <a:avLst/>
+            </a:prstTxWarp>
+            <a:spAutoFit/>
+          </a:bodyPr>
+          <a:lstStyle/>
+          <a:p>
+            <a:r>
+              <a:rPr lang="en-GB" sz="1200" dirty="0"/>
+              <a:t>I apologies for this gap in my development log and me not mentioning the two previous versions before V.0.9.3.</a:t>
+            </a:r>
+          </a:p>
+          <a:p>
+            <a:endParaRPr lang="en-GB" sz="1200" dirty="0"/>
+          </a:p>
+          <a:p>
+            <a:r>
+              <a:rPr lang="en-GB" sz="1200" dirty="0"/>
+              <a:t>To catch things up V.0.9.1 to V.0.9.2 were my attempts in making the zone sprite change controller. Unfortunately, I failed in both versions to create a working version of the zone sprite change mechanic.</a:t>
+            </a:r>
+          </a:p>
+          <a:p>
+            <a:endParaRPr lang="en-GB" sz="1200" dirty="0"/>
+          </a:p>
+          <a:p>
+            <a:r>
+              <a:rPr lang="en-GB" sz="1200" dirty="0"/>
+              <a:t>I started by giving each individual zone object code telling them to change their sprites based on if an enemy or enemies are in it. The zones changed sprites but didn’t return to normal and was separate from the enemies' movement.</a:t>
+            </a:r>
+          </a:p>
+          <a:p>
+            <a:endParaRPr lang="en-GB" sz="1200" dirty="0"/>
+          </a:p>
+          <a:p>
+            <a:r>
+              <a:rPr lang="en-GB" sz="1200" dirty="0"/>
+              <a:t>In, V.0.9.2 I tried adding the zone sprite change into the enemy's movement code using </a:t>
+            </a:r>
+            <a:r>
+              <a:rPr lang="en-GB" sz="1200" dirty="0" err="1"/>
+              <a:t>object_set_sprite</a:t>
+            </a:r>
+            <a:r>
+              <a:rPr lang="en-GB" sz="1200" dirty="0"/>
+              <a:t>(). This also didn’t work same as V.0.9.1. The issue seemed to lie with the fact that the zones couldn’t revert to their original sprite.</a:t>
+            </a:r>
+          </a:p>
+          <a:p>
+            <a:endParaRPr lang="en-GB" sz="1200" dirty="0"/>
+          </a:p>
+          <a:p>
+            <a:r>
+              <a:rPr lang="en-GB" sz="1200" dirty="0"/>
+              <a:t>V.0.9.3 is where I have a working change zone mechanic. A Friend of mine gave me guidance and explained to me that instead of using </a:t>
+            </a:r>
+            <a:r>
+              <a:rPr lang="en-GB" sz="1200" dirty="0" err="1"/>
+              <a:t>object_set_sprite</a:t>
+            </a:r>
+            <a:r>
+              <a:rPr lang="en-GB" sz="1200" dirty="0"/>
+              <a:t>, I instead make the alternate zone sprite versions into objects and use </a:t>
+            </a:r>
+            <a:r>
+              <a:rPr lang="en-GB" sz="1200" dirty="0" err="1"/>
+              <a:t>instance_layer</a:t>
+            </a:r>
+            <a:r>
+              <a:rPr lang="en-GB" sz="1200" dirty="0"/>
+              <a:t> to create the object zones and destroy them. </a:t>
+            </a:r>
+          </a:p>
+          <a:p>
+            <a:endParaRPr lang="en-GB" sz="1200" dirty="0"/>
+          </a:p>
+          <a:p>
+            <a:r>
+              <a:rPr lang="en-GB" sz="1200" dirty="0"/>
+              <a:t>The way it works is quite simple. What the </a:t>
+            </a:r>
+            <a:r>
+              <a:rPr lang="en-GB" sz="1200" dirty="0" err="1"/>
+              <a:t>instance_layer</a:t>
+            </a:r>
+            <a:r>
+              <a:rPr lang="en-GB" sz="1200" dirty="0"/>
+              <a:t> does is guarantee that the zone object is removed and then replaced. This code was used inside of Level 1 </a:t>
+            </a:r>
+            <a:r>
+              <a:rPr lang="en-GB" sz="1200" dirty="0" err="1"/>
+              <a:t>Gwibers</a:t>
+            </a:r>
+            <a:r>
+              <a:rPr lang="en-GB" sz="1200" dirty="0"/>
+              <a:t> movement code. The code checks if </a:t>
+            </a:r>
+            <a:r>
+              <a:rPr lang="en-GB" sz="1200" dirty="0" err="1"/>
+              <a:t>Gwibers</a:t>
+            </a:r>
+            <a:r>
+              <a:rPr lang="en-GB" sz="1200" dirty="0"/>
+              <a:t> next zone, the one he’s moving to is or isn’t occupied by K9. This allows </a:t>
+            </a:r>
+            <a:r>
+              <a:rPr lang="en-GB" sz="1200" dirty="0" err="1"/>
+              <a:t>Gwiber</a:t>
+            </a:r>
+            <a:r>
+              <a:rPr lang="en-GB" sz="1200" dirty="0"/>
+              <a:t> to destroy the next zones instance layer and replace it with the correct one based on if K9 is or isn’t in it. This also works the other way around and if </a:t>
+            </a:r>
+            <a:r>
+              <a:rPr lang="en-GB" sz="1200" dirty="0" err="1"/>
+              <a:t>Gwiber</a:t>
+            </a:r>
+            <a:r>
+              <a:rPr lang="en-GB" sz="1200" dirty="0"/>
+              <a:t> moves to lets say 1 from 2, </a:t>
+            </a:r>
+            <a:r>
+              <a:rPr lang="en-GB" sz="1200" dirty="0" err="1"/>
+              <a:t>Giwber</a:t>
+            </a:r>
+            <a:r>
+              <a:rPr lang="en-GB" sz="1200" dirty="0"/>
+              <a:t> will check if K9 is or isn’t in Zone 2 and Replace Zones 2 object accordingly.</a:t>
+            </a:r>
+          </a:p>
+          <a:p>
+            <a:endParaRPr lang="en-GB" sz="1200" dirty="0"/>
+          </a:p>
+          <a:p>
+            <a:r>
+              <a:rPr lang="en-GB" sz="1200" dirty="0"/>
+              <a:t>Note: Only Level 1 and Level 1 </a:t>
+            </a:r>
+            <a:r>
+              <a:rPr lang="en-GB" sz="1200" dirty="0" err="1"/>
+              <a:t>Gwiber</a:t>
+            </a:r>
+            <a:r>
+              <a:rPr lang="en-GB" sz="1200" dirty="0"/>
+              <a:t> have this code.</a:t>
+            </a:r>
+          </a:p>
+          <a:p>
+            <a:endParaRPr lang="en-GB" sz="1200" dirty="0"/>
+          </a:p>
+          <a:p>
+            <a:r>
+              <a:rPr lang="en-GB" sz="1200" dirty="0"/>
+              <a:t>I also designed the Double Zones for when enemies are in the same zone together.</a:t>
+            </a:r>
+          </a:p>
+        </p:txBody>
+      </p:sp>
+      <p:sp>
+        <p:nvSpPr>
+          <p:cNvPr id="12" name="TextBox 11">
+            <a:extLst>
+              <a:ext uri="{FF2B5EF4-FFF2-40B4-BE49-F238E27FC236}">
+                <a16:creationId xmlns:a16="http://schemas.microsoft.com/office/drawing/2014/main" id="{83339772-E0CC-C0C2-7CD9-7328158EA734}"/>
+              </a:ext>
+            </a:extLst>
+          </p:cNvPr>
+          <p:cNvSpPr txBox="1"/>
+          <p:nvPr/>
+        </p:nvSpPr>
+        <p:spPr>
+          <a:xfrm>
+            <a:off x="7537550" y="107525"/>
+            <a:ext cx="4286175" cy="3108543"/>
+          </a:xfrm>
+          <a:prstGeom prst="rect">
+            <a:avLst/>
+          </a:prstGeom>
+          <a:noFill/>
+        </p:spPr>
+        <p:txBody>
+          <a:bodyPr wrap="square" rtlCol="0">
+            <a:spAutoFit/>
+          </a:bodyPr>
+          <a:lstStyle/>
+          <a:p>
+            <a:r>
+              <a:rPr lang="en-GB" sz="1400" dirty="0"/>
+              <a:t>What to Do next session</a:t>
+            </a:r>
+          </a:p>
+          <a:p>
+            <a:endParaRPr lang="en-GB" sz="1400" dirty="0"/>
+          </a:p>
+          <a:p>
+            <a:endParaRPr lang="en-GB" sz="1400" dirty="0"/>
+          </a:p>
+          <a:p>
+            <a:endParaRPr lang="en-GB" sz="1400" dirty="0"/>
+          </a:p>
+          <a:p>
+            <a:endParaRPr lang="en-GB" sz="1400" dirty="0"/>
+          </a:p>
+          <a:p>
+            <a:endParaRPr lang="en-GB" sz="1400" dirty="0"/>
+          </a:p>
+          <a:p>
+            <a:endParaRPr lang="en-GB" sz="1400" dirty="0"/>
+          </a:p>
+          <a:p>
+            <a:endParaRPr lang="en-GB" sz="1400" dirty="0"/>
+          </a:p>
+          <a:p>
+            <a:endParaRPr lang="en-GB" sz="1400" dirty="0"/>
+          </a:p>
+          <a:p>
+            <a:endParaRPr lang="en-GB" sz="1400" dirty="0"/>
+          </a:p>
+          <a:p>
+            <a:endParaRPr lang="en-GB" sz="1400" dirty="0"/>
+          </a:p>
+          <a:p>
+            <a:endParaRPr lang="en-GB" sz="1400" dirty="0"/>
+          </a:p>
+          <a:p>
+            <a:endParaRPr lang="en-GB" sz="1400" dirty="0"/>
+          </a:p>
+          <a:p>
+            <a:endParaRPr lang="en-GB" sz="1400" dirty="0"/>
+          </a:p>
+        </p:txBody>
+      </p:sp>
+      <p:pic>
+        <p:nvPicPr>
+          <p:cNvPr id="6" name="Picture 5" descr="A screen shot of a computer program&#10;&#10;AI-generated content may be incorrect.">
+            <a:extLst>
+              <a:ext uri="{FF2B5EF4-FFF2-40B4-BE49-F238E27FC236}">
+                <a16:creationId xmlns:a16="http://schemas.microsoft.com/office/drawing/2014/main" id="{45C09BB4-6063-9416-F5F4-473ED8B94638}"/>
+              </a:ext>
+            </a:extLst>
+          </p:cNvPr>
+          <p:cNvPicPr>
+            <a:picLocks noChangeAspect="1"/>
+          </p:cNvPicPr>
+          <p:nvPr/>
+        </p:nvPicPr>
+        <p:blipFill>
+          <a:blip r:embed="rId2"/>
+          <a:stretch>
+            <a:fillRect/>
+          </a:stretch>
+        </p:blipFill>
+        <p:spPr>
+          <a:xfrm>
+            <a:off x="5316789" y="2113037"/>
+            <a:ext cx="6096883" cy="4484159"/>
+          </a:xfrm>
+          <a:prstGeom prst="rect">
+            <a:avLst/>
+          </a:prstGeom>
+        </p:spPr>
+      </p:pic>
+      <p:sp>
+        <p:nvSpPr>
+          <p:cNvPr id="8" name="TextBox 7">
+            <a:extLst>
+              <a:ext uri="{FF2B5EF4-FFF2-40B4-BE49-F238E27FC236}">
+                <a16:creationId xmlns:a16="http://schemas.microsoft.com/office/drawing/2014/main" id="{88E7019B-9FB6-BEDE-7214-5C543DB0234D}"/>
+              </a:ext>
+            </a:extLst>
+          </p:cNvPr>
+          <p:cNvSpPr txBox="1"/>
+          <p:nvPr/>
+        </p:nvSpPr>
+        <p:spPr>
+          <a:xfrm>
+            <a:off x="5015350" y="1028700"/>
+            <a:ext cx="1875307" cy="830997"/>
+          </a:xfrm>
+          <a:prstGeom prst="rect">
+            <a:avLst/>
+          </a:prstGeom>
+          <a:noFill/>
+        </p:spPr>
+        <p:txBody>
+          <a:bodyPr wrap="square" rtlCol="0">
+            <a:spAutoFit/>
+          </a:bodyPr>
+          <a:lstStyle/>
+          <a:p>
+            <a:r>
+              <a:rPr lang="en-GB" sz="1200" dirty="0"/>
+              <a:t>Last thing, I made a sound controller to make it easier to manage the sounds in the game.</a:t>
+            </a:r>
+          </a:p>
+        </p:txBody>
+      </p:sp>
+    </p:spTree>
+    <p:extLst>
+      <p:ext uri="{BB962C8B-B14F-4D97-AF65-F5344CB8AC3E}">
+        <p14:creationId xmlns:p14="http://schemas.microsoft.com/office/powerpoint/2010/main" val="3293056493"/>
+      </p:ext>
+    </p:extLst>
+  </p:cSld>
+  <p:clrMapOvr>
+    <a:masterClrMapping/>
+  </p:clrMapOvr>
+</p:sld>
+</file>
+
+<file path=ppt/slides/slide33.xml><?xml version="1.0" encoding="utf-8"?>
 <p:sld xmlns:a="http://schemas.openxmlformats.org/drawingml/2006/main" xmlns:r="http://schemas.openxmlformats.org/officeDocument/2006/relationships" xmlns:p="http://schemas.openxmlformats.org/presentationml/2006/main">
   <p:cSld>
     <p:spTree>
@@ -13949,7 +14412,7 @@
 </p:sld>
 </file>
 
-<file path=ppt/slides/slide33.xml><?xml version="1.0" encoding="utf-8"?>
+<file path=ppt/slides/slide34.xml><?xml version="1.0" encoding="utf-8"?>
 <p:sld xmlns:a="http://schemas.openxmlformats.org/drawingml/2006/main" xmlns:r="http://schemas.openxmlformats.org/officeDocument/2006/relationships" xmlns:p="http://schemas.openxmlformats.org/presentationml/2006/main">
   <p:cSld>
     <p:spTree>
@@ -14540,7 +15003,7 @@
 </p:sld>
 </file>
 
-<file path=ppt/slides/slide34.xml><?xml version="1.0" encoding="utf-8"?>
+<file path=ppt/slides/slide35.xml><?xml version="1.0" encoding="utf-8"?>
 <p:sld xmlns:a="http://schemas.openxmlformats.org/drawingml/2006/main" xmlns:r="http://schemas.openxmlformats.org/officeDocument/2006/relationships" xmlns:p="http://schemas.openxmlformats.org/presentationml/2006/main">
   <p:cSld>
     <p:spTree>
@@ -15064,7 +15527,7 @@
 </p:sld>
 </file>
 
-<file path=ppt/slides/slide35.xml><?xml version="1.0" encoding="utf-8"?>
+<file path=ppt/slides/slide36.xml><?xml version="1.0" encoding="utf-8"?>
 <p:sld xmlns:a="http://schemas.openxmlformats.org/drawingml/2006/main" xmlns:r="http://schemas.openxmlformats.org/officeDocument/2006/relationships" xmlns:p="http://schemas.openxmlformats.org/presentationml/2006/main">
   <p:cSld>
     <p:spTree>
@@ -15578,7 +16041,7 @@
 </p:sld>
 </file>
 
-<file path=ppt/slides/slide36.xml><?xml version="1.0" encoding="utf-8"?>
+<file path=ppt/slides/slide37.xml><?xml version="1.0" encoding="utf-8"?>
 <p:sld xmlns:a="http://schemas.openxmlformats.org/drawingml/2006/main" xmlns:r="http://schemas.openxmlformats.org/officeDocument/2006/relationships" xmlns:p="http://schemas.openxmlformats.org/presentationml/2006/main">
   <p:cSld>
     <p:spTree>
@@ -16070,7 +16533,7 @@
 </p:sld>
 </file>
 
-<file path=ppt/slides/slide37.xml><?xml version="1.0" encoding="utf-8"?>
+<file path=ppt/slides/slide38.xml><?xml version="1.0" encoding="utf-8"?>
 <p:sld xmlns:a="http://schemas.openxmlformats.org/drawingml/2006/main" xmlns:r="http://schemas.openxmlformats.org/officeDocument/2006/relationships" xmlns:p="http://schemas.openxmlformats.org/presentationml/2006/main">
   <p:cSld>
     <p:spTree>
@@ -16751,7 +17214,7 @@
 </p:sld>
 </file>
 
-<file path=ppt/slides/slide38.xml><?xml version="1.0" encoding="utf-8"?>
+<file path=ppt/slides/slide39.xml><?xml version="1.0" encoding="utf-8"?>
 <p:sld xmlns:a="http://schemas.openxmlformats.org/drawingml/2006/main" xmlns:r="http://schemas.openxmlformats.org/officeDocument/2006/relationships" xmlns:p="http://schemas.openxmlformats.org/presentationml/2006/main">
   <p:cSld>
     <p:spTree>
@@ -17454,7 +17917,391 @@
 </p:sld>
 </file>
 
-<file path=ppt/slides/slide39.xml><?xml version="1.0" encoding="utf-8"?>
+<file path=ppt/slides/slide4.xml><?xml version="1.0" encoding="utf-8"?>
+<p:sld xmlns:a="http://schemas.openxmlformats.org/drawingml/2006/main" xmlns:r="http://schemas.openxmlformats.org/officeDocument/2006/relationships" xmlns:p="http://schemas.openxmlformats.org/presentationml/2006/main">
+  <p:cSld>
+    <p:spTree>
+      <p:nvGrpSpPr>
+        <p:cNvPr id="1" name="">
+          <a:extLst>
+            <a:ext uri="{FF2B5EF4-FFF2-40B4-BE49-F238E27FC236}">
+              <a16:creationId xmlns:a16="http://schemas.microsoft.com/office/drawing/2014/main" id="{B71AF447-2503-6E06-EB64-6A29C299795D}"/>
+            </a:ext>
+          </a:extLst>
+        </p:cNvPr>
+        <p:cNvGrpSpPr/>
+        <p:nvPr/>
+      </p:nvGrpSpPr>
+      <p:grpSpPr>
+        <a:xfrm>
+          <a:off x="0" y="0"/>
+          <a:ext cx="0" cy="0"/>
+          <a:chOff x="0" y="0"/>
+          <a:chExt cx="0" cy="0"/>
+        </a:xfrm>
+      </p:grpSpPr>
+      <p:sp>
+        <p:nvSpPr>
+          <p:cNvPr id="4" name="TextBox 3">
+            <a:extLst>
+              <a:ext uri="{FF2B5EF4-FFF2-40B4-BE49-F238E27FC236}">
+                <a16:creationId xmlns:a16="http://schemas.microsoft.com/office/drawing/2014/main" id="{3ABD7D05-D183-64C6-1BA1-72453612143E}"/>
+              </a:ext>
+            </a:extLst>
+          </p:cNvPr>
+          <p:cNvSpPr txBox="1"/>
+          <p:nvPr/>
+        </p:nvSpPr>
+        <p:spPr>
+          <a:xfrm>
+            <a:off x="7763992" y="90121"/>
+            <a:ext cx="1809641" cy="338554"/>
+          </a:xfrm>
+          <a:prstGeom prst="rect">
+            <a:avLst/>
+          </a:prstGeom>
+          <a:noFill/>
+          <a:ln>
+            <a:solidFill>
+              <a:schemeClr val="tx1"/>
+            </a:solidFill>
+          </a:ln>
+        </p:spPr>
+        <p:txBody>
+          <a:bodyPr rot="0" spcFirstLastPara="0" vertOverflow="overflow" horzOverflow="overflow" vert="horz" wrap="square" lIns="91440" tIns="45720" rIns="91440" bIns="45720" numCol="1" spcCol="0" rtlCol="0" fromWordArt="0" anchor="t" anchorCtr="0" forceAA="0" compatLnSpc="1">
+            <a:prstTxWarp prst="textNoShape">
+              <a:avLst/>
+            </a:prstTxWarp>
+            <a:spAutoFit/>
+          </a:bodyPr>
+          <a:lstStyle/>
+          <a:p>
+            <a:r>
+              <a:rPr lang="en-GB" sz="1600" dirty="0"/>
+              <a:t>Date – 24/11/2025</a:t>
+            </a:r>
+          </a:p>
+        </p:txBody>
+      </p:sp>
+      <p:sp>
+        <p:nvSpPr>
+          <p:cNvPr id="2" name="TextBox 1">
+            <a:extLst>
+              <a:ext uri="{FF2B5EF4-FFF2-40B4-BE49-F238E27FC236}">
+                <a16:creationId xmlns:a16="http://schemas.microsoft.com/office/drawing/2014/main" id="{3E37F77A-82C0-2039-AD51-40366B52EBEB}"/>
+              </a:ext>
+            </a:extLst>
+          </p:cNvPr>
+          <p:cNvSpPr txBox="1"/>
+          <p:nvPr/>
+        </p:nvSpPr>
+        <p:spPr>
+          <a:xfrm>
+            <a:off x="5651845" y="90120"/>
+            <a:ext cx="1959856" cy="338554"/>
+          </a:xfrm>
+          <a:prstGeom prst="rect">
+            <a:avLst/>
+          </a:prstGeom>
+          <a:noFill/>
+          <a:ln>
+            <a:solidFill>
+              <a:schemeClr val="tx1"/>
+            </a:solidFill>
+          </a:ln>
+        </p:spPr>
+        <p:txBody>
+          <a:bodyPr rot="0" spcFirstLastPara="0" vertOverflow="overflow" horzOverflow="overflow" vert="horz" wrap="square" lIns="91440" tIns="45720" rIns="91440" bIns="45720" numCol="1" spcCol="0" rtlCol="0" fromWordArt="0" anchor="t" anchorCtr="0" forceAA="0" compatLnSpc="1">
+            <a:prstTxWarp prst="textNoShape">
+              <a:avLst/>
+            </a:prstTxWarp>
+            <a:spAutoFit/>
+          </a:bodyPr>
+          <a:lstStyle/>
+          <a:p>
+            <a:r>
+              <a:rPr lang="en-GB" sz="1600" dirty="0"/>
+              <a:t>Game Build V.0.2</a:t>
+            </a:r>
+          </a:p>
+        </p:txBody>
+      </p:sp>
+      <p:sp>
+        <p:nvSpPr>
+          <p:cNvPr id="3" name="TextBox 2">
+            <a:extLst>
+              <a:ext uri="{FF2B5EF4-FFF2-40B4-BE49-F238E27FC236}">
+                <a16:creationId xmlns:a16="http://schemas.microsoft.com/office/drawing/2014/main" id="{2886F3E7-61E5-445C-5038-15B1F86B5A87}"/>
+              </a:ext>
+            </a:extLst>
+          </p:cNvPr>
+          <p:cNvSpPr txBox="1"/>
+          <p:nvPr/>
+        </p:nvSpPr>
+        <p:spPr>
+          <a:xfrm>
+            <a:off x="5642854" y="578678"/>
+            <a:ext cx="3926490" cy="3354765"/>
+          </a:xfrm>
+          <a:prstGeom prst="rect">
+            <a:avLst/>
+          </a:prstGeom>
+          <a:noFill/>
+          <a:ln>
+            <a:solidFill>
+              <a:schemeClr val="tx1"/>
+            </a:solidFill>
+          </a:ln>
+        </p:spPr>
+        <p:txBody>
+          <a:bodyPr rot="0" spcFirstLastPara="0" vertOverflow="overflow" horzOverflow="overflow" vert="horz" wrap="square" lIns="91440" tIns="45720" rIns="91440" bIns="45720" numCol="1" spcCol="0" rtlCol="0" fromWordArt="0" anchor="t" anchorCtr="0" forceAA="0" compatLnSpc="1">
+            <a:prstTxWarp prst="textNoShape">
+              <a:avLst/>
+            </a:prstTxWarp>
+            <a:spAutoFit/>
+          </a:bodyPr>
+          <a:lstStyle/>
+          <a:p>
+            <a:r>
+              <a:rPr lang="en-GB" sz="1400" dirty="0"/>
+              <a:t>Summary Of Session</a:t>
+            </a:r>
+          </a:p>
+          <a:p>
+            <a:endParaRPr lang="en-GB" sz="1400" dirty="0"/>
+          </a:p>
+          <a:p>
+            <a:r>
+              <a:rPr lang="en-GB" sz="1400" dirty="0"/>
+              <a:t>Refined Sprite designs such as the doors. Created template buttons for the doors both from main view and close-up view.</a:t>
+            </a:r>
+          </a:p>
+          <a:p>
+            <a:endParaRPr lang="en-GB" sz="1400" dirty="0"/>
+          </a:p>
+          <a:p>
+            <a:r>
+              <a:rPr lang="en-GB" sz="1400" dirty="0"/>
+              <a:t>Named each zones area/location.</a:t>
+            </a:r>
+          </a:p>
+          <a:p>
+            <a:endParaRPr lang="en-GB" sz="1400" dirty="0"/>
+          </a:p>
+          <a:p>
+            <a:r>
+              <a:rPr lang="en-GB" sz="1400" dirty="0"/>
+              <a:t>Created variables for </a:t>
+            </a:r>
+            <a:r>
+              <a:rPr lang="en-GB" sz="1400" dirty="0" err="1"/>
+              <a:t>obj_camera</a:t>
+            </a:r>
+            <a:r>
+              <a:rPr lang="en-GB" sz="1400" dirty="0"/>
+              <a:t>.</a:t>
+            </a:r>
+          </a:p>
+          <a:p>
+            <a:endParaRPr lang="en-GB" sz="1400" dirty="0"/>
+          </a:p>
+          <a:p>
+            <a:r>
+              <a:rPr lang="en-GB" sz="1400" dirty="0"/>
+              <a:t>Added Up close door to the up close door zones for both left and right.</a:t>
+            </a:r>
+          </a:p>
+          <a:p>
+            <a:endParaRPr lang="en-GB" sz="1400" dirty="0"/>
+          </a:p>
+          <a:p>
+            <a:endParaRPr lang="en-GB" sz="1400" dirty="0"/>
+          </a:p>
+          <a:p>
+            <a:endParaRPr lang="en-GB" sz="1600" dirty="0"/>
+          </a:p>
+        </p:txBody>
+      </p:sp>
+      <p:sp>
+        <p:nvSpPr>
+          <p:cNvPr id="6" name="TextBox 5">
+            <a:extLst>
+              <a:ext uri="{FF2B5EF4-FFF2-40B4-BE49-F238E27FC236}">
+                <a16:creationId xmlns:a16="http://schemas.microsoft.com/office/drawing/2014/main" id="{6C671371-B8F1-97C1-D2C5-BD2850E814D7}"/>
+              </a:ext>
+            </a:extLst>
+          </p:cNvPr>
+          <p:cNvSpPr txBox="1"/>
+          <p:nvPr/>
+        </p:nvSpPr>
+        <p:spPr>
+          <a:xfrm>
+            <a:off x="9642445" y="54237"/>
+            <a:ext cx="2438400" cy="2308324"/>
+          </a:xfrm>
+          <a:prstGeom prst="rect">
+            <a:avLst/>
+          </a:prstGeom>
+          <a:noFill/>
+          <a:ln>
+            <a:solidFill>
+              <a:schemeClr val="tx1"/>
+            </a:solidFill>
+          </a:ln>
+        </p:spPr>
+        <p:txBody>
+          <a:bodyPr rot="0" spcFirstLastPara="0" vertOverflow="overflow" horzOverflow="overflow" vert="horz" wrap="square" lIns="91440" tIns="45720" rIns="91440" bIns="45720" numCol="1" spcCol="0" rtlCol="0" fromWordArt="0" anchor="t" anchorCtr="0" forceAA="0" compatLnSpc="1">
+            <a:prstTxWarp prst="textNoShape">
+              <a:avLst/>
+            </a:prstTxWarp>
+            <a:spAutoFit/>
+          </a:bodyPr>
+          <a:lstStyle/>
+          <a:p>
+            <a:r>
+              <a:rPr lang="en-GB" sz="1200" dirty="0"/>
+              <a:t>What to do for Next Session</a:t>
+            </a:r>
+          </a:p>
+          <a:p>
+            <a:endParaRPr lang="en-GB" sz="1200" dirty="0"/>
+          </a:p>
+          <a:p>
+            <a:r>
+              <a:rPr lang="en-GB" sz="1200" dirty="0"/>
+              <a:t>Work on sound designs for the game and the characters.</a:t>
+            </a:r>
+          </a:p>
+          <a:p>
+            <a:endParaRPr lang="en-GB" sz="1200" dirty="0"/>
+          </a:p>
+          <a:p>
+            <a:r>
+              <a:rPr lang="en-GB" sz="1200" dirty="0"/>
+              <a:t>Use audio and SFX from other horror games as reference or for the smaller sounds.</a:t>
+            </a:r>
+          </a:p>
+          <a:p>
+            <a:endParaRPr lang="en-GB" sz="1200" dirty="0"/>
+          </a:p>
+          <a:p>
+            <a:r>
+              <a:rPr lang="en-GB" sz="1200" b="1" dirty="0"/>
+              <a:t>Get Camera system operational</a:t>
+            </a:r>
+          </a:p>
+          <a:p>
+            <a:endParaRPr lang="en-GB" sz="1200" dirty="0"/>
+          </a:p>
+          <a:p>
+            <a:endParaRPr lang="en-GB" sz="1200" dirty="0"/>
+          </a:p>
+        </p:txBody>
+      </p:sp>
+      <p:pic>
+        <p:nvPicPr>
+          <p:cNvPr id="8" name="Picture 7">
+            <a:extLst>
+              <a:ext uri="{FF2B5EF4-FFF2-40B4-BE49-F238E27FC236}">
+                <a16:creationId xmlns:a16="http://schemas.microsoft.com/office/drawing/2014/main" id="{2B25F36B-7370-C022-0982-D33C4899384B}"/>
+              </a:ext>
+            </a:extLst>
+          </p:cNvPr>
+          <p:cNvPicPr>
+            <a:picLocks noChangeAspect="1"/>
+          </p:cNvPicPr>
+          <p:nvPr/>
+        </p:nvPicPr>
+        <p:blipFill>
+          <a:blip r:embed="rId2"/>
+          <a:stretch>
+            <a:fillRect/>
+          </a:stretch>
+        </p:blipFill>
+        <p:spPr>
+          <a:xfrm>
+            <a:off x="0" y="4302897"/>
+            <a:ext cx="4356284" cy="2362127"/>
+          </a:xfrm>
+          <a:prstGeom prst="rect">
+            <a:avLst/>
+          </a:prstGeom>
+        </p:spPr>
+      </p:pic>
+      <p:pic>
+        <p:nvPicPr>
+          <p:cNvPr id="10" name="Picture 9">
+            <a:extLst>
+              <a:ext uri="{FF2B5EF4-FFF2-40B4-BE49-F238E27FC236}">
+                <a16:creationId xmlns:a16="http://schemas.microsoft.com/office/drawing/2014/main" id="{330D62C2-AA53-B794-C0B6-312FEE7FF2DF}"/>
+              </a:ext>
+            </a:extLst>
+          </p:cNvPr>
+          <p:cNvPicPr>
+            <a:picLocks noChangeAspect="1"/>
+          </p:cNvPicPr>
+          <p:nvPr/>
+        </p:nvPicPr>
+        <p:blipFill>
+          <a:blip r:embed="rId3"/>
+          <a:stretch>
+            <a:fillRect/>
+          </a:stretch>
+        </p:blipFill>
+        <p:spPr>
+          <a:xfrm>
+            <a:off x="294127" y="428674"/>
+            <a:ext cx="1704008" cy="3354765"/>
+          </a:xfrm>
+          <a:prstGeom prst="rect">
+            <a:avLst/>
+          </a:prstGeom>
+        </p:spPr>
+      </p:pic>
+      <p:pic>
+        <p:nvPicPr>
+          <p:cNvPr id="13" name="Picture 12">
+            <a:extLst>
+              <a:ext uri="{FF2B5EF4-FFF2-40B4-BE49-F238E27FC236}">
+                <a16:creationId xmlns:a16="http://schemas.microsoft.com/office/drawing/2014/main" id="{350428BE-0AC0-96D2-D92A-71AD3D19FADD}"/>
+              </a:ext>
+            </a:extLst>
+          </p:cNvPr>
+          <p:cNvPicPr>
+            <a:picLocks noChangeAspect="1"/>
+          </p:cNvPicPr>
+          <p:nvPr/>
+        </p:nvPicPr>
+        <p:blipFill>
+          <a:blip r:embed="rId4"/>
+          <a:stretch>
+            <a:fillRect/>
+          </a:stretch>
+        </p:blipFill>
+        <p:spPr>
+          <a:xfrm>
+            <a:off x="2092643" y="885888"/>
+            <a:ext cx="3477110" cy="952633"/>
+          </a:xfrm>
+          <a:prstGeom prst="rect">
+            <a:avLst/>
+          </a:prstGeom>
+        </p:spPr>
+      </p:pic>
+    </p:spTree>
+    <p:extLst>
+      <p:ext uri="{BB962C8B-B14F-4D97-AF65-F5344CB8AC3E}">
+        <p14:creationId xmlns:p14="http://schemas.microsoft.com/office/powerpoint/2010/main" val="1285422550"/>
+      </p:ext>
+    </p:extLst>
+  </p:cSld>
+  <p:clrMapOvr>
+    <a:masterClrMapping/>
+  </p:clrMapOvr>
+</p:sld>
+</file>
+
+<file path=ppt/slides/slide40.xml><?xml version="1.0" encoding="utf-8"?>
 <p:sld xmlns:a="http://schemas.openxmlformats.org/drawingml/2006/main" xmlns:r="http://schemas.openxmlformats.org/officeDocument/2006/relationships" xmlns:p="http://schemas.openxmlformats.org/presentationml/2006/main">
   <p:cSld>
     <p:spTree>
@@ -17953,390 +18800,6 @@
     <p:extLst>
       <p:ext uri="{BB962C8B-B14F-4D97-AF65-F5344CB8AC3E}">
         <p14:creationId xmlns:p14="http://schemas.microsoft.com/office/powerpoint/2010/main" val="3685646310"/>
-      </p:ext>
-    </p:extLst>
-  </p:cSld>
-  <p:clrMapOvr>
-    <a:masterClrMapping/>
-  </p:clrMapOvr>
-</p:sld>
-</file>
-
-<file path=ppt/slides/slide4.xml><?xml version="1.0" encoding="utf-8"?>
-<p:sld xmlns:a="http://schemas.openxmlformats.org/drawingml/2006/main" xmlns:r="http://schemas.openxmlformats.org/officeDocument/2006/relationships" xmlns:p="http://schemas.openxmlformats.org/presentationml/2006/main">
-  <p:cSld>
-    <p:spTree>
-      <p:nvGrpSpPr>
-        <p:cNvPr id="1" name="">
-          <a:extLst>
-            <a:ext uri="{FF2B5EF4-FFF2-40B4-BE49-F238E27FC236}">
-              <a16:creationId xmlns:a16="http://schemas.microsoft.com/office/drawing/2014/main" id="{B71AF447-2503-6E06-EB64-6A29C299795D}"/>
-            </a:ext>
-          </a:extLst>
-        </p:cNvPr>
-        <p:cNvGrpSpPr/>
-        <p:nvPr/>
-      </p:nvGrpSpPr>
-      <p:grpSpPr>
-        <a:xfrm>
-          <a:off x="0" y="0"/>
-          <a:ext cx="0" cy="0"/>
-          <a:chOff x="0" y="0"/>
-          <a:chExt cx="0" cy="0"/>
-        </a:xfrm>
-      </p:grpSpPr>
-      <p:sp>
-        <p:nvSpPr>
-          <p:cNvPr id="4" name="TextBox 3">
-            <a:extLst>
-              <a:ext uri="{FF2B5EF4-FFF2-40B4-BE49-F238E27FC236}">
-                <a16:creationId xmlns:a16="http://schemas.microsoft.com/office/drawing/2014/main" id="{3ABD7D05-D183-64C6-1BA1-72453612143E}"/>
-              </a:ext>
-            </a:extLst>
-          </p:cNvPr>
-          <p:cNvSpPr txBox="1"/>
-          <p:nvPr/>
-        </p:nvSpPr>
-        <p:spPr>
-          <a:xfrm>
-            <a:off x="7763992" y="90121"/>
-            <a:ext cx="1809641" cy="338554"/>
-          </a:xfrm>
-          <a:prstGeom prst="rect">
-            <a:avLst/>
-          </a:prstGeom>
-          <a:noFill/>
-          <a:ln>
-            <a:solidFill>
-              <a:schemeClr val="tx1"/>
-            </a:solidFill>
-          </a:ln>
-        </p:spPr>
-        <p:txBody>
-          <a:bodyPr rot="0" spcFirstLastPara="0" vertOverflow="overflow" horzOverflow="overflow" vert="horz" wrap="square" lIns="91440" tIns="45720" rIns="91440" bIns="45720" numCol="1" spcCol="0" rtlCol="0" fromWordArt="0" anchor="t" anchorCtr="0" forceAA="0" compatLnSpc="1">
-            <a:prstTxWarp prst="textNoShape">
-              <a:avLst/>
-            </a:prstTxWarp>
-            <a:spAutoFit/>
-          </a:bodyPr>
-          <a:lstStyle/>
-          <a:p>
-            <a:r>
-              <a:rPr lang="en-GB" sz="1600" dirty="0"/>
-              <a:t>Date – 24/11/2025</a:t>
-            </a:r>
-          </a:p>
-        </p:txBody>
-      </p:sp>
-      <p:sp>
-        <p:nvSpPr>
-          <p:cNvPr id="2" name="TextBox 1">
-            <a:extLst>
-              <a:ext uri="{FF2B5EF4-FFF2-40B4-BE49-F238E27FC236}">
-                <a16:creationId xmlns:a16="http://schemas.microsoft.com/office/drawing/2014/main" id="{3E37F77A-82C0-2039-AD51-40366B52EBEB}"/>
-              </a:ext>
-            </a:extLst>
-          </p:cNvPr>
-          <p:cNvSpPr txBox="1"/>
-          <p:nvPr/>
-        </p:nvSpPr>
-        <p:spPr>
-          <a:xfrm>
-            <a:off x="5651845" y="90120"/>
-            <a:ext cx="1959856" cy="338554"/>
-          </a:xfrm>
-          <a:prstGeom prst="rect">
-            <a:avLst/>
-          </a:prstGeom>
-          <a:noFill/>
-          <a:ln>
-            <a:solidFill>
-              <a:schemeClr val="tx1"/>
-            </a:solidFill>
-          </a:ln>
-        </p:spPr>
-        <p:txBody>
-          <a:bodyPr rot="0" spcFirstLastPara="0" vertOverflow="overflow" horzOverflow="overflow" vert="horz" wrap="square" lIns="91440" tIns="45720" rIns="91440" bIns="45720" numCol="1" spcCol="0" rtlCol="0" fromWordArt="0" anchor="t" anchorCtr="0" forceAA="0" compatLnSpc="1">
-            <a:prstTxWarp prst="textNoShape">
-              <a:avLst/>
-            </a:prstTxWarp>
-            <a:spAutoFit/>
-          </a:bodyPr>
-          <a:lstStyle/>
-          <a:p>
-            <a:r>
-              <a:rPr lang="en-GB" sz="1600" dirty="0"/>
-              <a:t>Game Build V.0.2</a:t>
-            </a:r>
-          </a:p>
-        </p:txBody>
-      </p:sp>
-      <p:sp>
-        <p:nvSpPr>
-          <p:cNvPr id="3" name="TextBox 2">
-            <a:extLst>
-              <a:ext uri="{FF2B5EF4-FFF2-40B4-BE49-F238E27FC236}">
-                <a16:creationId xmlns:a16="http://schemas.microsoft.com/office/drawing/2014/main" id="{2886F3E7-61E5-445C-5038-15B1F86B5A87}"/>
-              </a:ext>
-            </a:extLst>
-          </p:cNvPr>
-          <p:cNvSpPr txBox="1"/>
-          <p:nvPr/>
-        </p:nvSpPr>
-        <p:spPr>
-          <a:xfrm>
-            <a:off x="5642854" y="578678"/>
-            <a:ext cx="3926490" cy="3354765"/>
-          </a:xfrm>
-          <a:prstGeom prst="rect">
-            <a:avLst/>
-          </a:prstGeom>
-          <a:noFill/>
-          <a:ln>
-            <a:solidFill>
-              <a:schemeClr val="tx1"/>
-            </a:solidFill>
-          </a:ln>
-        </p:spPr>
-        <p:txBody>
-          <a:bodyPr rot="0" spcFirstLastPara="0" vertOverflow="overflow" horzOverflow="overflow" vert="horz" wrap="square" lIns="91440" tIns="45720" rIns="91440" bIns="45720" numCol="1" spcCol="0" rtlCol="0" fromWordArt="0" anchor="t" anchorCtr="0" forceAA="0" compatLnSpc="1">
-            <a:prstTxWarp prst="textNoShape">
-              <a:avLst/>
-            </a:prstTxWarp>
-            <a:spAutoFit/>
-          </a:bodyPr>
-          <a:lstStyle/>
-          <a:p>
-            <a:r>
-              <a:rPr lang="en-GB" sz="1400" dirty="0"/>
-              <a:t>Summary Of Session</a:t>
-            </a:r>
-          </a:p>
-          <a:p>
-            <a:endParaRPr lang="en-GB" sz="1400" dirty="0"/>
-          </a:p>
-          <a:p>
-            <a:r>
-              <a:rPr lang="en-GB" sz="1400" dirty="0"/>
-              <a:t>Refined Sprite designs such as the doors. Created template buttons for the doors both from main view and close-up view.</a:t>
-            </a:r>
-          </a:p>
-          <a:p>
-            <a:endParaRPr lang="en-GB" sz="1400" dirty="0"/>
-          </a:p>
-          <a:p>
-            <a:r>
-              <a:rPr lang="en-GB" sz="1400" dirty="0"/>
-              <a:t>Named each zones area/location.</a:t>
-            </a:r>
-          </a:p>
-          <a:p>
-            <a:endParaRPr lang="en-GB" sz="1400" dirty="0"/>
-          </a:p>
-          <a:p>
-            <a:r>
-              <a:rPr lang="en-GB" sz="1400" dirty="0"/>
-              <a:t>Created variables for </a:t>
-            </a:r>
-            <a:r>
-              <a:rPr lang="en-GB" sz="1400" dirty="0" err="1"/>
-              <a:t>obj_camera</a:t>
-            </a:r>
-            <a:r>
-              <a:rPr lang="en-GB" sz="1400" dirty="0"/>
-              <a:t>.</a:t>
-            </a:r>
-          </a:p>
-          <a:p>
-            <a:endParaRPr lang="en-GB" sz="1400" dirty="0"/>
-          </a:p>
-          <a:p>
-            <a:r>
-              <a:rPr lang="en-GB" sz="1400" dirty="0"/>
-              <a:t>Added Up close door to the up close door zones for both left and right.</a:t>
-            </a:r>
-          </a:p>
-          <a:p>
-            <a:endParaRPr lang="en-GB" sz="1400" dirty="0"/>
-          </a:p>
-          <a:p>
-            <a:endParaRPr lang="en-GB" sz="1400" dirty="0"/>
-          </a:p>
-          <a:p>
-            <a:endParaRPr lang="en-GB" sz="1600" dirty="0"/>
-          </a:p>
-        </p:txBody>
-      </p:sp>
-      <p:sp>
-        <p:nvSpPr>
-          <p:cNvPr id="6" name="TextBox 5">
-            <a:extLst>
-              <a:ext uri="{FF2B5EF4-FFF2-40B4-BE49-F238E27FC236}">
-                <a16:creationId xmlns:a16="http://schemas.microsoft.com/office/drawing/2014/main" id="{6C671371-B8F1-97C1-D2C5-BD2850E814D7}"/>
-              </a:ext>
-            </a:extLst>
-          </p:cNvPr>
-          <p:cNvSpPr txBox="1"/>
-          <p:nvPr/>
-        </p:nvSpPr>
-        <p:spPr>
-          <a:xfrm>
-            <a:off x="9642445" y="54237"/>
-            <a:ext cx="2438400" cy="2308324"/>
-          </a:xfrm>
-          <a:prstGeom prst="rect">
-            <a:avLst/>
-          </a:prstGeom>
-          <a:noFill/>
-          <a:ln>
-            <a:solidFill>
-              <a:schemeClr val="tx1"/>
-            </a:solidFill>
-          </a:ln>
-        </p:spPr>
-        <p:txBody>
-          <a:bodyPr rot="0" spcFirstLastPara="0" vertOverflow="overflow" horzOverflow="overflow" vert="horz" wrap="square" lIns="91440" tIns="45720" rIns="91440" bIns="45720" numCol="1" spcCol="0" rtlCol="0" fromWordArt="0" anchor="t" anchorCtr="0" forceAA="0" compatLnSpc="1">
-            <a:prstTxWarp prst="textNoShape">
-              <a:avLst/>
-            </a:prstTxWarp>
-            <a:spAutoFit/>
-          </a:bodyPr>
-          <a:lstStyle/>
-          <a:p>
-            <a:r>
-              <a:rPr lang="en-GB" sz="1200" dirty="0"/>
-              <a:t>What to do for Next Session</a:t>
-            </a:r>
-          </a:p>
-          <a:p>
-            <a:endParaRPr lang="en-GB" sz="1200" dirty="0"/>
-          </a:p>
-          <a:p>
-            <a:r>
-              <a:rPr lang="en-GB" sz="1200" dirty="0"/>
-              <a:t>Work on sound designs for the game and the characters.</a:t>
-            </a:r>
-          </a:p>
-          <a:p>
-            <a:endParaRPr lang="en-GB" sz="1200" dirty="0"/>
-          </a:p>
-          <a:p>
-            <a:r>
-              <a:rPr lang="en-GB" sz="1200" dirty="0"/>
-              <a:t>Use audio and SFX from other horror games as reference or for the smaller sounds.</a:t>
-            </a:r>
-          </a:p>
-          <a:p>
-            <a:endParaRPr lang="en-GB" sz="1200" dirty="0"/>
-          </a:p>
-          <a:p>
-            <a:r>
-              <a:rPr lang="en-GB" sz="1200" b="1" dirty="0"/>
-              <a:t>Get Camera system operational</a:t>
-            </a:r>
-          </a:p>
-          <a:p>
-            <a:endParaRPr lang="en-GB" sz="1200" dirty="0"/>
-          </a:p>
-          <a:p>
-            <a:endParaRPr lang="en-GB" sz="1200" dirty="0"/>
-          </a:p>
-        </p:txBody>
-      </p:sp>
-      <p:pic>
-        <p:nvPicPr>
-          <p:cNvPr id="8" name="Picture 7">
-            <a:extLst>
-              <a:ext uri="{FF2B5EF4-FFF2-40B4-BE49-F238E27FC236}">
-                <a16:creationId xmlns:a16="http://schemas.microsoft.com/office/drawing/2014/main" id="{2B25F36B-7370-C022-0982-D33C4899384B}"/>
-              </a:ext>
-            </a:extLst>
-          </p:cNvPr>
-          <p:cNvPicPr>
-            <a:picLocks noChangeAspect="1"/>
-          </p:cNvPicPr>
-          <p:nvPr/>
-        </p:nvPicPr>
-        <p:blipFill>
-          <a:blip r:embed="rId2"/>
-          <a:stretch>
-            <a:fillRect/>
-          </a:stretch>
-        </p:blipFill>
-        <p:spPr>
-          <a:xfrm>
-            <a:off x="0" y="4302897"/>
-            <a:ext cx="4356284" cy="2362127"/>
-          </a:xfrm>
-          <a:prstGeom prst="rect">
-            <a:avLst/>
-          </a:prstGeom>
-        </p:spPr>
-      </p:pic>
-      <p:pic>
-        <p:nvPicPr>
-          <p:cNvPr id="10" name="Picture 9">
-            <a:extLst>
-              <a:ext uri="{FF2B5EF4-FFF2-40B4-BE49-F238E27FC236}">
-                <a16:creationId xmlns:a16="http://schemas.microsoft.com/office/drawing/2014/main" id="{330D62C2-AA53-B794-C0B6-312FEE7FF2DF}"/>
-              </a:ext>
-            </a:extLst>
-          </p:cNvPr>
-          <p:cNvPicPr>
-            <a:picLocks noChangeAspect="1"/>
-          </p:cNvPicPr>
-          <p:nvPr/>
-        </p:nvPicPr>
-        <p:blipFill>
-          <a:blip r:embed="rId3"/>
-          <a:stretch>
-            <a:fillRect/>
-          </a:stretch>
-        </p:blipFill>
-        <p:spPr>
-          <a:xfrm>
-            <a:off x="294127" y="428674"/>
-            <a:ext cx="1704008" cy="3354765"/>
-          </a:xfrm>
-          <a:prstGeom prst="rect">
-            <a:avLst/>
-          </a:prstGeom>
-        </p:spPr>
-      </p:pic>
-      <p:pic>
-        <p:nvPicPr>
-          <p:cNvPr id="13" name="Picture 12">
-            <a:extLst>
-              <a:ext uri="{FF2B5EF4-FFF2-40B4-BE49-F238E27FC236}">
-                <a16:creationId xmlns:a16="http://schemas.microsoft.com/office/drawing/2014/main" id="{350428BE-0AC0-96D2-D92A-71AD3D19FADD}"/>
-              </a:ext>
-            </a:extLst>
-          </p:cNvPr>
-          <p:cNvPicPr>
-            <a:picLocks noChangeAspect="1"/>
-          </p:cNvPicPr>
-          <p:nvPr/>
-        </p:nvPicPr>
-        <p:blipFill>
-          <a:blip r:embed="rId4"/>
-          <a:stretch>
-            <a:fillRect/>
-          </a:stretch>
-        </p:blipFill>
-        <p:spPr>
-          <a:xfrm>
-            <a:off x="2092643" y="885888"/>
-            <a:ext cx="3477110" cy="952633"/>
-          </a:xfrm>
-          <a:prstGeom prst="rect">
-            <a:avLst/>
-          </a:prstGeom>
-        </p:spPr>
-      </p:pic>
-    </p:spTree>
-    <p:extLst>
-      <p:ext uri="{BB962C8B-B14F-4D97-AF65-F5344CB8AC3E}">
-        <p14:creationId xmlns:p14="http://schemas.microsoft.com/office/powerpoint/2010/main" val="1285422550"/>
       </p:ext>
     </p:extLst>
   </p:cSld>

</xml_diff>

<commit_message>
Critical Failure V.0.9.3 pt 4
Jump-scare mechanic 75% complete and currently solving issues with door/vent controller
</commit_message>
<xml_diff>
--- a/Logs/Development Log and Alpha Testing.pptx
+++ b/Logs/Development Log and Alpha Testing.pptx
@@ -37,14 +37,15 @@
     <p:sldId id="293" r:id="rId31"/>
     <p:sldId id="294" r:id="rId32"/>
     <p:sldId id="295" r:id="rId33"/>
-    <p:sldId id="257" r:id="rId34"/>
-    <p:sldId id="267" r:id="rId35"/>
-    <p:sldId id="270" r:id="rId36"/>
-    <p:sldId id="272" r:id="rId37"/>
-    <p:sldId id="276" r:id="rId38"/>
-    <p:sldId id="278" r:id="rId39"/>
-    <p:sldId id="284" r:id="rId40"/>
-    <p:sldId id="289" r:id="rId41"/>
+    <p:sldId id="296" r:id="rId34"/>
+    <p:sldId id="257" r:id="rId35"/>
+    <p:sldId id="267" r:id="rId36"/>
+    <p:sldId id="270" r:id="rId37"/>
+    <p:sldId id="272" r:id="rId38"/>
+    <p:sldId id="276" r:id="rId39"/>
+    <p:sldId id="278" r:id="rId40"/>
+    <p:sldId id="284" r:id="rId41"/>
+    <p:sldId id="289" r:id="rId42"/>
   </p:sldIdLst>
   <p:sldSz cx="12192000" cy="6858000"/>
   <p:notesSz cx="6858000" cy="9144000"/>
@@ -318,7 +319,7 @@
           <a:p>
             <a:fld id="{846CE7D5-CF57-46EF-B807-FDD0502418D4}" type="datetimeFigureOut">
               <a:rPr lang="en-GB" smtClean="0"/>
-              <a:t>09/02/2026</a:t>
+              <a:t>10/02/2026</a:t>
             </a:fld>
             <a:endParaRPr lang="en-GB"/>
           </a:p>
@@ -488,7 +489,7 @@
           <a:p>
             <a:fld id="{846CE7D5-CF57-46EF-B807-FDD0502418D4}" type="datetimeFigureOut">
               <a:rPr lang="en-GB" smtClean="0"/>
-              <a:t>09/02/2026</a:t>
+              <a:t>10/02/2026</a:t>
             </a:fld>
             <a:endParaRPr lang="en-GB"/>
           </a:p>
@@ -668,7 +669,7 @@
           <a:p>
             <a:fld id="{846CE7D5-CF57-46EF-B807-FDD0502418D4}" type="datetimeFigureOut">
               <a:rPr lang="en-GB" smtClean="0"/>
-              <a:t>09/02/2026</a:t>
+              <a:t>10/02/2026</a:t>
             </a:fld>
             <a:endParaRPr lang="en-GB"/>
           </a:p>
@@ -838,7 +839,7 @@
           <a:p>
             <a:fld id="{846CE7D5-CF57-46EF-B807-FDD0502418D4}" type="datetimeFigureOut">
               <a:rPr lang="en-GB" smtClean="0"/>
-              <a:t>09/02/2026</a:t>
+              <a:t>10/02/2026</a:t>
             </a:fld>
             <a:endParaRPr lang="en-GB"/>
           </a:p>
@@ -1084,7 +1085,7 @@
           <a:p>
             <a:fld id="{846CE7D5-CF57-46EF-B807-FDD0502418D4}" type="datetimeFigureOut">
               <a:rPr lang="en-GB" smtClean="0"/>
-              <a:t>09/02/2026</a:t>
+              <a:t>10/02/2026</a:t>
             </a:fld>
             <a:endParaRPr lang="en-GB"/>
           </a:p>
@@ -1316,7 +1317,7 @@
           <a:p>
             <a:fld id="{846CE7D5-CF57-46EF-B807-FDD0502418D4}" type="datetimeFigureOut">
               <a:rPr lang="en-GB" smtClean="0"/>
-              <a:t>09/02/2026</a:t>
+              <a:t>10/02/2026</a:t>
             </a:fld>
             <a:endParaRPr lang="en-GB"/>
           </a:p>
@@ -1683,7 +1684,7 @@
           <a:p>
             <a:fld id="{846CE7D5-CF57-46EF-B807-FDD0502418D4}" type="datetimeFigureOut">
               <a:rPr lang="en-GB" smtClean="0"/>
-              <a:t>09/02/2026</a:t>
+              <a:t>10/02/2026</a:t>
             </a:fld>
             <a:endParaRPr lang="en-GB"/>
           </a:p>
@@ -1801,7 +1802,7 @@
           <a:p>
             <a:fld id="{846CE7D5-CF57-46EF-B807-FDD0502418D4}" type="datetimeFigureOut">
               <a:rPr lang="en-GB" smtClean="0"/>
-              <a:t>09/02/2026</a:t>
+              <a:t>10/02/2026</a:t>
             </a:fld>
             <a:endParaRPr lang="en-GB"/>
           </a:p>
@@ -1896,7 +1897,7 @@
           <a:p>
             <a:fld id="{846CE7D5-CF57-46EF-B807-FDD0502418D4}" type="datetimeFigureOut">
               <a:rPr lang="en-GB" smtClean="0"/>
-              <a:t>09/02/2026</a:t>
+              <a:t>10/02/2026</a:t>
             </a:fld>
             <a:endParaRPr lang="en-GB"/>
           </a:p>
@@ -2173,7 +2174,7 @@
           <a:p>
             <a:fld id="{846CE7D5-CF57-46EF-B807-FDD0502418D4}" type="datetimeFigureOut">
               <a:rPr lang="en-GB" smtClean="0"/>
-              <a:t>09/02/2026</a:t>
+              <a:t>10/02/2026</a:t>
             </a:fld>
             <a:endParaRPr lang="en-GB"/>
           </a:p>
@@ -2430,7 +2431,7 @@
           <a:p>
             <a:fld id="{846CE7D5-CF57-46EF-B807-FDD0502418D4}" type="datetimeFigureOut">
               <a:rPr lang="en-GB" smtClean="0"/>
-              <a:t>09/02/2026</a:t>
+              <a:t>10/02/2026</a:t>
             </a:fld>
             <a:endParaRPr lang="en-GB"/>
           </a:p>
@@ -2643,7 +2644,7 @@
           <a:p>
             <a:fld id="{846CE7D5-CF57-46EF-B807-FDD0502418D4}" type="datetimeFigureOut">
               <a:rPr lang="en-GB" smtClean="0"/>
-              <a:t>09/02/2026</a:t>
+              <a:t>10/02/2026</a:t>
             </a:fld>
             <a:endParaRPr lang="en-GB"/>
           </a:p>
@@ -13462,7 +13463,7 @@
         <p:spPr>
           <a:xfrm>
             <a:off x="7537550" y="107525"/>
-            <a:ext cx="4286175" cy="3108543"/>
+            <a:ext cx="4286175" cy="4401205"/>
           </a:xfrm>
           <a:prstGeom prst="rect">
             <a:avLst/>
@@ -13478,6 +13479,33 @@
             <a:r>
               <a:rPr lang="en-GB" sz="1400" dirty="0"/>
               <a:t>What to Do next session</a:t>
+            </a:r>
+          </a:p>
+          <a:p>
+            <a:endParaRPr lang="en-GB" sz="1400" dirty="0"/>
+          </a:p>
+          <a:p>
+            <a:r>
+              <a:rPr lang="en-GB" sz="1400" dirty="0"/>
+              <a:t>Finish level 1 enemies zone change mechanic</a:t>
+            </a:r>
+          </a:p>
+          <a:p>
+            <a:endParaRPr lang="en-GB" sz="1400" dirty="0"/>
+          </a:p>
+          <a:p>
+            <a:r>
+              <a:rPr lang="en-GB" sz="1400" dirty="0"/>
+              <a:t>Design jump-scares</a:t>
+            </a:r>
+          </a:p>
+          <a:p>
+            <a:endParaRPr lang="en-GB" sz="1400" dirty="0"/>
+          </a:p>
+          <a:p>
+            <a:r>
+              <a:rPr lang="en-GB" sz="1400" dirty="0"/>
+              <a:t>Implement Jump-scares into the game.</a:t>
             </a:r>
           </a:p>
           <a:p>
@@ -13600,6 +13628,294 @@
 </file>
 
 <file path=ppt/slides/slide33.xml><?xml version="1.0" encoding="utf-8"?>
+<p:sld xmlns:a="http://schemas.openxmlformats.org/drawingml/2006/main" xmlns:r="http://schemas.openxmlformats.org/officeDocument/2006/relationships" xmlns:p="http://schemas.openxmlformats.org/presentationml/2006/main">
+  <p:cSld>
+    <p:spTree>
+      <p:nvGrpSpPr>
+        <p:cNvPr id="1" name="">
+          <a:extLst>
+            <a:ext uri="{FF2B5EF4-FFF2-40B4-BE49-F238E27FC236}">
+              <a16:creationId xmlns:a16="http://schemas.microsoft.com/office/drawing/2014/main" id="{F7952D63-0913-40A3-A082-16F5A498D5D5}"/>
+            </a:ext>
+          </a:extLst>
+        </p:cNvPr>
+        <p:cNvGrpSpPr/>
+        <p:nvPr/>
+      </p:nvGrpSpPr>
+      <p:grpSpPr>
+        <a:xfrm>
+          <a:off x="0" y="0"/>
+          <a:ext cx="0" cy="0"/>
+          <a:chOff x="0" y="0"/>
+          <a:chExt cx="0" cy="0"/>
+        </a:xfrm>
+      </p:grpSpPr>
+      <p:sp>
+        <p:nvSpPr>
+          <p:cNvPr id="4" name="TextBox 3">
+            <a:extLst>
+              <a:ext uri="{FF2B5EF4-FFF2-40B4-BE49-F238E27FC236}">
+                <a16:creationId xmlns:a16="http://schemas.microsoft.com/office/drawing/2014/main" id="{A32472B1-828A-C8FC-269C-59E5229378E0}"/>
+              </a:ext>
+            </a:extLst>
+          </p:cNvPr>
+          <p:cNvSpPr txBox="1"/>
+          <p:nvPr/>
+        </p:nvSpPr>
+        <p:spPr>
+          <a:xfrm>
+            <a:off x="5015350" y="107525"/>
+            <a:ext cx="2269916" cy="338554"/>
+          </a:xfrm>
+          <a:prstGeom prst="rect">
+            <a:avLst/>
+          </a:prstGeom>
+          <a:noFill/>
+          <a:ln>
+            <a:solidFill>
+              <a:schemeClr val="tx1"/>
+            </a:solidFill>
+          </a:ln>
+        </p:spPr>
+        <p:txBody>
+          <a:bodyPr rot="0" spcFirstLastPara="0" vertOverflow="overflow" horzOverflow="overflow" vert="horz" wrap="square" lIns="91440" tIns="45720" rIns="91440" bIns="45720" numCol="1" spcCol="0" rtlCol="0" fromWordArt="0" anchor="t" anchorCtr="0" forceAA="0" compatLnSpc="1">
+            <a:prstTxWarp prst="textNoShape">
+              <a:avLst/>
+            </a:prstTxWarp>
+            <a:spAutoFit/>
+          </a:bodyPr>
+          <a:lstStyle/>
+          <a:p>
+            <a:r>
+              <a:rPr lang="en-GB" sz="1600" dirty="0"/>
+              <a:t>Date – 10/02/2026</a:t>
+            </a:r>
+          </a:p>
+        </p:txBody>
+      </p:sp>
+      <p:sp>
+        <p:nvSpPr>
+          <p:cNvPr id="2" name="TextBox 1">
+            <a:extLst>
+              <a:ext uri="{FF2B5EF4-FFF2-40B4-BE49-F238E27FC236}">
+                <a16:creationId xmlns:a16="http://schemas.microsoft.com/office/drawing/2014/main" id="{34289866-E8F5-AD39-D6C7-2BD8012A7032}"/>
+              </a:ext>
+            </a:extLst>
+          </p:cNvPr>
+          <p:cNvSpPr txBox="1"/>
+          <p:nvPr/>
+        </p:nvSpPr>
+        <p:spPr>
+          <a:xfrm>
+            <a:off x="5015350" y="542303"/>
+            <a:ext cx="2112147" cy="338554"/>
+          </a:xfrm>
+          <a:prstGeom prst="rect">
+            <a:avLst/>
+          </a:prstGeom>
+          <a:noFill/>
+          <a:ln>
+            <a:solidFill>
+              <a:schemeClr val="tx1"/>
+            </a:solidFill>
+          </a:ln>
+        </p:spPr>
+        <p:txBody>
+          <a:bodyPr rot="0" spcFirstLastPara="0" vertOverflow="overflow" horzOverflow="overflow" vert="horz" wrap="square" lIns="91440" tIns="45720" rIns="91440" bIns="45720" numCol="1" spcCol="0" rtlCol="0" fromWordArt="0" anchor="t" anchorCtr="0" forceAA="0" compatLnSpc="1">
+            <a:prstTxWarp prst="textNoShape">
+              <a:avLst/>
+            </a:prstTxWarp>
+            <a:spAutoFit/>
+          </a:bodyPr>
+          <a:lstStyle/>
+          <a:p>
+            <a:r>
+              <a:rPr lang="en-GB" sz="1600" dirty="0"/>
+              <a:t>Game Build V.0.9.3</a:t>
+            </a:r>
+          </a:p>
+        </p:txBody>
+      </p:sp>
+      <p:sp>
+        <p:nvSpPr>
+          <p:cNvPr id="3" name="TextBox 2">
+            <a:extLst>
+              <a:ext uri="{FF2B5EF4-FFF2-40B4-BE49-F238E27FC236}">
+                <a16:creationId xmlns:a16="http://schemas.microsoft.com/office/drawing/2014/main" id="{0C64B911-15FF-5BFC-4CB8-1A785568E084}"/>
+              </a:ext>
+            </a:extLst>
+          </p:cNvPr>
+          <p:cNvSpPr txBox="1"/>
+          <p:nvPr/>
+        </p:nvSpPr>
+        <p:spPr>
+          <a:xfrm>
+            <a:off x="0" y="121250"/>
+            <a:ext cx="4906736" cy="4339650"/>
+          </a:xfrm>
+          <a:prstGeom prst="rect">
+            <a:avLst/>
+          </a:prstGeom>
+          <a:noFill/>
+          <a:ln>
+            <a:solidFill>
+              <a:schemeClr val="tx1"/>
+            </a:solidFill>
+          </a:ln>
+        </p:spPr>
+        <p:txBody>
+          <a:bodyPr rot="0" spcFirstLastPara="0" vertOverflow="overflow" horzOverflow="overflow" vert="horz" wrap="square" lIns="91440" tIns="45720" rIns="91440" bIns="45720" numCol="1" spcCol="0" rtlCol="0" fromWordArt="0" anchor="t" anchorCtr="0" forceAA="0" compatLnSpc="1">
+            <a:prstTxWarp prst="textNoShape">
+              <a:avLst/>
+            </a:prstTxWarp>
+            <a:spAutoFit/>
+          </a:bodyPr>
+          <a:lstStyle/>
+          <a:p>
+            <a:r>
+              <a:rPr lang="en-GB" sz="1200" dirty="0"/>
+              <a:t>In this session I implemented to Jump-scares to work similarly to how the enemies change zone.</a:t>
+            </a:r>
+          </a:p>
+          <a:p>
+            <a:endParaRPr lang="en-GB" sz="1200" dirty="0"/>
+          </a:p>
+          <a:p>
+            <a:r>
+              <a:rPr lang="en-GB" sz="1200" dirty="0"/>
+              <a:t>How the jump-scares work is that when dead = true the death screen timer begins, counting down to when the player should change to the death screen room. During this time, the jump-scare happens. What the Jump-scare is, is just the enemies forcing the players camera view to go to the jump-scare zone in which the enemies can then change it into their jump-scare. Scaring the Player :).</a:t>
+            </a:r>
+          </a:p>
+          <a:p>
+            <a:endParaRPr lang="en-GB" sz="1200" dirty="0"/>
+          </a:p>
+          <a:p>
+            <a:r>
+              <a:rPr lang="en-GB" sz="1200" dirty="0"/>
+              <a:t>This was done using a newly added zone that only the enemies can interact with. This will be the jump-scare zone. The enemies can change this zone as they please into the version related to the enemy that killed you.</a:t>
+            </a:r>
+          </a:p>
+          <a:p>
+            <a:endParaRPr lang="en-GB" sz="1200" dirty="0"/>
+          </a:p>
+          <a:p>
+            <a:r>
+              <a:rPr lang="en-GB" sz="1200" dirty="0"/>
+              <a:t>I have run into a problem concerning the aftermath of player death. The door and vent controller is persistent meaning that even after dying the doors/vents that are closed, remain that way after death. The issue with the doors/vents is that their code isn’t as simple as making </a:t>
+            </a:r>
+            <a:r>
+              <a:rPr lang="en-GB" sz="1200" dirty="0" err="1"/>
+              <a:t>global.door_open</a:t>
+            </a:r>
+            <a:r>
+              <a:rPr lang="en-GB" sz="1200" dirty="0"/>
+              <a:t> = true. The doors and vents are synced with each other and require themselves to change sprite as well as know what state they are in for the oxygen count. I’m going to try and find a solution </a:t>
+            </a:r>
+            <a:r>
+              <a:rPr lang="en-GB" sz="1200"/>
+              <a:t>to this.</a:t>
+            </a:r>
+            <a:endParaRPr lang="en-GB" sz="1200" dirty="0"/>
+          </a:p>
+        </p:txBody>
+      </p:sp>
+      <p:sp>
+        <p:nvSpPr>
+          <p:cNvPr id="12" name="TextBox 11">
+            <a:extLst>
+              <a:ext uri="{FF2B5EF4-FFF2-40B4-BE49-F238E27FC236}">
+                <a16:creationId xmlns:a16="http://schemas.microsoft.com/office/drawing/2014/main" id="{98A250EB-DC51-5D1D-5E2C-D7A3E200CF2F}"/>
+              </a:ext>
+            </a:extLst>
+          </p:cNvPr>
+          <p:cNvSpPr txBox="1"/>
+          <p:nvPr/>
+        </p:nvSpPr>
+        <p:spPr>
+          <a:xfrm>
+            <a:off x="7537550" y="107525"/>
+            <a:ext cx="4286175" cy="3754874"/>
+          </a:xfrm>
+          <a:prstGeom prst="rect">
+            <a:avLst/>
+          </a:prstGeom>
+          <a:noFill/>
+        </p:spPr>
+        <p:txBody>
+          <a:bodyPr wrap="square" rtlCol="0">
+            <a:spAutoFit/>
+          </a:bodyPr>
+          <a:lstStyle/>
+          <a:p>
+            <a:r>
+              <a:rPr lang="en-GB" sz="1400" dirty="0"/>
+              <a:t>What to Do next session</a:t>
+            </a:r>
+          </a:p>
+          <a:p>
+            <a:endParaRPr lang="en-GB" sz="1400" dirty="0"/>
+          </a:p>
+          <a:p>
+            <a:r>
+              <a:rPr lang="en-GB" sz="1400" dirty="0"/>
+              <a:t>Make Doors and Vents be in an open state after death.</a:t>
+            </a:r>
+          </a:p>
+          <a:p>
+            <a:endParaRPr lang="en-GB" sz="1400" dirty="0"/>
+          </a:p>
+          <a:p>
+            <a:endParaRPr lang="en-GB" sz="1400" dirty="0"/>
+          </a:p>
+          <a:p>
+            <a:endParaRPr lang="en-GB" sz="1400" dirty="0"/>
+          </a:p>
+          <a:p>
+            <a:endParaRPr lang="en-GB" sz="1400" dirty="0"/>
+          </a:p>
+          <a:p>
+            <a:endParaRPr lang="en-GB" sz="1400" dirty="0"/>
+          </a:p>
+          <a:p>
+            <a:endParaRPr lang="en-GB" sz="1400" dirty="0"/>
+          </a:p>
+          <a:p>
+            <a:endParaRPr lang="en-GB" sz="1400" dirty="0"/>
+          </a:p>
+          <a:p>
+            <a:endParaRPr lang="en-GB" sz="1400" dirty="0"/>
+          </a:p>
+          <a:p>
+            <a:endParaRPr lang="en-GB" sz="1400" dirty="0"/>
+          </a:p>
+          <a:p>
+            <a:endParaRPr lang="en-GB" sz="1400" dirty="0"/>
+          </a:p>
+          <a:p>
+            <a:endParaRPr lang="en-GB" sz="1400" dirty="0"/>
+          </a:p>
+          <a:p>
+            <a:endParaRPr lang="en-GB" sz="1400" dirty="0"/>
+          </a:p>
+          <a:p>
+            <a:endParaRPr lang="en-GB" sz="1400" dirty="0"/>
+          </a:p>
+        </p:txBody>
+      </p:sp>
+    </p:spTree>
+    <p:extLst>
+      <p:ext uri="{BB962C8B-B14F-4D97-AF65-F5344CB8AC3E}">
+        <p14:creationId xmlns:p14="http://schemas.microsoft.com/office/powerpoint/2010/main" val="1411057633"/>
+      </p:ext>
+    </p:extLst>
+  </p:cSld>
+  <p:clrMapOvr>
+    <a:masterClrMapping/>
+  </p:clrMapOvr>
+</p:sld>
+</file>
+
+<file path=ppt/slides/slide34.xml><?xml version="1.0" encoding="utf-8"?>
 <p:sld xmlns:a="http://schemas.openxmlformats.org/drawingml/2006/main" xmlns:r="http://schemas.openxmlformats.org/officeDocument/2006/relationships" xmlns:p="http://schemas.openxmlformats.org/presentationml/2006/main">
   <p:cSld>
     <p:spTree>
@@ -14412,7 +14728,7 @@
 </p:sld>
 </file>
 
-<file path=ppt/slides/slide34.xml><?xml version="1.0" encoding="utf-8"?>
+<file path=ppt/slides/slide35.xml><?xml version="1.0" encoding="utf-8"?>
 <p:sld xmlns:a="http://schemas.openxmlformats.org/drawingml/2006/main" xmlns:r="http://schemas.openxmlformats.org/officeDocument/2006/relationships" xmlns:p="http://schemas.openxmlformats.org/presentationml/2006/main">
   <p:cSld>
     <p:spTree>
@@ -15003,7 +15319,7 @@
 </p:sld>
 </file>
 
-<file path=ppt/slides/slide35.xml><?xml version="1.0" encoding="utf-8"?>
+<file path=ppt/slides/slide36.xml><?xml version="1.0" encoding="utf-8"?>
 <p:sld xmlns:a="http://schemas.openxmlformats.org/drawingml/2006/main" xmlns:r="http://schemas.openxmlformats.org/officeDocument/2006/relationships" xmlns:p="http://schemas.openxmlformats.org/presentationml/2006/main">
   <p:cSld>
     <p:spTree>
@@ -15527,7 +15843,7 @@
 </p:sld>
 </file>
 
-<file path=ppt/slides/slide36.xml><?xml version="1.0" encoding="utf-8"?>
+<file path=ppt/slides/slide37.xml><?xml version="1.0" encoding="utf-8"?>
 <p:sld xmlns:a="http://schemas.openxmlformats.org/drawingml/2006/main" xmlns:r="http://schemas.openxmlformats.org/officeDocument/2006/relationships" xmlns:p="http://schemas.openxmlformats.org/presentationml/2006/main">
   <p:cSld>
     <p:spTree>
@@ -16041,7 +16357,7 @@
 </p:sld>
 </file>
 
-<file path=ppt/slides/slide37.xml><?xml version="1.0" encoding="utf-8"?>
+<file path=ppt/slides/slide38.xml><?xml version="1.0" encoding="utf-8"?>
 <p:sld xmlns:a="http://schemas.openxmlformats.org/drawingml/2006/main" xmlns:r="http://schemas.openxmlformats.org/officeDocument/2006/relationships" xmlns:p="http://schemas.openxmlformats.org/presentationml/2006/main">
   <p:cSld>
     <p:spTree>
@@ -16533,7 +16849,7 @@
 </p:sld>
 </file>
 
-<file path=ppt/slides/slide38.xml><?xml version="1.0" encoding="utf-8"?>
+<file path=ppt/slides/slide39.xml><?xml version="1.0" encoding="utf-8"?>
 <p:sld xmlns:a="http://schemas.openxmlformats.org/drawingml/2006/main" xmlns:r="http://schemas.openxmlformats.org/officeDocument/2006/relationships" xmlns:p="http://schemas.openxmlformats.org/presentationml/2006/main">
   <p:cSld>
     <p:spTree>
@@ -17214,7 +17530,391 @@
 </p:sld>
 </file>
 
-<file path=ppt/slides/slide39.xml><?xml version="1.0" encoding="utf-8"?>
+<file path=ppt/slides/slide4.xml><?xml version="1.0" encoding="utf-8"?>
+<p:sld xmlns:a="http://schemas.openxmlformats.org/drawingml/2006/main" xmlns:r="http://schemas.openxmlformats.org/officeDocument/2006/relationships" xmlns:p="http://schemas.openxmlformats.org/presentationml/2006/main">
+  <p:cSld>
+    <p:spTree>
+      <p:nvGrpSpPr>
+        <p:cNvPr id="1" name="">
+          <a:extLst>
+            <a:ext uri="{FF2B5EF4-FFF2-40B4-BE49-F238E27FC236}">
+              <a16:creationId xmlns:a16="http://schemas.microsoft.com/office/drawing/2014/main" id="{B71AF447-2503-6E06-EB64-6A29C299795D}"/>
+            </a:ext>
+          </a:extLst>
+        </p:cNvPr>
+        <p:cNvGrpSpPr/>
+        <p:nvPr/>
+      </p:nvGrpSpPr>
+      <p:grpSpPr>
+        <a:xfrm>
+          <a:off x="0" y="0"/>
+          <a:ext cx="0" cy="0"/>
+          <a:chOff x="0" y="0"/>
+          <a:chExt cx="0" cy="0"/>
+        </a:xfrm>
+      </p:grpSpPr>
+      <p:sp>
+        <p:nvSpPr>
+          <p:cNvPr id="4" name="TextBox 3">
+            <a:extLst>
+              <a:ext uri="{FF2B5EF4-FFF2-40B4-BE49-F238E27FC236}">
+                <a16:creationId xmlns:a16="http://schemas.microsoft.com/office/drawing/2014/main" id="{3ABD7D05-D183-64C6-1BA1-72453612143E}"/>
+              </a:ext>
+            </a:extLst>
+          </p:cNvPr>
+          <p:cNvSpPr txBox="1"/>
+          <p:nvPr/>
+        </p:nvSpPr>
+        <p:spPr>
+          <a:xfrm>
+            <a:off x="7763992" y="90121"/>
+            <a:ext cx="1809641" cy="338554"/>
+          </a:xfrm>
+          <a:prstGeom prst="rect">
+            <a:avLst/>
+          </a:prstGeom>
+          <a:noFill/>
+          <a:ln>
+            <a:solidFill>
+              <a:schemeClr val="tx1"/>
+            </a:solidFill>
+          </a:ln>
+        </p:spPr>
+        <p:txBody>
+          <a:bodyPr rot="0" spcFirstLastPara="0" vertOverflow="overflow" horzOverflow="overflow" vert="horz" wrap="square" lIns="91440" tIns="45720" rIns="91440" bIns="45720" numCol="1" spcCol="0" rtlCol="0" fromWordArt="0" anchor="t" anchorCtr="0" forceAA="0" compatLnSpc="1">
+            <a:prstTxWarp prst="textNoShape">
+              <a:avLst/>
+            </a:prstTxWarp>
+            <a:spAutoFit/>
+          </a:bodyPr>
+          <a:lstStyle/>
+          <a:p>
+            <a:r>
+              <a:rPr lang="en-GB" sz="1600" dirty="0"/>
+              <a:t>Date – 24/11/2025</a:t>
+            </a:r>
+          </a:p>
+        </p:txBody>
+      </p:sp>
+      <p:sp>
+        <p:nvSpPr>
+          <p:cNvPr id="2" name="TextBox 1">
+            <a:extLst>
+              <a:ext uri="{FF2B5EF4-FFF2-40B4-BE49-F238E27FC236}">
+                <a16:creationId xmlns:a16="http://schemas.microsoft.com/office/drawing/2014/main" id="{3E37F77A-82C0-2039-AD51-40366B52EBEB}"/>
+              </a:ext>
+            </a:extLst>
+          </p:cNvPr>
+          <p:cNvSpPr txBox="1"/>
+          <p:nvPr/>
+        </p:nvSpPr>
+        <p:spPr>
+          <a:xfrm>
+            <a:off x="5651845" y="90120"/>
+            <a:ext cx="1959856" cy="338554"/>
+          </a:xfrm>
+          <a:prstGeom prst="rect">
+            <a:avLst/>
+          </a:prstGeom>
+          <a:noFill/>
+          <a:ln>
+            <a:solidFill>
+              <a:schemeClr val="tx1"/>
+            </a:solidFill>
+          </a:ln>
+        </p:spPr>
+        <p:txBody>
+          <a:bodyPr rot="0" spcFirstLastPara="0" vertOverflow="overflow" horzOverflow="overflow" vert="horz" wrap="square" lIns="91440" tIns="45720" rIns="91440" bIns="45720" numCol="1" spcCol="0" rtlCol="0" fromWordArt="0" anchor="t" anchorCtr="0" forceAA="0" compatLnSpc="1">
+            <a:prstTxWarp prst="textNoShape">
+              <a:avLst/>
+            </a:prstTxWarp>
+            <a:spAutoFit/>
+          </a:bodyPr>
+          <a:lstStyle/>
+          <a:p>
+            <a:r>
+              <a:rPr lang="en-GB" sz="1600" dirty="0"/>
+              <a:t>Game Build V.0.2</a:t>
+            </a:r>
+          </a:p>
+        </p:txBody>
+      </p:sp>
+      <p:sp>
+        <p:nvSpPr>
+          <p:cNvPr id="3" name="TextBox 2">
+            <a:extLst>
+              <a:ext uri="{FF2B5EF4-FFF2-40B4-BE49-F238E27FC236}">
+                <a16:creationId xmlns:a16="http://schemas.microsoft.com/office/drawing/2014/main" id="{2886F3E7-61E5-445C-5038-15B1F86B5A87}"/>
+              </a:ext>
+            </a:extLst>
+          </p:cNvPr>
+          <p:cNvSpPr txBox="1"/>
+          <p:nvPr/>
+        </p:nvSpPr>
+        <p:spPr>
+          <a:xfrm>
+            <a:off x="5642854" y="578678"/>
+            <a:ext cx="3926490" cy="3354765"/>
+          </a:xfrm>
+          <a:prstGeom prst="rect">
+            <a:avLst/>
+          </a:prstGeom>
+          <a:noFill/>
+          <a:ln>
+            <a:solidFill>
+              <a:schemeClr val="tx1"/>
+            </a:solidFill>
+          </a:ln>
+        </p:spPr>
+        <p:txBody>
+          <a:bodyPr rot="0" spcFirstLastPara="0" vertOverflow="overflow" horzOverflow="overflow" vert="horz" wrap="square" lIns="91440" tIns="45720" rIns="91440" bIns="45720" numCol="1" spcCol="0" rtlCol="0" fromWordArt="0" anchor="t" anchorCtr="0" forceAA="0" compatLnSpc="1">
+            <a:prstTxWarp prst="textNoShape">
+              <a:avLst/>
+            </a:prstTxWarp>
+            <a:spAutoFit/>
+          </a:bodyPr>
+          <a:lstStyle/>
+          <a:p>
+            <a:r>
+              <a:rPr lang="en-GB" sz="1400" dirty="0"/>
+              <a:t>Summary Of Session</a:t>
+            </a:r>
+          </a:p>
+          <a:p>
+            <a:endParaRPr lang="en-GB" sz="1400" dirty="0"/>
+          </a:p>
+          <a:p>
+            <a:r>
+              <a:rPr lang="en-GB" sz="1400" dirty="0"/>
+              <a:t>Refined Sprite designs such as the doors. Created template buttons for the doors both from main view and close-up view.</a:t>
+            </a:r>
+          </a:p>
+          <a:p>
+            <a:endParaRPr lang="en-GB" sz="1400" dirty="0"/>
+          </a:p>
+          <a:p>
+            <a:r>
+              <a:rPr lang="en-GB" sz="1400" dirty="0"/>
+              <a:t>Named each zones area/location.</a:t>
+            </a:r>
+          </a:p>
+          <a:p>
+            <a:endParaRPr lang="en-GB" sz="1400" dirty="0"/>
+          </a:p>
+          <a:p>
+            <a:r>
+              <a:rPr lang="en-GB" sz="1400" dirty="0"/>
+              <a:t>Created variables for </a:t>
+            </a:r>
+            <a:r>
+              <a:rPr lang="en-GB" sz="1400" dirty="0" err="1"/>
+              <a:t>obj_camera</a:t>
+            </a:r>
+            <a:r>
+              <a:rPr lang="en-GB" sz="1400" dirty="0"/>
+              <a:t>.</a:t>
+            </a:r>
+          </a:p>
+          <a:p>
+            <a:endParaRPr lang="en-GB" sz="1400" dirty="0"/>
+          </a:p>
+          <a:p>
+            <a:r>
+              <a:rPr lang="en-GB" sz="1400" dirty="0"/>
+              <a:t>Added Up close door to the up close door zones for both left and right.</a:t>
+            </a:r>
+          </a:p>
+          <a:p>
+            <a:endParaRPr lang="en-GB" sz="1400" dirty="0"/>
+          </a:p>
+          <a:p>
+            <a:endParaRPr lang="en-GB" sz="1400" dirty="0"/>
+          </a:p>
+          <a:p>
+            <a:endParaRPr lang="en-GB" sz="1600" dirty="0"/>
+          </a:p>
+        </p:txBody>
+      </p:sp>
+      <p:sp>
+        <p:nvSpPr>
+          <p:cNvPr id="6" name="TextBox 5">
+            <a:extLst>
+              <a:ext uri="{FF2B5EF4-FFF2-40B4-BE49-F238E27FC236}">
+                <a16:creationId xmlns:a16="http://schemas.microsoft.com/office/drawing/2014/main" id="{6C671371-B8F1-97C1-D2C5-BD2850E814D7}"/>
+              </a:ext>
+            </a:extLst>
+          </p:cNvPr>
+          <p:cNvSpPr txBox="1"/>
+          <p:nvPr/>
+        </p:nvSpPr>
+        <p:spPr>
+          <a:xfrm>
+            <a:off x="9642445" y="54237"/>
+            <a:ext cx="2438400" cy="2308324"/>
+          </a:xfrm>
+          <a:prstGeom prst="rect">
+            <a:avLst/>
+          </a:prstGeom>
+          <a:noFill/>
+          <a:ln>
+            <a:solidFill>
+              <a:schemeClr val="tx1"/>
+            </a:solidFill>
+          </a:ln>
+        </p:spPr>
+        <p:txBody>
+          <a:bodyPr rot="0" spcFirstLastPara="0" vertOverflow="overflow" horzOverflow="overflow" vert="horz" wrap="square" lIns="91440" tIns="45720" rIns="91440" bIns="45720" numCol="1" spcCol="0" rtlCol="0" fromWordArt="0" anchor="t" anchorCtr="0" forceAA="0" compatLnSpc="1">
+            <a:prstTxWarp prst="textNoShape">
+              <a:avLst/>
+            </a:prstTxWarp>
+            <a:spAutoFit/>
+          </a:bodyPr>
+          <a:lstStyle/>
+          <a:p>
+            <a:r>
+              <a:rPr lang="en-GB" sz="1200" dirty="0"/>
+              <a:t>What to do for Next Session</a:t>
+            </a:r>
+          </a:p>
+          <a:p>
+            <a:endParaRPr lang="en-GB" sz="1200" dirty="0"/>
+          </a:p>
+          <a:p>
+            <a:r>
+              <a:rPr lang="en-GB" sz="1200" dirty="0"/>
+              <a:t>Work on sound designs for the game and the characters.</a:t>
+            </a:r>
+          </a:p>
+          <a:p>
+            <a:endParaRPr lang="en-GB" sz="1200" dirty="0"/>
+          </a:p>
+          <a:p>
+            <a:r>
+              <a:rPr lang="en-GB" sz="1200" dirty="0"/>
+              <a:t>Use audio and SFX from other horror games as reference or for the smaller sounds.</a:t>
+            </a:r>
+          </a:p>
+          <a:p>
+            <a:endParaRPr lang="en-GB" sz="1200" dirty="0"/>
+          </a:p>
+          <a:p>
+            <a:r>
+              <a:rPr lang="en-GB" sz="1200" b="1" dirty="0"/>
+              <a:t>Get Camera system operational</a:t>
+            </a:r>
+          </a:p>
+          <a:p>
+            <a:endParaRPr lang="en-GB" sz="1200" dirty="0"/>
+          </a:p>
+          <a:p>
+            <a:endParaRPr lang="en-GB" sz="1200" dirty="0"/>
+          </a:p>
+        </p:txBody>
+      </p:sp>
+      <p:pic>
+        <p:nvPicPr>
+          <p:cNvPr id="8" name="Picture 7">
+            <a:extLst>
+              <a:ext uri="{FF2B5EF4-FFF2-40B4-BE49-F238E27FC236}">
+                <a16:creationId xmlns:a16="http://schemas.microsoft.com/office/drawing/2014/main" id="{2B25F36B-7370-C022-0982-D33C4899384B}"/>
+              </a:ext>
+            </a:extLst>
+          </p:cNvPr>
+          <p:cNvPicPr>
+            <a:picLocks noChangeAspect="1"/>
+          </p:cNvPicPr>
+          <p:nvPr/>
+        </p:nvPicPr>
+        <p:blipFill>
+          <a:blip r:embed="rId2"/>
+          <a:stretch>
+            <a:fillRect/>
+          </a:stretch>
+        </p:blipFill>
+        <p:spPr>
+          <a:xfrm>
+            <a:off x="0" y="4302897"/>
+            <a:ext cx="4356284" cy="2362127"/>
+          </a:xfrm>
+          <a:prstGeom prst="rect">
+            <a:avLst/>
+          </a:prstGeom>
+        </p:spPr>
+      </p:pic>
+      <p:pic>
+        <p:nvPicPr>
+          <p:cNvPr id="10" name="Picture 9">
+            <a:extLst>
+              <a:ext uri="{FF2B5EF4-FFF2-40B4-BE49-F238E27FC236}">
+                <a16:creationId xmlns:a16="http://schemas.microsoft.com/office/drawing/2014/main" id="{330D62C2-AA53-B794-C0B6-312FEE7FF2DF}"/>
+              </a:ext>
+            </a:extLst>
+          </p:cNvPr>
+          <p:cNvPicPr>
+            <a:picLocks noChangeAspect="1"/>
+          </p:cNvPicPr>
+          <p:nvPr/>
+        </p:nvPicPr>
+        <p:blipFill>
+          <a:blip r:embed="rId3"/>
+          <a:stretch>
+            <a:fillRect/>
+          </a:stretch>
+        </p:blipFill>
+        <p:spPr>
+          <a:xfrm>
+            <a:off x="294127" y="428674"/>
+            <a:ext cx="1704008" cy="3354765"/>
+          </a:xfrm>
+          <a:prstGeom prst="rect">
+            <a:avLst/>
+          </a:prstGeom>
+        </p:spPr>
+      </p:pic>
+      <p:pic>
+        <p:nvPicPr>
+          <p:cNvPr id="13" name="Picture 12">
+            <a:extLst>
+              <a:ext uri="{FF2B5EF4-FFF2-40B4-BE49-F238E27FC236}">
+                <a16:creationId xmlns:a16="http://schemas.microsoft.com/office/drawing/2014/main" id="{350428BE-0AC0-96D2-D92A-71AD3D19FADD}"/>
+              </a:ext>
+            </a:extLst>
+          </p:cNvPr>
+          <p:cNvPicPr>
+            <a:picLocks noChangeAspect="1"/>
+          </p:cNvPicPr>
+          <p:nvPr/>
+        </p:nvPicPr>
+        <p:blipFill>
+          <a:blip r:embed="rId4"/>
+          <a:stretch>
+            <a:fillRect/>
+          </a:stretch>
+        </p:blipFill>
+        <p:spPr>
+          <a:xfrm>
+            <a:off x="2092643" y="885888"/>
+            <a:ext cx="3477110" cy="952633"/>
+          </a:xfrm>
+          <a:prstGeom prst="rect">
+            <a:avLst/>
+          </a:prstGeom>
+        </p:spPr>
+      </p:pic>
+    </p:spTree>
+    <p:extLst>
+      <p:ext uri="{BB962C8B-B14F-4D97-AF65-F5344CB8AC3E}">
+        <p14:creationId xmlns:p14="http://schemas.microsoft.com/office/powerpoint/2010/main" val="1285422550"/>
+      </p:ext>
+    </p:extLst>
+  </p:cSld>
+  <p:clrMapOvr>
+    <a:masterClrMapping/>
+  </p:clrMapOvr>
+</p:sld>
+</file>
+
+<file path=ppt/slides/slide40.xml><?xml version="1.0" encoding="utf-8"?>
 <p:sld xmlns:a="http://schemas.openxmlformats.org/drawingml/2006/main" xmlns:r="http://schemas.openxmlformats.org/officeDocument/2006/relationships" xmlns:p="http://schemas.openxmlformats.org/presentationml/2006/main">
   <p:cSld>
     <p:spTree>
@@ -17917,391 +18617,7 @@
 </p:sld>
 </file>
 
-<file path=ppt/slides/slide4.xml><?xml version="1.0" encoding="utf-8"?>
-<p:sld xmlns:a="http://schemas.openxmlformats.org/drawingml/2006/main" xmlns:r="http://schemas.openxmlformats.org/officeDocument/2006/relationships" xmlns:p="http://schemas.openxmlformats.org/presentationml/2006/main">
-  <p:cSld>
-    <p:spTree>
-      <p:nvGrpSpPr>
-        <p:cNvPr id="1" name="">
-          <a:extLst>
-            <a:ext uri="{FF2B5EF4-FFF2-40B4-BE49-F238E27FC236}">
-              <a16:creationId xmlns:a16="http://schemas.microsoft.com/office/drawing/2014/main" id="{B71AF447-2503-6E06-EB64-6A29C299795D}"/>
-            </a:ext>
-          </a:extLst>
-        </p:cNvPr>
-        <p:cNvGrpSpPr/>
-        <p:nvPr/>
-      </p:nvGrpSpPr>
-      <p:grpSpPr>
-        <a:xfrm>
-          <a:off x="0" y="0"/>
-          <a:ext cx="0" cy="0"/>
-          <a:chOff x="0" y="0"/>
-          <a:chExt cx="0" cy="0"/>
-        </a:xfrm>
-      </p:grpSpPr>
-      <p:sp>
-        <p:nvSpPr>
-          <p:cNvPr id="4" name="TextBox 3">
-            <a:extLst>
-              <a:ext uri="{FF2B5EF4-FFF2-40B4-BE49-F238E27FC236}">
-                <a16:creationId xmlns:a16="http://schemas.microsoft.com/office/drawing/2014/main" id="{3ABD7D05-D183-64C6-1BA1-72453612143E}"/>
-              </a:ext>
-            </a:extLst>
-          </p:cNvPr>
-          <p:cNvSpPr txBox="1"/>
-          <p:nvPr/>
-        </p:nvSpPr>
-        <p:spPr>
-          <a:xfrm>
-            <a:off x="7763992" y="90121"/>
-            <a:ext cx="1809641" cy="338554"/>
-          </a:xfrm>
-          <a:prstGeom prst="rect">
-            <a:avLst/>
-          </a:prstGeom>
-          <a:noFill/>
-          <a:ln>
-            <a:solidFill>
-              <a:schemeClr val="tx1"/>
-            </a:solidFill>
-          </a:ln>
-        </p:spPr>
-        <p:txBody>
-          <a:bodyPr rot="0" spcFirstLastPara="0" vertOverflow="overflow" horzOverflow="overflow" vert="horz" wrap="square" lIns="91440" tIns="45720" rIns="91440" bIns="45720" numCol="1" spcCol="0" rtlCol="0" fromWordArt="0" anchor="t" anchorCtr="0" forceAA="0" compatLnSpc="1">
-            <a:prstTxWarp prst="textNoShape">
-              <a:avLst/>
-            </a:prstTxWarp>
-            <a:spAutoFit/>
-          </a:bodyPr>
-          <a:lstStyle/>
-          <a:p>
-            <a:r>
-              <a:rPr lang="en-GB" sz="1600" dirty="0"/>
-              <a:t>Date – 24/11/2025</a:t>
-            </a:r>
-          </a:p>
-        </p:txBody>
-      </p:sp>
-      <p:sp>
-        <p:nvSpPr>
-          <p:cNvPr id="2" name="TextBox 1">
-            <a:extLst>
-              <a:ext uri="{FF2B5EF4-FFF2-40B4-BE49-F238E27FC236}">
-                <a16:creationId xmlns:a16="http://schemas.microsoft.com/office/drawing/2014/main" id="{3E37F77A-82C0-2039-AD51-40366B52EBEB}"/>
-              </a:ext>
-            </a:extLst>
-          </p:cNvPr>
-          <p:cNvSpPr txBox="1"/>
-          <p:nvPr/>
-        </p:nvSpPr>
-        <p:spPr>
-          <a:xfrm>
-            <a:off x="5651845" y="90120"/>
-            <a:ext cx="1959856" cy="338554"/>
-          </a:xfrm>
-          <a:prstGeom prst="rect">
-            <a:avLst/>
-          </a:prstGeom>
-          <a:noFill/>
-          <a:ln>
-            <a:solidFill>
-              <a:schemeClr val="tx1"/>
-            </a:solidFill>
-          </a:ln>
-        </p:spPr>
-        <p:txBody>
-          <a:bodyPr rot="0" spcFirstLastPara="0" vertOverflow="overflow" horzOverflow="overflow" vert="horz" wrap="square" lIns="91440" tIns="45720" rIns="91440" bIns="45720" numCol="1" spcCol="0" rtlCol="0" fromWordArt="0" anchor="t" anchorCtr="0" forceAA="0" compatLnSpc="1">
-            <a:prstTxWarp prst="textNoShape">
-              <a:avLst/>
-            </a:prstTxWarp>
-            <a:spAutoFit/>
-          </a:bodyPr>
-          <a:lstStyle/>
-          <a:p>
-            <a:r>
-              <a:rPr lang="en-GB" sz="1600" dirty="0"/>
-              <a:t>Game Build V.0.2</a:t>
-            </a:r>
-          </a:p>
-        </p:txBody>
-      </p:sp>
-      <p:sp>
-        <p:nvSpPr>
-          <p:cNvPr id="3" name="TextBox 2">
-            <a:extLst>
-              <a:ext uri="{FF2B5EF4-FFF2-40B4-BE49-F238E27FC236}">
-                <a16:creationId xmlns:a16="http://schemas.microsoft.com/office/drawing/2014/main" id="{2886F3E7-61E5-445C-5038-15B1F86B5A87}"/>
-              </a:ext>
-            </a:extLst>
-          </p:cNvPr>
-          <p:cNvSpPr txBox="1"/>
-          <p:nvPr/>
-        </p:nvSpPr>
-        <p:spPr>
-          <a:xfrm>
-            <a:off x="5642854" y="578678"/>
-            <a:ext cx="3926490" cy="3354765"/>
-          </a:xfrm>
-          <a:prstGeom prst="rect">
-            <a:avLst/>
-          </a:prstGeom>
-          <a:noFill/>
-          <a:ln>
-            <a:solidFill>
-              <a:schemeClr val="tx1"/>
-            </a:solidFill>
-          </a:ln>
-        </p:spPr>
-        <p:txBody>
-          <a:bodyPr rot="0" spcFirstLastPara="0" vertOverflow="overflow" horzOverflow="overflow" vert="horz" wrap="square" lIns="91440" tIns="45720" rIns="91440" bIns="45720" numCol="1" spcCol="0" rtlCol="0" fromWordArt="0" anchor="t" anchorCtr="0" forceAA="0" compatLnSpc="1">
-            <a:prstTxWarp prst="textNoShape">
-              <a:avLst/>
-            </a:prstTxWarp>
-            <a:spAutoFit/>
-          </a:bodyPr>
-          <a:lstStyle/>
-          <a:p>
-            <a:r>
-              <a:rPr lang="en-GB" sz="1400" dirty="0"/>
-              <a:t>Summary Of Session</a:t>
-            </a:r>
-          </a:p>
-          <a:p>
-            <a:endParaRPr lang="en-GB" sz="1400" dirty="0"/>
-          </a:p>
-          <a:p>
-            <a:r>
-              <a:rPr lang="en-GB" sz="1400" dirty="0"/>
-              <a:t>Refined Sprite designs such as the doors. Created template buttons for the doors both from main view and close-up view.</a:t>
-            </a:r>
-          </a:p>
-          <a:p>
-            <a:endParaRPr lang="en-GB" sz="1400" dirty="0"/>
-          </a:p>
-          <a:p>
-            <a:r>
-              <a:rPr lang="en-GB" sz="1400" dirty="0"/>
-              <a:t>Named each zones area/location.</a:t>
-            </a:r>
-          </a:p>
-          <a:p>
-            <a:endParaRPr lang="en-GB" sz="1400" dirty="0"/>
-          </a:p>
-          <a:p>
-            <a:r>
-              <a:rPr lang="en-GB" sz="1400" dirty="0"/>
-              <a:t>Created variables for </a:t>
-            </a:r>
-            <a:r>
-              <a:rPr lang="en-GB" sz="1400" dirty="0" err="1"/>
-              <a:t>obj_camera</a:t>
-            </a:r>
-            <a:r>
-              <a:rPr lang="en-GB" sz="1400" dirty="0"/>
-              <a:t>.</a:t>
-            </a:r>
-          </a:p>
-          <a:p>
-            <a:endParaRPr lang="en-GB" sz="1400" dirty="0"/>
-          </a:p>
-          <a:p>
-            <a:r>
-              <a:rPr lang="en-GB" sz="1400" dirty="0"/>
-              <a:t>Added Up close door to the up close door zones for both left and right.</a:t>
-            </a:r>
-          </a:p>
-          <a:p>
-            <a:endParaRPr lang="en-GB" sz="1400" dirty="0"/>
-          </a:p>
-          <a:p>
-            <a:endParaRPr lang="en-GB" sz="1400" dirty="0"/>
-          </a:p>
-          <a:p>
-            <a:endParaRPr lang="en-GB" sz="1600" dirty="0"/>
-          </a:p>
-        </p:txBody>
-      </p:sp>
-      <p:sp>
-        <p:nvSpPr>
-          <p:cNvPr id="6" name="TextBox 5">
-            <a:extLst>
-              <a:ext uri="{FF2B5EF4-FFF2-40B4-BE49-F238E27FC236}">
-                <a16:creationId xmlns:a16="http://schemas.microsoft.com/office/drawing/2014/main" id="{6C671371-B8F1-97C1-D2C5-BD2850E814D7}"/>
-              </a:ext>
-            </a:extLst>
-          </p:cNvPr>
-          <p:cNvSpPr txBox="1"/>
-          <p:nvPr/>
-        </p:nvSpPr>
-        <p:spPr>
-          <a:xfrm>
-            <a:off x="9642445" y="54237"/>
-            <a:ext cx="2438400" cy="2308324"/>
-          </a:xfrm>
-          <a:prstGeom prst="rect">
-            <a:avLst/>
-          </a:prstGeom>
-          <a:noFill/>
-          <a:ln>
-            <a:solidFill>
-              <a:schemeClr val="tx1"/>
-            </a:solidFill>
-          </a:ln>
-        </p:spPr>
-        <p:txBody>
-          <a:bodyPr rot="0" spcFirstLastPara="0" vertOverflow="overflow" horzOverflow="overflow" vert="horz" wrap="square" lIns="91440" tIns="45720" rIns="91440" bIns="45720" numCol="1" spcCol="0" rtlCol="0" fromWordArt="0" anchor="t" anchorCtr="0" forceAA="0" compatLnSpc="1">
-            <a:prstTxWarp prst="textNoShape">
-              <a:avLst/>
-            </a:prstTxWarp>
-            <a:spAutoFit/>
-          </a:bodyPr>
-          <a:lstStyle/>
-          <a:p>
-            <a:r>
-              <a:rPr lang="en-GB" sz="1200" dirty="0"/>
-              <a:t>What to do for Next Session</a:t>
-            </a:r>
-          </a:p>
-          <a:p>
-            <a:endParaRPr lang="en-GB" sz="1200" dirty="0"/>
-          </a:p>
-          <a:p>
-            <a:r>
-              <a:rPr lang="en-GB" sz="1200" dirty="0"/>
-              <a:t>Work on sound designs for the game and the characters.</a:t>
-            </a:r>
-          </a:p>
-          <a:p>
-            <a:endParaRPr lang="en-GB" sz="1200" dirty="0"/>
-          </a:p>
-          <a:p>
-            <a:r>
-              <a:rPr lang="en-GB" sz="1200" dirty="0"/>
-              <a:t>Use audio and SFX from other horror games as reference or for the smaller sounds.</a:t>
-            </a:r>
-          </a:p>
-          <a:p>
-            <a:endParaRPr lang="en-GB" sz="1200" dirty="0"/>
-          </a:p>
-          <a:p>
-            <a:r>
-              <a:rPr lang="en-GB" sz="1200" b="1" dirty="0"/>
-              <a:t>Get Camera system operational</a:t>
-            </a:r>
-          </a:p>
-          <a:p>
-            <a:endParaRPr lang="en-GB" sz="1200" dirty="0"/>
-          </a:p>
-          <a:p>
-            <a:endParaRPr lang="en-GB" sz="1200" dirty="0"/>
-          </a:p>
-        </p:txBody>
-      </p:sp>
-      <p:pic>
-        <p:nvPicPr>
-          <p:cNvPr id="8" name="Picture 7">
-            <a:extLst>
-              <a:ext uri="{FF2B5EF4-FFF2-40B4-BE49-F238E27FC236}">
-                <a16:creationId xmlns:a16="http://schemas.microsoft.com/office/drawing/2014/main" id="{2B25F36B-7370-C022-0982-D33C4899384B}"/>
-              </a:ext>
-            </a:extLst>
-          </p:cNvPr>
-          <p:cNvPicPr>
-            <a:picLocks noChangeAspect="1"/>
-          </p:cNvPicPr>
-          <p:nvPr/>
-        </p:nvPicPr>
-        <p:blipFill>
-          <a:blip r:embed="rId2"/>
-          <a:stretch>
-            <a:fillRect/>
-          </a:stretch>
-        </p:blipFill>
-        <p:spPr>
-          <a:xfrm>
-            <a:off x="0" y="4302897"/>
-            <a:ext cx="4356284" cy="2362127"/>
-          </a:xfrm>
-          <a:prstGeom prst="rect">
-            <a:avLst/>
-          </a:prstGeom>
-        </p:spPr>
-      </p:pic>
-      <p:pic>
-        <p:nvPicPr>
-          <p:cNvPr id="10" name="Picture 9">
-            <a:extLst>
-              <a:ext uri="{FF2B5EF4-FFF2-40B4-BE49-F238E27FC236}">
-                <a16:creationId xmlns:a16="http://schemas.microsoft.com/office/drawing/2014/main" id="{330D62C2-AA53-B794-C0B6-312FEE7FF2DF}"/>
-              </a:ext>
-            </a:extLst>
-          </p:cNvPr>
-          <p:cNvPicPr>
-            <a:picLocks noChangeAspect="1"/>
-          </p:cNvPicPr>
-          <p:nvPr/>
-        </p:nvPicPr>
-        <p:blipFill>
-          <a:blip r:embed="rId3"/>
-          <a:stretch>
-            <a:fillRect/>
-          </a:stretch>
-        </p:blipFill>
-        <p:spPr>
-          <a:xfrm>
-            <a:off x="294127" y="428674"/>
-            <a:ext cx="1704008" cy="3354765"/>
-          </a:xfrm>
-          <a:prstGeom prst="rect">
-            <a:avLst/>
-          </a:prstGeom>
-        </p:spPr>
-      </p:pic>
-      <p:pic>
-        <p:nvPicPr>
-          <p:cNvPr id="13" name="Picture 12">
-            <a:extLst>
-              <a:ext uri="{FF2B5EF4-FFF2-40B4-BE49-F238E27FC236}">
-                <a16:creationId xmlns:a16="http://schemas.microsoft.com/office/drawing/2014/main" id="{350428BE-0AC0-96D2-D92A-71AD3D19FADD}"/>
-              </a:ext>
-            </a:extLst>
-          </p:cNvPr>
-          <p:cNvPicPr>
-            <a:picLocks noChangeAspect="1"/>
-          </p:cNvPicPr>
-          <p:nvPr/>
-        </p:nvPicPr>
-        <p:blipFill>
-          <a:blip r:embed="rId4"/>
-          <a:stretch>
-            <a:fillRect/>
-          </a:stretch>
-        </p:blipFill>
-        <p:spPr>
-          <a:xfrm>
-            <a:off x="2092643" y="885888"/>
-            <a:ext cx="3477110" cy="952633"/>
-          </a:xfrm>
-          <a:prstGeom prst="rect">
-            <a:avLst/>
-          </a:prstGeom>
-        </p:spPr>
-      </p:pic>
-    </p:spTree>
-    <p:extLst>
-      <p:ext uri="{BB962C8B-B14F-4D97-AF65-F5344CB8AC3E}">
-        <p14:creationId xmlns:p14="http://schemas.microsoft.com/office/powerpoint/2010/main" val="1285422550"/>
-      </p:ext>
-    </p:extLst>
-  </p:cSld>
-  <p:clrMapOvr>
-    <a:masterClrMapping/>
-  </p:clrMapOvr>
-</p:sld>
-</file>
-
-<file path=ppt/slides/slide40.xml><?xml version="1.0" encoding="utf-8"?>
+<file path=ppt/slides/slide41.xml><?xml version="1.0" encoding="utf-8"?>
 <p:sld xmlns:a="http://schemas.openxmlformats.org/drawingml/2006/main" xmlns:r="http://schemas.openxmlformats.org/officeDocument/2006/relationships" xmlns:p="http://schemas.openxmlformats.org/presentationml/2006/main">
   <p:cSld>
     <p:spTree>

</xml_diff>